<commit_message>
add mediator example and open source usages
</commit_message>
<xml_diff>
--- a/PPT Presentations/DesignPatterns-BehavioralPatterns.pptx
+++ b/PPT Presentations/DesignPatterns-BehavioralPatterns.pptx
@@ -5,13 +5,15 @@
     <p:sldMasterId id="2147483660" r:id="rId4"/>
   </p:sldMasterIdLst>
   <p:notesMasterIdLst>
-    <p:notesMasterId r:id="rId9"/>
+    <p:notesMasterId r:id="rId11"/>
   </p:notesMasterIdLst>
   <p:sldIdLst>
     <p:sldId id="287" r:id="rId5"/>
     <p:sldId id="288" r:id="rId6"/>
     <p:sldId id="289" r:id="rId7"/>
     <p:sldId id="291" r:id="rId8"/>
+    <p:sldId id="292" r:id="rId9"/>
+    <p:sldId id="293" r:id="rId10"/>
   </p:sldIdLst>
   <p:sldSz cx="12192000" cy="6858000"/>
   <p:notesSz cx="6858000" cy="9144000"/>
@@ -119,6 +121,753 @@
 </file>
 
 <file path=ppt/diagrams/colors1.xml><?xml version="1.0" encoding="utf-8"?>
+<dgm:colorsDef xmlns:dgm="http://schemas.openxmlformats.org/drawingml/2006/diagram" xmlns:a="http://schemas.openxmlformats.org/drawingml/2006/main" uniqueId="urn:microsoft.com/office/officeart/2005/8/colors/accent1_2">
+  <dgm:title val=""/>
+  <dgm:desc val=""/>
+  <dgm:catLst>
+    <dgm:cat type="accent1" pri="11200"/>
+  </dgm:catLst>
+  <dgm:styleLbl name="node0">
+    <dgm:fillClrLst meth="repeat">
+      <a:schemeClr val="accent1"/>
+    </dgm:fillClrLst>
+    <dgm:linClrLst meth="repeat">
+      <a:schemeClr val="lt1"/>
+    </dgm:linClrLst>
+    <dgm:effectClrLst/>
+    <dgm:txLinClrLst/>
+    <dgm:txFillClrLst/>
+    <dgm:txEffectClrLst/>
+  </dgm:styleLbl>
+  <dgm:styleLbl name="alignNode1">
+    <dgm:fillClrLst meth="repeat">
+      <a:schemeClr val="accent1"/>
+    </dgm:fillClrLst>
+    <dgm:linClrLst meth="repeat">
+      <a:schemeClr val="accent1"/>
+    </dgm:linClrLst>
+    <dgm:effectClrLst/>
+    <dgm:txLinClrLst/>
+    <dgm:txFillClrLst/>
+    <dgm:txEffectClrLst/>
+  </dgm:styleLbl>
+  <dgm:styleLbl name="node1">
+    <dgm:fillClrLst meth="repeat">
+      <a:schemeClr val="accent1"/>
+    </dgm:fillClrLst>
+    <dgm:linClrLst meth="repeat">
+      <a:schemeClr val="lt1"/>
+    </dgm:linClrLst>
+    <dgm:effectClrLst/>
+    <dgm:txLinClrLst/>
+    <dgm:txFillClrLst/>
+    <dgm:txEffectClrLst/>
+  </dgm:styleLbl>
+  <dgm:styleLbl name="lnNode1">
+    <dgm:fillClrLst meth="repeat">
+      <a:schemeClr val="accent1"/>
+    </dgm:fillClrLst>
+    <dgm:linClrLst meth="repeat">
+      <a:schemeClr val="lt1"/>
+    </dgm:linClrLst>
+    <dgm:effectClrLst/>
+    <dgm:txLinClrLst/>
+    <dgm:txFillClrLst/>
+    <dgm:txEffectClrLst/>
+  </dgm:styleLbl>
+  <dgm:styleLbl name="vennNode1">
+    <dgm:fillClrLst meth="repeat">
+      <a:schemeClr val="accent1">
+        <a:alpha val="50000"/>
+      </a:schemeClr>
+    </dgm:fillClrLst>
+    <dgm:linClrLst meth="repeat">
+      <a:schemeClr val="lt1"/>
+    </dgm:linClrLst>
+    <dgm:effectClrLst/>
+    <dgm:txLinClrLst/>
+    <dgm:txFillClrLst/>
+    <dgm:txEffectClrLst/>
+  </dgm:styleLbl>
+  <dgm:styleLbl name="node2">
+    <dgm:fillClrLst meth="repeat">
+      <a:schemeClr val="accent1"/>
+    </dgm:fillClrLst>
+    <dgm:linClrLst meth="repeat">
+      <a:schemeClr val="lt1"/>
+    </dgm:linClrLst>
+    <dgm:effectClrLst/>
+    <dgm:txLinClrLst/>
+    <dgm:txFillClrLst/>
+    <dgm:txEffectClrLst/>
+  </dgm:styleLbl>
+  <dgm:styleLbl name="node3">
+    <dgm:fillClrLst meth="repeat">
+      <a:schemeClr val="accent1"/>
+    </dgm:fillClrLst>
+    <dgm:linClrLst meth="repeat">
+      <a:schemeClr val="lt1"/>
+    </dgm:linClrLst>
+    <dgm:effectClrLst/>
+    <dgm:txLinClrLst/>
+    <dgm:txFillClrLst/>
+    <dgm:txEffectClrLst/>
+  </dgm:styleLbl>
+  <dgm:styleLbl name="node4">
+    <dgm:fillClrLst meth="repeat">
+      <a:schemeClr val="accent1"/>
+    </dgm:fillClrLst>
+    <dgm:linClrLst meth="repeat">
+      <a:schemeClr val="lt1"/>
+    </dgm:linClrLst>
+    <dgm:effectClrLst/>
+    <dgm:txLinClrLst/>
+    <dgm:txFillClrLst/>
+    <dgm:txEffectClrLst/>
+  </dgm:styleLbl>
+  <dgm:styleLbl name="fgImgPlace1">
+    <dgm:fillClrLst meth="repeat">
+      <a:schemeClr val="accent1">
+        <a:tint val="50000"/>
+      </a:schemeClr>
+    </dgm:fillClrLst>
+    <dgm:linClrLst meth="repeat">
+      <a:schemeClr val="lt1"/>
+    </dgm:linClrLst>
+    <dgm:effectClrLst/>
+    <dgm:txLinClrLst/>
+    <dgm:txFillClrLst meth="repeat">
+      <a:schemeClr val="lt1"/>
+    </dgm:txFillClrLst>
+    <dgm:txEffectClrLst/>
+  </dgm:styleLbl>
+  <dgm:styleLbl name="alignImgPlace1">
+    <dgm:fillClrLst meth="repeat">
+      <a:schemeClr val="accent1">
+        <a:tint val="50000"/>
+      </a:schemeClr>
+    </dgm:fillClrLst>
+    <dgm:linClrLst meth="repeat">
+      <a:schemeClr val="lt1"/>
+    </dgm:linClrLst>
+    <dgm:effectClrLst/>
+    <dgm:txLinClrLst/>
+    <dgm:txFillClrLst meth="repeat">
+      <a:schemeClr val="lt1"/>
+    </dgm:txFillClrLst>
+    <dgm:txEffectClrLst/>
+  </dgm:styleLbl>
+  <dgm:styleLbl name="bgImgPlace1">
+    <dgm:fillClrLst meth="repeat">
+      <a:schemeClr val="accent1">
+        <a:tint val="50000"/>
+      </a:schemeClr>
+    </dgm:fillClrLst>
+    <dgm:linClrLst meth="repeat">
+      <a:schemeClr val="lt1"/>
+    </dgm:linClrLst>
+    <dgm:effectClrLst/>
+    <dgm:txLinClrLst/>
+    <dgm:txFillClrLst meth="repeat">
+      <a:schemeClr val="lt1"/>
+    </dgm:txFillClrLst>
+    <dgm:txEffectClrLst/>
+  </dgm:styleLbl>
+  <dgm:styleLbl name="sibTrans2D1">
+    <dgm:fillClrLst meth="repeat">
+      <a:schemeClr val="accent1">
+        <a:tint val="60000"/>
+      </a:schemeClr>
+    </dgm:fillClrLst>
+    <dgm:linClrLst meth="repeat">
+      <a:schemeClr val="accent1">
+        <a:tint val="60000"/>
+      </a:schemeClr>
+    </dgm:linClrLst>
+    <dgm:effectClrLst/>
+    <dgm:txLinClrLst/>
+    <dgm:txFillClrLst/>
+    <dgm:txEffectClrLst/>
+  </dgm:styleLbl>
+  <dgm:styleLbl name="fgSibTrans2D1">
+    <dgm:fillClrLst meth="repeat">
+      <a:schemeClr val="accent1">
+        <a:tint val="60000"/>
+      </a:schemeClr>
+    </dgm:fillClrLst>
+    <dgm:linClrLst meth="repeat">
+      <a:schemeClr val="accent1">
+        <a:tint val="60000"/>
+      </a:schemeClr>
+    </dgm:linClrLst>
+    <dgm:effectClrLst/>
+    <dgm:txLinClrLst/>
+    <dgm:txFillClrLst/>
+    <dgm:txEffectClrLst/>
+  </dgm:styleLbl>
+  <dgm:styleLbl name="bgSibTrans2D1">
+    <dgm:fillClrLst meth="repeat">
+      <a:schemeClr val="accent1">
+        <a:tint val="60000"/>
+      </a:schemeClr>
+    </dgm:fillClrLst>
+    <dgm:linClrLst meth="repeat">
+      <a:schemeClr val="accent1">
+        <a:tint val="60000"/>
+      </a:schemeClr>
+    </dgm:linClrLst>
+    <dgm:effectClrLst/>
+    <dgm:txLinClrLst/>
+    <dgm:txFillClrLst/>
+    <dgm:txEffectClrLst/>
+  </dgm:styleLbl>
+  <dgm:styleLbl name="sibTrans1D1">
+    <dgm:fillClrLst meth="repeat">
+      <a:schemeClr val="accent1"/>
+    </dgm:fillClrLst>
+    <dgm:linClrLst meth="repeat">
+      <a:schemeClr val="accent1"/>
+    </dgm:linClrLst>
+    <dgm:effectClrLst/>
+    <dgm:txLinClrLst/>
+    <dgm:txFillClrLst meth="repeat">
+      <a:schemeClr val="tx1"/>
+    </dgm:txFillClrLst>
+    <dgm:txEffectClrLst/>
+  </dgm:styleLbl>
+  <dgm:styleLbl name="callout">
+    <dgm:fillClrLst meth="repeat">
+      <a:schemeClr val="accent1"/>
+    </dgm:fillClrLst>
+    <dgm:linClrLst meth="repeat">
+      <a:schemeClr val="accent1">
+        <a:tint val="50000"/>
+      </a:schemeClr>
+    </dgm:linClrLst>
+    <dgm:effectClrLst/>
+    <dgm:txLinClrLst/>
+    <dgm:txFillClrLst meth="repeat">
+      <a:schemeClr val="tx1"/>
+    </dgm:txFillClrLst>
+    <dgm:txEffectClrLst/>
+  </dgm:styleLbl>
+  <dgm:styleLbl name="asst0">
+    <dgm:fillClrLst meth="repeat">
+      <a:schemeClr val="accent1"/>
+    </dgm:fillClrLst>
+    <dgm:linClrLst meth="repeat">
+      <a:schemeClr val="lt1"/>
+    </dgm:linClrLst>
+    <dgm:effectClrLst/>
+    <dgm:txLinClrLst/>
+    <dgm:txFillClrLst/>
+    <dgm:txEffectClrLst/>
+  </dgm:styleLbl>
+  <dgm:styleLbl name="asst1">
+    <dgm:fillClrLst meth="repeat">
+      <a:schemeClr val="accent1"/>
+    </dgm:fillClrLst>
+    <dgm:linClrLst meth="repeat">
+      <a:schemeClr val="lt1"/>
+    </dgm:linClrLst>
+    <dgm:effectClrLst/>
+    <dgm:txLinClrLst/>
+    <dgm:txFillClrLst/>
+    <dgm:txEffectClrLst/>
+  </dgm:styleLbl>
+  <dgm:styleLbl name="asst2">
+    <dgm:fillClrLst meth="repeat">
+      <a:schemeClr val="accent1"/>
+    </dgm:fillClrLst>
+    <dgm:linClrLst meth="repeat">
+      <a:schemeClr val="lt1"/>
+    </dgm:linClrLst>
+    <dgm:effectClrLst/>
+    <dgm:txLinClrLst/>
+    <dgm:txFillClrLst/>
+    <dgm:txEffectClrLst/>
+  </dgm:styleLbl>
+  <dgm:styleLbl name="asst3">
+    <dgm:fillClrLst meth="repeat">
+      <a:schemeClr val="accent1"/>
+    </dgm:fillClrLst>
+    <dgm:linClrLst meth="repeat">
+      <a:schemeClr val="lt1"/>
+    </dgm:linClrLst>
+    <dgm:effectClrLst/>
+    <dgm:txLinClrLst/>
+    <dgm:txFillClrLst/>
+    <dgm:txEffectClrLst/>
+  </dgm:styleLbl>
+  <dgm:styleLbl name="asst4">
+    <dgm:fillClrLst meth="repeat">
+      <a:schemeClr val="accent1"/>
+    </dgm:fillClrLst>
+    <dgm:linClrLst meth="repeat">
+      <a:schemeClr val="lt1"/>
+    </dgm:linClrLst>
+    <dgm:effectClrLst/>
+    <dgm:txLinClrLst/>
+    <dgm:txFillClrLst/>
+    <dgm:txEffectClrLst/>
+  </dgm:styleLbl>
+  <dgm:styleLbl name="parChTrans2D1">
+    <dgm:fillClrLst meth="repeat">
+      <a:schemeClr val="accent1">
+        <a:tint val="60000"/>
+      </a:schemeClr>
+    </dgm:fillClrLst>
+    <dgm:linClrLst meth="repeat">
+      <a:schemeClr val="accent1">
+        <a:tint val="60000"/>
+      </a:schemeClr>
+    </dgm:linClrLst>
+    <dgm:effectClrLst/>
+    <dgm:txLinClrLst/>
+    <dgm:txFillClrLst meth="repeat">
+      <a:schemeClr val="lt1"/>
+    </dgm:txFillClrLst>
+    <dgm:txEffectClrLst/>
+  </dgm:styleLbl>
+  <dgm:styleLbl name="parChTrans2D2">
+    <dgm:fillClrLst meth="repeat">
+      <a:schemeClr val="accent1"/>
+    </dgm:fillClrLst>
+    <dgm:linClrLst meth="repeat">
+      <a:schemeClr val="accent1"/>
+    </dgm:linClrLst>
+    <dgm:effectClrLst/>
+    <dgm:txLinClrLst/>
+    <dgm:txFillClrLst meth="repeat">
+      <a:schemeClr val="lt1"/>
+    </dgm:txFillClrLst>
+    <dgm:txEffectClrLst/>
+  </dgm:styleLbl>
+  <dgm:styleLbl name="parChTrans2D3">
+    <dgm:fillClrLst meth="repeat">
+      <a:schemeClr val="accent1"/>
+    </dgm:fillClrLst>
+    <dgm:linClrLst meth="repeat">
+      <a:schemeClr val="accent1"/>
+    </dgm:linClrLst>
+    <dgm:effectClrLst/>
+    <dgm:txLinClrLst/>
+    <dgm:txFillClrLst meth="repeat">
+      <a:schemeClr val="lt1"/>
+    </dgm:txFillClrLst>
+    <dgm:txEffectClrLst/>
+  </dgm:styleLbl>
+  <dgm:styleLbl name="parChTrans2D4">
+    <dgm:fillClrLst meth="repeat">
+      <a:schemeClr val="accent1"/>
+    </dgm:fillClrLst>
+    <dgm:linClrLst meth="repeat">
+      <a:schemeClr val="accent1"/>
+    </dgm:linClrLst>
+    <dgm:effectClrLst/>
+    <dgm:txLinClrLst/>
+    <dgm:txFillClrLst meth="repeat">
+      <a:schemeClr val="lt1"/>
+    </dgm:txFillClrLst>
+    <dgm:txEffectClrLst/>
+  </dgm:styleLbl>
+  <dgm:styleLbl name="parChTrans1D1">
+    <dgm:fillClrLst meth="repeat">
+      <a:schemeClr val="accent1"/>
+    </dgm:fillClrLst>
+    <dgm:linClrLst meth="repeat">
+      <a:schemeClr val="accent1">
+        <a:shade val="60000"/>
+      </a:schemeClr>
+    </dgm:linClrLst>
+    <dgm:effectClrLst/>
+    <dgm:txLinClrLst/>
+    <dgm:txFillClrLst meth="repeat">
+      <a:schemeClr val="tx1"/>
+    </dgm:txFillClrLst>
+    <dgm:txEffectClrLst/>
+  </dgm:styleLbl>
+  <dgm:styleLbl name="parChTrans1D2">
+    <dgm:fillClrLst meth="repeat">
+      <a:schemeClr val="accent1"/>
+    </dgm:fillClrLst>
+    <dgm:linClrLst meth="repeat">
+      <a:schemeClr val="accent1">
+        <a:shade val="60000"/>
+      </a:schemeClr>
+    </dgm:linClrLst>
+    <dgm:effectClrLst/>
+    <dgm:txLinClrLst/>
+    <dgm:txFillClrLst meth="repeat">
+      <a:schemeClr val="tx1"/>
+    </dgm:txFillClrLst>
+    <dgm:txEffectClrLst/>
+  </dgm:styleLbl>
+  <dgm:styleLbl name="parChTrans1D3">
+    <dgm:fillClrLst meth="repeat">
+      <a:schemeClr val="accent1"/>
+    </dgm:fillClrLst>
+    <dgm:linClrLst meth="repeat">
+      <a:schemeClr val="accent1">
+        <a:shade val="80000"/>
+      </a:schemeClr>
+    </dgm:linClrLst>
+    <dgm:effectClrLst/>
+    <dgm:txLinClrLst/>
+    <dgm:txFillClrLst meth="repeat">
+      <a:schemeClr val="tx1"/>
+    </dgm:txFillClrLst>
+    <dgm:txEffectClrLst/>
+  </dgm:styleLbl>
+  <dgm:styleLbl name="parChTrans1D4">
+    <dgm:fillClrLst meth="repeat">
+      <a:schemeClr val="accent1"/>
+    </dgm:fillClrLst>
+    <dgm:linClrLst meth="repeat">
+      <a:schemeClr val="accent1">
+        <a:shade val="80000"/>
+      </a:schemeClr>
+    </dgm:linClrLst>
+    <dgm:effectClrLst/>
+    <dgm:txLinClrLst/>
+    <dgm:txFillClrLst meth="repeat">
+      <a:schemeClr val="tx1"/>
+    </dgm:txFillClrLst>
+    <dgm:txEffectClrLst/>
+  </dgm:styleLbl>
+  <dgm:styleLbl name="fgAcc1">
+    <dgm:fillClrLst meth="repeat">
+      <a:schemeClr val="lt1">
+        <a:alpha val="90000"/>
+      </a:schemeClr>
+    </dgm:fillClrLst>
+    <dgm:linClrLst meth="repeat">
+      <a:schemeClr val="accent1"/>
+    </dgm:linClrLst>
+    <dgm:effectClrLst/>
+    <dgm:txLinClrLst/>
+    <dgm:txFillClrLst meth="repeat">
+      <a:schemeClr val="dk1"/>
+    </dgm:txFillClrLst>
+    <dgm:txEffectClrLst/>
+  </dgm:styleLbl>
+  <dgm:styleLbl name="conFgAcc1">
+    <dgm:fillClrLst meth="repeat">
+      <a:schemeClr val="lt1">
+        <a:alpha val="90000"/>
+      </a:schemeClr>
+    </dgm:fillClrLst>
+    <dgm:linClrLst meth="repeat">
+      <a:schemeClr val="accent1"/>
+    </dgm:linClrLst>
+    <dgm:effectClrLst/>
+    <dgm:txLinClrLst/>
+    <dgm:txFillClrLst meth="repeat">
+      <a:schemeClr val="dk1"/>
+    </dgm:txFillClrLst>
+    <dgm:txEffectClrLst/>
+  </dgm:styleLbl>
+  <dgm:styleLbl name="alignAcc1">
+    <dgm:fillClrLst meth="repeat">
+      <a:schemeClr val="lt1">
+        <a:alpha val="90000"/>
+      </a:schemeClr>
+    </dgm:fillClrLst>
+    <dgm:linClrLst meth="repeat">
+      <a:schemeClr val="accent1"/>
+    </dgm:linClrLst>
+    <dgm:effectClrLst/>
+    <dgm:txLinClrLst/>
+    <dgm:txFillClrLst meth="repeat">
+      <a:schemeClr val="dk1"/>
+    </dgm:txFillClrLst>
+    <dgm:txEffectClrLst/>
+  </dgm:styleLbl>
+  <dgm:styleLbl name="trAlignAcc1">
+    <dgm:fillClrLst meth="repeat">
+      <a:schemeClr val="lt1">
+        <a:alpha val="40000"/>
+      </a:schemeClr>
+    </dgm:fillClrLst>
+    <dgm:linClrLst meth="repeat">
+      <a:schemeClr val="accent1"/>
+    </dgm:linClrLst>
+    <dgm:effectClrLst/>
+    <dgm:txLinClrLst/>
+    <dgm:txFillClrLst meth="repeat">
+      <a:schemeClr val="dk1"/>
+    </dgm:txFillClrLst>
+    <dgm:txEffectClrLst/>
+  </dgm:styleLbl>
+  <dgm:styleLbl name="bgAcc1">
+    <dgm:fillClrLst meth="repeat">
+      <a:schemeClr val="lt1">
+        <a:alpha val="90000"/>
+      </a:schemeClr>
+    </dgm:fillClrLst>
+    <dgm:linClrLst meth="repeat">
+      <a:schemeClr val="accent1"/>
+    </dgm:linClrLst>
+    <dgm:effectClrLst/>
+    <dgm:txLinClrLst/>
+    <dgm:txFillClrLst meth="repeat">
+      <a:schemeClr val="dk1"/>
+    </dgm:txFillClrLst>
+    <dgm:txEffectClrLst/>
+  </dgm:styleLbl>
+  <dgm:styleLbl name="solidFgAcc1">
+    <dgm:fillClrLst meth="repeat">
+      <a:schemeClr val="lt1"/>
+    </dgm:fillClrLst>
+    <dgm:linClrLst meth="repeat">
+      <a:schemeClr val="accent1"/>
+    </dgm:linClrLst>
+    <dgm:effectClrLst/>
+    <dgm:txLinClrLst/>
+    <dgm:txFillClrLst meth="repeat">
+      <a:schemeClr val="dk1"/>
+    </dgm:txFillClrLst>
+    <dgm:txEffectClrLst/>
+  </dgm:styleLbl>
+  <dgm:styleLbl name="solidAlignAcc1">
+    <dgm:fillClrLst meth="repeat">
+      <a:schemeClr val="lt1"/>
+    </dgm:fillClrLst>
+    <dgm:linClrLst meth="repeat">
+      <a:schemeClr val="accent1"/>
+    </dgm:linClrLst>
+    <dgm:effectClrLst/>
+    <dgm:txLinClrLst/>
+    <dgm:txFillClrLst meth="repeat">
+      <a:schemeClr val="dk1"/>
+    </dgm:txFillClrLst>
+    <dgm:txEffectClrLst/>
+  </dgm:styleLbl>
+  <dgm:styleLbl name="solidBgAcc1">
+    <dgm:fillClrLst meth="repeat">
+      <a:schemeClr val="lt1"/>
+    </dgm:fillClrLst>
+    <dgm:linClrLst meth="repeat">
+      <a:schemeClr val="accent1"/>
+    </dgm:linClrLst>
+    <dgm:effectClrLst/>
+    <dgm:txLinClrLst/>
+    <dgm:txFillClrLst meth="repeat">
+      <a:schemeClr val="dk1"/>
+    </dgm:txFillClrLst>
+    <dgm:txEffectClrLst/>
+  </dgm:styleLbl>
+  <dgm:styleLbl name="fgAccFollowNode1">
+    <dgm:fillClrLst meth="repeat">
+      <a:schemeClr val="accent1">
+        <a:alpha val="90000"/>
+        <a:tint val="40000"/>
+      </a:schemeClr>
+    </dgm:fillClrLst>
+    <dgm:linClrLst meth="repeat">
+      <a:schemeClr val="accent1">
+        <a:alpha val="90000"/>
+        <a:tint val="40000"/>
+      </a:schemeClr>
+    </dgm:linClrLst>
+    <dgm:effectClrLst/>
+    <dgm:txLinClrLst/>
+    <dgm:txFillClrLst meth="repeat">
+      <a:schemeClr val="dk1"/>
+    </dgm:txFillClrLst>
+    <dgm:txEffectClrLst/>
+  </dgm:styleLbl>
+  <dgm:styleLbl name="alignAccFollowNode1">
+    <dgm:fillClrLst meth="repeat">
+      <a:schemeClr val="accent1">
+        <a:alpha val="90000"/>
+        <a:tint val="40000"/>
+      </a:schemeClr>
+    </dgm:fillClrLst>
+    <dgm:linClrLst meth="repeat">
+      <a:schemeClr val="accent1">
+        <a:alpha val="90000"/>
+        <a:tint val="40000"/>
+      </a:schemeClr>
+    </dgm:linClrLst>
+    <dgm:effectClrLst/>
+    <dgm:txLinClrLst/>
+    <dgm:txFillClrLst meth="repeat">
+      <a:schemeClr val="dk1"/>
+    </dgm:txFillClrLst>
+    <dgm:txEffectClrLst/>
+  </dgm:styleLbl>
+  <dgm:styleLbl name="bgAccFollowNode1">
+    <dgm:fillClrLst meth="repeat">
+      <a:schemeClr val="accent1">
+        <a:alpha val="90000"/>
+        <a:tint val="40000"/>
+      </a:schemeClr>
+    </dgm:fillClrLst>
+    <dgm:linClrLst meth="repeat">
+      <a:schemeClr val="accent1">
+        <a:alpha val="90000"/>
+        <a:tint val="40000"/>
+      </a:schemeClr>
+    </dgm:linClrLst>
+    <dgm:effectClrLst/>
+    <dgm:txLinClrLst/>
+    <dgm:txFillClrLst meth="repeat">
+      <a:schemeClr val="dk1"/>
+    </dgm:txFillClrLst>
+    <dgm:txEffectClrLst/>
+  </dgm:styleLbl>
+  <dgm:styleLbl name="fgAcc0">
+    <dgm:fillClrLst meth="repeat">
+      <a:schemeClr val="lt1">
+        <a:alpha val="90000"/>
+      </a:schemeClr>
+    </dgm:fillClrLst>
+    <dgm:linClrLst meth="repeat">
+      <a:schemeClr val="accent1"/>
+    </dgm:linClrLst>
+    <dgm:effectClrLst/>
+    <dgm:txLinClrLst/>
+    <dgm:txFillClrLst meth="repeat">
+      <a:schemeClr val="dk1"/>
+    </dgm:txFillClrLst>
+    <dgm:txEffectClrLst/>
+  </dgm:styleLbl>
+  <dgm:styleLbl name="fgAcc2">
+    <dgm:fillClrLst meth="repeat">
+      <a:schemeClr val="lt1">
+        <a:alpha val="90000"/>
+      </a:schemeClr>
+    </dgm:fillClrLst>
+    <dgm:linClrLst meth="repeat">
+      <a:schemeClr val="accent1"/>
+    </dgm:linClrLst>
+    <dgm:effectClrLst/>
+    <dgm:txLinClrLst/>
+    <dgm:txFillClrLst meth="repeat">
+      <a:schemeClr val="dk1"/>
+    </dgm:txFillClrLst>
+    <dgm:txEffectClrLst/>
+  </dgm:styleLbl>
+  <dgm:styleLbl name="fgAcc3">
+    <dgm:fillClrLst meth="repeat">
+      <a:schemeClr val="lt1">
+        <a:alpha val="90000"/>
+      </a:schemeClr>
+    </dgm:fillClrLst>
+    <dgm:linClrLst meth="repeat">
+      <a:schemeClr val="accent1"/>
+    </dgm:linClrLst>
+    <dgm:effectClrLst/>
+    <dgm:txLinClrLst/>
+    <dgm:txFillClrLst meth="repeat">
+      <a:schemeClr val="dk1"/>
+    </dgm:txFillClrLst>
+    <dgm:txEffectClrLst/>
+  </dgm:styleLbl>
+  <dgm:styleLbl name="fgAcc4">
+    <dgm:fillClrLst meth="repeat">
+      <a:schemeClr val="lt1">
+        <a:alpha val="90000"/>
+      </a:schemeClr>
+    </dgm:fillClrLst>
+    <dgm:linClrLst meth="repeat">
+      <a:schemeClr val="accent1"/>
+    </dgm:linClrLst>
+    <dgm:effectClrLst/>
+    <dgm:txLinClrLst/>
+    <dgm:txFillClrLst meth="repeat">
+      <a:schemeClr val="dk1"/>
+    </dgm:txFillClrLst>
+    <dgm:txEffectClrLst/>
+  </dgm:styleLbl>
+  <dgm:styleLbl name="bgShp">
+    <dgm:fillClrLst meth="repeat">
+      <a:schemeClr val="accent1">
+        <a:tint val="40000"/>
+      </a:schemeClr>
+    </dgm:fillClrLst>
+    <dgm:linClrLst meth="repeat">
+      <a:schemeClr val="accent1"/>
+    </dgm:linClrLst>
+    <dgm:effectClrLst/>
+    <dgm:txLinClrLst/>
+    <dgm:txFillClrLst meth="repeat">
+      <a:schemeClr val="dk1"/>
+    </dgm:txFillClrLst>
+    <dgm:txEffectClrLst/>
+  </dgm:styleLbl>
+  <dgm:styleLbl name="dkBgShp">
+    <dgm:fillClrLst meth="repeat">
+      <a:schemeClr val="accent1">
+        <a:shade val="80000"/>
+      </a:schemeClr>
+    </dgm:fillClrLst>
+    <dgm:linClrLst meth="repeat">
+      <a:schemeClr val="accent1"/>
+    </dgm:linClrLst>
+    <dgm:effectClrLst/>
+    <dgm:txLinClrLst/>
+    <dgm:txFillClrLst meth="repeat">
+      <a:schemeClr val="lt1"/>
+    </dgm:txFillClrLst>
+    <dgm:txEffectClrLst/>
+  </dgm:styleLbl>
+  <dgm:styleLbl name="trBgShp">
+    <dgm:fillClrLst meth="repeat">
+      <a:schemeClr val="accent1">
+        <a:tint val="50000"/>
+        <a:alpha val="40000"/>
+      </a:schemeClr>
+    </dgm:fillClrLst>
+    <dgm:linClrLst meth="repeat">
+      <a:schemeClr val="accent1"/>
+    </dgm:linClrLst>
+    <dgm:effectClrLst/>
+    <dgm:txLinClrLst/>
+    <dgm:txFillClrLst meth="repeat">
+      <a:schemeClr val="lt1"/>
+    </dgm:txFillClrLst>
+    <dgm:txEffectClrLst/>
+  </dgm:styleLbl>
+  <dgm:styleLbl name="fgShp">
+    <dgm:fillClrLst meth="repeat">
+      <a:schemeClr val="accent1">
+        <a:tint val="60000"/>
+      </a:schemeClr>
+    </dgm:fillClrLst>
+    <dgm:linClrLst meth="repeat">
+      <a:schemeClr val="lt1"/>
+    </dgm:linClrLst>
+    <dgm:effectClrLst/>
+    <dgm:txLinClrLst/>
+    <dgm:txFillClrLst meth="repeat">
+      <a:schemeClr val="dk1"/>
+    </dgm:txFillClrLst>
+    <dgm:txEffectClrLst/>
+  </dgm:styleLbl>
+  <dgm:styleLbl name="revTx">
+    <dgm:fillClrLst meth="repeat">
+      <a:schemeClr val="lt1">
+        <a:alpha val="0"/>
+      </a:schemeClr>
+    </dgm:fillClrLst>
+    <dgm:linClrLst meth="repeat">
+      <a:schemeClr val="dk1">
+        <a:alpha val="0"/>
+      </a:schemeClr>
+    </dgm:linClrLst>
+    <dgm:effectClrLst/>
+    <dgm:txLinClrLst/>
+    <dgm:txFillClrLst meth="repeat">
+      <a:schemeClr val="tx1"/>
+    </dgm:txFillClrLst>
+    <dgm:txEffectClrLst/>
+  </dgm:styleLbl>
+</dgm:colorsDef>
+</file>
+
+<file path=ppt/diagrams/colors2.xml><?xml version="1.0" encoding="utf-8"?>
 <dgm:colorsDef xmlns:dgm="http://schemas.openxmlformats.org/drawingml/2006/diagram" xmlns:a="http://schemas.openxmlformats.org/drawingml/2006/main" uniqueId="urn:microsoft.com/office/officeart/2005/8/colors/accent1_2">
   <dgm:title val=""/>
   <dgm:desc val=""/>
@@ -1017,6 +1766,434 @@
           <a:r>
             <a:rPr lang="en-US" dirty="0"/>
             <a:t>There might be the risk of leaving a request unprocessed</a:t>
+          </a:r>
+        </a:p>
+      </dgm:t>
+    </dgm:pt>
+    <dgm:pt modelId="{88215926-66BF-48C4-A93B-2B9055E4B30E}" type="parTrans" cxnId="{2C52642D-1657-4F8D-BBDD-B987CC65BE05}">
+      <dgm:prSet/>
+      <dgm:spPr/>
+      <dgm:t>
+        <a:bodyPr/>
+        <a:lstStyle/>
+        <a:p>
+          <a:endParaRPr lang="en-US"/>
+        </a:p>
+      </dgm:t>
+    </dgm:pt>
+    <dgm:pt modelId="{69F2F367-DB05-4C42-B3B6-E5FAE86F9F26}" type="sibTrans" cxnId="{2C52642D-1657-4F8D-BBDD-B987CC65BE05}">
+      <dgm:prSet/>
+      <dgm:spPr/>
+      <dgm:t>
+        <a:bodyPr/>
+        <a:lstStyle/>
+        <a:p>
+          <a:endParaRPr lang="en-US"/>
+        </a:p>
+      </dgm:t>
+    </dgm:pt>
+    <dgm:pt modelId="{933F326E-830B-4831-B1CB-C533857382D0}" type="pres">
+      <dgm:prSet presAssocID="{730B5E20-22E8-49EE-849D-2F09EB7C5E55}" presName="root" presStyleCnt="0">
+        <dgm:presLayoutVars>
+          <dgm:dir/>
+          <dgm:resizeHandles val="exact"/>
+        </dgm:presLayoutVars>
+      </dgm:prSet>
+      <dgm:spPr/>
+    </dgm:pt>
+    <dgm:pt modelId="{76D33545-207A-477F-A16B-BB2B9D7F2D3A}" type="pres">
+      <dgm:prSet presAssocID="{D23F440E-398D-41B6-A80F-74494D5847CA}" presName="compNode" presStyleCnt="0"/>
+      <dgm:spPr/>
+    </dgm:pt>
+    <dgm:pt modelId="{8FAC3CA6-DB25-4C68-BA9A-AD1D71B4FF5F}" type="pres">
+      <dgm:prSet presAssocID="{D23F440E-398D-41B6-A80F-74494D5847CA}" presName="bgRect" presStyleLbl="bgShp" presStyleIdx="0" presStyleCnt="4"/>
+      <dgm:spPr/>
+    </dgm:pt>
+    <dgm:pt modelId="{EE8C7A60-76B2-49C3-B369-A96EA3E5C2D4}" type="pres">
+      <dgm:prSet presAssocID="{D23F440E-398D-41B6-A80F-74494D5847CA}" presName="iconRect" presStyleLbl="node1" presStyleIdx="0" presStyleCnt="4"/>
+      <dgm:spPr>
+        <a:blipFill>
+          <a:blip xmlns:r="http://schemas.openxmlformats.org/officeDocument/2006/relationships" r:embed="rId1">
+            <a:extLst>
+              <a:ext uri="{28A0092B-C50C-407E-A947-70E740481C1C}">
+                <a14:useLocalDpi xmlns:a14="http://schemas.microsoft.com/office/drawing/2010/main" val="0"/>
+              </a:ext>
+              <a:ext uri="{96DAC541-7B7A-43D3-8B79-37D633B846F1}">
+                <asvg:svgBlip xmlns:asvg="http://schemas.microsoft.com/office/drawing/2016/SVG/main" r:embed="rId2"/>
+              </a:ext>
+            </a:extLst>
+          </a:blip>
+          <a:stretch>
+            <a:fillRect/>
+          </a:stretch>
+        </a:blipFill>
+      </dgm:spPr>
+      <dgm:extLst>
+        <a:ext uri="{E40237B7-FDA0-4F09-8148-C483321AD2D9}">
+          <dgm14:cNvPr xmlns:dgm14="http://schemas.microsoft.com/office/drawing/2010/diagram" id="0" name="" descr="Cement truck"/>
+        </a:ext>
+      </dgm:extLst>
+    </dgm:pt>
+    <dgm:pt modelId="{B6D7E020-35D4-4D94-A1B9-406EAB63801E}" type="pres">
+      <dgm:prSet presAssocID="{D23F440E-398D-41B6-A80F-74494D5847CA}" presName="spaceRect" presStyleCnt="0"/>
+      <dgm:spPr/>
+    </dgm:pt>
+    <dgm:pt modelId="{E59E20F8-4207-45B4-B668-018957100416}" type="pres">
+      <dgm:prSet presAssocID="{D23F440E-398D-41B6-A80F-74494D5847CA}" presName="parTx" presStyleLbl="revTx" presStyleIdx="0" presStyleCnt="4">
+        <dgm:presLayoutVars>
+          <dgm:chMax val="0"/>
+          <dgm:chPref val="0"/>
+        </dgm:presLayoutVars>
+      </dgm:prSet>
+      <dgm:spPr/>
+    </dgm:pt>
+    <dgm:pt modelId="{5E9395D8-4450-4F9F-846C-719251944482}" type="pres">
+      <dgm:prSet presAssocID="{039D6CC6-CBE0-4615-AC1E-542A7D83BEE4}" presName="sibTrans" presStyleCnt="0"/>
+      <dgm:spPr/>
+    </dgm:pt>
+    <dgm:pt modelId="{4317EA3C-F64C-49F9-8D0C-2AD3C7D8B19A}" type="pres">
+      <dgm:prSet presAssocID="{F8289849-E987-4255-8EC8-44B4F81CB10E}" presName="compNode" presStyleCnt="0"/>
+      <dgm:spPr/>
+    </dgm:pt>
+    <dgm:pt modelId="{37F77629-432B-4A69-837C-14C65DEDD20C}" type="pres">
+      <dgm:prSet presAssocID="{F8289849-E987-4255-8EC8-44B4F81CB10E}" presName="bgRect" presStyleLbl="bgShp" presStyleIdx="1" presStyleCnt="4"/>
+      <dgm:spPr/>
+    </dgm:pt>
+    <dgm:pt modelId="{C1FCEA5C-0298-4163-931F-016E81AAB647}" type="pres">
+      <dgm:prSet presAssocID="{F8289849-E987-4255-8EC8-44B4F81CB10E}" presName="iconRect" presStyleLbl="node1" presStyleIdx="1" presStyleCnt="4"/>
+      <dgm:spPr>
+        <a:blipFill>
+          <a:blip xmlns:r="http://schemas.openxmlformats.org/officeDocument/2006/relationships" r:embed="rId3">
+            <a:extLst>
+              <a:ext uri="{28A0092B-C50C-407E-A947-70E740481C1C}">
+                <a14:useLocalDpi xmlns:a14="http://schemas.microsoft.com/office/drawing/2010/main" val="0"/>
+              </a:ext>
+              <a:ext uri="{96DAC541-7B7A-43D3-8B79-37D633B846F1}">
+                <asvg:svgBlip xmlns:asvg="http://schemas.microsoft.com/office/drawing/2016/SVG/main" r:embed="rId4"/>
+              </a:ext>
+            </a:extLst>
+          </a:blip>
+          <a:stretch>
+            <a:fillRect/>
+          </a:stretch>
+        </a:blipFill>
+      </dgm:spPr>
+      <dgm:extLst>
+        <a:ext uri="{E40237B7-FDA0-4F09-8148-C483321AD2D9}">
+          <dgm14:cNvPr xmlns:dgm14="http://schemas.microsoft.com/office/drawing/2010/diagram" id="0" name="" descr="Excavator"/>
+        </a:ext>
+      </dgm:extLst>
+    </dgm:pt>
+    <dgm:pt modelId="{4E01C590-E7DA-4835-86D2-4CCA915CA9A6}" type="pres">
+      <dgm:prSet presAssocID="{F8289849-E987-4255-8EC8-44B4F81CB10E}" presName="spaceRect" presStyleCnt="0"/>
+      <dgm:spPr/>
+    </dgm:pt>
+    <dgm:pt modelId="{7DE8E408-DE79-443F-8629-C089FBA689E3}" type="pres">
+      <dgm:prSet presAssocID="{F8289849-E987-4255-8EC8-44B4F81CB10E}" presName="parTx" presStyleLbl="revTx" presStyleIdx="1" presStyleCnt="4">
+        <dgm:presLayoutVars>
+          <dgm:chMax val="0"/>
+          <dgm:chPref val="0"/>
+        </dgm:presLayoutVars>
+      </dgm:prSet>
+      <dgm:spPr/>
+    </dgm:pt>
+    <dgm:pt modelId="{6F5BEA2C-D35A-40CD-AADB-C93FF0714F82}" type="pres">
+      <dgm:prSet presAssocID="{CFDFBA7F-EFFF-4644-9D4D-D4EA2AB33D7D}" presName="sibTrans" presStyleCnt="0"/>
+      <dgm:spPr/>
+    </dgm:pt>
+    <dgm:pt modelId="{061BB9BD-3EFB-484E-9E1E-584C8BD2EBBC}" type="pres">
+      <dgm:prSet presAssocID="{B987AC83-493B-4B18-BBDE-1E83EAF7E925}" presName="compNode" presStyleCnt="0"/>
+      <dgm:spPr/>
+    </dgm:pt>
+    <dgm:pt modelId="{7760943E-59EA-4625-8C71-92A18A3E7522}" type="pres">
+      <dgm:prSet presAssocID="{B987AC83-493B-4B18-BBDE-1E83EAF7E925}" presName="bgRect" presStyleLbl="bgShp" presStyleIdx="2" presStyleCnt="4"/>
+      <dgm:spPr/>
+    </dgm:pt>
+    <dgm:pt modelId="{676EE63F-6485-4E2A-ABAE-83CF265BF069}" type="pres">
+      <dgm:prSet presAssocID="{B987AC83-493B-4B18-BBDE-1E83EAF7E925}" presName="iconRect" presStyleLbl="node1" presStyleIdx="2" presStyleCnt="4"/>
+      <dgm:spPr>
+        <a:blipFill>
+          <a:blip xmlns:r="http://schemas.openxmlformats.org/officeDocument/2006/relationships" r:embed="rId5">
+            <a:extLst>
+              <a:ext uri="{28A0092B-C50C-407E-A947-70E740481C1C}">
+                <a14:useLocalDpi xmlns:a14="http://schemas.microsoft.com/office/drawing/2010/main" val="0"/>
+              </a:ext>
+              <a:ext uri="{96DAC541-7B7A-43D3-8B79-37D633B846F1}">
+                <asvg:svgBlip xmlns:asvg="http://schemas.microsoft.com/office/drawing/2016/SVG/main" r:embed="rId6"/>
+              </a:ext>
+            </a:extLst>
+          </a:blip>
+          <a:stretch>
+            <a:fillRect/>
+          </a:stretch>
+        </a:blipFill>
+      </dgm:spPr>
+      <dgm:extLst>
+        <a:ext uri="{E40237B7-FDA0-4F09-8148-C483321AD2D9}">
+          <dgm14:cNvPr xmlns:dgm14="http://schemas.microsoft.com/office/drawing/2010/diagram" id="0" name="" descr="Factory"/>
+        </a:ext>
+      </dgm:extLst>
+    </dgm:pt>
+    <dgm:pt modelId="{028304A6-CF27-4F1D-99F6-FE8D277AEE17}" type="pres">
+      <dgm:prSet presAssocID="{B987AC83-493B-4B18-BBDE-1E83EAF7E925}" presName="spaceRect" presStyleCnt="0"/>
+      <dgm:spPr/>
+    </dgm:pt>
+    <dgm:pt modelId="{B9DB9720-3FDF-4ACB-85FA-66976B22A528}" type="pres">
+      <dgm:prSet presAssocID="{B987AC83-493B-4B18-BBDE-1E83EAF7E925}" presName="parTx" presStyleLbl="revTx" presStyleIdx="2" presStyleCnt="4">
+        <dgm:presLayoutVars>
+          <dgm:chMax val="0"/>
+          <dgm:chPref val="0"/>
+        </dgm:presLayoutVars>
+      </dgm:prSet>
+      <dgm:spPr/>
+    </dgm:pt>
+    <dgm:pt modelId="{2B0E55DF-6C35-4664-BC0E-365BF51E4C99}" type="pres">
+      <dgm:prSet presAssocID="{3871E768-D972-4239-9CDD-D2C93D59DC76}" presName="sibTrans" presStyleCnt="0"/>
+      <dgm:spPr/>
+    </dgm:pt>
+    <dgm:pt modelId="{F128A80F-4611-4111-9193-176AF502C376}" type="pres">
+      <dgm:prSet presAssocID="{D18979C8-D283-4F11-8056-816DA377F0C0}" presName="compNode" presStyleCnt="0"/>
+      <dgm:spPr/>
+    </dgm:pt>
+    <dgm:pt modelId="{79AEF808-314B-4C4B-82AA-6EEA54A65F07}" type="pres">
+      <dgm:prSet presAssocID="{D18979C8-D283-4F11-8056-816DA377F0C0}" presName="bgRect" presStyleLbl="bgShp" presStyleIdx="3" presStyleCnt="4"/>
+      <dgm:spPr/>
+    </dgm:pt>
+    <dgm:pt modelId="{73575651-229C-4229-B203-88512EEA95C5}" type="pres">
+      <dgm:prSet presAssocID="{D18979C8-D283-4F11-8056-816DA377F0C0}" presName="iconRect" presStyleLbl="node1" presStyleIdx="3" presStyleCnt="4"/>
+      <dgm:spPr>
+        <a:blipFill>
+          <a:blip xmlns:r="http://schemas.openxmlformats.org/officeDocument/2006/relationships" r:embed="rId7">
+            <a:extLst>
+              <a:ext uri="{28A0092B-C50C-407E-A947-70E740481C1C}">
+                <a14:useLocalDpi xmlns:a14="http://schemas.microsoft.com/office/drawing/2010/main" val="0"/>
+              </a:ext>
+              <a:ext uri="{96DAC541-7B7A-43D3-8B79-37D633B846F1}">
+                <asvg:svgBlip xmlns:asvg="http://schemas.microsoft.com/office/drawing/2016/SVG/main" r:embed="rId8"/>
+              </a:ext>
+            </a:extLst>
+          </a:blip>
+          <a:stretch>
+            <a:fillRect/>
+          </a:stretch>
+        </a:blipFill>
+      </dgm:spPr>
+      <dgm:extLst>
+        <a:ext uri="{E40237B7-FDA0-4F09-8148-C483321AD2D9}">
+          <dgm14:cNvPr xmlns:dgm14="http://schemas.microsoft.com/office/drawing/2010/diagram" id="0" name="" descr="Projector"/>
+        </a:ext>
+      </dgm:extLst>
+    </dgm:pt>
+    <dgm:pt modelId="{806002CB-A457-44F2-A2DD-11D2572CD18C}" type="pres">
+      <dgm:prSet presAssocID="{D18979C8-D283-4F11-8056-816DA377F0C0}" presName="spaceRect" presStyleCnt="0"/>
+      <dgm:spPr/>
+    </dgm:pt>
+    <dgm:pt modelId="{77CFAC55-D3CF-45EA-A63C-9656646CA42E}" type="pres">
+      <dgm:prSet presAssocID="{D18979C8-D283-4F11-8056-816DA377F0C0}" presName="parTx" presStyleLbl="revTx" presStyleIdx="3" presStyleCnt="4">
+        <dgm:presLayoutVars>
+          <dgm:chMax val="0"/>
+          <dgm:chPref val="0"/>
+        </dgm:presLayoutVars>
+      </dgm:prSet>
+      <dgm:spPr/>
+    </dgm:pt>
+  </dgm:ptLst>
+  <dgm:cxnLst>
+    <dgm:cxn modelId="{ABD03D04-9D53-4E00-AB81-F25AC035AAD4}" srcId="{730B5E20-22E8-49EE-849D-2F09EB7C5E55}" destId="{D23F440E-398D-41B6-A80F-74494D5847CA}" srcOrd="0" destOrd="0" parTransId="{90B11B28-5797-4553-BCD6-924D483AEFA1}" sibTransId="{039D6CC6-CBE0-4615-AC1E-542A7D83BEE4}"/>
+    <dgm:cxn modelId="{B69A751B-F5A4-4FDF-A1ED-C6E1EE94BDBA}" type="presOf" srcId="{F8289849-E987-4255-8EC8-44B4F81CB10E}" destId="{7DE8E408-DE79-443F-8629-C089FBA689E3}" srcOrd="0" destOrd="0" presId="urn:microsoft.com/office/officeart/2018/2/layout/IconVerticalSolidList"/>
+    <dgm:cxn modelId="{2C52642D-1657-4F8D-BBDD-B987CC65BE05}" srcId="{730B5E20-22E8-49EE-849D-2F09EB7C5E55}" destId="{D18979C8-D283-4F11-8056-816DA377F0C0}" srcOrd="3" destOrd="0" parTransId="{88215926-66BF-48C4-A93B-2B9055E4B30E}" sibTransId="{69F2F367-DB05-4C42-B3B6-E5FAE86F9F26}"/>
+    <dgm:cxn modelId="{27CB5032-1C28-4B71-9DE7-3B8573DAA06B}" type="presOf" srcId="{D18979C8-D283-4F11-8056-816DA377F0C0}" destId="{77CFAC55-D3CF-45EA-A63C-9656646CA42E}" srcOrd="0" destOrd="0" presId="urn:microsoft.com/office/officeart/2018/2/layout/IconVerticalSolidList"/>
+    <dgm:cxn modelId="{36BA1767-35CA-4C91-93C5-94F0ADD921AD}" type="presOf" srcId="{730B5E20-22E8-49EE-849D-2F09EB7C5E55}" destId="{933F326E-830B-4831-B1CB-C533857382D0}" srcOrd="0" destOrd="0" presId="urn:microsoft.com/office/officeart/2018/2/layout/IconVerticalSolidList"/>
+    <dgm:cxn modelId="{70466650-EF21-44D4-9C56-FBD4098B58CE}" srcId="{730B5E20-22E8-49EE-849D-2F09EB7C5E55}" destId="{B987AC83-493B-4B18-BBDE-1E83EAF7E925}" srcOrd="2" destOrd="0" parTransId="{8B487908-3605-4A42-980E-D4512632196F}" sibTransId="{3871E768-D972-4239-9CDD-D2C93D59DC76}"/>
+    <dgm:cxn modelId="{0DECB193-7D07-48D4-B4D0-8A44B02B0EFC}" srcId="{730B5E20-22E8-49EE-849D-2F09EB7C5E55}" destId="{F8289849-E987-4255-8EC8-44B4F81CB10E}" srcOrd="1" destOrd="0" parTransId="{58406139-B729-43A1-9AA7-0431547BE2D4}" sibTransId="{CFDFBA7F-EFFF-4644-9D4D-D4EA2AB33D7D}"/>
+    <dgm:cxn modelId="{44162A95-8BE4-488C-B835-013E9523D7C9}" type="presOf" srcId="{B987AC83-493B-4B18-BBDE-1E83EAF7E925}" destId="{B9DB9720-3FDF-4ACB-85FA-66976B22A528}" srcOrd="0" destOrd="0" presId="urn:microsoft.com/office/officeart/2018/2/layout/IconVerticalSolidList"/>
+    <dgm:cxn modelId="{CBA314A9-2DA4-4A96-8AAA-82DB60A2107B}" type="presOf" srcId="{D23F440E-398D-41B6-A80F-74494D5847CA}" destId="{E59E20F8-4207-45B4-B668-018957100416}" srcOrd="0" destOrd="0" presId="urn:microsoft.com/office/officeart/2018/2/layout/IconVerticalSolidList"/>
+    <dgm:cxn modelId="{9530F58C-F371-4809-A58E-6A168C19975B}" type="presParOf" srcId="{933F326E-830B-4831-B1CB-C533857382D0}" destId="{76D33545-207A-477F-A16B-BB2B9D7F2D3A}" srcOrd="0" destOrd="0" presId="urn:microsoft.com/office/officeart/2018/2/layout/IconVerticalSolidList"/>
+    <dgm:cxn modelId="{E451D301-FBDE-471F-ABE3-C1348C32FA64}" type="presParOf" srcId="{76D33545-207A-477F-A16B-BB2B9D7F2D3A}" destId="{8FAC3CA6-DB25-4C68-BA9A-AD1D71B4FF5F}" srcOrd="0" destOrd="0" presId="urn:microsoft.com/office/officeart/2018/2/layout/IconVerticalSolidList"/>
+    <dgm:cxn modelId="{14E7CD92-A38A-4FAF-9BA9-5FF42774E845}" type="presParOf" srcId="{76D33545-207A-477F-A16B-BB2B9D7F2D3A}" destId="{EE8C7A60-76B2-49C3-B369-A96EA3E5C2D4}" srcOrd="1" destOrd="0" presId="urn:microsoft.com/office/officeart/2018/2/layout/IconVerticalSolidList"/>
+    <dgm:cxn modelId="{5D26878D-4F9B-405F-8E85-83F7C0F8E1DB}" type="presParOf" srcId="{76D33545-207A-477F-A16B-BB2B9D7F2D3A}" destId="{B6D7E020-35D4-4D94-A1B9-406EAB63801E}" srcOrd="2" destOrd="0" presId="urn:microsoft.com/office/officeart/2018/2/layout/IconVerticalSolidList"/>
+    <dgm:cxn modelId="{C9133D54-CFA6-4961-AF72-CCA5E88723C5}" type="presParOf" srcId="{76D33545-207A-477F-A16B-BB2B9D7F2D3A}" destId="{E59E20F8-4207-45B4-B668-018957100416}" srcOrd="3" destOrd="0" presId="urn:microsoft.com/office/officeart/2018/2/layout/IconVerticalSolidList"/>
+    <dgm:cxn modelId="{CD16DBD8-D5DB-4E7C-B56A-F7994BF3480C}" type="presParOf" srcId="{933F326E-830B-4831-B1CB-C533857382D0}" destId="{5E9395D8-4450-4F9F-846C-719251944482}" srcOrd="1" destOrd="0" presId="urn:microsoft.com/office/officeart/2018/2/layout/IconVerticalSolidList"/>
+    <dgm:cxn modelId="{C5884024-B1F3-44A6-AAC9-EA7FDF63D1F4}" type="presParOf" srcId="{933F326E-830B-4831-B1CB-C533857382D0}" destId="{4317EA3C-F64C-49F9-8D0C-2AD3C7D8B19A}" srcOrd="2" destOrd="0" presId="urn:microsoft.com/office/officeart/2018/2/layout/IconVerticalSolidList"/>
+    <dgm:cxn modelId="{B61F5F59-BFC6-4790-A4CB-49481E4A7E67}" type="presParOf" srcId="{4317EA3C-F64C-49F9-8D0C-2AD3C7D8B19A}" destId="{37F77629-432B-4A69-837C-14C65DEDD20C}" srcOrd="0" destOrd="0" presId="urn:microsoft.com/office/officeart/2018/2/layout/IconVerticalSolidList"/>
+    <dgm:cxn modelId="{F26FB358-72F0-4DE0-BF50-574AA8D7675B}" type="presParOf" srcId="{4317EA3C-F64C-49F9-8D0C-2AD3C7D8B19A}" destId="{C1FCEA5C-0298-4163-931F-016E81AAB647}" srcOrd="1" destOrd="0" presId="urn:microsoft.com/office/officeart/2018/2/layout/IconVerticalSolidList"/>
+    <dgm:cxn modelId="{04F992BD-F4A0-4C73-8E88-0DCB02F4B0DA}" type="presParOf" srcId="{4317EA3C-F64C-49F9-8D0C-2AD3C7D8B19A}" destId="{4E01C590-E7DA-4835-86D2-4CCA915CA9A6}" srcOrd="2" destOrd="0" presId="urn:microsoft.com/office/officeart/2018/2/layout/IconVerticalSolidList"/>
+    <dgm:cxn modelId="{D9501396-62D3-464C-AFF5-D80F72C0E0A4}" type="presParOf" srcId="{4317EA3C-F64C-49F9-8D0C-2AD3C7D8B19A}" destId="{7DE8E408-DE79-443F-8629-C089FBA689E3}" srcOrd="3" destOrd="0" presId="urn:microsoft.com/office/officeart/2018/2/layout/IconVerticalSolidList"/>
+    <dgm:cxn modelId="{B64CE750-A220-423D-A5EB-CB9BECD78567}" type="presParOf" srcId="{933F326E-830B-4831-B1CB-C533857382D0}" destId="{6F5BEA2C-D35A-40CD-AADB-C93FF0714F82}" srcOrd="3" destOrd="0" presId="urn:microsoft.com/office/officeart/2018/2/layout/IconVerticalSolidList"/>
+    <dgm:cxn modelId="{CEE0C149-DA4E-4DAA-86E5-5BAFB611B822}" type="presParOf" srcId="{933F326E-830B-4831-B1CB-C533857382D0}" destId="{061BB9BD-3EFB-484E-9E1E-584C8BD2EBBC}" srcOrd="4" destOrd="0" presId="urn:microsoft.com/office/officeart/2018/2/layout/IconVerticalSolidList"/>
+    <dgm:cxn modelId="{A46EC668-5ED2-4686-99BE-1BD7F730D13B}" type="presParOf" srcId="{061BB9BD-3EFB-484E-9E1E-584C8BD2EBBC}" destId="{7760943E-59EA-4625-8C71-92A18A3E7522}" srcOrd="0" destOrd="0" presId="urn:microsoft.com/office/officeart/2018/2/layout/IconVerticalSolidList"/>
+    <dgm:cxn modelId="{A9A84054-A6B0-499D-BCD3-576032380D45}" type="presParOf" srcId="{061BB9BD-3EFB-484E-9E1E-584C8BD2EBBC}" destId="{676EE63F-6485-4E2A-ABAE-83CF265BF069}" srcOrd="1" destOrd="0" presId="urn:microsoft.com/office/officeart/2018/2/layout/IconVerticalSolidList"/>
+    <dgm:cxn modelId="{194187CE-E057-4230-A3BD-9459A03BE67D}" type="presParOf" srcId="{061BB9BD-3EFB-484E-9E1E-584C8BD2EBBC}" destId="{028304A6-CF27-4F1D-99F6-FE8D277AEE17}" srcOrd="2" destOrd="0" presId="urn:microsoft.com/office/officeart/2018/2/layout/IconVerticalSolidList"/>
+    <dgm:cxn modelId="{8C1E721E-A458-4A52-900B-6C798D950C87}" type="presParOf" srcId="{061BB9BD-3EFB-484E-9E1E-584C8BD2EBBC}" destId="{B9DB9720-3FDF-4ACB-85FA-66976B22A528}" srcOrd="3" destOrd="0" presId="urn:microsoft.com/office/officeart/2018/2/layout/IconVerticalSolidList"/>
+    <dgm:cxn modelId="{0F6C0F8A-C0DA-459D-A474-7474A6218E97}" type="presParOf" srcId="{933F326E-830B-4831-B1CB-C533857382D0}" destId="{2B0E55DF-6C35-4664-BC0E-365BF51E4C99}" srcOrd="5" destOrd="0" presId="urn:microsoft.com/office/officeart/2018/2/layout/IconVerticalSolidList"/>
+    <dgm:cxn modelId="{C21BD3D6-F6A4-4D28-8A3D-E08E8BD04862}" type="presParOf" srcId="{933F326E-830B-4831-B1CB-C533857382D0}" destId="{F128A80F-4611-4111-9193-176AF502C376}" srcOrd="6" destOrd="0" presId="urn:microsoft.com/office/officeart/2018/2/layout/IconVerticalSolidList"/>
+    <dgm:cxn modelId="{7B6F3B4D-5C95-42B1-92C1-75F8AB45D4B7}" type="presParOf" srcId="{F128A80F-4611-4111-9193-176AF502C376}" destId="{79AEF808-314B-4C4B-82AA-6EEA54A65F07}" srcOrd="0" destOrd="0" presId="urn:microsoft.com/office/officeart/2018/2/layout/IconVerticalSolidList"/>
+    <dgm:cxn modelId="{F14DA5EF-E538-446F-BE7C-45C876E34890}" type="presParOf" srcId="{F128A80F-4611-4111-9193-176AF502C376}" destId="{73575651-229C-4229-B203-88512EEA95C5}" srcOrd="1" destOrd="0" presId="urn:microsoft.com/office/officeart/2018/2/layout/IconVerticalSolidList"/>
+    <dgm:cxn modelId="{E9A85B14-90AD-48A2-9B16-6090607A5F65}" type="presParOf" srcId="{F128A80F-4611-4111-9193-176AF502C376}" destId="{806002CB-A457-44F2-A2DD-11D2572CD18C}" srcOrd="2" destOrd="0" presId="urn:microsoft.com/office/officeart/2018/2/layout/IconVerticalSolidList"/>
+    <dgm:cxn modelId="{18B0CAC5-6463-418B-8377-8680A23E679D}" type="presParOf" srcId="{F128A80F-4611-4111-9193-176AF502C376}" destId="{77CFAC55-D3CF-45EA-A63C-9656646CA42E}" srcOrd="3" destOrd="0" presId="urn:microsoft.com/office/officeart/2018/2/layout/IconVerticalSolidList"/>
+  </dgm:cxnLst>
+  <dgm:bg/>
+  <dgm:whole/>
+  <dgm:extLst>
+    <a:ext uri="http://schemas.microsoft.com/office/drawing/2008/diagram">
+      <dsp:dataModelExt xmlns:dsp="http://schemas.microsoft.com/office/drawing/2008/diagram" relId="rId6" minVer="http://schemas.openxmlformats.org/drawingml/2006/diagram"/>
+    </a:ext>
+  </dgm:extLst>
+</dgm:dataModel>
+</file>
+
+<file path=ppt/diagrams/data2.xml><?xml version="1.0" encoding="utf-8"?>
+<dgm:dataModel xmlns:dgm="http://schemas.openxmlformats.org/drawingml/2006/diagram" xmlns:a="http://schemas.openxmlformats.org/drawingml/2006/main">
+  <dgm:ptLst>
+    <dgm:pt modelId="{730B5E20-22E8-49EE-849D-2F09EB7C5E55}" type="doc">
+      <dgm:prSet loTypeId="urn:microsoft.com/office/officeart/2018/2/layout/IconVerticalSolidList" loCatId="icon" qsTypeId="urn:microsoft.com/office/officeart/2005/8/quickstyle/simple1" qsCatId="simple" csTypeId="urn:microsoft.com/office/officeart/2005/8/colors/accent1_2" csCatId="accent1" phldr="1"/>
+      <dgm:spPr/>
+      <dgm:t>
+        <a:bodyPr/>
+        <a:lstStyle/>
+        <a:p>
+          <a:endParaRPr lang="en-US"/>
+        </a:p>
+      </dgm:t>
+    </dgm:pt>
+    <dgm:pt modelId="{D23F440E-398D-41B6-A80F-74494D5847CA}">
+      <dgm:prSet/>
+      <dgm:spPr/>
+      <dgm:t>
+        <a:bodyPr/>
+        <a:lstStyle/>
+        <a:p>
+          <a:pPr>
+            <a:lnSpc>
+              <a:spcPct val="100000"/>
+            </a:lnSpc>
+          </a:pPr>
+          <a:r>
+            <a:rPr lang="en-US" dirty="0"/>
+            <a:t>TODO</a:t>
+          </a:r>
+        </a:p>
+      </dgm:t>
+    </dgm:pt>
+    <dgm:pt modelId="{90B11B28-5797-4553-BCD6-924D483AEFA1}" type="parTrans" cxnId="{ABD03D04-9D53-4E00-AB81-F25AC035AAD4}">
+      <dgm:prSet/>
+      <dgm:spPr/>
+      <dgm:t>
+        <a:bodyPr/>
+        <a:lstStyle/>
+        <a:p>
+          <a:endParaRPr lang="en-US"/>
+        </a:p>
+      </dgm:t>
+    </dgm:pt>
+    <dgm:pt modelId="{039D6CC6-CBE0-4615-AC1E-542A7D83BEE4}" type="sibTrans" cxnId="{ABD03D04-9D53-4E00-AB81-F25AC035AAD4}">
+      <dgm:prSet/>
+      <dgm:spPr/>
+      <dgm:t>
+        <a:bodyPr/>
+        <a:lstStyle/>
+        <a:p>
+          <a:endParaRPr lang="en-US"/>
+        </a:p>
+      </dgm:t>
+    </dgm:pt>
+    <dgm:pt modelId="{F8289849-E987-4255-8EC8-44B4F81CB10E}">
+      <dgm:prSet/>
+      <dgm:spPr/>
+      <dgm:t>
+        <a:bodyPr/>
+        <a:lstStyle/>
+        <a:p>
+          <a:pPr>
+            <a:lnSpc>
+              <a:spcPct val="100000"/>
+            </a:lnSpc>
+          </a:pPr>
+          <a:r>
+            <a:rPr lang="en-US" dirty="0"/>
+            <a:t>TODO</a:t>
+          </a:r>
+        </a:p>
+      </dgm:t>
+    </dgm:pt>
+    <dgm:pt modelId="{58406139-B729-43A1-9AA7-0431547BE2D4}" type="parTrans" cxnId="{0DECB193-7D07-48D4-B4D0-8A44B02B0EFC}">
+      <dgm:prSet/>
+      <dgm:spPr/>
+      <dgm:t>
+        <a:bodyPr/>
+        <a:lstStyle/>
+        <a:p>
+          <a:endParaRPr lang="en-US"/>
+        </a:p>
+      </dgm:t>
+    </dgm:pt>
+    <dgm:pt modelId="{CFDFBA7F-EFFF-4644-9D4D-D4EA2AB33D7D}" type="sibTrans" cxnId="{0DECB193-7D07-48D4-B4D0-8A44B02B0EFC}">
+      <dgm:prSet/>
+      <dgm:spPr/>
+      <dgm:t>
+        <a:bodyPr/>
+        <a:lstStyle/>
+        <a:p>
+          <a:endParaRPr lang="en-US"/>
+        </a:p>
+      </dgm:t>
+    </dgm:pt>
+    <dgm:pt modelId="{B987AC83-493B-4B18-BBDE-1E83EAF7E925}">
+      <dgm:prSet/>
+      <dgm:spPr/>
+      <dgm:t>
+        <a:bodyPr/>
+        <a:lstStyle/>
+        <a:p>
+          <a:pPr>
+            <a:lnSpc>
+              <a:spcPct val="100000"/>
+            </a:lnSpc>
+          </a:pPr>
+          <a:r>
+            <a:rPr lang="en-US" dirty="0"/>
+            <a:t>TODO</a:t>
+          </a:r>
+        </a:p>
+      </dgm:t>
+    </dgm:pt>
+    <dgm:pt modelId="{8B487908-3605-4A42-980E-D4512632196F}" type="parTrans" cxnId="{70466650-EF21-44D4-9C56-FBD4098B58CE}">
+      <dgm:prSet/>
+      <dgm:spPr/>
+      <dgm:t>
+        <a:bodyPr/>
+        <a:lstStyle/>
+        <a:p>
+          <a:endParaRPr lang="en-US"/>
+        </a:p>
+      </dgm:t>
+    </dgm:pt>
+    <dgm:pt modelId="{3871E768-D972-4239-9CDD-D2C93D59DC76}" type="sibTrans" cxnId="{70466650-EF21-44D4-9C56-FBD4098B58CE}">
+      <dgm:prSet/>
+      <dgm:spPr/>
+      <dgm:t>
+        <a:bodyPr/>
+        <a:lstStyle/>
+        <a:p>
+          <a:endParaRPr lang="en-US"/>
+        </a:p>
+      </dgm:t>
+    </dgm:pt>
+    <dgm:pt modelId="{D18979C8-D283-4F11-8056-816DA377F0C0}">
+      <dgm:prSet/>
+      <dgm:spPr/>
+      <dgm:t>
+        <a:bodyPr/>
+        <a:lstStyle/>
+        <a:p>
+          <a:pPr>
+            <a:lnSpc>
+              <a:spcPct val="100000"/>
+            </a:lnSpc>
+          </a:pPr>
+          <a:r>
+            <a:rPr lang="en-US" dirty="0"/>
+            <a:t>TODO</a:t>
           </a:r>
         </a:p>
       </dgm:t>
@@ -1937,7 +3114,945 @@
 </dsp:drawing>
 </file>
 
+<file path=ppt/diagrams/drawing2.xml><?xml version="1.0" encoding="utf-8"?>
+<dsp:drawing xmlns:dgm="http://schemas.openxmlformats.org/drawingml/2006/diagram" xmlns:dsp="http://schemas.microsoft.com/office/drawing/2008/diagram" xmlns:a="http://schemas.openxmlformats.org/drawingml/2006/main">
+  <dsp:spTree>
+    <dsp:nvGrpSpPr>
+      <dsp:cNvPr id="0" name=""/>
+      <dsp:cNvGrpSpPr/>
+    </dsp:nvGrpSpPr>
+    <dsp:grpSpPr/>
+    <dsp:sp modelId="{8FAC3CA6-DB25-4C68-BA9A-AD1D71B4FF5F}">
+      <dsp:nvSpPr>
+        <dsp:cNvPr id="0" name=""/>
+        <dsp:cNvSpPr/>
+      </dsp:nvSpPr>
+      <dsp:spPr>
+        <a:xfrm>
+          <a:off x="0" y="1555"/>
+          <a:ext cx="4639736" cy="788438"/>
+        </a:xfrm>
+        <a:prstGeom prst="roundRect">
+          <a:avLst>
+            <a:gd name="adj" fmla="val 10000"/>
+          </a:avLst>
+        </a:prstGeom>
+        <a:solidFill>
+          <a:schemeClr val="accent1">
+            <a:tint val="40000"/>
+            <a:hueOff val="0"/>
+            <a:satOff val="0"/>
+            <a:lumOff val="0"/>
+            <a:alphaOff val="0"/>
+          </a:schemeClr>
+        </a:solidFill>
+        <a:ln>
+          <a:noFill/>
+        </a:ln>
+        <a:effectLst/>
+      </dsp:spPr>
+      <dsp:style>
+        <a:lnRef idx="0">
+          <a:scrgbClr r="0" g="0" b="0"/>
+        </a:lnRef>
+        <a:fillRef idx="1">
+          <a:scrgbClr r="0" g="0" b="0"/>
+        </a:fillRef>
+        <a:effectRef idx="0">
+          <a:scrgbClr r="0" g="0" b="0"/>
+        </a:effectRef>
+        <a:fontRef idx="minor"/>
+      </dsp:style>
+    </dsp:sp>
+    <dsp:sp modelId="{EE8C7A60-76B2-49C3-B369-A96EA3E5C2D4}">
+      <dsp:nvSpPr>
+        <dsp:cNvPr id="0" name=""/>
+        <dsp:cNvSpPr/>
+      </dsp:nvSpPr>
+      <dsp:spPr>
+        <a:xfrm>
+          <a:off x="238502" y="178954"/>
+          <a:ext cx="433641" cy="433641"/>
+        </a:xfrm>
+        <a:prstGeom prst="rect">
+          <a:avLst/>
+        </a:prstGeom>
+        <a:blipFill>
+          <a:blip xmlns:r="http://schemas.openxmlformats.org/officeDocument/2006/relationships" r:embed="rId1">
+            <a:extLst>
+              <a:ext uri="{28A0092B-C50C-407E-A947-70E740481C1C}">
+                <a14:useLocalDpi xmlns:a14="http://schemas.microsoft.com/office/drawing/2010/main" val="0"/>
+              </a:ext>
+              <a:ext uri="{96DAC541-7B7A-43D3-8B79-37D633B846F1}">
+                <asvg:svgBlip xmlns:asvg="http://schemas.microsoft.com/office/drawing/2016/SVG/main" r:embed="rId2"/>
+              </a:ext>
+            </a:extLst>
+          </a:blip>
+          <a:stretch>
+            <a:fillRect/>
+          </a:stretch>
+        </a:blipFill>
+        <a:ln w="15875" cap="flat" cmpd="sng" algn="ctr">
+          <a:solidFill>
+            <a:schemeClr val="lt1">
+              <a:hueOff val="0"/>
+              <a:satOff val="0"/>
+              <a:lumOff val="0"/>
+              <a:alphaOff val="0"/>
+            </a:schemeClr>
+          </a:solidFill>
+          <a:prstDash val="solid"/>
+        </a:ln>
+        <a:effectLst/>
+      </dsp:spPr>
+      <dsp:style>
+        <a:lnRef idx="2">
+          <a:scrgbClr r="0" g="0" b="0"/>
+        </a:lnRef>
+        <a:fillRef idx="1">
+          <a:scrgbClr r="0" g="0" b="0"/>
+        </a:fillRef>
+        <a:effectRef idx="0">
+          <a:scrgbClr r="0" g="0" b="0"/>
+        </a:effectRef>
+        <a:fontRef idx="minor">
+          <a:schemeClr val="lt1"/>
+        </a:fontRef>
+      </dsp:style>
+    </dsp:sp>
+    <dsp:sp modelId="{E59E20F8-4207-45B4-B668-018957100416}">
+      <dsp:nvSpPr>
+        <dsp:cNvPr id="0" name=""/>
+        <dsp:cNvSpPr/>
+      </dsp:nvSpPr>
+      <dsp:spPr>
+        <a:xfrm>
+          <a:off x="910646" y="1555"/>
+          <a:ext cx="3729089" cy="788438"/>
+        </a:xfrm>
+        <a:prstGeom prst="rect">
+          <a:avLst/>
+        </a:prstGeom>
+        <a:noFill/>
+        <a:ln>
+          <a:noFill/>
+        </a:ln>
+        <a:effectLst/>
+      </dsp:spPr>
+      <dsp:style>
+        <a:lnRef idx="0">
+          <a:scrgbClr r="0" g="0" b="0"/>
+        </a:lnRef>
+        <a:fillRef idx="0">
+          <a:scrgbClr r="0" g="0" b="0"/>
+        </a:fillRef>
+        <a:effectRef idx="0">
+          <a:scrgbClr r="0" g="0" b="0"/>
+        </a:effectRef>
+        <a:fontRef idx="minor"/>
+      </dsp:style>
+      <dsp:txBody>
+        <a:bodyPr spcFirstLastPara="0" vert="horz" wrap="square" lIns="83443" tIns="83443" rIns="83443" bIns="83443" numCol="1" spcCol="1270" anchor="ctr" anchorCtr="0">
+          <a:noAutofit/>
+        </a:bodyPr>
+        <a:lstStyle/>
+        <a:p>
+          <a:pPr marL="0" lvl="0" indent="0" algn="l" defTabSz="977900">
+            <a:lnSpc>
+              <a:spcPct val="100000"/>
+            </a:lnSpc>
+            <a:spcBef>
+              <a:spcPct val="0"/>
+            </a:spcBef>
+            <a:spcAft>
+              <a:spcPct val="35000"/>
+            </a:spcAft>
+            <a:buNone/>
+          </a:pPr>
+          <a:r>
+            <a:rPr lang="en-US" sz="2200" kern="1200" dirty="0"/>
+            <a:t>TODO</a:t>
+          </a:r>
+        </a:p>
+      </dsp:txBody>
+      <dsp:txXfrm>
+        <a:off x="910646" y="1555"/>
+        <a:ext cx="3729089" cy="788438"/>
+      </dsp:txXfrm>
+    </dsp:sp>
+    <dsp:sp modelId="{37F77629-432B-4A69-837C-14C65DEDD20C}">
+      <dsp:nvSpPr>
+        <dsp:cNvPr id="0" name=""/>
+        <dsp:cNvSpPr/>
+      </dsp:nvSpPr>
+      <dsp:spPr>
+        <a:xfrm>
+          <a:off x="0" y="987103"/>
+          <a:ext cx="4639736" cy="788438"/>
+        </a:xfrm>
+        <a:prstGeom prst="roundRect">
+          <a:avLst>
+            <a:gd name="adj" fmla="val 10000"/>
+          </a:avLst>
+        </a:prstGeom>
+        <a:solidFill>
+          <a:schemeClr val="accent1">
+            <a:tint val="40000"/>
+            <a:hueOff val="0"/>
+            <a:satOff val="0"/>
+            <a:lumOff val="0"/>
+            <a:alphaOff val="0"/>
+          </a:schemeClr>
+        </a:solidFill>
+        <a:ln>
+          <a:noFill/>
+        </a:ln>
+        <a:effectLst/>
+      </dsp:spPr>
+      <dsp:style>
+        <a:lnRef idx="0">
+          <a:scrgbClr r="0" g="0" b="0"/>
+        </a:lnRef>
+        <a:fillRef idx="1">
+          <a:scrgbClr r="0" g="0" b="0"/>
+        </a:fillRef>
+        <a:effectRef idx="0">
+          <a:scrgbClr r="0" g="0" b="0"/>
+        </a:effectRef>
+        <a:fontRef idx="minor"/>
+      </dsp:style>
+    </dsp:sp>
+    <dsp:sp modelId="{C1FCEA5C-0298-4163-931F-016E81AAB647}">
+      <dsp:nvSpPr>
+        <dsp:cNvPr id="0" name=""/>
+        <dsp:cNvSpPr/>
+      </dsp:nvSpPr>
+      <dsp:spPr>
+        <a:xfrm>
+          <a:off x="238502" y="1164502"/>
+          <a:ext cx="433641" cy="433641"/>
+        </a:xfrm>
+        <a:prstGeom prst="rect">
+          <a:avLst/>
+        </a:prstGeom>
+        <a:blipFill>
+          <a:blip xmlns:r="http://schemas.openxmlformats.org/officeDocument/2006/relationships" r:embed="rId3">
+            <a:extLst>
+              <a:ext uri="{28A0092B-C50C-407E-A947-70E740481C1C}">
+                <a14:useLocalDpi xmlns:a14="http://schemas.microsoft.com/office/drawing/2010/main" val="0"/>
+              </a:ext>
+              <a:ext uri="{96DAC541-7B7A-43D3-8B79-37D633B846F1}">
+                <asvg:svgBlip xmlns:asvg="http://schemas.microsoft.com/office/drawing/2016/SVG/main" r:embed="rId4"/>
+              </a:ext>
+            </a:extLst>
+          </a:blip>
+          <a:stretch>
+            <a:fillRect/>
+          </a:stretch>
+        </a:blipFill>
+        <a:ln w="15875" cap="flat" cmpd="sng" algn="ctr">
+          <a:solidFill>
+            <a:schemeClr val="lt1">
+              <a:hueOff val="0"/>
+              <a:satOff val="0"/>
+              <a:lumOff val="0"/>
+              <a:alphaOff val="0"/>
+            </a:schemeClr>
+          </a:solidFill>
+          <a:prstDash val="solid"/>
+        </a:ln>
+        <a:effectLst/>
+      </dsp:spPr>
+      <dsp:style>
+        <a:lnRef idx="2">
+          <a:scrgbClr r="0" g="0" b="0"/>
+        </a:lnRef>
+        <a:fillRef idx="1">
+          <a:scrgbClr r="0" g="0" b="0"/>
+        </a:fillRef>
+        <a:effectRef idx="0">
+          <a:scrgbClr r="0" g="0" b="0"/>
+        </a:effectRef>
+        <a:fontRef idx="minor">
+          <a:schemeClr val="lt1"/>
+        </a:fontRef>
+      </dsp:style>
+    </dsp:sp>
+    <dsp:sp modelId="{7DE8E408-DE79-443F-8629-C089FBA689E3}">
+      <dsp:nvSpPr>
+        <dsp:cNvPr id="0" name=""/>
+        <dsp:cNvSpPr/>
+      </dsp:nvSpPr>
+      <dsp:spPr>
+        <a:xfrm>
+          <a:off x="910646" y="987103"/>
+          <a:ext cx="3729089" cy="788438"/>
+        </a:xfrm>
+        <a:prstGeom prst="rect">
+          <a:avLst/>
+        </a:prstGeom>
+        <a:noFill/>
+        <a:ln>
+          <a:noFill/>
+        </a:ln>
+        <a:effectLst/>
+      </dsp:spPr>
+      <dsp:style>
+        <a:lnRef idx="0">
+          <a:scrgbClr r="0" g="0" b="0"/>
+        </a:lnRef>
+        <a:fillRef idx="0">
+          <a:scrgbClr r="0" g="0" b="0"/>
+        </a:fillRef>
+        <a:effectRef idx="0">
+          <a:scrgbClr r="0" g="0" b="0"/>
+        </a:effectRef>
+        <a:fontRef idx="minor"/>
+      </dsp:style>
+      <dsp:txBody>
+        <a:bodyPr spcFirstLastPara="0" vert="horz" wrap="square" lIns="83443" tIns="83443" rIns="83443" bIns="83443" numCol="1" spcCol="1270" anchor="ctr" anchorCtr="0">
+          <a:noAutofit/>
+        </a:bodyPr>
+        <a:lstStyle/>
+        <a:p>
+          <a:pPr marL="0" lvl="0" indent="0" algn="l" defTabSz="977900">
+            <a:lnSpc>
+              <a:spcPct val="100000"/>
+            </a:lnSpc>
+            <a:spcBef>
+              <a:spcPct val="0"/>
+            </a:spcBef>
+            <a:spcAft>
+              <a:spcPct val="35000"/>
+            </a:spcAft>
+            <a:buNone/>
+          </a:pPr>
+          <a:r>
+            <a:rPr lang="en-US" sz="2200" kern="1200" dirty="0"/>
+            <a:t>TODO</a:t>
+          </a:r>
+        </a:p>
+      </dsp:txBody>
+      <dsp:txXfrm>
+        <a:off x="910646" y="987103"/>
+        <a:ext cx="3729089" cy="788438"/>
+      </dsp:txXfrm>
+    </dsp:sp>
+    <dsp:sp modelId="{7760943E-59EA-4625-8C71-92A18A3E7522}">
+      <dsp:nvSpPr>
+        <dsp:cNvPr id="0" name=""/>
+        <dsp:cNvSpPr/>
+      </dsp:nvSpPr>
+      <dsp:spPr>
+        <a:xfrm>
+          <a:off x="0" y="1972651"/>
+          <a:ext cx="4639736" cy="788438"/>
+        </a:xfrm>
+        <a:prstGeom prst="roundRect">
+          <a:avLst>
+            <a:gd name="adj" fmla="val 10000"/>
+          </a:avLst>
+        </a:prstGeom>
+        <a:solidFill>
+          <a:schemeClr val="accent1">
+            <a:tint val="40000"/>
+            <a:hueOff val="0"/>
+            <a:satOff val="0"/>
+            <a:lumOff val="0"/>
+            <a:alphaOff val="0"/>
+          </a:schemeClr>
+        </a:solidFill>
+        <a:ln>
+          <a:noFill/>
+        </a:ln>
+        <a:effectLst/>
+      </dsp:spPr>
+      <dsp:style>
+        <a:lnRef idx="0">
+          <a:scrgbClr r="0" g="0" b="0"/>
+        </a:lnRef>
+        <a:fillRef idx="1">
+          <a:scrgbClr r="0" g="0" b="0"/>
+        </a:fillRef>
+        <a:effectRef idx="0">
+          <a:scrgbClr r="0" g="0" b="0"/>
+        </a:effectRef>
+        <a:fontRef idx="minor"/>
+      </dsp:style>
+    </dsp:sp>
+    <dsp:sp modelId="{676EE63F-6485-4E2A-ABAE-83CF265BF069}">
+      <dsp:nvSpPr>
+        <dsp:cNvPr id="0" name=""/>
+        <dsp:cNvSpPr/>
+      </dsp:nvSpPr>
+      <dsp:spPr>
+        <a:xfrm>
+          <a:off x="238502" y="2150049"/>
+          <a:ext cx="433641" cy="433641"/>
+        </a:xfrm>
+        <a:prstGeom prst="rect">
+          <a:avLst/>
+        </a:prstGeom>
+        <a:blipFill>
+          <a:blip xmlns:r="http://schemas.openxmlformats.org/officeDocument/2006/relationships" r:embed="rId5">
+            <a:extLst>
+              <a:ext uri="{28A0092B-C50C-407E-A947-70E740481C1C}">
+                <a14:useLocalDpi xmlns:a14="http://schemas.microsoft.com/office/drawing/2010/main" val="0"/>
+              </a:ext>
+              <a:ext uri="{96DAC541-7B7A-43D3-8B79-37D633B846F1}">
+                <asvg:svgBlip xmlns:asvg="http://schemas.microsoft.com/office/drawing/2016/SVG/main" r:embed="rId6"/>
+              </a:ext>
+            </a:extLst>
+          </a:blip>
+          <a:stretch>
+            <a:fillRect/>
+          </a:stretch>
+        </a:blipFill>
+        <a:ln w="15875" cap="flat" cmpd="sng" algn="ctr">
+          <a:solidFill>
+            <a:schemeClr val="lt1">
+              <a:hueOff val="0"/>
+              <a:satOff val="0"/>
+              <a:lumOff val="0"/>
+              <a:alphaOff val="0"/>
+            </a:schemeClr>
+          </a:solidFill>
+          <a:prstDash val="solid"/>
+        </a:ln>
+        <a:effectLst/>
+      </dsp:spPr>
+      <dsp:style>
+        <a:lnRef idx="2">
+          <a:scrgbClr r="0" g="0" b="0"/>
+        </a:lnRef>
+        <a:fillRef idx="1">
+          <a:scrgbClr r="0" g="0" b="0"/>
+        </a:fillRef>
+        <a:effectRef idx="0">
+          <a:scrgbClr r="0" g="0" b="0"/>
+        </a:effectRef>
+        <a:fontRef idx="minor">
+          <a:schemeClr val="lt1"/>
+        </a:fontRef>
+      </dsp:style>
+    </dsp:sp>
+    <dsp:sp modelId="{B9DB9720-3FDF-4ACB-85FA-66976B22A528}">
+      <dsp:nvSpPr>
+        <dsp:cNvPr id="0" name=""/>
+        <dsp:cNvSpPr/>
+      </dsp:nvSpPr>
+      <dsp:spPr>
+        <a:xfrm>
+          <a:off x="910646" y="1972651"/>
+          <a:ext cx="3729089" cy="788438"/>
+        </a:xfrm>
+        <a:prstGeom prst="rect">
+          <a:avLst/>
+        </a:prstGeom>
+        <a:noFill/>
+        <a:ln>
+          <a:noFill/>
+        </a:ln>
+        <a:effectLst/>
+      </dsp:spPr>
+      <dsp:style>
+        <a:lnRef idx="0">
+          <a:scrgbClr r="0" g="0" b="0"/>
+        </a:lnRef>
+        <a:fillRef idx="0">
+          <a:scrgbClr r="0" g="0" b="0"/>
+        </a:fillRef>
+        <a:effectRef idx="0">
+          <a:scrgbClr r="0" g="0" b="0"/>
+        </a:effectRef>
+        <a:fontRef idx="minor"/>
+      </dsp:style>
+      <dsp:txBody>
+        <a:bodyPr spcFirstLastPara="0" vert="horz" wrap="square" lIns="83443" tIns="83443" rIns="83443" bIns="83443" numCol="1" spcCol="1270" anchor="ctr" anchorCtr="0">
+          <a:noAutofit/>
+        </a:bodyPr>
+        <a:lstStyle/>
+        <a:p>
+          <a:pPr marL="0" lvl="0" indent="0" algn="l" defTabSz="977900">
+            <a:lnSpc>
+              <a:spcPct val="100000"/>
+            </a:lnSpc>
+            <a:spcBef>
+              <a:spcPct val="0"/>
+            </a:spcBef>
+            <a:spcAft>
+              <a:spcPct val="35000"/>
+            </a:spcAft>
+            <a:buNone/>
+          </a:pPr>
+          <a:r>
+            <a:rPr lang="en-US" sz="2200" kern="1200" dirty="0"/>
+            <a:t>TODO</a:t>
+          </a:r>
+        </a:p>
+      </dsp:txBody>
+      <dsp:txXfrm>
+        <a:off x="910646" y="1972651"/>
+        <a:ext cx="3729089" cy="788438"/>
+      </dsp:txXfrm>
+    </dsp:sp>
+    <dsp:sp modelId="{79AEF808-314B-4C4B-82AA-6EEA54A65F07}">
+      <dsp:nvSpPr>
+        <dsp:cNvPr id="0" name=""/>
+        <dsp:cNvSpPr/>
+      </dsp:nvSpPr>
+      <dsp:spPr>
+        <a:xfrm>
+          <a:off x="0" y="2958199"/>
+          <a:ext cx="4639736" cy="788438"/>
+        </a:xfrm>
+        <a:prstGeom prst="roundRect">
+          <a:avLst>
+            <a:gd name="adj" fmla="val 10000"/>
+          </a:avLst>
+        </a:prstGeom>
+        <a:solidFill>
+          <a:schemeClr val="accent1">
+            <a:tint val="40000"/>
+            <a:hueOff val="0"/>
+            <a:satOff val="0"/>
+            <a:lumOff val="0"/>
+            <a:alphaOff val="0"/>
+          </a:schemeClr>
+        </a:solidFill>
+        <a:ln>
+          <a:noFill/>
+        </a:ln>
+        <a:effectLst/>
+      </dsp:spPr>
+      <dsp:style>
+        <a:lnRef idx="0">
+          <a:scrgbClr r="0" g="0" b="0"/>
+        </a:lnRef>
+        <a:fillRef idx="1">
+          <a:scrgbClr r="0" g="0" b="0"/>
+        </a:fillRef>
+        <a:effectRef idx="0">
+          <a:scrgbClr r="0" g="0" b="0"/>
+        </a:effectRef>
+        <a:fontRef idx="minor"/>
+      </dsp:style>
+    </dsp:sp>
+    <dsp:sp modelId="{73575651-229C-4229-B203-88512EEA95C5}">
+      <dsp:nvSpPr>
+        <dsp:cNvPr id="0" name=""/>
+        <dsp:cNvSpPr/>
+      </dsp:nvSpPr>
+      <dsp:spPr>
+        <a:xfrm>
+          <a:off x="238502" y="3135597"/>
+          <a:ext cx="433641" cy="433641"/>
+        </a:xfrm>
+        <a:prstGeom prst="rect">
+          <a:avLst/>
+        </a:prstGeom>
+        <a:blipFill>
+          <a:blip xmlns:r="http://schemas.openxmlformats.org/officeDocument/2006/relationships" r:embed="rId7">
+            <a:extLst>
+              <a:ext uri="{28A0092B-C50C-407E-A947-70E740481C1C}">
+                <a14:useLocalDpi xmlns:a14="http://schemas.microsoft.com/office/drawing/2010/main" val="0"/>
+              </a:ext>
+              <a:ext uri="{96DAC541-7B7A-43D3-8B79-37D633B846F1}">
+                <asvg:svgBlip xmlns:asvg="http://schemas.microsoft.com/office/drawing/2016/SVG/main" r:embed="rId8"/>
+              </a:ext>
+            </a:extLst>
+          </a:blip>
+          <a:stretch>
+            <a:fillRect/>
+          </a:stretch>
+        </a:blipFill>
+        <a:ln w="15875" cap="flat" cmpd="sng" algn="ctr">
+          <a:solidFill>
+            <a:schemeClr val="lt1">
+              <a:hueOff val="0"/>
+              <a:satOff val="0"/>
+              <a:lumOff val="0"/>
+              <a:alphaOff val="0"/>
+            </a:schemeClr>
+          </a:solidFill>
+          <a:prstDash val="solid"/>
+        </a:ln>
+        <a:effectLst/>
+      </dsp:spPr>
+      <dsp:style>
+        <a:lnRef idx="2">
+          <a:scrgbClr r="0" g="0" b="0"/>
+        </a:lnRef>
+        <a:fillRef idx="1">
+          <a:scrgbClr r="0" g="0" b="0"/>
+        </a:fillRef>
+        <a:effectRef idx="0">
+          <a:scrgbClr r="0" g="0" b="0"/>
+        </a:effectRef>
+        <a:fontRef idx="minor">
+          <a:schemeClr val="lt1"/>
+        </a:fontRef>
+      </dsp:style>
+    </dsp:sp>
+    <dsp:sp modelId="{77CFAC55-D3CF-45EA-A63C-9656646CA42E}">
+      <dsp:nvSpPr>
+        <dsp:cNvPr id="0" name=""/>
+        <dsp:cNvSpPr/>
+      </dsp:nvSpPr>
+      <dsp:spPr>
+        <a:xfrm>
+          <a:off x="910646" y="2958199"/>
+          <a:ext cx="3729089" cy="788438"/>
+        </a:xfrm>
+        <a:prstGeom prst="rect">
+          <a:avLst/>
+        </a:prstGeom>
+        <a:noFill/>
+        <a:ln>
+          <a:noFill/>
+        </a:ln>
+        <a:effectLst/>
+      </dsp:spPr>
+      <dsp:style>
+        <a:lnRef idx="0">
+          <a:scrgbClr r="0" g="0" b="0"/>
+        </a:lnRef>
+        <a:fillRef idx="0">
+          <a:scrgbClr r="0" g="0" b="0"/>
+        </a:fillRef>
+        <a:effectRef idx="0">
+          <a:scrgbClr r="0" g="0" b="0"/>
+        </a:effectRef>
+        <a:fontRef idx="minor"/>
+      </dsp:style>
+      <dsp:txBody>
+        <a:bodyPr spcFirstLastPara="0" vert="horz" wrap="square" lIns="83443" tIns="83443" rIns="83443" bIns="83443" numCol="1" spcCol="1270" anchor="ctr" anchorCtr="0">
+          <a:noAutofit/>
+        </a:bodyPr>
+        <a:lstStyle/>
+        <a:p>
+          <a:pPr marL="0" lvl="0" indent="0" algn="l" defTabSz="977900">
+            <a:lnSpc>
+              <a:spcPct val="100000"/>
+            </a:lnSpc>
+            <a:spcBef>
+              <a:spcPct val="0"/>
+            </a:spcBef>
+            <a:spcAft>
+              <a:spcPct val="35000"/>
+            </a:spcAft>
+            <a:buNone/>
+          </a:pPr>
+          <a:r>
+            <a:rPr lang="en-US" sz="2200" kern="1200" dirty="0"/>
+            <a:t>TODO</a:t>
+          </a:r>
+        </a:p>
+      </dsp:txBody>
+      <dsp:txXfrm>
+        <a:off x="910646" y="2958199"/>
+        <a:ext cx="3729089" cy="788438"/>
+      </dsp:txXfrm>
+    </dsp:sp>
+  </dsp:spTree>
+</dsp:drawing>
+</file>
+
 <file path=ppt/diagrams/layout1.xml><?xml version="1.0" encoding="utf-8"?>
+<dgm:layoutDef xmlns:dgm="http://schemas.openxmlformats.org/drawingml/2006/diagram" xmlns:a="http://schemas.openxmlformats.org/drawingml/2006/main" uniqueId="urn:microsoft.com/office/officeart/2018/2/layout/IconVerticalSolidList">
+  <dgm:title val="Icon Vertical Solid List"/>
+  <dgm:desc val="Use to show a series of visuals from top to bottom with Level 1 or Level 1 and Level 2 text grouped in a shape. Works best with icons or small pictures with lengthier descriptions."/>
+  <dgm:catLst>
+    <dgm:cat type="icon" pri="500"/>
+  </dgm:catLst>
+  <dgm:sampData useDef="1">
+    <dgm:dataModel>
+      <dgm:ptLst/>
+      <dgm:bg/>
+      <dgm:whole/>
+    </dgm:dataModel>
+  </dgm:sampData>
+  <dgm:styleData useDef="1">
+    <dgm:dataModel>
+      <dgm:ptLst/>
+      <dgm:bg/>
+      <dgm:whole/>
+    </dgm:dataModel>
+  </dgm:styleData>
+  <dgm:clrData useDef="1">
+    <dgm:dataModel>
+      <dgm:ptLst/>
+      <dgm:bg/>
+      <dgm:whole/>
+    </dgm:dataModel>
+  </dgm:clrData>
+  <dgm:layoutNode name="root">
+    <dgm:varLst>
+      <dgm:dir/>
+      <dgm:resizeHandles val="exact"/>
+    </dgm:varLst>
+    <dgm:choose name="Name0">
+      <dgm:if name="Name1" axis="self" func="var" arg="dir" op="equ" val="norm">
+        <dgm:alg type="lin">
+          <dgm:param type="linDir" val="fromT"/>
+          <dgm:param type="nodeHorzAlign" val="l"/>
+        </dgm:alg>
+      </dgm:if>
+      <dgm:else name="Name2">
+        <dgm:alg type="lin">
+          <dgm:param type="linDir" val="fromT"/>
+          <dgm:param type="nodeHorzAlign" val="r"/>
+        </dgm:alg>
+      </dgm:else>
+    </dgm:choose>
+    <dgm:shape xmlns:r="http://schemas.openxmlformats.org/officeDocument/2006/relationships" r:blip="">
+      <dgm:adjLst/>
+    </dgm:shape>
+    <dgm:presOf/>
+    <dgm:choose name="Name3">
+      <dgm:if name="Name4" axis="ch" ptType="node" func="cnt" op="lte" val="3">
+        <dgm:constrLst>
+          <dgm:constr type="h" for="ch" forName="compNode" refType="h" fact="0.3"/>
+          <dgm:constr type="w" for="ch" forName="compNode" refType="w"/>
+          <dgm:constr type="h" for="ch" forName="sibTrans" refType="h" refFor="ch" refForName="compNode" fact="0.25"/>
+          <dgm:constr type="primFontSz" for="des" forName="parTx" val="25"/>
+          <dgm:constr type="primFontSz" for="des" forName="desTx" refType="primFontSz" refFor="des" refForName="parTx" op="lte" fact="0.75"/>
+          <dgm:constr type="h" for="des" forName="compNode" op="equ"/>
+          <dgm:constr type="h" for="des" forName="bgRect" op="equ"/>
+          <dgm:constr type="h" for="des" forName="iconRect" op="equ"/>
+          <dgm:constr type="w" for="des" forName="iconRect" op="equ"/>
+          <dgm:constr type="h" for="des" forName="spaceRect" op="equ"/>
+          <dgm:constr type="h" for="des" forName="parTx" op="equ"/>
+          <dgm:constr type="h" for="des" forName="desTx" op="equ"/>
+        </dgm:constrLst>
+      </dgm:if>
+      <dgm:if name="Name5" axis="ch" ptType="node" func="cnt" op="lte" val="4">
+        <dgm:constrLst>
+          <dgm:constr type="h" for="ch" forName="compNode" refType="h" fact="0.3"/>
+          <dgm:constr type="w" for="ch" forName="compNode" refType="w"/>
+          <dgm:constr type="h" for="ch" forName="sibTrans" refType="h" refFor="ch" refForName="compNode" fact="0.25"/>
+          <dgm:constr type="primFontSz" for="des" forName="parTx" val="22"/>
+          <dgm:constr type="primFontSz" for="des" forName="desTx" refType="primFontSz" refFor="des" refForName="parTx" op="lte" fact="0.75"/>
+          <dgm:constr type="h" for="des" forName="compNode" op="equ"/>
+          <dgm:constr type="h" for="des" forName="bgRect" op="equ"/>
+          <dgm:constr type="h" for="des" forName="iconRect" op="equ"/>
+          <dgm:constr type="w" for="des" forName="iconRect" op="equ"/>
+          <dgm:constr type="h" for="des" forName="spaceRect" op="equ"/>
+          <dgm:constr type="h" for="des" forName="parTx" op="equ"/>
+          <dgm:constr type="h" for="des" forName="desTx" op="equ"/>
+        </dgm:constrLst>
+      </dgm:if>
+      <dgm:if name="Name6" axis="ch" ptType="node" func="cnt" op="lte" val="6">
+        <dgm:constrLst>
+          <dgm:constr type="h" for="ch" forName="compNode" refType="h" fact="0.3"/>
+          <dgm:constr type="w" for="ch" forName="compNode" refType="w"/>
+          <dgm:constr type="h" for="ch" forName="sibTrans" refType="h" refFor="ch" refForName="compNode" fact="0.25"/>
+          <dgm:constr type="primFontSz" for="des" forName="parTx" val="19"/>
+          <dgm:constr type="primFontSz" for="des" forName="desTx" refType="primFontSz" refFor="des" refForName="parTx" op="lte" fact="0.75"/>
+          <dgm:constr type="h" for="des" forName="compNode" op="equ"/>
+          <dgm:constr type="h" for="des" forName="bgRect" op="equ"/>
+          <dgm:constr type="h" for="des" forName="iconRect" op="equ"/>
+          <dgm:constr type="w" for="des" forName="iconRect" op="equ"/>
+          <dgm:constr type="h" for="des" forName="spaceRect" op="equ"/>
+          <dgm:constr type="h" for="des" forName="parTx" op="equ"/>
+          <dgm:constr type="h" for="des" forName="desTx" op="equ"/>
+        </dgm:constrLst>
+      </dgm:if>
+      <dgm:else name="Name7">
+        <dgm:constrLst>
+          <dgm:constr type="h" for="ch" forName="compNode" refType="h" fact="0.3"/>
+          <dgm:constr type="w" for="ch" forName="compNode" refType="w"/>
+          <dgm:constr type="h" for="ch" forName="sibTrans" refType="h" refFor="ch" refForName="compNode" fact="0.25"/>
+          <dgm:constr type="primFontSz" for="des" forName="parTx" val="16"/>
+          <dgm:constr type="primFontSz" for="des" forName="desTx" refType="primFontSz" refFor="des" refForName="parTx" op="lte" fact="0.75"/>
+          <dgm:constr type="h" for="des" forName="compNode" op="equ"/>
+          <dgm:constr type="h" for="des" forName="bgRect" op="equ"/>
+          <dgm:constr type="h" for="des" forName="iconRect" op="equ"/>
+          <dgm:constr type="w" for="des" forName="iconRect" op="equ"/>
+          <dgm:constr type="h" for="des" forName="spaceRect" op="equ"/>
+          <dgm:constr type="h" for="des" forName="parTx" op="equ"/>
+          <dgm:constr type="h" for="des" forName="desTx" op="equ"/>
+        </dgm:constrLst>
+      </dgm:else>
+    </dgm:choose>
+    <dgm:ruleLst>
+      <dgm:rule type="h" for="ch" forName="compNode" val="0" fact="NaN" max="NaN"/>
+    </dgm:ruleLst>
+    <dgm:forEach name="Name8" axis="ch" ptType="node">
+      <dgm:layoutNode name="compNode">
+        <dgm:alg type="composite"/>
+        <dgm:shape xmlns:r="http://schemas.openxmlformats.org/officeDocument/2006/relationships" r:blip="">
+          <dgm:adjLst/>
+        </dgm:shape>
+        <dgm:presOf axis="self"/>
+        <dgm:choose name="Name9">
+          <dgm:if name="Name10" axis="ch" ptType="node" func="cnt" op="gte" val="1">
+            <dgm:constrLst>
+              <dgm:constr type="w" for="ch" forName="bgRect" refType="w"/>
+              <dgm:constr type="h" for="ch" forName="bgRect" refType="h"/>
+              <dgm:constr type="l" for="ch" forName="bgRect"/>
+              <dgm:constr type="t" for="ch" forName="bgRect"/>
+              <dgm:constr type="h" for="ch" forName="iconRect" refType="h" fact="0.55"/>
+              <dgm:constr type="w" for="ch" forName="iconRect" refType="h" refFor="ch" refForName="iconRect"/>
+              <dgm:constr type="l" for="ch" forName="iconRect" refType="h" refFor="ch" refForName="iconRect" fact="0.55"/>
+              <dgm:constr type="ctrY" for="ch" forName="iconRect" refType="ctrY" refFor="ch" refForName="bgRect"/>
+              <dgm:constr type="w" for="ch" forName="spaceRect" refType="l" refFor="ch" refForName="iconRect"/>
+              <dgm:constr type="h" for="ch" forName="spaceRect" refType="h"/>
+              <dgm:constr type="l" for="ch" forName="spaceRect" refType="r" refFor="ch" refForName="iconRect"/>
+              <dgm:constr type="t" for="ch" forName="spaceRect"/>
+              <dgm:constr type="w" for="ch" forName="parTx" refType="w" fact="0.45"/>
+              <dgm:constr type="h" for="ch" forName="parTx" refType="h"/>
+              <dgm:constr type="l" for="ch" forName="parTx" refType="r" refFor="ch" refForName="spaceRect"/>
+              <dgm:constr type="t" for="ch" forName="parTx"/>
+              <dgm:constr type="h" for="ch" forName="desTx" refType="h"/>
+              <dgm:constr type="l" for="ch" forName="desTx" refType="r" refFor="ch" refForName="parTx"/>
+              <dgm:constr type="t" for="ch" forName="desTx"/>
+            </dgm:constrLst>
+          </dgm:if>
+          <dgm:else name="Name11">
+            <dgm:constrLst>
+              <dgm:constr type="w" for="ch" forName="bgRect" refType="w"/>
+              <dgm:constr type="h" for="ch" forName="bgRect" refType="h"/>
+              <dgm:constr type="l" for="ch" forName="bgRect"/>
+              <dgm:constr type="t" for="ch" forName="bgRect"/>
+              <dgm:constr type="h" for="ch" forName="iconRect" refType="h" fact="0.55"/>
+              <dgm:constr type="w" for="ch" forName="iconRect" refType="h" refFor="ch" refForName="iconRect"/>
+              <dgm:constr type="l" for="ch" forName="iconRect" refType="h" refFor="ch" refForName="iconRect" fact="0.55"/>
+              <dgm:constr type="ctrY" for="ch" forName="iconRect" refType="ctrY" refFor="ch" refForName="bgRect"/>
+              <dgm:constr type="w" for="ch" forName="spaceRect" refType="l" refFor="ch" refForName="iconRect"/>
+              <dgm:constr type="h" for="ch" forName="spaceRect" refType="h"/>
+              <dgm:constr type="l" for="ch" forName="spaceRect" refType="r" refFor="ch" refForName="iconRect"/>
+              <dgm:constr type="t" for="ch" forName="spaceRect"/>
+              <dgm:constr type="h" for="ch" forName="parTx" refType="h"/>
+              <dgm:constr type="l" for="ch" forName="parTx" refType="r" refFor="ch" refForName="spaceRect"/>
+              <dgm:constr type="t" for="ch" forName="parTx"/>
+            </dgm:constrLst>
+          </dgm:else>
+        </dgm:choose>
+        <dgm:ruleLst>
+          <dgm:rule type="h" val="INF" fact="NaN" max="NaN"/>
+        </dgm:ruleLst>
+        <dgm:layoutNode name="bgRect" styleLbl="bgShp">
+          <dgm:alg type="sp"/>
+          <dgm:shape xmlns:r="http://schemas.openxmlformats.org/officeDocument/2006/relationships" type="roundRect" r:blip="">
+            <dgm:adjLst>
+              <dgm:adj idx="1" val="0.1"/>
+            </dgm:adjLst>
+          </dgm:shape>
+          <dgm:presOf/>
+          <dgm:constrLst/>
+          <dgm:ruleLst/>
+        </dgm:layoutNode>
+        <dgm:layoutNode name="iconRect" styleLbl="node1">
+          <dgm:alg type="sp"/>
+          <dgm:shape xmlns:r="http://schemas.openxmlformats.org/officeDocument/2006/relationships" type="rect" r:blip="" blipPhldr="1">
+            <dgm:adjLst/>
+          </dgm:shape>
+          <dgm:presOf/>
+          <dgm:constrLst/>
+          <dgm:ruleLst/>
+        </dgm:layoutNode>
+        <dgm:layoutNode name="spaceRect">
+          <dgm:alg type="sp"/>
+          <dgm:shape xmlns:r="http://schemas.openxmlformats.org/officeDocument/2006/relationships" r:blip="">
+            <dgm:adjLst/>
+          </dgm:shape>
+          <dgm:presOf/>
+          <dgm:constrLst/>
+          <dgm:ruleLst/>
+        </dgm:layoutNode>
+        <dgm:layoutNode name="parTx" styleLbl="revTx">
+          <dgm:varLst>
+            <dgm:chMax val="0"/>
+            <dgm:chPref val="0"/>
+          </dgm:varLst>
+          <dgm:alg type="tx">
+            <dgm:param type="txAnchorVert" val="mid"/>
+            <dgm:param type="parTxLTRAlign" val="l"/>
+            <dgm:param type="shpTxLTRAlignCh" val="l"/>
+            <dgm:param type="parTxRTLAlign" val="r"/>
+            <dgm:param type="shpTxRTLAlignCh" val="r"/>
+          </dgm:alg>
+          <dgm:shape xmlns:r="http://schemas.openxmlformats.org/officeDocument/2006/relationships" type="rect" r:blip="">
+            <dgm:adjLst/>
+          </dgm:shape>
+          <dgm:presOf axis="self" ptType="node"/>
+          <dgm:constrLst>
+            <dgm:constr type="lMarg" refType="h" fact="0.3"/>
+            <dgm:constr type="rMarg" refType="h" fact="0.3"/>
+            <dgm:constr type="tMarg" refType="h" fact="0.3"/>
+            <dgm:constr type="bMarg" refType="h" fact="0.3"/>
+          </dgm:constrLst>
+          <dgm:ruleLst>
+            <dgm:rule type="primFontSz" val="14" fact="NaN" max="NaN"/>
+            <dgm:rule type="h" val="INF" fact="NaN" max="NaN"/>
+          </dgm:ruleLst>
+        </dgm:layoutNode>
+        <dgm:choose name="Name12">
+          <dgm:if name="Name13" axis="ch" ptType="node" func="cnt" op="gte" val="1">
+            <dgm:layoutNode name="desTx" styleLbl="revTx">
+              <dgm:varLst/>
+              <dgm:alg type="tx">
+                <dgm:param type="txAnchorVertCh" val="mid"/>
+                <dgm:param type="parTxLTRAlign" val="l"/>
+                <dgm:param type="shpTxLTRAlignCh" val="l"/>
+                <dgm:param type="parTxRTLAlign" val="r"/>
+                <dgm:param type="shpTxRTLAlignCh" val="r"/>
+                <dgm:param type="stBulletLvl" val="0"/>
+              </dgm:alg>
+              <dgm:shape xmlns:r="http://schemas.openxmlformats.org/officeDocument/2006/relationships" type="rect" r:blip="">
+                <dgm:adjLst/>
+              </dgm:shape>
+              <dgm:presOf axis="des" ptType="node"/>
+              <dgm:constrLst>
+                <dgm:constr type="primFontSz" val="18"/>
+                <dgm:constr type="secFontSz" refType="primFontSz"/>
+                <dgm:constr type="lMarg" refType="h" fact="0.3"/>
+                <dgm:constr type="rMarg" refType="h" fact="0.3"/>
+                <dgm:constr type="tMarg" refType="h" fact="0.3"/>
+                <dgm:constr type="bMarg" refType="h" fact="0.3"/>
+              </dgm:constrLst>
+              <dgm:ruleLst>
+                <dgm:rule type="primFontSz" val="11" fact="NaN" max="NaN"/>
+              </dgm:ruleLst>
+            </dgm:layoutNode>
+          </dgm:if>
+          <dgm:else name="Name14"/>
+        </dgm:choose>
+      </dgm:layoutNode>
+      <dgm:forEach name="Name15" axis="followSib" ptType="sibTrans" cnt="1">
+        <dgm:layoutNode name="sibTrans">
+          <dgm:alg type="sp"/>
+          <dgm:shape xmlns:r="http://schemas.openxmlformats.org/officeDocument/2006/relationships" r:blip="">
+            <dgm:adjLst/>
+          </dgm:shape>
+          <dgm:presOf axis="self"/>
+          <dgm:constrLst/>
+          <dgm:ruleLst/>
+        </dgm:layoutNode>
+      </dgm:forEach>
+    </dgm:forEach>
+  </dgm:layoutNode>
+  <dgm:extLst>
+    <a:ext uri="{68A01E43-0DF5-4B5B-8FA6-DAF915123BFB}">
+      <dgm1612:lstStyle xmlns:dgm1612="http://schemas.microsoft.com/office/drawing/2016/12/diagram">
+        <a:lvl1pPr>
+          <a:lnSpc>
+            <a:spcPct val="100000"/>
+          </a:lnSpc>
+        </a:lvl1pPr>
+        <a:lvl2pPr>
+          <a:lnSpc>
+            <a:spcPct val="100000"/>
+          </a:lnSpc>
+        </a:lvl2pPr>
+      </dgm1612:lstStyle>
+    </a:ext>
+  </dgm:extLst>
+</dgm:layoutDef>
+</file>
+
+<file path=ppt/diagrams/layout2.xml><?xml version="1.0" encoding="utf-8"?>
 <dgm:layoutDef xmlns:dgm="http://schemas.openxmlformats.org/drawingml/2006/diagram" xmlns:a="http://schemas.openxmlformats.org/drawingml/2006/main" uniqueId="urn:microsoft.com/office/officeart/2018/2/layout/IconVerticalSolidList">
   <dgm:title val="Icon Vertical Solid List"/>
   <dgm:desc val="Use to show a series of visuals from top to bottom with Level 1 or Level 1 and Level 2 text grouped in a shape. Works best with icons or small pictures with lengthier descriptions."/>
@@ -3265,6 +5380,1040 @@
 </dgm:styleDef>
 </file>
 
+<file path=ppt/diagrams/quickStyle2.xml><?xml version="1.0" encoding="utf-8"?>
+<dgm:styleDef xmlns:dgm="http://schemas.openxmlformats.org/drawingml/2006/diagram" xmlns:a="http://schemas.openxmlformats.org/drawingml/2006/main" uniqueId="urn:microsoft.com/office/officeart/2005/8/quickstyle/simple1">
+  <dgm:title val=""/>
+  <dgm:desc val=""/>
+  <dgm:catLst>
+    <dgm:cat type="simple" pri="10100"/>
+  </dgm:catLst>
+  <dgm:scene3d>
+    <a:camera prst="orthographicFront"/>
+    <a:lightRig rig="threePt" dir="t"/>
+  </dgm:scene3d>
+  <dgm:styleLbl name="node0">
+    <dgm:scene3d>
+      <a:camera prst="orthographicFront"/>
+      <a:lightRig rig="threePt" dir="t"/>
+    </dgm:scene3d>
+    <dgm:sp3d/>
+    <dgm:txPr/>
+    <dgm:style>
+      <a:lnRef idx="2">
+        <a:scrgbClr r="0" g="0" b="0"/>
+      </a:lnRef>
+      <a:fillRef idx="1">
+        <a:scrgbClr r="0" g="0" b="0"/>
+      </a:fillRef>
+      <a:effectRef idx="0">
+        <a:scrgbClr r="0" g="0" b="0"/>
+      </a:effectRef>
+      <a:fontRef idx="minor">
+        <a:schemeClr val="lt1"/>
+      </a:fontRef>
+    </dgm:style>
+  </dgm:styleLbl>
+  <dgm:styleLbl name="lnNode1">
+    <dgm:scene3d>
+      <a:camera prst="orthographicFront"/>
+      <a:lightRig rig="threePt" dir="t"/>
+    </dgm:scene3d>
+    <dgm:sp3d/>
+    <dgm:txPr/>
+    <dgm:style>
+      <a:lnRef idx="2">
+        <a:scrgbClr r="0" g="0" b="0"/>
+      </a:lnRef>
+      <a:fillRef idx="1">
+        <a:scrgbClr r="0" g="0" b="0"/>
+      </a:fillRef>
+      <a:effectRef idx="0">
+        <a:scrgbClr r="0" g="0" b="0"/>
+      </a:effectRef>
+      <a:fontRef idx="minor">
+        <a:schemeClr val="lt1"/>
+      </a:fontRef>
+    </dgm:style>
+  </dgm:styleLbl>
+  <dgm:styleLbl name="vennNode1">
+    <dgm:scene3d>
+      <a:camera prst="orthographicFront"/>
+      <a:lightRig rig="threePt" dir="t"/>
+    </dgm:scene3d>
+    <dgm:sp3d/>
+    <dgm:txPr/>
+    <dgm:style>
+      <a:lnRef idx="2">
+        <a:scrgbClr r="0" g="0" b="0"/>
+      </a:lnRef>
+      <a:fillRef idx="1">
+        <a:scrgbClr r="0" g="0" b="0"/>
+      </a:fillRef>
+      <a:effectRef idx="0">
+        <a:scrgbClr r="0" g="0" b="0"/>
+      </a:effectRef>
+      <a:fontRef idx="minor">
+        <a:schemeClr val="tx1"/>
+      </a:fontRef>
+    </dgm:style>
+  </dgm:styleLbl>
+  <dgm:styleLbl name="alignNode1">
+    <dgm:scene3d>
+      <a:camera prst="orthographicFront"/>
+      <a:lightRig rig="threePt" dir="t"/>
+    </dgm:scene3d>
+    <dgm:sp3d/>
+    <dgm:txPr/>
+    <dgm:style>
+      <a:lnRef idx="2">
+        <a:scrgbClr r="0" g="0" b="0"/>
+      </a:lnRef>
+      <a:fillRef idx="1">
+        <a:scrgbClr r="0" g="0" b="0"/>
+      </a:fillRef>
+      <a:effectRef idx="0">
+        <a:scrgbClr r="0" g="0" b="0"/>
+      </a:effectRef>
+      <a:fontRef idx="minor">
+        <a:schemeClr val="lt1"/>
+      </a:fontRef>
+    </dgm:style>
+  </dgm:styleLbl>
+  <dgm:styleLbl name="node1">
+    <dgm:scene3d>
+      <a:camera prst="orthographicFront"/>
+      <a:lightRig rig="threePt" dir="t"/>
+    </dgm:scene3d>
+    <dgm:sp3d/>
+    <dgm:txPr/>
+    <dgm:style>
+      <a:lnRef idx="2">
+        <a:scrgbClr r="0" g="0" b="0"/>
+      </a:lnRef>
+      <a:fillRef idx="1">
+        <a:scrgbClr r="0" g="0" b="0"/>
+      </a:fillRef>
+      <a:effectRef idx="0">
+        <a:scrgbClr r="0" g="0" b="0"/>
+      </a:effectRef>
+      <a:fontRef idx="minor">
+        <a:schemeClr val="lt1"/>
+      </a:fontRef>
+    </dgm:style>
+  </dgm:styleLbl>
+  <dgm:styleLbl name="node2">
+    <dgm:scene3d>
+      <a:camera prst="orthographicFront"/>
+      <a:lightRig rig="threePt" dir="t"/>
+    </dgm:scene3d>
+    <dgm:sp3d/>
+    <dgm:txPr/>
+    <dgm:style>
+      <a:lnRef idx="2">
+        <a:scrgbClr r="0" g="0" b="0"/>
+      </a:lnRef>
+      <a:fillRef idx="1">
+        <a:scrgbClr r="0" g="0" b="0"/>
+      </a:fillRef>
+      <a:effectRef idx="0">
+        <a:scrgbClr r="0" g="0" b="0"/>
+      </a:effectRef>
+      <a:fontRef idx="minor">
+        <a:schemeClr val="lt1"/>
+      </a:fontRef>
+    </dgm:style>
+  </dgm:styleLbl>
+  <dgm:styleLbl name="node3">
+    <dgm:scene3d>
+      <a:camera prst="orthographicFront"/>
+      <a:lightRig rig="threePt" dir="t"/>
+    </dgm:scene3d>
+    <dgm:sp3d/>
+    <dgm:txPr/>
+    <dgm:style>
+      <a:lnRef idx="2">
+        <a:scrgbClr r="0" g="0" b="0"/>
+      </a:lnRef>
+      <a:fillRef idx="1">
+        <a:scrgbClr r="0" g="0" b="0"/>
+      </a:fillRef>
+      <a:effectRef idx="0">
+        <a:scrgbClr r="0" g="0" b="0"/>
+      </a:effectRef>
+      <a:fontRef idx="minor">
+        <a:schemeClr val="lt1"/>
+      </a:fontRef>
+    </dgm:style>
+  </dgm:styleLbl>
+  <dgm:styleLbl name="node4">
+    <dgm:scene3d>
+      <a:camera prst="orthographicFront"/>
+      <a:lightRig rig="threePt" dir="t"/>
+    </dgm:scene3d>
+    <dgm:sp3d/>
+    <dgm:txPr/>
+    <dgm:style>
+      <a:lnRef idx="2">
+        <a:scrgbClr r="0" g="0" b="0"/>
+      </a:lnRef>
+      <a:fillRef idx="1">
+        <a:scrgbClr r="0" g="0" b="0"/>
+      </a:fillRef>
+      <a:effectRef idx="0">
+        <a:scrgbClr r="0" g="0" b="0"/>
+      </a:effectRef>
+      <a:fontRef idx="minor">
+        <a:schemeClr val="lt1"/>
+      </a:fontRef>
+    </dgm:style>
+  </dgm:styleLbl>
+  <dgm:styleLbl name="fgImgPlace1">
+    <dgm:scene3d>
+      <a:camera prst="orthographicFront"/>
+      <a:lightRig rig="threePt" dir="t"/>
+    </dgm:scene3d>
+    <dgm:sp3d/>
+    <dgm:txPr/>
+    <dgm:style>
+      <a:lnRef idx="2">
+        <a:scrgbClr r="0" g="0" b="0"/>
+      </a:lnRef>
+      <a:fillRef idx="1">
+        <a:scrgbClr r="0" g="0" b="0"/>
+      </a:fillRef>
+      <a:effectRef idx="0">
+        <a:scrgbClr r="0" g="0" b="0"/>
+      </a:effectRef>
+      <a:fontRef idx="minor"/>
+    </dgm:style>
+  </dgm:styleLbl>
+  <dgm:styleLbl name="alignImgPlace1">
+    <dgm:scene3d>
+      <a:camera prst="orthographicFront"/>
+      <a:lightRig rig="threePt" dir="t"/>
+    </dgm:scene3d>
+    <dgm:sp3d/>
+    <dgm:txPr/>
+    <dgm:style>
+      <a:lnRef idx="2">
+        <a:scrgbClr r="0" g="0" b="0"/>
+      </a:lnRef>
+      <a:fillRef idx="1">
+        <a:scrgbClr r="0" g="0" b="0"/>
+      </a:fillRef>
+      <a:effectRef idx="0">
+        <a:scrgbClr r="0" g="0" b="0"/>
+      </a:effectRef>
+      <a:fontRef idx="minor"/>
+    </dgm:style>
+  </dgm:styleLbl>
+  <dgm:styleLbl name="bgImgPlace1">
+    <dgm:scene3d>
+      <a:camera prst="orthographicFront"/>
+      <a:lightRig rig="threePt" dir="t"/>
+    </dgm:scene3d>
+    <dgm:sp3d/>
+    <dgm:txPr/>
+    <dgm:style>
+      <a:lnRef idx="2">
+        <a:scrgbClr r="0" g="0" b="0"/>
+      </a:lnRef>
+      <a:fillRef idx="1">
+        <a:scrgbClr r="0" g="0" b="0"/>
+      </a:fillRef>
+      <a:effectRef idx="0">
+        <a:scrgbClr r="0" g="0" b="0"/>
+      </a:effectRef>
+      <a:fontRef idx="minor"/>
+    </dgm:style>
+  </dgm:styleLbl>
+  <dgm:styleLbl name="sibTrans2D1">
+    <dgm:scene3d>
+      <a:camera prst="orthographicFront"/>
+      <a:lightRig rig="threePt" dir="t"/>
+    </dgm:scene3d>
+    <dgm:sp3d/>
+    <dgm:txPr/>
+    <dgm:style>
+      <a:lnRef idx="0">
+        <a:scrgbClr r="0" g="0" b="0"/>
+      </a:lnRef>
+      <a:fillRef idx="1">
+        <a:scrgbClr r="0" g="0" b="0"/>
+      </a:fillRef>
+      <a:effectRef idx="0">
+        <a:scrgbClr r="0" g="0" b="0"/>
+      </a:effectRef>
+      <a:fontRef idx="minor">
+        <a:schemeClr val="lt1"/>
+      </a:fontRef>
+    </dgm:style>
+  </dgm:styleLbl>
+  <dgm:styleLbl name="fgSibTrans2D1">
+    <dgm:scene3d>
+      <a:camera prst="orthographicFront"/>
+      <a:lightRig rig="threePt" dir="t"/>
+    </dgm:scene3d>
+    <dgm:sp3d/>
+    <dgm:txPr/>
+    <dgm:style>
+      <a:lnRef idx="0">
+        <a:scrgbClr r="0" g="0" b="0"/>
+      </a:lnRef>
+      <a:fillRef idx="1">
+        <a:scrgbClr r="0" g="0" b="0"/>
+      </a:fillRef>
+      <a:effectRef idx="0">
+        <a:scrgbClr r="0" g="0" b="0"/>
+      </a:effectRef>
+      <a:fontRef idx="minor">
+        <a:schemeClr val="lt1"/>
+      </a:fontRef>
+    </dgm:style>
+  </dgm:styleLbl>
+  <dgm:styleLbl name="bgSibTrans2D1">
+    <dgm:scene3d>
+      <a:camera prst="orthographicFront"/>
+      <a:lightRig rig="threePt" dir="t"/>
+    </dgm:scene3d>
+    <dgm:sp3d/>
+    <dgm:txPr/>
+    <dgm:style>
+      <a:lnRef idx="0">
+        <a:scrgbClr r="0" g="0" b="0"/>
+      </a:lnRef>
+      <a:fillRef idx="1">
+        <a:scrgbClr r="0" g="0" b="0"/>
+      </a:fillRef>
+      <a:effectRef idx="0">
+        <a:scrgbClr r="0" g="0" b="0"/>
+      </a:effectRef>
+      <a:fontRef idx="minor">
+        <a:schemeClr val="lt1"/>
+      </a:fontRef>
+    </dgm:style>
+  </dgm:styleLbl>
+  <dgm:styleLbl name="sibTrans1D1">
+    <dgm:scene3d>
+      <a:camera prst="orthographicFront"/>
+      <a:lightRig rig="threePt" dir="t"/>
+    </dgm:scene3d>
+    <dgm:sp3d/>
+    <dgm:txPr/>
+    <dgm:style>
+      <a:lnRef idx="1">
+        <a:scrgbClr r="0" g="0" b="0"/>
+      </a:lnRef>
+      <a:fillRef idx="0">
+        <a:scrgbClr r="0" g="0" b="0"/>
+      </a:fillRef>
+      <a:effectRef idx="0">
+        <a:scrgbClr r="0" g="0" b="0"/>
+      </a:effectRef>
+      <a:fontRef idx="minor"/>
+    </dgm:style>
+  </dgm:styleLbl>
+  <dgm:styleLbl name="callout">
+    <dgm:scene3d>
+      <a:camera prst="orthographicFront"/>
+      <a:lightRig rig="threePt" dir="t"/>
+    </dgm:scene3d>
+    <dgm:sp3d/>
+    <dgm:txPr/>
+    <dgm:style>
+      <a:lnRef idx="2">
+        <a:scrgbClr r="0" g="0" b="0"/>
+      </a:lnRef>
+      <a:fillRef idx="1">
+        <a:scrgbClr r="0" g="0" b="0"/>
+      </a:fillRef>
+      <a:effectRef idx="0">
+        <a:scrgbClr r="0" g="0" b="0"/>
+      </a:effectRef>
+      <a:fontRef idx="minor"/>
+    </dgm:style>
+  </dgm:styleLbl>
+  <dgm:styleLbl name="asst0">
+    <dgm:scene3d>
+      <a:camera prst="orthographicFront"/>
+      <a:lightRig rig="threePt" dir="t"/>
+    </dgm:scene3d>
+    <dgm:sp3d/>
+    <dgm:txPr/>
+    <dgm:style>
+      <a:lnRef idx="2">
+        <a:scrgbClr r="0" g="0" b="0"/>
+      </a:lnRef>
+      <a:fillRef idx="1">
+        <a:scrgbClr r="0" g="0" b="0"/>
+      </a:fillRef>
+      <a:effectRef idx="0">
+        <a:scrgbClr r="0" g="0" b="0"/>
+      </a:effectRef>
+      <a:fontRef idx="minor">
+        <a:schemeClr val="lt1"/>
+      </a:fontRef>
+    </dgm:style>
+  </dgm:styleLbl>
+  <dgm:styleLbl name="asst1">
+    <dgm:scene3d>
+      <a:camera prst="orthographicFront"/>
+      <a:lightRig rig="threePt" dir="t"/>
+    </dgm:scene3d>
+    <dgm:sp3d/>
+    <dgm:txPr/>
+    <dgm:style>
+      <a:lnRef idx="2">
+        <a:scrgbClr r="0" g="0" b="0"/>
+      </a:lnRef>
+      <a:fillRef idx="1">
+        <a:scrgbClr r="0" g="0" b="0"/>
+      </a:fillRef>
+      <a:effectRef idx="0">
+        <a:scrgbClr r="0" g="0" b="0"/>
+      </a:effectRef>
+      <a:fontRef idx="minor">
+        <a:schemeClr val="lt1"/>
+      </a:fontRef>
+    </dgm:style>
+  </dgm:styleLbl>
+  <dgm:styleLbl name="asst2">
+    <dgm:scene3d>
+      <a:camera prst="orthographicFront"/>
+      <a:lightRig rig="threePt" dir="t"/>
+    </dgm:scene3d>
+    <dgm:sp3d/>
+    <dgm:txPr/>
+    <dgm:style>
+      <a:lnRef idx="2">
+        <a:scrgbClr r="0" g="0" b="0"/>
+      </a:lnRef>
+      <a:fillRef idx="1">
+        <a:scrgbClr r="0" g="0" b="0"/>
+      </a:fillRef>
+      <a:effectRef idx="0">
+        <a:scrgbClr r="0" g="0" b="0"/>
+      </a:effectRef>
+      <a:fontRef idx="minor">
+        <a:schemeClr val="lt1"/>
+      </a:fontRef>
+    </dgm:style>
+  </dgm:styleLbl>
+  <dgm:styleLbl name="asst3">
+    <dgm:scene3d>
+      <a:camera prst="orthographicFront"/>
+      <a:lightRig rig="threePt" dir="t"/>
+    </dgm:scene3d>
+    <dgm:sp3d/>
+    <dgm:txPr/>
+    <dgm:style>
+      <a:lnRef idx="2">
+        <a:scrgbClr r="0" g="0" b="0"/>
+      </a:lnRef>
+      <a:fillRef idx="1">
+        <a:scrgbClr r="0" g="0" b="0"/>
+      </a:fillRef>
+      <a:effectRef idx="0">
+        <a:scrgbClr r="0" g="0" b="0"/>
+      </a:effectRef>
+      <a:fontRef idx="minor">
+        <a:schemeClr val="lt1"/>
+      </a:fontRef>
+    </dgm:style>
+  </dgm:styleLbl>
+  <dgm:styleLbl name="asst4">
+    <dgm:scene3d>
+      <a:camera prst="orthographicFront"/>
+      <a:lightRig rig="threePt" dir="t"/>
+    </dgm:scene3d>
+    <dgm:sp3d/>
+    <dgm:txPr/>
+    <dgm:style>
+      <a:lnRef idx="2">
+        <a:scrgbClr r="0" g="0" b="0"/>
+      </a:lnRef>
+      <a:fillRef idx="1">
+        <a:scrgbClr r="0" g="0" b="0"/>
+      </a:fillRef>
+      <a:effectRef idx="0">
+        <a:scrgbClr r="0" g="0" b="0"/>
+      </a:effectRef>
+      <a:fontRef idx="minor">
+        <a:schemeClr val="lt1"/>
+      </a:fontRef>
+    </dgm:style>
+  </dgm:styleLbl>
+  <dgm:styleLbl name="parChTrans2D1">
+    <dgm:scene3d>
+      <a:camera prst="orthographicFront"/>
+      <a:lightRig rig="threePt" dir="t"/>
+    </dgm:scene3d>
+    <dgm:sp3d/>
+    <dgm:txPr/>
+    <dgm:style>
+      <a:lnRef idx="2">
+        <a:scrgbClr r="0" g="0" b="0"/>
+      </a:lnRef>
+      <a:fillRef idx="1">
+        <a:scrgbClr r="0" g="0" b="0"/>
+      </a:fillRef>
+      <a:effectRef idx="0">
+        <a:scrgbClr r="0" g="0" b="0"/>
+      </a:effectRef>
+      <a:fontRef idx="minor">
+        <a:schemeClr val="lt1"/>
+      </a:fontRef>
+    </dgm:style>
+  </dgm:styleLbl>
+  <dgm:styleLbl name="parChTrans2D2">
+    <dgm:scene3d>
+      <a:camera prst="orthographicFront"/>
+      <a:lightRig rig="threePt" dir="t"/>
+    </dgm:scene3d>
+    <dgm:sp3d/>
+    <dgm:txPr/>
+    <dgm:style>
+      <a:lnRef idx="2">
+        <a:scrgbClr r="0" g="0" b="0"/>
+      </a:lnRef>
+      <a:fillRef idx="1">
+        <a:scrgbClr r="0" g="0" b="0"/>
+      </a:fillRef>
+      <a:effectRef idx="0">
+        <a:scrgbClr r="0" g="0" b="0"/>
+      </a:effectRef>
+      <a:fontRef idx="minor">
+        <a:schemeClr val="lt1"/>
+      </a:fontRef>
+    </dgm:style>
+  </dgm:styleLbl>
+  <dgm:styleLbl name="parChTrans2D3">
+    <dgm:scene3d>
+      <a:camera prst="orthographicFront"/>
+      <a:lightRig rig="threePt" dir="t"/>
+    </dgm:scene3d>
+    <dgm:sp3d/>
+    <dgm:txPr/>
+    <dgm:style>
+      <a:lnRef idx="2">
+        <a:scrgbClr r="0" g="0" b="0"/>
+      </a:lnRef>
+      <a:fillRef idx="1">
+        <a:scrgbClr r="0" g="0" b="0"/>
+      </a:fillRef>
+      <a:effectRef idx="0">
+        <a:scrgbClr r="0" g="0" b="0"/>
+      </a:effectRef>
+      <a:fontRef idx="minor">
+        <a:schemeClr val="lt1"/>
+      </a:fontRef>
+    </dgm:style>
+  </dgm:styleLbl>
+  <dgm:styleLbl name="parChTrans2D4">
+    <dgm:scene3d>
+      <a:camera prst="orthographicFront"/>
+      <a:lightRig rig="threePt" dir="t"/>
+    </dgm:scene3d>
+    <dgm:sp3d/>
+    <dgm:txPr/>
+    <dgm:style>
+      <a:lnRef idx="2">
+        <a:scrgbClr r="0" g="0" b="0"/>
+      </a:lnRef>
+      <a:fillRef idx="1">
+        <a:scrgbClr r="0" g="0" b="0"/>
+      </a:fillRef>
+      <a:effectRef idx="0">
+        <a:scrgbClr r="0" g="0" b="0"/>
+      </a:effectRef>
+      <a:fontRef idx="minor">
+        <a:schemeClr val="lt1"/>
+      </a:fontRef>
+    </dgm:style>
+  </dgm:styleLbl>
+  <dgm:styleLbl name="parChTrans1D1">
+    <dgm:scene3d>
+      <a:camera prst="orthographicFront"/>
+      <a:lightRig rig="threePt" dir="t"/>
+    </dgm:scene3d>
+    <dgm:sp3d/>
+    <dgm:txPr/>
+    <dgm:style>
+      <a:lnRef idx="2">
+        <a:scrgbClr r="0" g="0" b="0"/>
+      </a:lnRef>
+      <a:fillRef idx="0">
+        <a:scrgbClr r="0" g="0" b="0"/>
+      </a:fillRef>
+      <a:effectRef idx="0">
+        <a:scrgbClr r="0" g="0" b="0"/>
+      </a:effectRef>
+      <a:fontRef idx="minor"/>
+    </dgm:style>
+  </dgm:styleLbl>
+  <dgm:styleLbl name="parChTrans1D2">
+    <dgm:scene3d>
+      <a:camera prst="orthographicFront"/>
+      <a:lightRig rig="threePt" dir="t"/>
+    </dgm:scene3d>
+    <dgm:sp3d/>
+    <dgm:txPr/>
+    <dgm:style>
+      <a:lnRef idx="2">
+        <a:scrgbClr r="0" g="0" b="0"/>
+      </a:lnRef>
+      <a:fillRef idx="0">
+        <a:scrgbClr r="0" g="0" b="0"/>
+      </a:fillRef>
+      <a:effectRef idx="0">
+        <a:scrgbClr r="0" g="0" b="0"/>
+      </a:effectRef>
+      <a:fontRef idx="minor"/>
+    </dgm:style>
+  </dgm:styleLbl>
+  <dgm:styleLbl name="parChTrans1D3">
+    <dgm:scene3d>
+      <a:camera prst="orthographicFront"/>
+      <a:lightRig rig="threePt" dir="t"/>
+    </dgm:scene3d>
+    <dgm:sp3d/>
+    <dgm:txPr/>
+    <dgm:style>
+      <a:lnRef idx="2">
+        <a:scrgbClr r="0" g="0" b="0"/>
+      </a:lnRef>
+      <a:fillRef idx="0">
+        <a:scrgbClr r="0" g="0" b="0"/>
+      </a:fillRef>
+      <a:effectRef idx="0">
+        <a:scrgbClr r="0" g="0" b="0"/>
+      </a:effectRef>
+      <a:fontRef idx="minor"/>
+    </dgm:style>
+  </dgm:styleLbl>
+  <dgm:styleLbl name="parChTrans1D4">
+    <dgm:scene3d>
+      <a:camera prst="orthographicFront"/>
+      <a:lightRig rig="threePt" dir="t"/>
+    </dgm:scene3d>
+    <dgm:sp3d/>
+    <dgm:txPr/>
+    <dgm:style>
+      <a:lnRef idx="2">
+        <a:scrgbClr r="0" g="0" b="0"/>
+      </a:lnRef>
+      <a:fillRef idx="0">
+        <a:scrgbClr r="0" g="0" b="0"/>
+      </a:fillRef>
+      <a:effectRef idx="0">
+        <a:scrgbClr r="0" g="0" b="0"/>
+      </a:effectRef>
+      <a:fontRef idx="minor"/>
+    </dgm:style>
+  </dgm:styleLbl>
+  <dgm:styleLbl name="fgAcc1">
+    <dgm:scene3d>
+      <a:camera prst="orthographicFront"/>
+      <a:lightRig rig="threePt" dir="t"/>
+    </dgm:scene3d>
+    <dgm:sp3d/>
+    <dgm:txPr/>
+    <dgm:style>
+      <a:lnRef idx="2">
+        <a:scrgbClr r="0" g="0" b="0"/>
+      </a:lnRef>
+      <a:fillRef idx="1">
+        <a:scrgbClr r="0" g="0" b="0"/>
+      </a:fillRef>
+      <a:effectRef idx="0">
+        <a:scrgbClr r="0" g="0" b="0"/>
+      </a:effectRef>
+      <a:fontRef idx="minor"/>
+    </dgm:style>
+  </dgm:styleLbl>
+  <dgm:styleLbl name="conFgAcc1">
+    <dgm:scene3d>
+      <a:camera prst="orthographicFront"/>
+      <a:lightRig rig="threePt" dir="t"/>
+    </dgm:scene3d>
+    <dgm:sp3d/>
+    <dgm:txPr/>
+    <dgm:style>
+      <a:lnRef idx="2">
+        <a:scrgbClr r="0" g="0" b="0"/>
+      </a:lnRef>
+      <a:fillRef idx="1">
+        <a:scrgbClr r="0" g="0" b="0"/>
+      </a:fillRef>
+      <a:effectRef idx="0">
+        <a:scrgbClr r="0" g="0" b="0"/>
+      </a:effectRef>
+      <a:fontRef idx="minor"/>
+    </dgm:style>
+  </dgm:styleLbl>
+  <dgm:styleLbl name="alignAcc1">
+    <dgm:scene3d>
+      <a:camera prst="orthographicFront"/>
+      <a:lightRig rig="threePt" dir="t"/>
+    </dgm:scene3d>
+    <dgm:sp3d/>
+    <dgm:txPr/>
+    <dgm:style>
+      <a:lnRef idx="2">
+        <a:scrgbClr r="0" g="0" b="0"/>
+      </a:lnRef>
+      <a:fillRef idx="1">
+        <a:scrgbClr r="0" g="0" b="0"/>
+      </a:fillRef>
+      <a:effectRef idx="0">
+        <a:scrgbClr r="0" g="0" b="0"/>
+      </a:effectRef>
+      <a:fontRef idx="minor"/>
+    </dgm:style>
+  </dgm:styleLbl>
+  <dgm:styleLbl name="trAlignAcc1">
+    <dgm:scene3d>
+      <a:camera prst="orthographicFront"/>
+      <a:lightRig rig="threePt" dir="t"/>
+    </dgm:scene3d>
+    <dgm:sp3d/>
+    <dgm:txPr/>
+    <dgm:style>
+      <a:lnRef idx="1">
+        <a:scrgbClr r="0" g="0" b="0"/>
+      </a:lnRef>
+      <a:fillRef idx="1">
+        <a:scrgbClr r="0" g="0" b="0"/>
+      </a:fillRef>
+      <a:effectRef idx="0">
+        <a:scrgbClr r="0" g="0" b="0"/>
+      </a:effectRef>
+      <a:fontRef idx="minor"/>
+    </dgm:style>
+  </dgm:styleLbl>
+  <dgm:styleLbl name="bgAcc1">
+    <dgm:scene3d>
+      <a:camera prst="orthographicFront"/>
+      <a:lightRig rig="threePt" dir="t"/>
+    </dgm:scene3d>
+    <dgm:sp3d/>
+    <dgm:txPr/>
+    <dgm:style>
+      <a:lnRef idx="2">
+        <a:scrgbClr r="0" g="0" b="0"/>
+      </a:lnRef>
+      <a:fillRef idx="1">
+        <a:scrgbClr r="0" g="0" b="0"/>
+      </a:fillRef>
+      <a:effectRef idx="0">
+        <a:scrgbClr r="0" g="0" b="0"/>
+      </a:effectRef>
+      <a:fontRef idx="minor"/>
+    </dgm:style>
+  </dgm:styleLbl>
+  <dgm:styleLbl name="solidFgAcc1">
+    <dgm:scene3d>
+      <a:camera prst="orthographicFront"/>
+      <a:lightRig rig="threePt" dir="t"/>
+    </dgm:scene3d>
+    <dgm:sp3d/>
+    <dgm:txPr/>
+    <dgm:style>
+      <a:lnRef idx="2">
+        <a:scrgbClr r="0" g="0" b="0"/>
+      </a:lnRef>
+      <a:fillRef idx="1">
+        <a:scrgbClr r="0" g="0" b="0"/>
+      </a:fillRef>
+      <a:effectRef idx="0">
+        <a:scrgbClr r="0" g="0" b="0"/>
+      </a:effectRef>
+      <a:fontRef idx="minor"/>
+    </dgm:style>
+  </dgm:styleLbl>
+  <dgm:styleLbl name="solidAlignAcc1">
+    <dgm:scene3d>
+      <a:camera prst="orthographicFront"/>
+      <a:lightRig rig="threePt" dir="t"/>
+    </dgm:scene3d>
+    <dgm:sp3d/>
+    <dgm:txPr/>
+    <dgm:style>
+      <a:lnRef idx="2">
+        <a:scrgbClr r="0" g="0" b="0"/>
+      </a:lnRef>
+      <a:fillRef idx="1">
+        <a:scrgbClr r="0" g="0" b="0"/>
+      </a:fillRef>
+      <a:effectRef idx="0">
+        <a:scrgbClr r="0" g="0" b="0"/>
+      </a:effectRef>
+      <a:fontRef idx="minor"/>
+    </dgm:style>
+  </dgm:styleLbl>
+  <dgm:styleLbl name="solidBgAcc1">
+    <dgm:scene3d>
+      <a:camera prst="orthographicFront"/>
+      <a:lightRig rig="threePt" dir="t"/>
+    </dgm:scene3d>
+    <dgm:sp3d/>
+    <dgm:txPr/>
+    <dgm:style>
+      <a:lnRef idx="2">
+        <a:scrgbClr r="0" g="0" b="0"/>
+      </a:lnRef>
+      <a:fillRef idx="1">
+        <a:scrgbClr r="0" g="0" b="0"/>
+      </a:fillRef>
+      <a:effectRef idx="0">
+        <a:scrgbClr r="0" g="0" b="0"/>
+      </a:effectRef>
+      <a:fontRef idx="minor"/>
+    </dgm:style>
+  </dgm:styleLbl>
+  <dgm:styleLbl name="fgAccFollowNode1">
+    <dgm:scene3d>
+      <a:camera prst="orthographicFront"/>
+      <a:lightRig rig="threePt" dir="t"/>
+    </dgm:scene3d>
+    <dgm:sp3d/>
+    <dgm:txPr/>
+    <dgm:style>
+      <a:lnRef idx="2">
+        <a:scrgbClr r="0" g="0" b="0"/>
+      </a:lnRef>
+      <a:fillRef idx="1">
+        <a:scrgbClr r="0" g="0" b="0"/>
+      </a:fillRef>
+      <a:effectRef idx="0">
+        <a:scrgbClr r="0" g="0" b="0"/>
+      </a:effectRef>
+      <a:fontRef idx="minor"/>
+    </dgm:style>
+  </dgm:styleLbl>
+  <dgm:styleLbl name="alignAccFollowNode1">
+    <dgm:scene3d>
+      <a:camera prst="orthographicFront"/>
+      <a:lightRig rig="threePt" dir="t"/>
+    </dgm:scene3d>
+    <dgm:sp3d/>
+    <dgm:txPr/>
+    <dgm:style>
+      <a:lnRef idx="2">
+        <a:scrgbClr r="0" g="0" b="0"/>
+      </a:lnRef>
+      <a:fillRef idx="1">
+        <a:scrgbClr r="0" g="0" b="0"/>
+      </a:fillRef>
+      <a:effectRef idx="0">
+        <a:scrgbClr r="0" g="0" b="0"/>
+      </a:effectRef>
+      <a:fontRef idx="minor"/>
+    </dgm:style>
+  </dgm:styleLbl>
+  <dgm:styleLbl name="bgAccFollowNode1">
+    <dgm:scene3d>
+      <a:camera prst="orthographicFront"/>
+      <a:lightRig rig="threePt" dir="t"/>
+    </dgm:scene3d>
+    <dgm:sp3d/>
+    <dgm:txPr/>
+    <dgm:style>
+      <a:lnRef idx="2">
+        <a:scrgbClr r="0" g="0" b="0"/>
+      </a:lnRef>
+      <a:fillRef idx="1">
+        <a:scrgbClr r="0" g="0" b="0"/>
+      </a:fillRef>
+      <a:effectRef idx="0">
+        <a:scrgbClr r="0" g="0" b="0"/>
+      </a:effectRef>
+      <a:fontRef idx="minor"/>
+    </dgm:style>
+  </dgm:styleLbl>
+  <dgm:styleLbl name="fgAcc0">
+    <dgm:scene3d>
+      <a:camera prst="orthographicFront"/>
+      <a:lightRig rig="threePt" dir="t"/>
+    </dgm:scene3d>
+    <dgm:sp3d/>
+    <dgm:txPr/>
+    <dgm:style>
+      <a:lnRef idx="2">
+        <a:scrgbClr r="0" g="0" b="0"/>
+      </a:lnRef>
+      <a:fillRef idx="1">
+        <a:scrgbClr r="0" g="0" b="0"/>
+      </a:fillRef>
+      <a:effectRef idx="0">
+        <a:scrgbClr r="0" g="0" b="0"/>
+      </a:effectRef>
+      <a:fontRef idx="minor"/>
+    </dgm:style>
+  </dgm:styleLbl>
+  <dgm:styleLbl name="fgAcc2">
+    <dgm:scene3d>
+      <a:camera prst="orthographicFront"/>
+      <a:lightRig rig="threePt" dir="t"/>
+    </dgm:scene3d>
+    <dgm:sp3d/>
+    <dgm:txPr/>
+    <dgm:style>
+      <a:lnRef idx="2">
+        <a:scrgbClr r="0" g="0" b="0"/>
+      </a:lnRef>
+      <a:fillRef idx="1">
+        <a:scrgbClr r="0" g="0" b="0"/>
+      </a:fillRef>
+      <a:effectRef idx="0">
+        <a:scrgbClr r="0" g="0" b="0"/>
+      </a:effectRef>
+      <a:fontRef idx="minor"/>
+    </dgm:style>
+  </dgm:styleLbl>
+  <dgm:styleLbl name="fgAcc3">
+    <dgm:scene3d>
+      <a:camera prst="orthographicFront"/>
+      <a:lightRig rig="threePt" dir="t"/>
+    </dgm:scene3d>
+    <dgm:sp3d/>
+    <dgm:txPr/>
+    <dgm:style>
+      <a:lnRef idx="2">
+        <a:scrgbClr r="0" g="0" b="0"/>
+      </a:lnRef>
+      <a:fillRef idx="1">
+        <a:scrgbClr r="0" g="0" b="0"/>
+      </a:fillRef>
+      <a:effectRef idx="0">
+        <a:scrgbClr r="0" g="0" b="0"/>
+      </a:effectRef>
+      <a:fontRef idx="minor"/>
+    </dgm:style>
+  </dgm:styleLbl>
+  <dgm:styleLbl name="fgAcc4">
+    <dgm:scene3d>
+      <a:camera prst="orthographicFront"/>
+      <a:lightRig rig="threePt" dir="t"/>
+    </dgm:scene3d>
+    <dgm:sp3d/>
+    <dgm:txPr/>
+    <dgm:style>
+      <a:lnRef idx="2">
+        <a:scrgbClr r="0" g="0" b="0"/>
+      </a:lnRef>
+      <a:fillRef idx="1">
+        <a:scrgbClr r="0" g="0" b="0"/>
+      </a:fillRef>
+      <a:effectRef idx="0">
+        <a:scrgbClr r="0" g="0" b="0"/>
+      </a:effectRef>
+      <a:fontRef idx="minor"/>
+    </dgm:style>
+  </dgm:styleLbl>
+  <dgm:styleLbl name="bgShp">
+    <dgm:scene3d>
+      <a:camera prst="orthographicFront"/>
+      <a:lightRig rig="threePt" dir="t"/>
+    </dgm:scene3d>
+    <dgm:sp3d/>
+    <dgm:txPr/>
+    <dgm:style>
+      <a:lnRef idx="0">
+        <a:scrgbClr r="0" g="0" b="0"/>
+      </a:lnRef>
+      <a:fillRef idx="1">
+        <a:scrgbClr r="0" g="0" b="0"/>
+      </a:fillRef>
+      <a:effectRef idx="0">
+        <a:scrgbClr r="0" g="0" b="0"/>
+      </a:effectRef>
+      <a:fontRef idx="minor"/>
+    </dgm:style>
+  </dgm:styleLbl>
+  <dgm:styleLbl name="dkBgShp">
+    <dgm:scene3d>
+      <a:camera prst="orthographicFront"/>
+      <a:lightRig rig="threePt" dir="t"/>
+    </dgm:scene3d>
+    <dgm:sp3d/>
+    <dgm:txPr/>
+    <dgm:style>
+      <a:lnRef idx="0">
+        <a:scrgbClr r="0" g="0" b="0"/>
+      </a:lnRef>
+      <a:fillRef idx="1">
+        <a:scrgbClr r="0" g="0" b="0"/>
+      </a:fillRef>
+      <a:effectRef idx="0">
+        <a:scrgbClr r="0" g="0" b="0"/>
+      </a:effectRef>
+      <a:fontRef idx="minor"/>
+    </dgm:style>
+  </dgm:styleLbl>
+  <dgm:styleLbl name="trBgShp">
+    <dgm:scene3d>
+      <a:camera prst="orthographicFront"/>
+      <a:lightRig rig="threePt" dir="t"/>
+    </dgm:scene3d>
+    <dgm:sp3d/>
+    <dgm:txPr/>
+    <dgm:style>
+      <a:lnRef idx="0">
+        <a:scrgbClr r="0" g="0" b="0"/>
+      </a:lnRef>
+      <a:fillRef idx="1">
+        <a:scrgbClr r="0" g="0" b="0"/>
+      </a:fillRef>
+      <a:effectRef idx="0">
+        <a:scrgbClr r="0" g="0" b="0"/>
+      </a:effectRef>
+      <a:fontRef idx="minor"/>
+    </dgm:style>
+  </dgm:styleLbl>
+  <dgm:styleLbl name="fgShp">
+    <dgm:scene3d>
+      <a:camera prst="orthographicFront"/>
+      <a:lightRig rig="threePt" dir="t"/>
+    </dgm:scene3d>
+    <dgm:sp3d/>
+    <dgm:txPr/>
+    <dgm:style>
+      <a:lnRef idx="2">
+        <a:scrgbClr r="0" g="0" b="0"/>
+      </a:lnRef>
+      <a:fillRef idx="1">
+        <a:scrgbClr r="0" g="0" b="0"/>
+      </a:fillRef>
+      <a:effectRef idx="0">
+        <a:scrgbClr r="0" g="0" b="0"/>
+      </a:effectRef>
+      <a:fontRef idx="minor"/>
+    </dgm:style>
+  </dgm:styleLbl>
+  <dgm:styleLbl name="revTx">
+    <dgm:scene3d>
+      <a:camera prst="orthographicFront"/>
+      <a:lightRig rig="threePt" dir="t"/>
+    </dgm:scene3d>
+    <dgm:sp3d/>
+    <dgm:txPr/>
+    <dgm:style>
+      <a:lnRef idx="0">
+        <a:scrgbClr r="0" g="0" b="0"/>
+      </a:lnRef>
+      <a:fillRef idx="0">
+        <a:scrgbClr r="0" g="0" b="0"/>
+      </a:fillRef>
+      <a:effectRef idx="0">
+        <a:scrgbClr r="0" g="0" b="0"/>
+      </a:effectRef>
+      <a:fontRef idx="minor"/>
+    </dgm:style>
+  </dgm:styleLbl>
+</dgm:styleDef>
+</file>
+
 <file path=ppt/notesMasters/notesMaster1.xml><?xml version="1.0" encoding="utf-8"?>
 <p:notesMaster xmlns:a="http://schemas.openxmlformats.org/drawingml/2006/main" xmlns:r="http://schemas.openxmlformats.org/officeDocument/2006/relationships" xmlns:p="http://schemas.openxmlformats.org/presentationml/2006/main">
   <p:cSld>
@@ -3347,7 +6496,7 @@
           <a:p>
             <a:fld id="{5100E855-DC3F-44F7-B6F1-F5D0C0D1A424}" type="datetimeFigureOut">
               <a:rPr lang="en-US" smtClean="0"/>
-              <a:t>4/1/2021</a:t>
+              <a:t>4/5/2021</a:t>
             </a:fld>
             <a:endParaRPr lang="en-US"/>
           </a:p>
@@ -4263,7 +7412,7 @@
           <a:p>
             <a:fld id="{9184DA70-C731-4C70-880D-CCD4705E623C}" type="datetime1">
               <a:rPr lang="en-US" smtClean="0"/>
-              <a:t>4/1/2021</a:t>
+              <a:t>4/5/2021</a:t>
             </a:fld>
             <a:endParaRPr lang="en-US" dirty="0"/>
           </a:p>
@@ -4451,7 +7600,7 @@
           <a:p>
             <a:fld id="{4BE1D723-8F53-4F53-90B0-1982A396982E}" type="datetime1">
               <a:rPr lang="en-US" smtClean="0"/>
-              <a:t>4/1/2021</a:t>
+              <a:t>4/5/2021</a:t>
             </a:fld>
             <a:endParaRPr lang="en-US" dirty="0"/>
           </a:p>
@@ -4824,7 +7973,7 @@
           <a:p>
             <a:fld id="{97669AF7-7BEB-44E4-9852-375E34362B5B}" type="datetime1">
               <a:rPr lang="en-US" smtClean="0"/>
-              <a:t>4/1/2021</a:t>
+              <a:t>4/5/2021</a:t>
             </a:fld>
             <a:endParaRPr lang="en-US" dirty="0"/>
           </a:p>
@@ -5079,7 +8228,7 @@
           <a:p>
             <a:fld id="{BAAAC38D-0552-4C82-B593-E6124DFADBE2}" type="datetime1">
               <a:rPr lang="en-US" smtClean="0"/>
-              <a:t>4/1/2021</a:t>
+              <a:t>4/5/2021</a:t>
             </a:fld>
             <a:endParaRPr lang="en-US" dirty="0"/>
           </a:p>
@@ -5476,7 +8625,7 @@
           <a:p>
             <a:fld id="{D9DF0F1C-5577-4ACB-BB62-DF8F3C494C7E}" type="datetime1">
               <a:rPr lang="en-US" smtClean="0"/>
-              <a:t>4/1/2021</a:t>
+              <a:t>4/5/2021</a:t>
             </a:fld>
             <a:endParaRPr lang="en-US" dirty="0"/>
           </a:p>
@@ -5612,7 +8761,7 @@
           <a:p>
             <a:fld id="{1775B394-D9F9-4F0C-B15D-605F45CB9E9F}" type="datetime1">
               <a:rPr lang="en-US" smtClean="0"/>
-              <a:t>4/1/2021</a:t>
+              <a:t>4/5/2021</a:t>
             </a:fld>
             <a:endParaRPr lang="en-US" dirty="0"/>
           </a:p>
@@ -5769,7 +8918,7 @@
           <a:p>
             <a:fld id="{39667345-2558-425A-8533-9BFDBCE15005}" type="datetime1">
               <a:rPr lang="en-US" smtClean="0"/>
-              <a:t>4/1/2021</a:t>
+              <a:t>4/5/2021</a:t>
             </a:fld>
             <a:endParaRPr lang="en-US" dirty="0"/>
           </a:p>
@@ -6098,7 +9247,7 @@
           <a:p>
             <a:fld id="{92BEA474-078D-4E9B-9B14-09A87B19DC46}" type="datetime1">
               <a:rPr lang="en-US" smtClean="0"/>
-              <a:t>4/1/2021</a:t>
+              <a:t>4/5/2021</a:t>
             </a:fld>
             <a:endParaRPr lang="en-US" dirty="0"/>
           </a:p>
@@ -6448,7 +9597,7 @@
           <a:p>
             <a:fld id="{4907D986-8816-4272-A432-0437A28A9828}" type="datetime1">
               <a:rPr lang="en-US" smtClean="0"/>
-              <a:t>4/1/2021</a:t>
+              <a:t>4/5/2021</a:t>
             </a:fld>
             <a:endParaRPr lang="en-US" dirty="0"/>
           </a:p>
@@ -6709,7 +9858,7 @@
           <a:p>
             <a:fld id="{62D6E202-B606-4609-B914-27C9371A1F6D}" type="datetime1">
               <a:rPr lang="en-US" smtClean="0"/>
-              <a:t>4/1/2021</a:t>
+              <a:t>4/5/2021</a:t>
             </a:fld>
             <a:endParaRPr lang="en-US" dirty="0"/>
           </a:p>
@@ -8837,6 +11986,885 @@
 </p:sld>
 </file>
 
+<file path=ppt/slides/slide5.xml><?xml version="1.0" encoding="utf-8"?>
+<p:sld xmlns:a="http://schemas.openxmlformats.org/drawingml/2006/main" xmlns:r="http://schemas.openxmlformats.org/officeDocument/2006/relationships" xmlns:p="http://schemas.openxmlformats.org/presentationml/2006/main">
+  <p:cSld>
+    <p:bg>
+      <p:bgPr>
+        <a:solidFill>
+          <a:schemeClr val="bg1"/>
+        </a:solidFill>
+        <a:effectLst/>
+      </p:bgPr>
+    </p:bg>
+    <p:spTree>
+      <p:nvGrpSpPr>
+        <p:cNvPr id="1" name=""/>
+        <p:cNvGrpSpPr/>
+        <p:nvPr/>
+      </p:nvGrpSpPr>
+      <p:grpSpPr>
+        <a:xfrm>
+          <a:off x="0" y="0"/>
+          <a:ext cx="0" cy="0"/>
+          <a:chOff x="0" y="0"/>
+          <a:chExt cx="0" cy="0"/>
+        </a:xfrm>
+      </p:grpSpPr>
+      <p:sp>
+        <p:nvSpPr>
+          <p:cNvPr id="1034" name="Rectangle 76">
+            <a:extLst>
+              <a:ext uri="{FF2B5EF4-FFF2-40B4-BE49-F238E27FC236}">
+                <a16:creationId xmlns:a16="http://schemas.microsoft.com/office/drawing/2014/main" id="{416A0E3C-60E6-4F39-BC55-5F7C224E1F7C}"/>
+              </a:ext>
+              <a:ext uri="{C183D7F6-B498-43B3-948B-1728B52AA6E4}">
+                <adec:decorative xmlns:adec="http://schemas.microsoft.com/office/drawing/2017/decorative" val="1"/>
+              </a:ext>
+            </a:extLst>
+          </p:cNvPr>
+          <p:cNvSpPr>
+            <a:spLocks noGrp="1" noRot="1" noChangeAspect="1" noMove="1" noResize="1" noEditPoints="1" noAdjustHandles="1" noChangeArrowheads="1" noChangeShapeType="1" noTextEdit="1"/>
+          </p:cNvSpPr>
+          <p:nvPr>
+            <p:extLst>
+              <p:ext uri="{386F3935-93C4-4BCD-93E2-E3B085C9AB24}">
+                <p16:designElem xmlns:p16="http://schemas.microsoft.com/office/powerpoint/2015/main" val="1"/>
+              </p:ext>
+            </p:extLst>
+          </p:nvPr>
+        </p:nvSpPr>
+        <p:spPr>
+          <a:xfrm>
+            <a:off x="3175" y="6400800"/>
+            <a:ext cx="12188825" cy="457200"/>
+          </a:xfrm>
+          <a:prstGeom prst="rect">
+            <a:avLst/>
+          </a:prstGeom>
+          <a:solidFill>
+            <a:srgbClr val="262626"/>
+          </a:solidFill>
+          <a:ln>
+            <a:noFill/>
+          </a:ln>
+        </p:spPr>
+        <p:style>
+          <a:lnRef idx="2">
+            <a:schemeClr val="accent1">
+              <a:shade val="50000"/>
+            </a:schemeClr>
+          </a:lnRef>
+          <a:fillRef idx="1">
+            <a:schemeClr val="accent1"/>
+          </a:fillRef>
+          <a:effectRef idx="0">
+            <a:schemeClr val="accent1"/>
+          </a:effectRef>
+          <a:fontRef idx="minor">
+            <a:schemeClr val="lt1"/>
+          </a:fontRef>
+        </p:style>
+      </p:sp>
+      <p:cxnSp>
+        <p:nvCxnSpPr>
+          <p:cNvPr id="1035" name="Straight Connector 78">
+            <a:extLst>
+              <a:ext uri="{FF2B5EF4-FFF2-40B4-BE49-F238E27FC236}">
+                <a16:creationId xmlns:a16="http://schemas.microsoft.com/office/drawing/2014/main" id="{C5025DAC-8B93-4160-B017-3A274A5828C0}"/>
+              </a:ext>
+              <a:ext uri="{C183D7F6-B498-43B3-948B-1728B52AA6E4}">
+                <adec:decorative xmlns:adec="http://schemas.microsoft.com/office/drawing/2017/decorative" val="1"/>
+              </a:ext>
+            </a:extLst>
+          </p:cNvPr>
+          <p:cNvCxnSpPr>
+            <a:cxnSpLocks noGrp="1" noRot="1" noChangeAspect="1" noMove="1" noResize="1" noEditPoints="1" noAdjustHandles="1" noChangeArrowheads="1" noChangeShapeType="1"/>
+          </p:cNvCxnSpPr>
+          <p:nvPr>
+            <p:extLst>
+              <p:ext uri="{386F3935-93C4-4BCD-93E2-E3B085C9AB24}">
+                <p16:designElem xmlns:p16="http://schemas.microsoft.com/office/powerpoint/2015/main" val="1"/>
+              </p:ext>
+            </p:extLst>
+          </p:nvPr>
+        </p:nvCxnSpPr>
+        <p:spPr>
+          <a:xfrm>
+            <a:off x="1193532" y="1897380"/>
+            <a:ext cx="9966960" cy="0"/>
+          </a:xfrm>
+          <a:prstGeom prst="line">
+            <a:avLst/>
+          </a:prstGeom>
+          <a:ln w="12700">
+            <a:solidFill>
+              <a:schemeClr val="tx1">
+                <a:lumMod val="75000"/>
+                <a:lumOff val="25000"/>
+              </a:schemeClr>
+            </a:solidFill>
+          </a:ln>
+        </p:spPr>
+        <p:style>
+          <a:lnRef idx="1">
+            <a:schemeClr val="accent1"/>
+          </a:lnRef>
+          <a:fillRef idx="0">
+            <a:schemeClr val="accent1"/>
+          </a:fillRef>
+          <a:effectRef idx="0">
+            <a:schemeClr val="accent1"/>
+          </a:effectRef>
+          <a:fontRef idx="minor">
+            <a:schemeClr val="tx1"/>
+          </a:fontRef>
+        </p:style>
+      </p:cxnSp>
+      <p:sp useBgFill="1">
+        <p:nvSpPr>
+          <p:cNvPr id="1036" name="Rectangle 80">
+            <a:extLst>
+              <a:ext uri="{FF2B5EF4-FFF2-40B4-BE49-F238E27FC236}">
+                <a16:creationId xmlns:a16="http://schemas.microsoft.com/office/drawing/2014/main" id="{39B4056F-1959-4627-A683-77F6C0603FCD}"/>
+              </a:ext>
+              <a:ext uri="{C183D7F6-B498-43B3-948B-1728B52AA6E4}">
+                <adec:decorative xmlns:adec="http://schemas.microsoft.com/office/drawing/2017/decorative" val="1"/>
+              </a:ext>
+            </a:extLst>
+          </p:cNvPr>
+          <p:cNvSpPr>
+            <a:spLocks noGrp="1" noRot="1" noChangeAspect="1" noMove="1" noResize="1" noEditPoints="1" noAdjustHandles="1" noChangeArrowheads="1" noChangeShapeType="1" noTextEdit="1"/>
+          </p:cNvSpPr>
+          <p:nvPr>
+            <p:extLst>
+              <p:ext uri="{386F3935-93C4-4BCD-93E2-E3B085C9AB24}">
+                <p16:designElem xmlns:p16="http://schemas.microsoft.com/office/powerpoint/2015/main" val="1"/>
+              </p:ext>
+            </p:extLst>
+          </p:nvPr>
+        </p:nvSpPr>
+        <p:spPr>
+          <a:xfrm>
+            <a:off x="0" y="0"/>
+            <a:ext cx="12192001" cy="6858000"/>
+          </a:xfrm>
+          <a:prstGeom prst="rect">
+            <a:avLst/>
+          </a:prstGeom>
+          <a:ln>
+            <a:noFill/>
+          </a:ln>
+        </p:spPr>
+        <p:style>
+          <a:lnRef idx="2">
+            <a:schemeClr val="accent1">
+              <a:shade val="50000"/>
+            </a:schemeClr>
+          </a:lnRef>
+          <a:fillRef idx="1">
+            <a:schemeClr val="accent1"/>
+          </a:fillRef>
+          <a:effectRef idx="0">
+            <a:schemeClr val="accent1"/>
+          </a:effectRef>
+          <a:fontRef idx="minor">
+            <a:schemeClr val="lt1"/>
+          </a:fontRef>
+        </p:style>
+        <p:txBody>
+          <a:bodyPr rtlCol="0" anchor="ctr"/>
+          <a:lstStyle/>
+          <a:p>
+            <a:pPr algn="ctr"/>
+            <a:endParaRPr lang="en-US"/>
+          </a:p>
+        </p:txBody>
+      </p:sp>
+      <p:sp>
+        <p:nvSpPr>
+          <p:cNvPr id="1037" name="Rectangle 82">
+            <a:extLst>
+              <a:ext uri="{FF2B5EF4-FFF2-40B4-BE49-F238E27FC236}">
+                <a16:creationId xmlns:a16="http://schemas.microsoft.com/office/drawing/2014/main" id="{D8D7349B-C9FA-4FCE-A1FF-948F460A3A9A}"/>
+              </a:ext>
+              <a:ext uri="{C183D7F6-B498-43B3-948B-1728B52AA6E4}">
+                <adec:decorative xmlns:adec="http://schemas.microsoft.com/office/drawing/2017/decorative" val="1"/>
+              </a:ext>
+            </a:extLst>
+          </p:cNvPr>
+          <p:cNvSpPr>
+            <a:spLocks noGrp="1" noRot="1" noChangeAspect="1" noMove="1" noResize="1" noEditPoints="1" noAdjustHandles="1" noChangeArrowheads="1" noChangeShapeType="1" noTextEdit="1"/>
+          </p:cNvSpPr>
+          <p:nvPr>
+            <p:extLst>
+              <p:ext uri="{386F3935-93C4-4BCD-93E2-E3B085C9AB24}">
+                <p16:designElem xmlns:p16="http://schemas.microsoft.com/office/powerpoint/2015/main" val="1"/>
+              </p:ext>
+            </p:extLst>
+          </p:nvPr>
+        </p:nvSpPr>
+        <p:spPr bwMode="white">
+          <a:xfrm>
+            <a:off x="1507" y="4554906"/>
+            <a:ext cx="12188952" cy="2303094"/>
+          </a:xfrm>
+          <a:prstGeom prst="rect">
+            <a:avLst/>
+          </a:prstGeom>
+          <a:solidFill>
+            <a:srgbClr val="262626"/>
+          </a:solidFill>
+          <a:ln>
+            <a:noFill/>
+          </a:ln>
+        </p:spPr>
+        <p:style>
+          <a:lnRef idx="2">
+            <a:schemeClr val="accent1">
+              <a:shade val="50000"/>
+            </a:schemeClr>
+          </a:lnRef>
+          <a:fillRef idx="1">
+            <a:schemeClr val="accent1"/>
+          </a:fillRef>
+          <a:effectRef idx="0">
+            <a:schemeClr val="accent1"/>
+          </a:effectRef>
+          <a:fontRef idx="minor">
+            <a:schemeClr val="lt1"/>
+          </a:fontRef>
+        </p:style>
+      </p:sp>
+      <p:sp>
+        <p:nvSpPr>
+          <p:cNvPr id="5" name="Title 4">
+            <a:extLst>
+              <a:ext uri="{FF2B5EF4-FFF2-40B4-BE49-F238E27FC236}">
+                <a16:creationId xmlns:a16="http://schemas.microsoft.com/office/drawing/2014/main" id="{643C2EDD-9B02-481C-9721-A6669C7B7060}"/>
+              </a:ext>
+            </a:extLst>
+          </p:cNvPr>
+          <p:cNvSpPr>
+            <a:spLocks noGrp="1"/>
+          </p:cNvSpPr>
+          <p:nvPr>
+            <p:ph type="title"/>
+          </p:nvPr>
+        </p:nvSpPr>
+        <p:spPr>
+          <a:xfrm>
+            <a:off x="633998" y="4905301"/>
+            <a:ext cx="4988879" cy="1554485"/>
+          </a:xfrm>
+        </p:spPr>
+        <p:txBody>
+          <a:bodyPr vert="horz" lIns="91440" tIns="45720" rIns="91440" bIns="45720" rtlCol="0" anchor="ctr">
+            <a:normAutofit/>
+          </a:bodyPr>
+          <a:lstStyle/>
+          <a:p>
+            <a:pPr algn="r"/>
+            <a:r>
+              <a:rPr lang="en-US" sz="4000" dirty="0"/>
+              <a:t>Mediator</a:t>
+            </a:r>
+          </a:p>
+        </p:txBody>
+      </p:sp>
+      <p:cxnSp>
+        <p:nvCxnSpPr>
+          <p:cNvPr id="85" name="Straight Connector 84">
+            <a:extLst>
+              <a:ext uri="{FF2B5EF4-FFF2-40B4-BE49-F238E27FC236}">
+                <a16:creationId xmlns:a16="http://schemas.microsoft.com/office/drawing/2014/main" id="{55646586-8E5D-4A2B-BDA9-01CE28AC89A1}"/>
+              </a:ext>
+              <a:ext uri="{C183D7F6-B498-43B3-948B-1728B52AA6E4}">
+                <adec:decorative xmlns:adec="http://schemas.microsoft.com/office/drawing/2017/decorative" val="1"/>
+              </a:ext>
+            </a:extLst>
+          </p:cNvPr>
+          <p:cNvCxnSpPr>
+            <a:cxnSpLocks noGrp="1" noRot="1" noChangeAspect="1" noMove="1" noResize="1" noEditPoints="1" noAdjustHandles="1" noChangeArrowheads="1" noChangeShapeType="1"/>
+          </p:cNvCxnSpPr>
+          <p:nvPr>
+            <p:extLst>
+              <p:ext uri="{386F3935-93C4-4BCD-93E2-E3B085C9AB24}">
+                <p16:designElem xmlns:p16="http://schemas.microsoft.com/office/powerpoint/2015/main" val="1"/>
+              </p:ext>
+            </p:extLst>
+          </p:nvPr>
+        </p:nvCxnSpPr>
+        <p:spPr>
+          <a:xfrm>
+            <a:off x="5820770" y="5247564"/>
+            <a:ext cx="0" cy="873457"/>
+          </a:xfrm>
+          <a:prstGeom prst="line">
+            <a:avLst/>
+          </a:prstGeom>
+          <a:ln w="19050">
+            <a:solidFill>
+              <a:srgbClr val="FFC578"/>
+            </a:solidFill>
+          </a:ln>
+        </p:spPr>
+        <p:style>
+          <a:lnRef idx="1">
+            <a:schemeClr val="accent1"/>
+          </a:lnRef>
+          <a:fillRef idx="0">
+            <a:schemeClr val="accent1"/>
+          </a:fillRef>
+          <a:effectRef idx="0">
+            <a:schemeClr val="accent1"/>
+          </a:effectRef>
+          <a:fontRef idx="minor">
+            <a:schemeClr val="tx1"/>
+          </a:fontRef>
+        </p:style>
+      </p:cxnSp>
+      <p:sp>
+        <p:nvSpPr>
+          <p:cNvPr id="7" name="Text Placeholder 6">
+            <a:extLst>
+              <a:ext uri="{FF2B5EF4-FFF2-40B4-BE49-F238E27FC236}">
+                <a16:creationId xmlns:a16="http://schemas.microsoft.com/office/drawing/2014/main" id="{7E8F4492-485A-4DE4-AF79-08F65DEE159B}"/>
+              </a:ext>
+            </a:extLst>
+          </p:cNvPr>
+          <p:cNvSpPr>
+            <a:spLocks noGrp="1"/>
+          </p:cNvSpPr>
+          <p:nvPr>
+            <p:ph type="body" sz="half" idx="2"/>
+          </p:nvPr>
+        </p:nvSpPr>
+        <p:spPr>
+          <a:xfrm>
+            <a:off x="6064301" y="4905300"/>
+            <a:ext cx="5493699" cy="1554485"/>
+          </a:xfrm>
+        </p:spPr>
+        <p:txBody>
+          <a:bodyPr vert="horz" lIns="0" tIns="45720" rIns="0" bIns="45720" rtlCol="0" anchor="ctr">
+            <a:normAutofit/>
+          </a:bodyPr>
+          <a:lstStyle/>
+          <a:p>
+            <a:pPr>
+              <a:lnSpc>
+                <a:spcPct val="100000"/>
+              </a:lnSpc>
+            </a:pPr>
+            <a:r>
+              <a:rPr lang="en-US" dirty="0">
+                <a:solidFill>
+                  <a:schemeClr val="accent5">
+                    <a:lumMod val="75000"/>
+                  </a:schemeClr>
+                </a:solidFill>
+              </a:rPr>
+              <a:t>Problem</a:t>
+            </a:r>
+            <a:r>
+              <a:rPr lang="en-US" dirty="0"/>
+              <a:t>: </a:t>
+            </a:r>
+          </a:p>
+          <a:p>
+            <a:pPr>
+              <a:lnSpc>
+                <a:spcPct val="100000"/>
+              </a:lnSpc>
+            </a:pPr>
+            <a:r>
+              <a:rPr lang="en-US" dirty="0">
+                <a:solidFill>
+                  <a:schemeClr val="accent5">
+                    <a:lumMod val="75000"/>
+                  </a:schemeClr>
+                </a:solidFill>
+              </a:rPr>
+              <a:t>Solution</a:t>
+            </a:r>
+            <a:r>
+              <a:rPr lang="en-US" dirty="0"/>
+              <a:t>:</a:t>
+            </a:r>
+          </a:p>
+        </p:txBody>
+      </p:sp>
+      <p:pic>
+        <p:nvPicPr>
+          <p:cNvPr id="2" name="Picture 2" descr="Structure of the Mediator design pattern">
+            <a:extLst>
+              <a:ext uri="{FF2B5EF4-FFF2-40B4-BE49-F238E27FC236}">
+                <a16:creationId xmlns:a16="http://schemas.microsoft.com/office/drawing/2014/main" id="{125380CC-11FF-4950-BF22-DF3FE4E05C7B}"/>
+              </a:ext>
+            </a:extLst>
+          </p:cNvPr>
+          <p:cNvPicPr>
+            <a:picLocks noChangeAspect="1" noChangeArrowheads="1"/>
+          </p:cNvPicPr>
+          <p:nvPr/>
+        </p:nvPicPr>
+        <p:blipFill>
+          <a:blip r:embed="rId2">
+            <a:extLst>
+              <a:ext uri="{28A0092B-C50C-407E-A947-70E740481C1C}">
+                <a14:useLocalDpi xmlns:a14="http://schemas.microsoft.com/office/drawing/2010/main" val="0"/>
+              </a:ext>
+            </a:extLst>
+          </a:blip>
+          <a:srcRect/>
+          <a:stretch>
+            <a:fillRect/>
+          </a:stretch>
+        </p:blipFill>
+        <p:spPr bwMode="auto">
+          <a:xfrm>
+            <a:off x="3344270" y="228867"/>
+            <a:ext cx="4953000" cy="4095750"/>
+          </a:xfrm>
+          <a:prstGeom prst="rect">
+            <a:avLst/>
+          </a:prstGeom>
+          <a:noFill/>
+          <a:extLst>
+            <a:ext uri="{909E8E84-426E-40DD-AFC4-6F175D3DCCD1}">
+              <a14:hiddenFill xmlns:a14="http://schemas.microsoft.com/office/drawing/2010/main">
+                <a:solidFill>
+                  <a:srgbClr val="FFFFFF"/>
+                </a:solidFill>
+              </a14:hiddenFill>
+            </a:ext>
+          </a:extLst>
+        </p:spPr>
+      </p:pic>
+    </p:spTree>
+    <p:extLst>
+      <p:ext uri="{BB962C8B-B14F-4D97-AF65-F5344CB8AC3E}">
+        <p14:creationId xmlns:p14="http://schemas.microsoft.com/office/powerpoint/2010/main" val="3087674750"/>
+      </p:ext>
+    </p:extLst>
+  </p:cSld>
+  <p:clrMapOvr>
+    <a:masterClrMapping/>
+  </p:clrMapOvr>
+</p:sld>
+</file>
+
+<file path=ppt/slides/slide6.xml><?xml version="1.0" encoding="utf-8"?>
+<p:sld xmlns:a="http://schemas.openxmlformats.org/drawingml/2006/main" xmlns:r="http://schemas.openxmlformats.org/officeDocument/2006/relationships" xmlns:p="http://schemas.openxmlformats.org/presentationml/2006/main">
+  <p:cSld>
+    <p:spTree>
+      <p:nvGrpSpPr>
+        <p:cNvPr id="1" name=""/>
+        <p:cNvGrpSpPr/>
+        <p:nvPr/>
+      </p:nvGrpSpPr>
+      <p:grpSpPr>
+        <a:xfrm>
+          <a:off x="0" y="0"/>
+          <a:ext cx="0" cy="0"/>
+          <a:chOff x="0" y="0"/>
+          <a:chExt cx="0" cy="0"/>
+        </a:xfrm>
+      </p:grpSpPr>
+      <p:sp>
+        <p:nvSpPr>
+          <p:cNvPr id="5" name="Title 4">
+            <a:extLst>
+              <a:ext uri="{FF2B5EF4-FFF2-40B4-BE49-F238E27FC236}">
+                <a16:creationId xmlns:a16="http://schemas.microsoft.com/office/drawing/2014/main" id="{15DE6CDC-3760-4614-8575-CB1459F11CD8}"/>
+              </a:ext>
+            </a:extLst>
+          </p:cNvPr>
+          <p:cNvSpPr>
+            <a:spLocks noGrp="1"/>
+          </p:cNvSpPr>
+          <p:nvPr>
+            <p:ph type="title"/>
+          </p:nvPr>
+        </p:nvSpPr>
+        <p:spPr/>
+        <p:txBody>
+          <a:bodyPr>
+            <a:normAutofit fontScale="90000"/>
+          </a:bodyPr>
+          <a:lstStyle/>
+          <a:p>
+            <a:r>
+              <a:rPr lang="en-US" dirty="0"/>
+              <a:t>Mediator in a few words + examples from open-source projects</a:t>
+            </a:r>
+          </a:p>
+        </p:txBody>
+      </p:sp>
+      <p:graphicFrame>
+        <p:nvGraphicFramePr>
+          <p:cNvPr id="10" name="Content Placeholder 5">
+            <a:extLst>
+              <a:ext uri="{FF2B5EF4-FFF2-40B4-BE49-F238E27FC236}">
+                <a16:creationId xmlns:a16="http://schemas.microsoft.com/office/drawing/2014/main" id="{1DA604AA-B0C5-4DE1-8F1A-F3546A2ED7F0}"/>
+              </a:ext>
+            </a:extLst>
+          </p:cNvPr>
+          <p:cNvGraphicFramePr>
+            <a:graphicFrameLocks noGrp="1"/>
+          </p:cNvGraphicFramePr>
+          <p:nvPr>
+            <p:ph sz="half" idx="1"/>
+            <p:extLst>
+              <p:ext uri="{D42A27DB-BD31-4B8C-83A1-F6EECF244321}">
+                <p14:modId xmlns:p14="http://schemas.microsoft.com/office/powerpoint/2010/main" val="1869364889"/>
+              </p:ext>
+            </p:extLst>
+          </p:nvPr>
+        </p:nvGraphicFramePr>
+        <p:xfrm>
+          <a:off x="1097280" y="2120900"/>
+          <a:ext cx="4639736" cy="3748193"/>
+        </p:xfrm>
+        <a:graphic>
+          <a:graphicData uri="http://schemas.openxmlformats.org/drawingml/2006/diagram">
+            <dgm:relIds xmlns:dgm="http://schemas.openxmlformats.org/drawingml/2006/diagram" xmlns:r="http://schemas.openxmlformats.org/officeDocument/2006/relationships" r:dm="rId2" r:lo="rId3" r:qs="rId4" r:cs="rId5"/>
+          </a:graphicData>
+        </a:graphic>
+      </p:graphicFrame>
+      <p:sp>
+        <p:nvSpPr>
+          <p:cNvPr id="7" name="Content Placeholder 6">
+            <a:extLst>
+              <a:ext uri="{FF2B5EF4-FFF2-40B4-BE49-F238E27FC236}">
+                <a16:creationId xmlns:a16="http://schemas.microsoft.com/office/drawing/2014/main" id="{DB492ABE-1506-4371-999F-C690661B3366}"/>
+              </a:ext>
+            </a:extLst>
+          </p:cNvPr>
+          <p:cNvSpPr>
+            <a:spLocks noGrp="1"/>
+          </p:cNvSpPr>
+          <p:nvPr>
+            <p:ph sz="half" idx="2"/>
+          </p:nvPr>
+        </p:nvSpPr>
+        <p:spPr>
+          <a:xfrm>
+            <a:off x="6363093" y="2120899"/>
+            <a:ext cx="4911365" cy="3748194"/>
+          </a:xfrm>
+        </p:spPr>
+        <p:txBody>
+          <a:bodyPr>
+            <a:normAutofit lnSpcReduction="10000"/>
+          </a:bodyPr>
+          <a:lstStyle/>
+          <a:p>
+            <a:r>
+              <a:rPr lang="en-US" dirty="0"/>
+              <a:t>C#: </a:t>
+            </a:r>
+            <a:r>
+              <a:rPr lang="en-US" b="0" i="0" dirty="0" err="1">
+                <a:solidFill>
+                  <a:srgbClr val="242729"/>
+                </a:solidFill>
+                <a:effectLst/>
+              </a:rPr>
+              <a:t>System.Threading.Timer</a:t>
+            </a:r>
+            <a:endParaRPr lang="en-US" b="0" i="0" dirty="0">
+              <a:solidFill>
+                <a:srgbClr val="242729"/>
+              </a:solidFill>
+              <a:effectLst/>
+            </a:endParaRPr>
+          </a:p>
+          <a:p>
+            <a:r>
+              <a:rPr lang="en-US" dirty="0"/>
+              <a:t>Java: </a:t>
+            </a:r>
+          </a:p>
+          <a:p>
+            <a:pPr algn="l">
+              <a:buFont typeface="Arial" panose="020B0604020202020204" pitchFamily="34" charset="0"/>
+              <a:buChar char="•"/>
+            </a:pPr>
+            <a:r>
+              <a:rPr lang="en-US" b="0" i="0" dirty="0">
+                <a:solidFill>
+                  <a:srgbClr val="373B41"/>
+                </a:solidFill>
+                <a:effectLst/>
+              </a:rPr>
+              <a:t> </a:t>
+            </a:r>
+            <a:r>
+              <a:rPr lang="en-US" b="0" i="0" dirty="0" err="1">
+                <a:solidFill>
+                  <a:srgbClr val="373B41"/>
+                </a:solidFill>
+                <a:effectLst/>
+              </a:rPr>
+              <a:t>scheduleXXX</a:t>
+            </a:r>
+            <a:r>
+              <a:rPr lang="en-US" b="0" i="0" dirty="0">
+                <a:solidFill>
+                  <a:srgbClr val="373B41"/>
+                </a:solidFill>
+                <a:effectLst/>
+              </a:rPr>
+              <a:t>() methods of </a:t>
+            </a:r>
+            <a:r>
+              <a:rPr lang="en-US" b="0" i="0" u="none" strike="noStrike" dirty="0" err="1">
+                <a:solidFill>
+                  <a:srgbClr val="81A2BE"/>
+                </a:solidFill>
+                <a:effectLst/>
+                <a:hlinkClick r:id="rId7"/>
+              </a:rPr>
+              <a:t>java.util.Timer</a:t>
+            </a:r>
+            <a:endParaRPr lang="en-US" b="0" i="0" dirty="0">
+              <a:solidFill>
+                <a:srgbClr val="373B41"/>
+              </a:solidFill>
+              <a:effectLst/>
+            </a:endParaRPr>
+          </a:p>
+          <a:p>
+            <a:pPr algn="l">
+              <a:buFont typeface="Arial" panose="020B0604020202020204" pitchFamily="34" charset="0"/>
+              <a:buChar char="•"/>
+            </a:pPr>
+            <a:r>
+              <a:rPr lang="en-US" b="0" i="0" dirty="0">
+                <a:solidFill>
+                  <a:srgbClr val="373B41"/>
+                </a:solidFill>
+                <a:effectLst/>
+              </a:rPr>
+              <a:t> </a:t>
+            </a:r>
+            <a:r>
+              <a:rPr lang="en-US" b="0" i="0" dirty="0" err="1">
+                <a:solidFill>
+                  <a:srgbClr val="373B41"/>
+                </a:solidFill>
+                <a:effectLst/>
+              </a:rPr>
+              <a:t>scheduleXXX</a:t>
+            </a:r>
+            <a:r>
+              <a:rPr lang="en-US" b="0" i="0" dirty="0">
+                <a:solidFill>
+                  <a:srgbClr val="373B41"/>
+                </a:solidFill>
+                <a:effectLst/>
+              </a:rPr>
+              <a:t>() methods of </a:t>
+            </a:r>
+            <a:r>
+              <a:rPr lang="en-US" b="0" i="0" u="none" strike="noStrike" dirty="0" err="1">
+                <a:solidFill>
+                  <a:srgbClr val="81A2BE"/>
+                </a:solidFill>
+                <a:effectLst/>
+                <a:hlinkClick r:id="rId8"/>
+              </a:rPr>
+              <a:t>java.util.concurrent.ScheduledExecutorService</a:t>
+            </a:r>
+            <a:endParaRPr lang="en-US" b="0" i="0" dirty="0">
+              <a:solidFill>
+                <a:srgbClr val="373B41"/>
+              </a:solidFill>
+              <a:effectLst/>
+            </a:endParaRPr>
+          </a:p>
+          <a:p>
+            <a:pPr algn="l">
+              <a:buFont typeface="Arial" panose="020B0604020202020204" pitchFamily="34" charset="0"/>
+              <a:buChar char="•"/>
+            </a:pPr>
+            <a:r>
+              <a:rPr lang="en-US" b="0" i="0" u="none" strike="noStrike" dirty="0">
+                <a:solidFill>
+                  <a:srgbClr val="81A2BE"/>
+                </a:solidFill>
+                <a:effectLst/>
+                <a:hlinkClick r:id="rId9"/>
+              </a:rPr>
+              <a:t> </a:t>
+            </a:r>
+            <a:r>
+              <a:rPr lang="en-US" b="0" i="0" u="none" strike="noStrike" dirty="0" err="1">
+                <a:solidFill>
+                  <a:srgbClr val="81A2BE"/>
+                </a:solidFill>
+                <a:effectLst/>
+                <a:hlinkClick r:id="rId9"/>
+              </a:rPr>
+              <a:t>java.lang.reflect.Method#invoke</a:t>
+            </a:r>
+            <a:r>
+              <a:rPr lang="en-US" b="0" i="0" u="none" strike="noStrike" dirty="0">
+                <a:solidFill>
+                  <a:srgbClr val="81A2BE"/>
+                </a:solidFill>
+                <a:effectLst/>
+                <a:hlinkClick r:id="rId9"/>
+              </a:rPr>
+              <a:t>()</a:t>
+            </a:r>
+            <a:endParaRPr lang="en-US" b="0" i="0" u="none" strike="noStrike" dirty="0">
+              <a:solidFill>
+                <a:srgbClr val="81A2BE"/>
+              </a:solidFill>
+              <a:effectLst/>
+            </a:endParaRPr>
+          </a:p>
+          <a:p>
+            <a:r>
+              <a:rPr lang="en-US" dirty="0"/>
+              <a:t>Mediator.js: </a:t>
+            </a:r>
+            <a:r>
+              <a:rPr lang="en-US" dirty="0">
+                <a:hlinkClick r:id="rId10"/>
+              </a:rPr>
+              <a:t>https://www.npmjs.com/package/mediator-js</a:t>
+            </a:r>
+            <a:endParaRPr lang="en-US" dirty="0"/>
+          </a:p>
+          <a:p>
+            <a:endParaRPr lang="en-US" dirty="0"/>
+          </a:p>
+        </p:txBody>
+      </p:sp>
+      <p:sp>
+        <p:nvSpPr>
+          <p:cNvPr id="8" name="Rectangle 1">
+            <a:extLst>
+              <a:ext uri="{FF2B5EF4-FFF2-40B4-BE49-F238E27FC236}">
+                <a16:creationId xmlns:a16="http://schemas.microsoft.com/office/drawing/2014/main" id="{B065E2E4-AE49-41FC-8842-63643489E193}"/>
+              </a:ext>
+            </a:extLst>
+          </p:cNvPr>
+          <p:cNvSpPr>
+            <a:spLocks noChangeArrowheads="1"/>
+          </p:cNvSpPr>
+          <p:nvPr/>
+        </p:nvSpPr>
+        <p:spPr bwMode="auto">
+          <a:xfrm>
+            <a:off x="0" y="159350"/>
+            <a:ext cx="25648" cy="138499"/>
+          </a:xfrm>
+          <a:prstGeom prst="rect">
+            <a:avLst/>
+          </a:prstGeom>
+          <a:noFill/>
+          <a:ln>
+            <a:noFill/>
+          </a:ln>
+          <a:effectLst/>
+          <a:extLst>
+            <a:ext uri="{909E8E84-426E-40DD-AFC4-6F175D3DCCD1}">
+              <a14:hiddenFill xmlns:a14="http://schemas.microsoft.com/office/drawing/2010/main">
+                <a:solidFill>
+                  <a:schemeClr val="accent1"/>
+                </a:solidFill>
+              </a14:hiddenFill>
+            </a:ext>
+            <a:ext uri="{91240B29-F687-4F45-9708-019B960494DF}">
+              <a14:hiddenLine xmlns:a14="http://schemas.microsoft.com/office/drawing/2010/main" w="9525">
+                <a:solidFill>
+                  <a:schemeClr val="tx1"/>
+                </a:solidFill>
+                <a:miter lim="800000"/>
+                <a:headEnd/>
+                <a:tailEnd/>
+              </a14:hiddenLine>
+            </a:ext>
+            <a:ext uri="{AF507438-7753-43E0-B8FC-AC1667EBCBE1}">
+              <a14:hiddenEffects xmlns:a14="http://schemas.microsoft.com/office/drawing/2010/main">
+                <a:effectLst>
+                  <a:outerShdw dist="35921" dir="2700000" algn="ctr" rotWithShape="0">
+                    <a:schemeClr val="bg2"/>
+                  </a:outerShdw>
+                </a:effectLst>
+              </a14:hiddenEffects>
+            </a:ext>
+          </a:extLst>
+        </p:spPr>
+        <p:txBody>
+          <a:bodyPr vert="horz" wrap="none" lIns="0" tIns="0" rIns="0" bIns="0" numCol="1" anchor="ctr" anchorCtr="0" compatLnSpc="1">
+            <a:prstTxWarp prst="textNoShape">
+              <a:avLst/>
+            </a:prstTxWarp>
+            <a:spAutoFit/>
+          </a:bodyPr>
+          <a:lstStyle/>
+          <a:p>
+            <a:pPr marL="0" marR="0" lvl="0" indent="0" algn="l" defTabSz="914400" rtl="0" eaLnBrk="0" fontAlgn="base" latinLnBrk="0" hangingPunct="0">
+              <a:lnSpc>
+                <a:spcPct val="100000"/>
+              </a:lnSpc>
+              <a:spcBef>
+                <a:spcPct val="0"/>
+              </a:spcBef>
+              <a:spcAft>
+                <a:spcPct val="0"/>
+              </a:spcAft>
+              <a:buClrTx/>
+              <a:buSzTx/>
+              <a:buFontTx/>
+              <a:buNone/>
+              <a:tabLst/>
+            </a:pPr>
+            <a:r>
+              <a:rPr kumimoji="0" lang="en-US" altLang="en-US" sz="900" b="0" i="0" u="none" strike="noStrike" cap="none" normalizeH="0" baseline="0" dirty="0">
+                <a:ln>
+                  <a:noFill/>
+                </a:ln>
+                <a:solidFill>
+                  <a:schemeClr val="tx1"/>
+                </a:solidFill>
+                <a:effectLst/>
+                <a:latin typeface="inherit"/>
+              </a:rPr>
+              <a:t> </a:t>
+            </a:r>
+            <a:endParaRPr kumimoji="0" lang="en-US" altLang="en-US" sz="1800" b="0" i="0" u="none" strike="noStrike" cap="none" normalizeH="0" baseline="0" dirty="0">
+              <a:ln>
+                <a:noFill/>
+              </a:ln>
+              <a:solidFill>
+                <a:schemeClr val="tx1"/>
+              </a:solidFill>
+              <a:effectLst/>
+              <a:latin typeface="Arial" panose="020B0604020202020204" pitchFamily="34" charset="0"/>
+            </a:endParaRPr>
+          </a:p>
+        </p:txBody>
+      </p:sp>
+    </p:spTree>
+    <p:extLst>
+      <p:ext uri="{BB962C8B-B14F-4D97-AF65-F5344CB8AC3E}">
+        <p14:creationId xmlns:p14="http://schemas.microsoft.com/office/powerpoint/2010/main" val="1052716486"/>
+      </p:ext>
+    </p:extLst>
+  </p:cSld>
+  <p:clrMapOvr>
+    <a:masterClrMapping/>
+  </p:clrMapOvr>
+</p:sld>
+</file>
+
 <file path=ppt/theme/theme1.xml><?xml version="1.0" encoding="utf-8"?>
 <a:theme xmlns:a="http://schemas.openxmlformats.org/drawingml/2006/main" name="1_RetrospectVTI">
   <a:themeElements>
@@ -9459,24 +13487,6 @@
 </file>
 
 <file path=customXml/item1.xml><?xml version="1.0" encoding="utf-8"?>
-<p:properties xmlns:p="http://schemas.microsoft.com/office/2006/metadata/properties" xmlns:xsi="http://www.w3.org/2001/XMLSchema-instance" xmlns:pc="http://schemas.microsoft.com/office/infopath/2007/PartnerControls">
-  <documentManagement>
-    <Status xmlns="71af3243-3dd4-4a8d-8c0d-dd76da1f02a5">Not started</Status>
-    <MediaServiceKeyPoints xmlns="71af3243-3dd4-4a8d-8c0d-dd76da1f02a5" xsi:nil="true"/>
-  </documentManagement>
-</p:properties>
-</file>
-
-<file path=customXml/item2.xml><?xml version="1.0" encoding="utf-8"?>
-<?mso-contentType ?>
-<FormTemplates xmlns="http://schemas.microsoft.com/sharepoint/v3/contenttype/forms">
-  <Display>DocumentLibraryForm</Display>
-  <Edit>DocumentLibraryForm</Edit>
-  <New>DocumentLibraryForm</New>
-</FormTemplates>
-</file>
-
-<file path=customXml/item3.xml><?xml version="1.0" encoding="utf-8"?>
 <ct:contentTypeSchema xmlns:ct="http://schemas.microsoft.com/office/2006/metadata/contentType" xmlns:ma="http://schemas.microsoft.com/office/2006/metadata/properties/metaAttributes" ct:_="" ma:_="" ma:contentTypeName="Document" ma:contentTypeID="0x01010079F111ED35F8CC479449609E8A0923A6" ma:contentTypeVersion="12" ma:contentTypeDescription="Create a new document." ma:contentTypeScope="" ma:versionID="426e97fa315356fffbdcd9876fe988c2">
   <xsd:schema xmlns:xsd="http://www.w3.org/2001/XMLSchema" xmlns:xs="http://www.w3.org/2001/XMLSchema" xmlns:p="http://schemas.microsoft.com/office/2006/metadata/properties" xmlns:ns2="71af3243-3dd4-4a8d-8c0d-dd76da1f02a5" xmlns:ns3="16c05727-aa75-4e4a-9b5f-8a80a1165891" targetNamespace="http://schemas.microsoft.com/office/2006/metadata/properties" ma:root="true" ma:fieldsID="14b8f0def80e6d70ce3def20c90759ae" ns2:_="" ns3:_="">
     <xsd:import namespace="71af3243-3dd4-4a8d-8c0d-dd76da1f02a5"/>
@@ -9697,25 +13707,25 @@
 </ct:contentTypeSchema>
 </file>
 
-<file path=customXml/itemProps1.xml><?xml version="1.0" encoding="utf-8"?>
-<ds:datastoreItem xmlns:ds="http://schemas.openxmlformats.org/officeDocument/2006/customXml" ds:itemID="{84F503EC-3FFF-4193-A86F-39150E2BAC75}">
-  <ds:schemaRefs>
-    <ds:schemaRef ds:uri="http://schemas.microsoft.com/office/2006/metadata/properties"/>
-    <ds:schemaRef ds:uri="http://schemas.microsoft.com/office/infopath/2007/PartnerControls"/>
-    <ds:schemaRef ds:uri="71af3243-3dd4-4a8d-8c0d-dd76da1f02a5"/>
-  </ds:schemaRefs>
-</ds:datastoreItem>
+<file path=customXml/item2.xml><?xml version="1.0" encoding="utf-8"?>
+<?mso-contentType ?>
+<FormTemplates xmlns="http://schemas.microsoft.com/sharepoint/v3/contenttype/forms">
+  <Display>DocumentLibraryForm</Display>
+  <Edit>DocumentLibraryForm</Edit>
+  <New>DocumentLibraryForm</New>
+</FormTemplates>
 </file>
 
-<file path=customXml/itemProps2.xml><?xml version="1.0" encoding="utf-8"?>
-<ds:datastoreItem xmlns:ds="http://schemas.openxmlformats.org/officeDocument/2006/customXml" ds:itemID="{2E5ECA37-C458-4BA2-A090-D7A19E07B434}">
-  <ds:schemaRefs>
-    <ds:schemaRef ds:uri="http://schemas.microsoft.com/sharepoint/v3/contenttype/forms"/>
-  </ds:schemaRefs>
-</ds:datastoreItem>
+<file path=customXml/item3.xml><?xml version="1.0" encoding="utf-8"?>
+<p:properties xmlns:p="http://schemas.microsoft.com/office/2006/metadata/properties" xmlns:xsi="http://www.w3.org/2001/XMLSchema-instance" xmlns:pc="http://schemas.microsoft.com/office/infopath/2007/PartnerControls">
+  <documentManagement>
+    <Status xmlns="71af3243-3dd4-4a8d-8c0d-dd76da1f02a5">Not started</Status>
+    <MediaServiceKeyPoints xmlns="71af3243-3dd4-4a8d-8c0d-dd76da1f02a5" xsi:nil="true"/>
+  </documentManagement>
+</p:properties>
 </file>
 
-<file path=customXml/itemProps3.xml><?xml version="1.0" encoding="utf-8"?>
+<file path=customXml/itemProps1.xml><?xml version="1.0" encoding="utf-8"?>
 <ds:datastoreItem xmlns:ds="http://schemas.openxmlformats.org/officeDocument/2006/customXml" ds:itemID="{7A26AAF5-6CFC-4C52-B7DF-08410EDE6701}">
   <ds:schemaRefs>
     <ds:schemaRef ds:uri="http://schemas.microsoft.com/office/2006/metadata/contentType"/>
@@ -9732,4 +13742,22 @@
     <ds:schemaRef ds:uri="http://schemas.microsoft.com/internal/obd"/>
   </ds:schemaRefs>
 </ds:datastoreItem>
+</file>
+
+<file path=customXml/itemProps2.xml><?xml version="1.0" encoding="utf-8"?>
+<ds:datastoreItem xmlns:ds="http://schemas.openxmlformats.org/officeDocument/2006/customXml" ds:itemID="{2E5ECA37-C458-4BA2-A090-D7A19E07B434}">
+  <ds:schemaRefs>
+    <ds:schemaRef ds:uri="http://schemas.microsoft.com/sharepoint/v3/contenttype/forms"/>
+  </ds:schemaRefs>
+</ds:datastoreItem>
+</file>
+
+<file path=customXml/itemProps3.xml><?xml version="1.0" encoding="utf-8"?>
+<ds:datastoreItem xmlns:ds="http://schemas.openxmlformats.org/officeDocument/2006/customXml" ds:itemID="{84F503EC-3FFF-4193-A86F-39150E2BAC75}">
+  <ds:schemaRefs>
+    <ds:schemaRef ds:uri="http://schemas.microsoft.com/office/2006/metadata/properties"/>
+    <ds:schemaRef ds:uri="http://schemas.microsoft.com/office/infopath/2007/PartnerControls"/>
+    <ds:schemaRef ds:uri="71af3243-3dd4-4a8d-8c0d-dd76da1f02a5"/>
+  </ds:schemaRefs>
+</ds:datastoreItem>
 </file>
</xml_diff>

<commit_message>
add observer pattern example + slides
</commit_message>
<xml_diff>
--- a/PPT Presentations/DesignPatterns-BehavioralPatterns.pptx
+++ b/PPT Presentations/DesignPatterns-BehavioralPatterns.pptx
@@ -5,7 +5,7 @@
     <p:sldMasterId id="2147483660" r:id="rId4"/>
   </p:sldMasterIdLst>
   <p:notesMasterIdLst>
-    <p:notesMasterId r:id="rId17"/>
+    <p:notesMasterId r:id="rId19"/>
   </p:notesMasterIdLst>
   <p:sldIdLst>
     <p:sldId id="287" r:id="rId5"/>
@@ -20,6 +20,8 @@
     <p:sldId id="297" r:id="rId14"/>
     <p:sldId id="298" r:id="rId15"/>
     <p:sldId id="299" r:id="rId16"/>
+    <p:sldId id="300" r:id="rId17"/>
+    <p:sldId id="301" r:id="rId18"/>
   </p:sldIdLst>
   <p:sldSz cx="12192000" cy="6858000"/>
   <p:notesSz cx="6858000" cy="9144000"/>
@@ -3141,6 +3143,753 @@
 </file>
 
 <file path=ppt/diagrams/colors5.xml><?xml version="1.0" encoding="utf-8"?>
+<dgm:colorsDef xmlns:dgm="http://schemas.openxmlformats.org/drawingml/2006/diagram" xmlns:a="http://schemas.openxmlformats.org/drawingml/2006/main" uniqueId="urn:microsoft.com/office/officeart/2005/8/colors/accent1_2">
+  <dgm:title val=""/>
+  <dgm:desc val=""/>
+  <dgm:catLst>
+    <dgm:cat type="accent1" pri="11200"/>
+  </dgm:catLst>
+  <dgm:styleLbl name="node0">
+    <dgm:fillClrLst meth="repeat">
+      <a:schemeClr val="accent1"/>
+    </dgm:fillClrLst>
+    <dgm:linClrLst meth="repeat">
+      <a:schemeClr val="lt1"/>
+    </dgm:linClrLst>
+    <dgm:effectClrLst/>
+    <dgm:txLinClrLst/>
+    <dgm:txFillClrLst/>
+    <dgm:txEffectClrLst/>
+  </dgm:styleLbl>
+  <dgm:styleLbl name="alignNode1">
+    <dgm:fillClrLst meth="repeat">
+      <a:schemeClr val="accent1"/>
+    </dgm:fillClrLst>
+    <dgm:linClrLst meth="repeat">
+      <a:schemeClr val="accent1"/>
+    </dgm:linClrLst>
+    <dgm:effectClrLst/>
+    <dgm:txLinClrLst/>
+    <dgm:txFillClrLst/>
+    <dgm:txEffectClrLst/>
+  </dgm:styleLbl>
+  <dgm:styleLbl name="node1">
+    <dgm:fillClrLst meth="repeat">
+      <a:schemeClr val="accent1"/>
+    </dgm:fillClrLst>
+    <dgm:linClrLst meth="repeat">
+      <a:schemeClr val="lt1"/>
+    </dgm:linClrLst>
+    <dgm:effectClrLst/>
+    <dgm:txLinClrLst/>
+    <dgm:txFillClrLst/>
+    <dgm:txEffectClrLst/>
+  </dgm:styleLbl>
+  <dgm:styleLbl name="lnNode1">
+    <dgm:fillClrLst meth="repeat">
+      <a:schemeClr val="accent1"/>
+    </dgm:fillClrLst>
+    <dgm:linClrLst meth="repeat">
+      <a:schemeClr val="lt1"/>
+    </dgm:linClrLst>
+    <dgm:effectClrLst/>
+    <dgm:txLinClrLst/>
+    <dgm:txFillClrLst/>
+    <dgm:txEffectClrLst/>
+  </dgm:styleLbl>
+  <dgm:styleLbl name="vennNode1">
+    <dgm:fillClrLst meth="repeat">
+      <a:schemeClr val="accent1">
+        <a:alpha val="50000"/>
+      </a:schemeClr>
+    </dgm:fillClrLst>
+    <dgm:linClrLst meth="repeat">
+      <a:schemeClr val="lt1"/>
+    </dgm:linClrLst>
+    <dgm:effectClrLst/>
+    <dgm:txLinClrLst/>
+    <dgm:txFillClrLst/>
+    <dgm:txEffectClrLst/>
+  </dgm:styleLbl>
+  <dgm:styleLbl name="node2">
+    <dgm:fillClrLst meth="repeat">
+      <a:schemeClr val="accent1"/>
+    </dgm:fillClrLst>
+    <dgm:linClrLst meth="repeat">
+      <a:schemeClr val="lt1"/>
+    </dgm:linClrLst>
+    <dgm:effectClrLst/>
+    <dgm:txLinClrLst/>
+    <dgm:txFillClrLst/>
+    <dgm:txEffectClrLst/>
+  </dgm:styleLbl>
+  <dgm:styleLbl name="node3">
+    <dgm:fillClrLst meth="repeat">
+      <a:schemeClr val="accent1"/>
+    </dgm:fillClrLst>
+    <dgm:linClrLst meth="repeat">
+      <a:schemeClr val="lt1"/>
+    </dgm:linClrLst>
+    <dgm:effectClrLst/>
+    <dgm:txLinClrLst/>
+    <dgm:txFillClrLst/>
+    <dgm:txEffectClrLst/>
+  </dgm:styleLbl>
+  <dgm:styleLbl name="node4">
+    <dgm:fillClrLst meth="repeat">
+      <a:schemeClr val="accent1"/>
+    </dgm:fillClrLst>
+    <dgm:linClrLst meth="repeat">
+      <a:schemeClr val="lt1"/>
+    </dgm:linClrLst>
+    <dgm:effectClrLst/>
+    <dgm:txLinClrLst/>
+    <dgm:txFillClrLst/>
+    <dgm:txEffectClrLst/>
+  </dgm:styleLbl>
+  <dgm:styleLbl name="fgImgPlace1">
+    <dgm:fillClrLst meth="repeat">
+      <a:schemeClr val="accent1">
+        <a:tint val="50000"/>
+      </a:schemeClr>
+    </dgm:fillClrLst>
+    <dgm:linClrLst meth="repeat">
+      <a:schemeClr val="lt1"/>
+    </dgm:linClrLst>
+    <dgm:effectClrLst/>
+    <dgm:txLinClrLst/>
+    <dgm:txFillClrLst meth="repeat">
+      <a:schemeClr val="lt1"/>
+    </dgm:txFillClrLst>
+    <dgm:txEffectClrLst/>
+  </dgm:styleLbl>
+  <dgm:styleLbl name="alignImgPlace1">
+    <dgm:fillClrLst meth="repeat">
+      <a:schemeClr val="accent1">
+        <a:tint val="50000"/>
+      </a:schemeClr>
+    </dgm:fillClrLst>
+    <dgm:linClrLst meth="repeat">
+      <a:schemeClr val="lt1"/>
+    </dgm:linClrLst>
+    <dgm:effectClrLst/>
+    <dgm:txLinClrLst/>
+    <dgm:txFillClrLst meth="repeat">
+      <a:schemeClr val="lt1"/>
+    </dgm:txFillClrLst>
+    <dgm:txEffectClrLst/>
+  </dgm:styleLbl>
+  <dgm:styleLbl name="bgImgPlace1">
+    <dgm:fillClrLst meth="repeat">
+      <a:schemeClr val="accent1">
+        <a:tint val="50000"/>
+      </a:schemeClr>
+    </dgm:fillClrLst>
+    <dgm:linClrLst meth="repeat">
+      <a:schemeClr val="lt1"/>
+    </dgm:linClrLst>
+    <dgm:effectClrLst/>
+    <dgm:txLinClrLst/>
+    <dgm:txFillClrLst meth="repeat">
+      <a:schemeClr val="lt1"/>
+    </dgm:txFillClrLst>
+    <dgm:txEffectClrLst/>
+  </dgm:styleLbl>
+  <dgm:styleLbl name="sibTrans2D1">
+    <dgm:fillClrLst meth="repeat">
+      <a:schemeClr val="accent1">
+        <a:tint val="60000"/>
+      </a:schemeClr>
+    </dgm:fillClrLst>
+    <dgm:linClrLst meth="repeat">
+      <a:schemeClr val="accent1">
+        <a:tint val="60000"/>
+      </a:schemeClr>
+    </dgm:linClrLst>
+    <dgm:effectClrLst/>
+    <dgm:txLinClrLst/>
+    <dgm:txFillClrLst/>
+    <dgm:txEffectClrLst/>
+  </dgm:styleLbl>
+  <dgm:styleLbl name="fgSibTrans2D1">
+    <dgm:fillClrLst meth="repeat">
+      <a:schemeClr val="accent1">
+        <a:tint val="60000"/>
+      </a:schemeClr>
+    </dgm:fillClrLst>
+    <dgm:linClrLst meth="repeat">
+      <a:schemeClr val="accent1">
+        <a:tint val="60000"/>
+      </a:schemeClr>
+    </dgm:linClrLst>
+    <dgm:effectClrLst/>
+    <dgm:txLinClrLst/>
+    <dgm:txFillClrLst/>
+    <dgm:txEffectClrLst/>
+  </dgm:styleLbl>
+  <dgm:styleLbl name="bgSibTrans2D1">
+    <dgm:fillClrLst meth="repeat">
+      <a:schemeClr val="accent1">
+        <a:tint val="60000"/>
+      </a:schemeClr>
+    </dgm:fillClrLst>
+    <dgm:linClrLst meth="repeat">
+      <a:schemeClr val="accent1">
+        <a:tint val="60000"/>
+      </a:schemeClr>
+    </dgm:linClrLst>
+    <dgm:effectClrLst/>
+    <dgm:txLinClrLst/>
+    <dgm:txFillClrLst/>
+    <dgm:txEffectClrLst/>
+  </dgm:styleLbl>
+  <dgm:styleLbl name="sibTrans1D1">
+    <dgm:fillClrLst meth="repeat">
+      <a:schemeClr val="accent1"/>
+    </dgm:fillClrLst>
+    <dgm:linClrLst meth="repeat">
+      <a:schemeClr val="accent1"/>
+    </dgm:linClrLst>
+    <dgm:effectClrLst/>
+    <dgm:txLinClrLst/>
+    <dgm:txFillClrLst meth="repeat">
+      <a:schemeClr val="tx1"/>
+    </dgm:txFillClrLst>
+    <dgm:txEffectClrLst/>
+  </dgm:styleLbl>
+  <dgm:styleLbl name="callout">
+    <dgm:fillClrLst meth="repeat">
+      <a:schemeClr val="accent1"/>
+    </dgm:fillClrLst>
+    <dgm:linClrLst meth="repeat">
+      <a:schemeClr val="accent1">
+        <a:tint val="50000"/>
+      </a:schemeClr>
+    </dgm:linClrLst>
+    <dgm:effectClrLst/>
+    <dgm:txLinClrLst/>
+    <dgm:txFillClrLst meth="repeat">
+      <a:schemeClr val="tx1"/>
+    </dgm:txFillClrLst>
+    <dgm:txEffectClrLst/>
+  </dgm:styleLbl>
+  <dgm:styleLbl name="asst0">
+    <dgm:fillClrLst meth="repeat">
+      <a:schemeClr val="accent1"/>
+    </dgm:fillClrLst>
+    <dgm:linClrLst meth="repeat">
+      <a:schemeClr val="lt1"/>
+    </dgm:linClrLst>
+    <dgm:effectClrLst/>
+    <dgm:txLinClrLst/>
+    <dgm:txFillClrLst/>
+    <dgm:txEffectClrLst/>
+  </dgm:styleLbl>
+  <dgm:styleLbl name="asst1">
+    <dgm:fillClrLst meth="repeat">
+      <a:schemeClr val="accent1"/>
+    </dgm:fillClrLst>
+    <dgm:linClrLst meth="repeat">
+      <a:schemeClr val="lt1"/>
+    </dgm:linClrLst>
+    <dgm:effectClrLst/>
+    <dgm:txLinClrLst/>
+    <dgm:txFillClrLst/>
+    <dgm:txEffectClrLst/>
+  </dgm:styleLbl>
+  <dgm:styleLbl name="asst2">
+    <dgm:fillClrLst meth="repeat">
+      <a:schemeClr val="accent1"/>
+    </dgm:fillClrLst>
+    <dgm:linClrLst meth="repeat">
+      <a:schemeClr val="lt1"/>
+    </dgm:linClrLst>
+    <dgm:effectClrLst/>
+    <dgm:txLinClrLst/>
+    <dgm:txFillClrLst/>
+    <dgm:txEffectClrLst/>
+  </dgm:styleLbl>
+  <dgm:styleLbl name="asst3">
+    <dgm:fillClrLst meth="repeat">
+      <a:schemeClr val="accent1"/>
+    </dgm:fillClrLst>
+    <dgm:linClrLst meth="repeat">
+      <a:schemeClr val="lt1"/>
+    </dgm:linClrLst>
+    <dgm:effectClrLst/>
+    <dgm:txLinClrLst/>
+    <dgm:txFillClrLst/>
+    <dgm:txEffectClrLst/>
+  </dgm:styleLbl>
+  <dgm:styleLbl name="asst4">
+    <dgm:fillClrLst meth="repeat">
+      <a:schemeClr val="accent1"/>
+    </dgm:fillClrLst>
+    <dgm:linClrLst meth="repeat">
+      <a:schemeClr val="lt1"/>
+    </dgm:linClrLst>
+    <dgm:effectClrLst/>
+    <dgm:txLinClrLst/>
+    <dgm:txFillClrLst/>
+    <dgm:txEffectClrLst/>
+  </dgm:styleLbl>
+  <dgm:styleLbl name="parChTrans2D1">
+    <dgm:fillClrLst meth="repeat">
+      <a:schemeClr val="accent1">
+        <a:tint val="60000"/>
+      </a:schemeClr>
+    </dgm:fillClrLst>
+    <dgm:linClrLst meth="repeat">
+      <a:schemeClr val="accent1">
+        <a:tint val="60000"/>
+      </a:schemeClr>
+    </dgm:linClrLst>
+    <dgm:effectClrLst/>
+    <dgm:txLinClrLst/>
+    <dgm:txFillClrLst meth="repeat">
+      <a:schemeClr val="lt1"/>
+    </dgm:txFillClrLst>
+    <dgm:txEffectClrLst/>
+  </dgm:styleLbl>
+  <dgm:styleLbl name="parChTrans2D2">
+    <dgm:fillClrLst meth="repeat">
+      <a:schemeClr val="accent1"/>
+    </dgm:fillClrLst>
+    <dgm:linClrLst meth="repeat">
+      <a:schemeClr val="accent1"/>
+    </dgm:linClrLst>
+    <dgm:effectClrLst/>
+    <dgm:txLinClrLst/>
+    <dgm:txFillClrLst meth="repeat">
+      <a:schemeClr val="lt1"/>
+    </dgm:txFillClrLst>
+    <dgm:txEffectClrLst/>
+  </dgm:styleLbl>
+  <dgm:styleLbl name="parChTrans2D3">
+    <dgm:fillClrLst meth="repeat">
+      <a:schemeClr val="accent1"/>
+    </dgm:fillClrLst>
+    <dgm:linClrLst meth="repeat">
+      <a:schemeClr val="accent1"/>
+    </dgm:linClrLst>
+    <dgm:effectClrLst/>
+    <dgm:txLinClrLst/>
+    <dgm:txFillClrLst meth="repeat">
+      <a:schemeClr val="lt1"/>
+    </dgm:txFillClrLst>
+    <dgm:txEffectClrLst/>
+  </dgm:styleLbl>
+  <dgm:styleLbl name="parChTrans2D4">
+    <dgm:fillClrLst meth="repeat">
+      <a:schemeClr val="accent1"/>
+    </dgm:fillClrLst>
+    <dgm:linClrLst meth="repeat">
+      <a:schemeClr val="accent1"/>
+    </dgm:linClrLst>
+    <dgm:effectClrLst/>
+    <dgm:txLinClrLst/>
+    <dgm:txFillClrLst meth="repeat">
+      <a:schemeClr val="lt1"/>
+    </dgm:txFillClrLst>
+    <dgm:txEffectClrLst/>
+  </dgm:styleLbl>
+  <dgm:styleLbl name="parChTrans1D1">
+    <dgm:fillClrLst meth="repeat">
+      <a:schemeClr val="accent1"/>
+    </dgm:fillClrLst>
+    <dgm:linClrLst meth="repeat">
+      <a:schemeClr val="accent1">
+        <a:shade val="60000"/>
+      </a:schemeClr>
+    </dgm:linClrLst>
+    <dgm:effectClrLst/>
+    <dgm:txLinClrLst/>
+    <dgm:txFillClrLst meth="repeat">
+      <a:schemeClr val="tx1"/>
+    </dgm:txFillClrLst>
+    <dgm:txEffectClrLst/>
+  </dgm:styleLbl>
+  <dgm:styleLbl name="parChTrans1D2">
+    <dgm:fillClrLst meth="repeat">
+      <a:schemeClr val="accent1"/>
+    </dgm:fillClrLst>
+    <dgm:linClrLst meth="repeat">
+      <a:schemeClr val="accent1">
+        <a:shade val="60000"/>
+      </a:schemeClr>
+    </dgm:linClrLst>
+    <dgm:effectClrLst/>
+    <dgm:txLinClrLst/>
+    <dgm:txFillClrLst meth="repeat">
+      <a:schemeClr val="tx1"/>
+    </dgm:txFillClrLst>
+    <dgm:txEffectClrLst/>
+  </dgm:styleLbl>
+  <dgm:styleLbl name="parChTrans1D3">
+    <dgm:fillClrLst meth="repeat">
+      <a:schemeClr val="accent1"/>
+    </dgm:fillClrLst>
+    <dgm:linClrLst meth="repeat">
+      <a:schemeClr val="accent1">
+        <a:shade val="80000"/>
+      </a:schemeClr>
+    </dgm:linClrLst>
+    <dgm:effectClrLst/>
+    <dgm:txLinClrLst/>
+    <dgm:txFillClrLst meth="repeat">
+      <a:schemeClr val="tx1"/>
+    </dgm:txFillClrLst>
+    <dgm:txEffectClrLst/>
+  </dgm:styleLbl>
+  <dgm:styleLbl name="parChTrans1D4">
+    <dgm:fillClrLst meth="repeat">
+      <a:schemeClr val="accent1"/>
+    </dgm:fillClrLst>
+    <dgm:linClrLst meth="repeat">
+      <a:schemeClr val="accent1">
+        <a:shade val="80000"/>
+      </a:schemeClr>
+    </dgm:linClrLst>
+    <dgm:effectClrLst/>
+    <dgm:txLinClrLst/>
+    <dgm:txFillClrLst meth="repeat">
+      <a:schemeClr val="tx1"/>
+    </dgm:txFillClrLst>
+    <dgm:txEffectClrLst/>
+  </dgm:styleLbl>
+  <dgm:styleLbl name="fgAcc1">
+    <dgm:fillClrLst meth="repeat">
+      <a:schemeClr val="lt1">
+        <a:alpha val="90000"/>
+      </a:schemeClr>
+    </dgm:fillClrLst>
+    <dgm:linClrLst meth="repeat">
+      <a:schemeClr val="accent1"/>
+    </dgm:linClrLst>
+    <dgm:effectClrLst/>
+    <dgm:txLinClrLst/>
+    <dgm:txFillClrLst meth="repeat">
+      <a:schemeClr val="dk1"/>
+    </dgm:txFillClrLst>
+    <dgm:txEffectClrLst/>
+  </dgm:styleLbl>
+  <dgm:styleLbl name="conFgAcc1">
+    <dgm:fillClrLst meth="repeat">
+      <a:schemeClr val="lt1">
+        <a:alpha val="90000"/>
+      </a:schemeClr>
+    </dgm:fillClrLst>
+    <dgm:linClrLst meth="repeat">
+      <a:schemeClr val="accent1"/>
+    </dgm:linClrLst>
+    <dgm:effectClrLst/>
+    <dgm:txLinClrLst/>
+    <dgm:txFillClrLst meth="repeat">
+      <a:schemeClr val="dk1"/>
+    </dgm:txFillClrLst>
+    <dgm:txEffectClrLst/>
+  </dgm:styleLbl>
+  <dgm:styleLbl name="alignAcc1">
+    <dgm:fillClrLst meth="repeat">
+      <a:schemeClr val="lt1">
+        <a:alpha val="90000"/>
+      </a:schemeClr>
+    </dgm:fillClrLst>
+    <dgm:linClrLst meth="repeat">
+      <a:schemeClr val="accent1"/>
+    </dgm:linClrLst>
+    <dgm:effectClrLst/>
+    <dgm:txLinClrLst/>
+    <dgm:txFillClrLst meth="repeat">
+      <a:schemeClr val="dk1"/>
+    </dgm:txFillClrLst>
+    <dgm:txEffectClrLst/>
+  </dgm:styleLbl>
+  <dgm:styleLbl name="trAlignAcc1">
+    <dgm:fillClrLst meth="repeat">
+      <a:schemeClr val="lt1">
+        <a:alpha val="40000"/>
+      </a:schemeClr>
+    </dgm:fillClrLst>
+    <dgm:linClrLst meth="repeat">
+      <a:schemeClr val="accent1"/>
+    </dgm:linClrLst>
+    <dgm:effectClrLst/>
+    <dgm:txLinClrLst/>
+    <dgm:txFillClrLst meth="repeat">
+      <a:schemeClr val="dk1"/>
+    </dgm:txFillClrLst>
+    <dgm:txEffectClrLst/>
+  </dgm:styleLbl>
+  <dgm:styleLbl name="bgAcc1">
+    <dgm:fillClrLst meth="repeat">
+      <a:schemeClr val="lt1">
+        <a:alpha val="90000"/>
+      </a:schemeClr>
+    </dgm:fillClrLst>
+    <dgm:linClrLst meth="repeat">
+      <a:schemeClr val="accent1"/>
+    </dgm:linClrLst>
+    <dgm:effectClrLst/>
+    <dgm:txLinClrLst/>
+    <dgm:txFillClrLst meth="repeat">
+      <a:schemeClr val="dk1"/>
+    </dgm:txFillClrLst>
+    <dgm:txEffectClrLst/>
+  </dgm:styleLbl>
+  <dgm:styleLbl name="solidFgAcc1">
+    <dgm:fillClrLst meth="repeat">
+      <a:schemeClr val="lt1"/>
+    </dgm:fillClrLst>
+    <dgm:linClrLst meth="repeat">
+      <a:schemeClr val="accent1"/>
+    </dgm:linClrLst>
+    <dgm:effectClrLst/>
+    <dgm:txLinClrLst/>
+    <dgm:txFillClrLst meth="repeat">
+      <a:schemeClr val="dk1"/>
+    </dgm:txFillClrLst>
+    <dgm:txEffectClrLst/>
+  </dgm:styleLbl>
+  <dgm:styleLbl name="solidAlignAcc1">
+    <dgm:fillClrLst meth="repeat">
+      <a:schemeClr val="lt1"/>
+    </dgm:fillClrLst>
+    <dgm:linClrLst meth="repeat">
+      <a:schemeClr val="accent1"/>
+    </dgm:linClrLst>
+    <dgm:effectClrLst/>
+    <dgm:txLinClrLst/>
+    <dgm:txFillClrLst meth="repeat">
+      <a:schemeClr val="dk1"/>
+    </dgm:txFillClrLst>
+    <dgm:txEffectClrLst/>
+  </dgm:styleLbl>
+  <dgm:styleLbl name="solidBgAcc1">
+    <dgm:fillClrLst meth="repeat">
+      <a:schemeClr val="lt1"/>
+    </dgm:fillClrLst>
+    <dgm:linClrLst meth="repeat">
+      <a:schemeClr val="accent1"/>
+    </dgm:linClrLst>
+    <dgm:effectClrLst/>
+    <dgm:txLinClrLst/>
+    <dgm:txFillClrLst meth="repeat">
+      <a:schemeClr val="dk1"/>
+    </dgm:txFillClrLst>
+    <dgm:txEffectClrLst/>
+  </dgm:styleLbl>
+  <dgm:styleLbl name="fgAccFollowNode1">
+    <dgm:fillClrLst meth="repeat">
+      <a:schemeClr val="accent1">
+        <a:alpha val="90000"/>
+        <a:tint val="40000"/>
+      </a:schemeClr>
+    </dgm:fillClrLst>
+    <dgm:linClrLst meth="repeat">
+      <a:schemeClr val="accent1">
+        <a:alpha val="90000"/>
+        <a:tint val="40000"/>
+      </a:schemeClr>
+    </dgm:linClrLst>
+    <dgm:effectClrLst/>
+    <dgm:txLinClrLst/>
+    <dgm:txFillClrLst meth="repeat">
+      <a:schemeClr val="dk1"/>
+    </dgm:txFillClrLst>
+    <dgm:txEffectClrLst/>
+  </dgm:styleLbl>
+  <dgm:styleLbl name="alignAccFollowNode1">
+    <dgm:fillClrLst meth="repeat">
+      <a:schemeClr val="accent1">
+        <a:alpha val="90000"/>
+        <a:tint val="40000"/>
+      </a:schemeClr>
+    </dgm:fillClrLst>
+    <dgm:linClrLst meth="repeat">
+      <a:schemeClr val="accent1">
+        <a:alpha val="90000"/>
+        <a:tint val="40000"/>
+      </a:schemeClr>
+    </dgm:linClrLst>
+    <dgm:effectClrLst/>
+    <dgm:txLinClrLst/>
+    <dgm:txFillClrLst meth="repeat">
+      <a:schemeClr val="dk1"/>
+    </dgm:txFillClrLst>
+    <dgm:txEffectClrLst/>
+  </dgm:styleLbl>
+  <dgm:styleLbl name="bgAccFollowNode1">
+    <dgm:fillClrLst meth="repeat">
+      <a:schemeClr val="accent1">
+        <a:alpha val="90000"/>
+        <a:tint val="40000"/>
+      </a:schemeClr>
+    </dgm:fillClrLst>
+    <dgm:linClrLst meth="repeat">
+      <a:schemeClr val="accent1">
+        <a:alpha val="90000"/>
+        <a:tint val="40000"/>
+      </a:schemeClr>
+    </dgm:linClrLst>
+    <dgm:effectClrLst/>
+    <dgm:txLinClrLst/>
+    <dgm:txFillClrLst meth="repeat">
+      <a:schemeClr val="dk1"/>
+    </dgm:txFillClrLst>
+    <dgm:txEffectClrLst/>
+  </dgm:styleLbl>
+  <dgm:styleLbl name="fgAcc0">
+    <dgm:fillClrLst meth="repeat">
+      <a:schemeClr val="lt1">
+        <a:alpha val="90000"/>
+      </a:schemeClr>
+    </dgm:fillClrLst>
+    <dgm:linClrLst meth="repeat">
+      <a:schemeClr val="accent1"/>
+    </dgm:linClrLst>
+    <dgm:effectClrLst/>
+    <dgm:txLinClrLst/>
+    <dgm:txFillClrLst meth="repeat">
+      <a:schemeClr val="dk1"/>
+    </dgm:txFillClrLst>
+    <dgm:txEffectClrLst/>
+  </dgm:styleLbl>
+  <dgm:styleLbl name="fgAcc2">
+    <dgm:fillClrLst meth="repeat">
+      <a:schemeClr val="lt1">
+        <a:alpha val="90000"/>
+      </a:schemeClr>
+    </dgm:fillClrLst>
+    <dgm:linClrLst meth="repeat">
+      <a:schemeClr val="accent1"/>
+    </dgm:linClrLst>
+    <dgm:effectClrLst/>
+    <dgm:txLinClrLst/>
+    <dgm:txFillClrLst meth="repeat">
+      <a:schemeClr val="dk1"/>
+    </dgm:txFillClrLst>
+    <dgm:txEffectClrLst/>
+  </dgm:styleLbl>
+  <dgm:styleLbl name="fgAcc3">
+    <dgm:fillClrLst meth="repeat">
+      <a:schemeClr val="lt1">
+        <a:alpha val="90000"/>
+      </a:schemeClr>
+    </dgm:fillClrLst>
+    <dgm:linClrLst meth="repeat">
+      <a:schemeClr val="accent1"/>
+    </dgm:linClrLst>
+    <dgm:effectClrLst/>
+    <dgm:txLinClrLst/>
+    <dgm:txFillClrLst meth="repeat">
+      <a:schemeClr val="dk1"/>
+    </dgm:txFillClrLst>
+    <dgm:txEffectClrLst/>
+  </dgm:styleLbl>
+  <dgm:styleLbl name="fgAcc4">
+    <dgm:fillClrLst meth="repeat">
+      <a:schemeClr val="lt1">
+        <a:alpha val="90000"/>
+      </a:schemeClr>
+    </dgm:fillClrLst>
+    <dgm:linClrLst meth="repeat">
+      <a:schemeClr val="accent1"/>
+    </dgm:linClrLst>
+    <dgm:effectClrLst/>
+    <dgm:txLinClrLst/>
+    <dgm:txFillClrLst meth="repeat">
+      <a:schemeClr val="dk1"/>
+    </dgm:txFillClrLst>
+    <dgm:txEffectClrLst/>
+  </dgm:styleLbl>
+  <dgm:styleLbl name="bgShp">
+    <dgm:fillClrLst meth="repeat">
+      <a:schemeClr val="accent1">
+        <a:tint val="40000"/>
+      </a:schemeClr>
+    </dgm:fillClrLst>
+    <dgm:linClrLst meth="repeat">
+      <a:schemeClr val="accent1"/>
+    </dgm:linClrLst>
+    <dgm:effectClrLst/>
+    <dgm:txLinClrLst/>
+    <dgm:txFillClrLst meth="repeat">
+      <a:schemeClr val="dk1"/>
+    </dgm:txFillClrLst>
+    <dgm:txEffectClrLst/>
+  </dgm:styleLbl>
+  <dgm:styleLbl name="dkBgShp">
+    <dgm:fillClrLst meth="repeat">
+      <a:schemeClr val="accent1">
+        <a:shade val="80000"/>
+      </a:schemeClr>
+    </dgm:fillClrLst>
+    <dgm:linClrLst meth="repeat">
+      <a:schemeClr val="accent1"/>
+    </dgm:linClrLst>
+    <dgm:effectClrLst/>
+    <dgm:txLinClrLst/>
+    <dgm:txFillClrLst meth="repeat">
+      <a:schemeClr val="lt1"/>
+    </dgm:txFillClrLst>
+    <dgm:txEffectClrLst/>
+  </dgm:styleLbl>
+  <dgm:styleLbl name="trBgShp">
+    <dgm:fillClrLst meth="repeat">
+      <a:schemeClr val="accent1">
+        <a:tint val="50000"/>
+        <a:alpha val="40000"/>
+      </a:schemeClr>
+    </dgm:fillClrLst>
+    <dgm:linClrLst meth="repeat">
+      <a:schemeClr val="accent1"/>
+    </dgm:linClrLst>
+    <dgm:effectClrLst/>
+    <dgm:txLinClrLst/>
+    <dgm:txFillClrLst meth="repeat">
+      <a:schemeClr val="lt1"/>
+    </dgm:txFillClrLst>
+    <dgm:txEffectClrLst/>
+  </dgm:styleLbl>
+  <dgm:styleLbl name="fgShp">
+    <dgm:fillClrLst meth="repeat">
+      <a:schemeClr val="accent1">
+        <a:tint val="60000"/>
+      </a:schemeClr>
+    </dgm:fillClrLst>
+    <dgm:linClrLst meth="repeat">
+      <a:schemeClr val="lt1"/>
+    </dgm:linClrLst>
+    <dgm:effectClrLst/>
+    <dgm:txLinClrLst/>
+    <dgm:txFillClrLst meth="repeat">
+      <a:schemeClr val="dk1"/>
+    </dgm:txFillClrLst>
+    <dgm:txEffectClrLst/>
+  </dgm:styleLbl>
+  <dgm:styleLbl name="revTx">
+    <dgm:fillClrLst meth="repeat">
+      <a:schemeClr val="lt1">
+        <a:alpha val="0"/>
+      </a:schemeClr>
+    </dgm:fillClrLst>
+    <dgm:linClrLst meth="repeat">
+      <a:schemeClr val="dk1">
+        <a:alpha val="0"/>
+      </a:schemeClr>
+    </dgm:linClrLst>
+    <dgm:effectClrLst/>
+    <dgm:txLinClrLst/>
+    <dgm:txFillClrLst meth="repeat">
+      <a:schemeClr val="tx1"/>
+    </dgm:txFillClrLst>
+    <dgm:txEffectClrLst/>
+  </dgm:styleLbl>
+</dgm:colorsDef>
+</file>
+
+<file path=ppt/diagrams/colors6.xml><?xml version="1.0" encoding="utf-8"?>
 <dgm:colorsDef xmlns:dgm="http://schemas.openxmlformats.org/drawingml/2006/diagram" xmlns:a="http://schemas.openxmlformats.org/drawingml/2006/main" uniqueId="urn:microsoft.com/office/officeart/2005/8/colors/accent1_2">
   <dgm:title val=""/>
   <dgm:desc val=""/>
@@ -5986,6 +6735,434 @@
               </a:ext>
               <a:ext uri="{96DAC541-7B7A-43D3-8B79-37D633B846F1}">
                 <asvg:svgBlip xmlns:asvg="http://schemas.microsoft.com/office/drawing/2016/SVG/main" r:embed="rId9"/>
+              </a:ext>
+            </a:extLst>
+          </a:blip>
+          <a:stretch>
+            <a:fillRect/>
+          </a:stretch>
+        </a:blipFill>
+      </dgm:spPr>
+      <dgm:extLst>
+        <a:ext uri="{E40237B7-FDA0-4F09-8148-C483321AD2D9}">
+          <dgm14:cNvPr xmlns:dgm14="http://schemas.microsoft.com/office/drawing/2010/diagram" id="0" name="" descr="Projector"/>
+        </a:ext>
+      </dgm:extLst>
+    </dgm:pt>
+    <dgm:pt modelId="{806002CB-A457-44F2-A2DD-11D2572CD18C}" type="pres">
+      <dgm:prSet presAssocID="{D18979C8-D283-4F11-8056-816DA377F0C0}" presName="spaceRect" presStyleCnt="0"/>
+      <dgm:spPr/>
+    </dgm:pt>
+    <dgm:pt modelId="{77CFAC55-D3CF-45EA-A63C-9656646CA42E}" type="pres">
+      <dgm:prSet presAssocID="{D18979C8-D283-4F11-8056-816DA377F0C0}" presName="parTx" presStyleLbl="revTx" presStyleIdx="3" presStyleCnt="4">
+        <dgm:presLayoutVars>
+          <dgm:chMax val="0"/>
+          <dgm:chPref val="0"/>
+        </dgm:presLayoutVars>
+      </dgm:prSet>
+      <dgm:spPr/>
+    </dgm:pt>
+  </dgm:ptLst>
+  <dgm:cxnLst>
+    <dgm:cxn modelId="{ABD03D04-9D53-4E00-AB81-F25AC035AAD4}" srcId="{730B5E20-22E8-49EE-849D-2F09EB7C5E55}" destId="{D23F440E-398D-41B6-A80F-74494D5847CA}" srcOrd="0" destOrd="0" parTransId="{90B11B28-5797-4553-BCD6-924D483AEFA1}" sibTransId="{039D6CC6-CBE0-4615-AC1E-542A7D83BEE4}"/>
+    <dgm:cxn modelId="{B69A751B-F5A4-4FDF-A1ED-C6E1EE94BDBA}" type="presOf" srcId="{F8289849-E987-4255-8EC8-44B4F81CB10E}" destId="{7DE8E408-DE79-443F-8629-C089FBA689E3}" srcOrd="0" destOrd="0" presId="urn:microsoft.com/office/officeart/2018/2/layout/IconVerticalSolidList"/>
+    <dgm:cxn modelId="{2C52642D-1657-4F8D-BBDD-B987CC65BE05}" srcId="{730B5E20-22E8-49EE-849D-2F09EB7C5E55}" destId="{D18979C8-D283-4F11-8056-816DA377F0C0}" srcOrd="3" destOrd="0" parTransId="{88215926-66BF-48C4-A93B-2B9055E4B30E}" sibTransId="{69F2F367-DB05-4C42-B3B6-E5FAE86F9F26}"/>
+    <dgm:cxn modelId="{27CB5032-1C28-4B71-9DE7-3B8573DAA06B}" type="presOf" srcId="{D18979C8-D283-4F11-8056-816DA377F0C0}" destId="{77CFAC55-D3CF-45EA-A63C-9656646CA42E}" srcOrd="0" destOrd="0" presId="urn:microsoft.com/office/officeart/2018/2/layout/IconVerticalSolidList"/>
+    <dgm:cxn modelId="{36BA1767-35CA-4C91-93C5-94F0ADD921AD}" type="presOf" srcId="{730B5E20-22E8-49EE-849D-2F09EB7C5E55}" destId="{933F326E-830B-4831-B1CB-C533857382D0}" srcOrd="0" destOrd="0" presId="urn:microsoft.com/office/officeart/2018/2/layout/IconVerticalSolidList"/>
+    <dgm:cxn modelId="{70466650-EF21-44D4-9C56-FBD4098B58CE}" srcId="{730B5E20-22E8-49EE-849D-2F09EB7C5E55}" destId="{B987AC83-493B-4B18-BBDE-1E83EAF7E925}" srcOrd="2" destOrd="0" parTransId="{8B487908-3605-4A42-980E-D4512632196F}" sibTransId="{3871E768-D972-4239-9CDD-D2C93D59DC76}"/>
+    <dgm:cxn modelId="{0DECB193-7D07-48D4-B4D0-8A44B02B0EFC}" srcId="{730B5E20-22E8-49EE-849D-2F09EB7C5E55}" destId="{F8289849-E987-4255-8EC8-44B4F81CB10E}" srcOrd="1" destOrd="0" parTransId="{58406139-B729-43A1-9AA7-0431547BE2D4}" sibTransId="{CFDFBA7F-EFFF-4644-9D4D-D4EA2AB33D7D}"/>
+    <dgm:cxn modelId="{44162A95-8BE4-488C-B835-013E9523D7C9}" type="presOf" srcId="{B987AC83-493B-4B18-BBDE-1E83EAF7E925}" destId="{B9DB9720-3FDF-4ACB-85FA-66976B22A528}" srcOrd="0" destOrd="0" presId="urn:microsoft.com/office/officeart/2018/2/layout/IconVerticalSolidList"/>
+    <dgm:cxn modelId="{CBA314A9-2DA4-4A96-8AAA-82DB60A2107B}" type="presOf" srcId="{D23F440E-398D-41B6-A80F-74494D5847CA}" destId="{E59E20F8-4207-45B4-B668-018957100416}" srcOrd="0" destOrd="0" presId="urn:microsoft.com/office/officeart/2018/2/layout/IconVerticalSolidList"/>
+    <dgm:cxn modelId="{9530F58C-F371-4809-A58E-6A168C19975B}" type="presParOf" srcId="{933F326E-830B-4831-B1CB-C533857382D0}" destId="{76D33545-207A-477F-A16B-BB2B9D7F2D3A}" srcOrd="0" destOrd="0" presId="urn:microsoft.com/office/officeart/2018/2/layout/IconVerticalSolidList"/>
+    <dgm:cxn modelId="{E451D301-FBDE-471F-ABE3-C1348C32FA64}" type="presParOf" srcId="{76D33545-207A-477F-A16B-BB2B9D7F2D3A}" destId="{8FAC3CA6-DB25-4C68-BA9A-AD1D71B4FF5F}" srcOrd="0" destOrd="0" presId="urn:microsoft.com/office/officeart/2018/2/layout/IconVerticalSolidList"/>
+    <dgm:cxn modelId="{14E7CD92-A38A-4FAF-9BA9-5FF42774E845}" type="presParOf" srcId="{76D33545-207A-477F-A16B-BB2B9D7F2D3A}" destId="{EE8C7A60-76B2-49C3-B369-A96EA3E5C2D4}" srcOrd="1" destOrd="0" presId="urn:microsoft.com/office/officeart/2018/2/layout/IconVerticalSolidList"/>
+    <dgm:cxn modelId="{5D26878D-4F9B-405F-8E85-83F7C0F8E1DB}" type="presParOf" srcId="{76D33545-207A-477F-A16B-BB2B9D7F2D3A}" destId="{B6D7E020-35D4-4D94-A1B9-406EAB63801E}" srcOrd="2" destOrd="0" presId="urn:microsoft.com/office/officeart/2018/2/layout/IconVerticalSolidList"/>
+    <dgm:cxn modelId="{C9133D54-CFA6-4961-AF72-CCA5E88723C5}" type="presParOf" srcId="{76D33545-207A-477F-A16B-BB2B9D7F2D3A}" destId="{E59E20F8-4207-45B4-B668-018957100416}" srcOrd="3" destOrd="0" presId="urn:microsoft.com/office/officeart/2018/2/layout/IconVerticalSolidList"/>
+    <dgm:cxn modelId="{CD16DBD8-D5DB-4E7C-B56A-F7994BF3480C}" type="presParOf" srcId="{933F326E-830B-4831-B1CB-C533857382D0}" destId="{5E9395D8-4450-4F9F-846C-719251944482}" srcOrd="1" destOrd="0" presId="urn:microsoft.com/office/officeart/2018/2/layout/IconVerticalSolidList"/>
+    <dgm:cxn modelId="{C5884024-B1F3-44A6-AAC9-EA7FDF63D1F4}" type="presParOf" srcId="{933F326E-830B-4831-B1CB-C533857382D0}" destId="{4317EA3C-F64C-49F9-8D0C-2AD3C7D8B19A}" srcOrd="2" destOrd="0" presId="urn:microsoft.com/office/officeart/2018/2/layout/IconVerticalSolidList"/>
+    <dgm:cxn modelId="{B61F5F59-BFC6-4790-A4CB-49481E4A7E67}" type="presParOf" srcId="{4317EA3C-F64C-49F9-8D0C-2AD3C7D8B19A}" destId="{37F77629-432B-4A69-837C-14C65DEDD20C}" srcOrd="0" destOrd="0" presId="urn:microsoft.com/office/officeart/2018/2/layout/IconVerticalSolidList"/>
+    <dgm:cxn modelId="{F26FB358-72F0-4DE0-BF50-574AA8D7675B}" type="presParOf" srcId="{4317EA3C-F64C-49F9-8D0C-2AD3C7D8B19A}" destId="{C1FCEA5C-0298-4163-931F-016E81AAB647}" srcOrd="1" destOrd="0" presId="urn:microsoft.com/office/officeart/2018/2/layout/IconVerticalSolidList"/>
+    <dgm:cxn modelId="{04F992BD-F4A0-4C73-8E88-0DCB02F4B0DA}" type="presParOf" srcId="{4317EA3C-F64C-49F9-8D0C-2AD3C7D8B19A}" destId="{4E01C590-E7DA-4835-86D2-4CCA915CA9A6}" srcOrd="2" destOrd="0" presId="urn:microsoft.com/office/officeart/2018/2/layout/IconVerticalSolidList"/>
+    <dgm:cxn modelId="{D9501396-62D3-464C-AFF5-D80F72C0E0A4}" type="presParOf" srcId="{4317EA3C-F64C-49F9-8D0C-2AD3C7D8B19A}" destId="{7DE8E408-DE79-443F-8629-C089FBA689E3}" srcOrd="3" destOrd="0" presId="urn:microsoft.com/office/officeart/2018/2/layout/IconVerticalSolidList"/>
+    <dgm:cxn modelId="{B64CE750-A220-423D-A5EB-CB9BECD78567}" type="presParOf" srcId="{933F326E-830B-4831-B1CB-C533857382D0}" destId="{6F5BEA2C-D35A-40CD-AADB-C93FF0714F82}" srcOrd="3" destOrd="0" presId="urn:microsoft.com/office/officeart/2018/2/layout/IconVerticalSolidList"/>
+    <dgm:cxn modelId="{CEE0C149-DA4E-4DAA-86E5-5BAFB611B822}" type="presParOf" srcId="{933F326E-830B-4831-B1CB-C533857382D0}" destId="{061BB9BD-3EFB-484E-9E1E-584C8BD2EBBC}" srcOrd="4" destOrd="0" presId="urn:microsoft.com/office/officeart/2018/2/layout/IconVerticalSolidList"/>
+    <dgm:cxn modelId="{A46EC668-5ED2-4686-99BE-1BD7F730D13B}" type="presParOf" srcId="{061BB9BD-3EFB-484E-9E1E-584C8BD2EBBC}" destId="{7760943E-59EA-4625-8C71-92A18A3E7522}" srcOrd="0" destOrd="0" presId="urn:microsoft.com/office/officeart/2018/2/layout/IconVerticalSolidList"/>
+    <dgm:cxn modelId="{A9A84054-A6B0-499D-BCD3-576032380D45}" type="presParOf" srcId="{061BB9BD-3EFB-484E-9E1E-584C8BD2EBBC}" destId="{676EE63F-6485-4E2A-ABAE-83CF265BF069}" srcOrd="1" destOrd="0" presId="urn:microsoft.com/office/officeart/2018/2/layout/IconVerticalSolidList"/>
+    <dgm:cxn modelId="{194187CE-E057-4230-A3BD-9459A03BE67D}" type="presParOf" srcId="{061BB9BD-3EFB-484E-9E1E-584C8BD2EBBC}" destId="{028304A6-CF27-4F1D-99F6-FE8D277AEE17}" srcOrd="2" destOrd="0" presId="urn:microsoft.com/office/officeart/2018/2/layout/IconVerticalSolidList"/>
+    <dgm:cxn modelId="{8C1E721E-A458-4A52-900B-6C798D950C87}" type="presParOf" srcId="{061BB9BD-3EFB-484E-9E1E-584C8BD2EBBC}" destId="{B9DB9720-3FDF-4ACB-85FA-66976B22A528}" srcOrd="3" destOrd="0" presId="urn:microsoft.com/office/officeart/2018/2/layout/IconVerticalSolidList"/>
+    <dgm:cxn modelId="{0F6C0F8A-C0DA-459D-A474-7474A6218E97}" type="presParOf" srcId="{933F326E-830B-4831-B1CB-C533857382D0}" destId="{2B0E55DF-6C35-4664-BC0E-365BF51E4C99}" srcOrd="5" destOrd="0" presId="urn:microsoft.com/office/officeart/2018/2/layout/IconVerticalSolidList"/>
+    <dgm:cxn modelId="{C21BD3D6-F6A4-4D28-8A3D-E08E8BD04862}" type="presParOf" srcId="{933F326E-830B-4831-B1CB-C533857382D0}" destId="{F128A80F-4611-4111-9193-176AF502C376}" srcOrd="6" destOrd="0" presId="urn:microsoft.com/office/officeart/2018/2/layout/IconVerticalSolidList"/>
+    <dgm:cxn modelId="{7B6F3B4D-5C95-42B1-92C1-75F8AB45D4B7}" type="presParOf" srcId="{F128A80F-4611-4111-9193-176AF502C376}" destId="{79AEF808-314B-4C4B-82AA-6EEA54A65F07}" srcOrd="0" destOrd="0" presId="urn:microsoft.com/office/officeart/2018/2/layout/IconVerticalSolidList"/>
+    <dgm:cxn modelId="{F14DA5EF-E538-446F-BE7C-45C876E34890}" type="presParOf" srcId="{F128A80F-4611-4111-9193-176AF502C376}" destId="{73575651-229C-4229-B203-88512EEA95C5}" srcOrd="1" destOrd="0" presId="urn:microsoft.com/office/officeart/2018/2/layout/IconVerticalSolidList"/>
+    <dgm:cxn modelId="{E9A85B14-90AD-48A2-9B16-6090607A5F65}" type="presParOf" srcId="{F128A80F-4611-4111-9193-176AF502C376}" destId="{806002CB-A457-44F2-A2DD-11D2572CD18C}" srcOrd="2" destOrd="0" presId="urn:microsoft.com/office/officeart/2018/2/layout/IconVerticalSolidList"/>
+    <dgm:cxn modelId="{18B0CAC5-6463-418B-8377-8680A23E679D}" type="presParOf" srcId="{F128A80F-4611-4111-9193-176AF502C376}" destId="{77CFAC55-D3CF-45EA-A63C-9656646CA42E}" srcOrd="3" destOrd="0" presId="urn:microsoft.com/office/officeart/2018/2/layout/IconVerticalSolidList"/>
+  </dgm:cxnLst>
+  <dgm:bg/>
+  <dgm:whole/>
+  <dgm:extLst>
+    <a:ext uri="http://schemas.microsoft.com/office/drawing/2008/diagram">
+      <dsp:dataModelExt xmlns:dsp="http://schemas.microsoft.com/office/drawing/2008/diagram" relId="rId6" minVer="http://schemas.openxmlformats.org/drawingml/2006/diagram"/>
+    </a:ext>
+  </dgm:extLst>
+</dgm:dataModel>
+</file>
+
+<file path=ppt/diagrams/data6.xml><?xml version="1.0" encoding="utf-8"?>
+<dgm:dataModel xmlns:dgm="http://schemas.openxmlformats.org/drawingml/2006/diagram" xmlns:a="http://schemas.openxmlformats.org/drawingml/2006/main">
+  <dgm:ptLst>
+    <dgm:pt modelId="{730B5E20-22E8-49EE-849D-2F09EB7C5E55}" type="doc">
+      <dgm:prSet loTypeId="urn:microsoft.com/office/officeart/2018/2/layout/IconVerticalSolidList" loCatId="icon" qsTypeId="urn:microsoft.com/office/officeart/2005/8/quickstyle/simple1" qsCatId="simple" csTypeId="urn:microsoft.com/office/officeart/2005/8/colors/accent1_2" csCatId="accent1" phldr="1"/>
+      <dgm:spPr/>
+      <dgm:t>
+        <a:bodyPr/>
+        <a:lstStyle/>
+        <a:p>
+          <a:endParaRPr lang="en-US"/>
+        </a:p>
+      </dgm:t>
+    </dgm:pt>
+    <dgm:pt modelId="{D23F440E-398D-41B6-A80F-74494D5847CA}">
+      <dgm:prSet/>
+      <dgm:spPr/>
+      <dgm:t>
+        <a:bodyPr/>
+        <a:lstStyle/>
+        <a:p>
+          <a:pPr>
+            <a:lnSpc>
+              <a:spcPct val="100000"/>
+            </a:lnSpc>
+          </a:pPr>
+          <a:r>
+            <a:rPr lang="en-US" dirty="0"/>
+            <a:t>All subscribers need to follow the same interface, so that the Subject/Publisher can interact uniformly with them</a:t>
+          </a:r>
+        </a:p>
+      </dgm:t>
+    </dgm:pt>
+    <dgm:pt modelId="{90B11B28-5797-4553-BCD6-924D483AEFA1}" type="parTrans" cxnId="{ABD03D04-9D53-4E00-AB81-F25AC035AAD4}">
+      <dgm:prSet/>
+      <dgm:spPr/>
+      <dgm:t>
+        <a:bodyPr/>
+        <a:lstStyle/>
+        <a:p>
+          <a:endParaRPr lang="en-US"/>
+        </a:p>
+      </dgm:t>
+    </dgm:pt>
+    <dgm:pt modelId="{039D6CC6-CBE0-4615-AC1E-542A7D83BEE4}" type="sibTrans" cxnId="{ABD03D04-9D53-4E00-AB81-F25AC035AAD4}">
+      <dgm:prSet/>
+      <dgm:spPr/>
+      <dgm:t>
+        <a:bodyPr/>
+        <a:lstStyle/>
+        <a:p>
+          <a:endParaRPr lang="en-US"/>
+        </a:p>
+      </dgm:t>
+    </dgm:pt>
+    <dgm:pt modelId="{F8289849-E987-4255-8EC8-44B4F81CB10E}">
+      <dgm:prSet/>
+      <dgm:spPr/>
+      <dgm:t>
+        <a:bodyPr/>
+        <a:lstStyle/>
+        <a:p>
+          <a:pPr>
+            <a:lnSpc>
+              <a:spcPct val="100000"/>
+            </a:lnSpc>
+          </a:pPr>
+          <a:r>
+            <a:rPr lang="en-US" dirty="0"/>
+            <a:t>Usually, 1 to many relationship (1 observable with many subscribers)</a:t>
+          </a:r>
+        </a:p>
+      </dgm:t>
+    </dgm:pt>
+    <dgm:pt modelId="{58406139-B729-43A1-9AA7-0431547BE2D4}" type="parTrans" cxnId="{0DECB193-7D07-48D4-B4D0-8A44B02B0EFC}">
+      <dgm:prSet/>
+      <dgm:spPr/>
+      <dgm:t>
+        <a:bodyPr/>
+        <a:lstStyle/>
+        <a:p>
+          <a:endParaRPr lang="en-US"/>
+        </a:p>
+      </dgm:t>
+    </dgm:pt>
+    <dgm:pt modelId="{CFDFBA7F-EFFF-4644-9D4D-D4EA2AB33D7D}" type="sibTrans" cxnId="{0DECB193-7D07-48D4-B4D0-8A44B02B0EFC}">
+      <dgm:prSet/>
+      <dgm:spPr/>
+      <dgm:t>
+        <a:bodyPr/>
+        <a:lstStyle/>
+        <a:p>
+          <a:endParaRPr lang="en-US"/>
+        </a:p>
+      </dgm:t>
+    </dgm:pt>
+    <dgm:pt modelId="{B987AC83-493B-4B18-BBDE-1E83EAF7E925}">
+      <dgm:prSet/>
+      <dgm:spPr/>
+      <dgm:t>
+        <a:bodyPr/>
+        <a:lstStyle/>
+        <a:p>
+          <a:pPr>
+            <a:lnSpc>
+              <a:spcPct val="100000"/>
+            </a:lnSpc>
+          </a:pPr>
+          <a:r>
+            <a:rPr lang="en-US" dirty="0"/>
+            <a:t>Change subscribers at runtime</a:t>
+          </a:r>
+        </a:p>
+      </dgm:t>
+    </dgm:pt>
+    <dgm:pt modelId="{8B487908-3605-4A42-980E-D4512632196F}" type="parTrans" cxnId="{70466650-EF21-44D4-9C56-FBD4098B58CE}">
+      <dgm:prSet/>
+      <dgm:spPr/>
+      <dgm:t>
+        <a:bodyPr/>
+        <a:lstStyle/>
+        <a:p>
+          <a:endParaRPr lang="en-US"/>
+        </a:p>
+      </dgm:t>
+    </dgm:pt>
+    <dgm:pt modelId="{3871E768-D972-4239-9CDD-D2C93D59DC76}" type="sibTrans" cxnId="{70466650-EF21-44D4-9C56-FBD4098B58CE}">
+      <dgm:prSet/>
+      <dgm:spPr/>
+      <dgm:t>
+        <a:bodyPr/>
+        <a:lstStyle/>
+        <a:p>
+          <a:endParaRPr lang="en-US"/>
+        </a:p>
+      </dgm:t>
+    </dgm:pt>
+    <dgm:pt modelId="{D18979C8-D283-4F11-8056-816DA377F0C0}">
+      <dgm:prSet/>
+      <dgm:spPr/>
+      <dgm:t>
+        <a:bodyPr/>
+        <a:lstStyle/>
+        <a:p>
+          <a:pPr>
+            <a:lnSpc>
+              <a:spcPct val="100000"/>
+            </a:lnSpc>
+          </a:pPr>
+          <a:r>
+            <a:rPr lang="en-US" dirty="0"/>
+            <a:t>Can make debugging difficult, can lead to unexpected updates</a:t>
+          </a:r>
+        </a:p>
+      </dgm:t>
+    </dgm:pt>
+    <dgm:pt modelId="{88215926-66BF-48C4-A93B-2B9055E4B30E}" type="parTrans" cxnId="{2C52642D-1657-4F8D-BBDD-B987CC65BE05}">
+      <dgm:prSet/>
+      <dgm:spPr/>
+      <dgm:t>
+        <a:bodyPr/>
+        <a:lstStyle/>
+        <a:p>
+          <a:endParaRPr lang="en-US"/>
+        </a:p>
+      </dgm:t>
+    </dgm:pt>
+    <dgm:pt modelId="{69F2F367-DB05-4C42-B3B6-E5FAE86F9F26}" type="sibTrans" cxnId="{2C52642D-1657-4F8D-BBDD-B987CC65BE05}">
+      <dgm:prSet/>
+      <dgm:spPr/>
+      <dgm:t>
+        <a:bodyPr/>
+        <a:lstStyle/>
+        <a:p>
+          <a:endParaRPr lang="en-US"/>
+        </a:p>
+      </dgm:t>
+    </dgm:pt>
+    <dgm:pt modelId="{933F326E-830B-4831-B1CB-C533857382D0}" type="pres">
+      <dgm:prSet presAssocID="{730B5E20-22E8-49EE-849D-2F09EB7C5E55}" presName="root" presStyleCnt="0">
+        <dgm:presLayoutVars>
+          <dgm:dir/>
+          <dgm:resizeHandles val="exact"/>
+        </dgm:presLayoutVars>
+      </dgm:prSet>
+      <dgm:spPr/>
+    </dgm:pt>
+    <dgm:pt modelId="{76D33545-207A-477F-A16B-BB2B9D7F2D3A}" type="pres">
+      <dgm:prSet presAssocID="{D23F440E-398D-41B6-A80F-74494D5847CA}" presName="compNode" presStyleCnt="0"/>
+      <dgm:spPr/>
+    </dgm:pt>
+    <dgm:pt modelId="{8FAC3CA6-DB25-4C68-BA9A-AD1D71B4FF5F}" type="pres">
+      <dgm:prSet presAssocID="{D23F440E-398D-41B6-A80F-74494D5847CA}" presName="bgRect" presStyleLbl="bgShp" presStyleIdx="0" presStyleCnt="4"/>
+      <dgm:spPr/>
+    </dgm:pt>
+    <dgm:pt modelId="{EE8C7A60-76B2-49C3-B369-A96EA3E5C2D4}" type="pres">
+      <dgm:prSet presAssocID="{D23F440E-398D-41B6-A80F-74494D5847CA}" presName="iconRect" presStyleLbl="node1" presStyleIdx="0" presStyleCnt="4"/>
+      <dgm:spPr>
+        <a:blipFill>
+          <a:blip xmlns:r="http://schemas.openxmlformats.org/officeDocument/2006/relationships" r:embed="rId1">
+            <a:extLst>
+              <a:ext uri="{28A0092B-C50C-407E-A947-70E740481C1C}">
+                <a14:useLocalDpi xmlns:a14="http://schemas.microsoft.com/office/drawing/2010/main" val="0"/>
+              </a:ext>
+              <a:ext uri="{96DAC541-7B7A-43D3-8B79-37D633B846F1}">
+                <asvg:svgBlip xmlns:asvg="http://schemas.microsoft.com/office/drawing/2016/SVG/main" r:embed="rId2"/>
+              </a:ext>
+            </a:extLst>
+          </a:blip>
+          <a:stretch>
+            <a:fillRect/>
+          </a:stretch>
+        </a:blipFill>
+      </dgm:spPr>
+      <dgm:extLst>
+        <a:ext uri="{E40237B7-FDA0-4F09-8148-C483321AD2D9}">
+          <dgm14:cNvPr xmlns:dgm14="http://schemas.microsoft.com/office/drawing/2010/diagram" id="0" name="" descr="Cement truck"/>
+        </a:ext>
+      </dgm:extLst>
+    </dgm:pt>
+    <dgm:pt modelId="{B6D7E020-35D4-4D94-A1B9-406EAB63801E}" type="pres">
+      <dgm:prSet presAssocID="{D23F440E-398D-41B6-A80F-74494D5847CA}" presName="spaceRect" presStyleCnt="0"/>
+      <dgm:spPr/>
+    </dgm:pt>
+    <dgm:pt modelId="{E59E20F8-4207-45B4-B668-018957100416}" type="pres">
+      <dgm:prSet presAssocID="{D23F440E-398D-41B6-A80F-74494D5847CA}" presName="parTx" presStyleLbl="revTx" presStyleIdx="0" presStyleCnt="4">
+        <dgm:presLayoutVars>
+          <dgm:chMax val="0"/>
+          <dgm:chPref val="0"/>
+        </dgm:presLayoutVars>
+      </dgm:prSet>
+      <dgm:spPr/>
+    </dgm:pt>
+    <dgm:pt modelId="{5E9395D8-4450-4F9F-846C-719251944482}" type="pres">
+      <dgm:prSet presAssocID="{039D6CC6-CBE0-4615-AC1E-542A7D83BEE4}" presName="sibTrans" presStyleCnt="0"/>
+      <dgm:spPr/>
+    </dgm:pt>
+    <dgm:pt modelId="{4317EA3C-F64C-49F9-8D0C-2AD3C7D8B19A}" type="pres">
+      <dgm:prSet presAssocID="{F8289849-E987-4255-8EC8-44B4F81CB10E}" presName="compNode" presStyleCnt="0"/>
+      <dgm:spPr/>
+    </dgm:pt>
+    <dgm:pt modelId="{37F77629-432B-4A69-837C-14C65DEDD20C}" type="pres">
+      <dgm:prSet presAssocID="{F8289849-E987-4255-8EC8-44B4F81CB10E}" presName="bgRect" presStyleLbl="bgShp" presStyleIdx="1" presStyleCnt="4" custLinFactNeighborX="-15354" custLinFactNeighborY="-9287"/>
+      <dgm:spPr/>
+    </dgm:pt>
+    <dgm:pt modelId="{C1FCEA5C-0298-4163-931F-016E81AAB647}" type="pres">
+      <dgm:prSet presAssocID="{F8289849-E987-4255-8EC8-44B4F81CB10E}" presName="iconRect" presStyleLbl="node1" presStyleIdx="1" presStyleCnt="4"/>
+      <dgm:spPr>
+        <a:blipFill>
+          <a:blip xmlns:r="http://schemas.openxmlformats.org/officeDocument/2006/relationships" r:embed="rId3">
+            <a:extLst>
+              <a:ext uri="{28A0092B-C50C-407E-A947-70E740481C1C}">
+                <a14:useLocalDpi xmlns:a14="http://schemas.microsoft.com/office/drawing/2010/main" val="0"/>
+              </a:ext>
+              <a:ext uri="{96DAC541-7B7A-43D3-8B79-37D633B846F1}">
+                <asvg:svgBlip xmlns:asvg="http://schemas.microsoft.com/office/drawing/2016/SVG/main" r:embed="rId4"/>
+              </a:ext>
+            </a:extLst>
+          </a:blip>
+          <a:stretch>
+            <a:fillRect/>
+          </a:stretch>
+        </a:blipFill>
+      </dgm:spPr>
+      <dgm:extLst>
+        <a:ext uri="{E40237B7-FDA0-4F09-8148-C483321AD2D9}">
+          <dgm14:cNvPr xmlns:dgm14="http://schemas.microsoft.com/office/drawing/2010/diagram" id="0" name="" descr="Excavator"/>
+        </a:ext>
+      </dgm:extLst>
+    </dgm:pt>
+    <dgm:pt modelId="{4E01C590-E7DA-4835-86D2-4CCA915CA9A6}" type="pres">
+      <dgm:prSet presAssocID="{F8289849-E987-4255-8EC8-44B4F81CB10E}" presName="spaceRect" presStyleCnt="0"/>
+      <dgm:spPr/>
+    </dgm:pt>
+    <dgm:pt modelId="{7DE8E408-DE79-443F-8629-C089FBA689E3}" type="pres">
+      <dgm:prSet presAssocID="{F8289849-E987-4255-8EC8-44B4F81CB10E}" presName="parTx" presStyleLbl="revTx" presStyleIdx="1" presStyleCnt="4">
+        <dgm:presLayoutVars>
+          <dgm:chMax val="0"/>
+          <dgm:chPref val="0"/>
+        </dgm:presLayoutVars>
+      </dgm:prSet>
+      <dgm:spPr/>
+    </dgm:pt>
+    <dgm:pt modelId="{6F5BEA2C-D35A-40CD-AADB-C93FF0714F82}" type="pres">
+      <dgm:prSet presAssocID="{CFDFBA7F-EFFF-4644-9D4D-D4EA2AB33D7D}" presName="sibTrans" presStyleCnt="0"/>
+      <dgm:spPr/>
+    </dgm:pt>
+    <dgm:pt modelId="{061BB9BD-3EFB-484E-9E1E-584C8BD2EBBC}" type="pres">
+      <dgm:prSet presAssocID="{B987AC83-493B-4B18-BBDE-1E83EAF7E925}" presName="compNode" presStyleCnt="0"/>
+      <dgm:spPr/>
+    </dgm:pt>
+    <dgm:pt modelId="{7760943E-59EA-4625-8C71-92A18A3E7522}" type="pres">
+      <dgm:prSet presAssocID="{B987AC83-493B-4B18-BBDE-1E83EAF7E925}" presName="bgRect" presStyleLbl="bgShp" presStyleIdx="2" presStyleCnt="4"/>
+      <dgm:spPr/>
+    </dgm:pt>
+    <dgm:pt modelId="{676EE63F-6485-4E2A-ABAE-83CF265BF069}" type="pres">
+      <dgm:prSet presAssocID="{B987AC83-493B-4B18-BBDE-1E83EAF7E925}" presName="iconRect" presStyleLbl="node1" presStyleIdx="2" presStyleCnt="4"/>
+      <dgm:spPr>
+        <a:blipFill>
+          <a:blip xmlns:r="http://schemas.openxmlformats.org/officeDocument/2006/relationships" r:embed="rId5">
+            <a:extLst>
+              <a:ext uri="{28A0092B-C50C-407E-A947-70E740481C1C}">
+                <a14:useLocalDpi xmlns:a14="http://schemas.microsoft.com/office/drawing/2010/main" val="0"/>
+              </a:ext>
+              <a:ext uri="{96DAC541-7B7A-43D3-8B79-37D633B846F1}">
+                <asvg:svgBlip xmlns:asvg="http://schemas.microsoft.com/office/drawing/2016/SVG/main" r:embed="rId6"/>
+              </a:ext>
+            </a:extLst>
+          </a:blip>
+          <a:stretch>
+            <a:fillRect/>
+          </a:stretch>
+        </a:blipFill>
+      </dgm:spPr>
+      <dgm:extLst>
+        <a:ext uri="{E40237B7-FDA0-4F09-8148-C483321AD2D9}">
+          <dgm14:cNvPr xmlns:dgm14="http://schemas.microsoft.com/office/drawing/2010/diagram" id="0" name="" descr="Factory"/>
+        </a:ext>
+      </dgm:extLst>
+    </dgm:pt>
+    <dgm:pt modelId="{028304A6-CF27-4F1D-99F6-FE8D277AEE17}" type="pres">
+      <dgm:prSet presAssocID="{B987AC83-493B-4B18-BBDE-1E83EAF7E925}" presName="spaceRect" presStyleCnt="0"/>
+      <dgm:spPr/>
+    </dgm:pt>
+    <dgm:pt modelId="{B9DB9720-3FDF-4ACB-85FA-66976B22A528}" type="pres">
+      <dgm:prSet presAssocID="{B987AC83-493B-4B18-BBDE-1E83EAF7E925}" presName="parTx" presStyleLbl="revTx" presStyleIdx="2" presStyleCnt="4">
+        <dgm:presLayoutVars>
+          <dgm:chMax val="0"/>
+          <dgm:chPref val="0"/>
+        </dgm:presLayoutVars>
+      </dgm:prSet>
+      <dgm:spPr/>
+    </dgm:pt>
+    <dgm:pt modelId="{2B0E55DF-6C35-4664-BC0E-365BF51E4C99}" type="pres">
+      <dgm:prSet presAssocID="{3871E768-D972-4239-9CDD-D2C93D59DC76}" presName="sibTrans" presStyleCnt="0"/>
+      <dgm:spPr/>
+    </dgm:pt>
+    <dgm:pt modelId="{F128A80F-4611-4111-9193-176AF502C376}" type="pres">
+      <dgm:prSet presAssocID="{D18979C8-D283-4F11-8056-816DA377F0C0}" presName="compNode" presStyleCnt="0"/>
+      <dgm:spPr/>
+    </dgm:pt>
+    <dgm:pt modelId="{79AEF808-314B-4C4B-82AA-6EEA54A65F07}" type="pres">
+      <dgm:prSet presAssocID="{D18979C8-D283-4F11-8056-816DA377F0C0}" presName="bgRect" presStyleLbl="bgShp" presStyleIdx="3" presStyleCnt="4"/>
+      <dgm:spPr/>
+    </dgm:pt>
+    <dgm:pt modelId="{73575651-229C-4229-B203-88512EEA95C5}" type="pres">
+      <dgm:prSet presAssocID="{D18979C8-D283-4F11-8056-816DA377F0C0}" presName="iconRect" presStyleLbl="node1" presStyleIdx="3" presStyleCnt="4"/>
+      <dgm:spPr>
+        <a:blipFill>
+          <a:blip xmlns:r="http://schemas.openxmlformats.org/officeDocument/2006/relationships" r:embed="rId7">
+            <a:extLst>
+              <a:ext uri="{28A0092B-C50C-407E-A947-70E740481C1C}">
+                <a14:useLocalDpi xmlns:a14="http://schemas.microsoft.com/office/drawing/2010/main" val="0"/>
+              </a:ext>
+              <a:ext uri="{96DAC541-7B7A-43D3-8B79-37D633B846F1}">
+                <asvg:svgBlip xmlns:asvg="http://schemas.microsoft.com/office/drawing/2016/SVG/main" r:embed="rId8"/>
               </a:ext>
             </a:extLst>
           </a:blip>
@@ -9309,6 +10486,650 @@
 </dsp:drawing>
 </file>
 
+<file path=ppt/diagrams/drawing6.xml><?xml version="1.0" encoding="utf-8"?>
+<dsp:drawing xmlns:dgm="http://schemas.openxmlformats.org/drawingml/2006/diagram" xmlns:dsp="http://schemas.microsoft.com/office/drawing/2008/diagram" xmlns:a="http://schemas.openxmlformats.org/drawingml/2006/main">
+  <dsp:spTree>
+    <dsp:nvGrpSpPr>
+      <dsp:cNvPr id="0" name=""/>
+      <dsp:cNvGrpSpPr/>
+    </dsp:nvGrpSpPr>
+    <dsp:grpSpPr/>
+    <dsp:sp modelId="{8FAC3CA6-DB25-4C68-BA9A-AD1D71B4FF5F}">
+      <dsp:nvSpPr>
+        <dsp:cNvPr id="0" name=""/>
+        <dsp:cNvSpPr/>
+      </dsp:nvSpPr>
+      <dsp:spPr>
+        <a:xfrm>
+          <a:off x="0" y="1555"/>
+          <a:ext cx="4639736" cy="788438"/>
+        </a:xfrm>
+        <a:prstGeom prst="roundRect">
+          <a:avLst>
+            <a:gd name="adj" fmla="val 10000"/>
+          </a:avLst>
+        </a:prstGeom>
+        <a:solidFill>
+          <a:schemeClr val="accent1">
+            <a:tint val="40000"/>
+            <a:hueOff val="0"/>
+            <a:satOff val="0"/>
+            <a:lumOff val="0"/>
+            <a:alphaOff val="0"/>
+          </a:schemeClr>
+        </a:solidFill>
+        <a:ln>
+          <a:noFill/>
+        </a:ln>
+        <a:effectLst/>
+      </dsp:spPr>
+      <dsp:style>
+        <a:lnRef idx="0">
+          <a:scrgbClr r="0" g="0" b="0"/>
+        </a:lnRef>
+        <a:fillRef idx="1">
+          <a:scrgbClr r="0" g="0" b="0"/>
+        </a:fillRef>
+        <a:effectRef idx="0">
+          <a:scrgbClr r="0" g="0" b="0"/>
+        </a:effectRef>
+        <a:fontRef idx="minor"/>
+      </dsp:style>
+    </dsp:sp>
+    <dsp:sp modelId="{EE8C7A60-76B2-49C3-B369-A96EA3E5C2D4}">
+      <dsp:nvSpPr>
+        <dsp:cNvPr id="0" name=""/>
+        <dsp:cNvSpPr/>
+      </dsp:nvSpPr>
+      <dsp:spPr>
+        <a:xfrm>
+          <a:off x="238502" y="178954"/>
+          <a:ext cx="433641" cy="433641"/>
+        </a:xfrm>
+        <a:prstGeom prst="rect">
+          <a:avLst/>
+        </a:prstGeom>
+        <a:blipFill>
+          <a:blip xmlns:r="http://schemas.openxmlformats.org/officeDocument/2006/relationships" r:embed="rId1">
+            <a:extLst>
+              <a:ext uri="{28A0092B-C50C-407E-A947-70E740481C1C}">
+                <a14:useLocalDpi xmlns:a14="http://schemas.microsoft.com/office/drawing/2010/main" val="0"/>
+              </a:ext>
+              <a:ext uri="{96DAC541-7B7A-43D3-8B79-37D633B846F1}">
+                <asvg:svgBlip xmlns:asvg="http://schemas.microsoft.com/office/drawing/2016/SVG/main" r:embed="rId2"/>
+              </a:ext>
+            </a:extLst>
+          </a:blip>
+          <a:stretch>
+            <a:fillRect/>
+          </a:stretch>
+        </a:blipFill>
+        <a:ln w="15875" cap="flat" cmpd="sng" algn="ctr">
+          <a:solidFill>
+            <a:schemeClr val="lt1">
+              <a:hueOff val="0"/>
+              <a:satOff val="0"/>
+              <a:lumOff val="0"/>
+              <a:alphaOff val="0"/>
+            </a:schemeClr>
+          </a:solidFill>
+          <a:prstDash val="solid"/>
+        </a:ln>
+        <a:effectLst/>
+      </dsp:spPr>
+      <dsp:style>
+        <a:lnRef idx="2">
+          <a:scrgbClr r="0" g="0" b="0"/>
+        </a:lnRef>
+        <a:fillRef idx="1">
+          <a:scrgbClr r="0" g="0" b="0"/>
+        </a:fillRef>
+        <a:effectRef idx="0">
+          <a:scrgbClr r="0" g="0" b="0"/>
+        </a:effectRef>
+        <a:fontRef idx="minor">
+          <a:schemeClr val="lt1"/>
+        </a:fontRef>
+      </dsp:style>
+    </dsp:sp>
+    <dsp:sp modelId="{E59E20F8-4207-45B4-B668-018957100416}">
+      <dsp:nvSpPr>
+        <dsp:cNvPr id="0" name=""/>
+        <dsp:cNvSpPr/>
+      </dsp:nvSpPr>
+      <dsp:spPr>
+        <a:xfrm>
+          <a:off x="910646" y="1555"/>
+          <a:ext cx="3729089" cy="788438"/>
+        </a:xfrm>
+        <a:prstGeom prst="rect">
+          <a:avLst/>
+        </a:prstGeom>
+        <a:noFill/>
+        <a:ln>
+          <a:noFill/>
+        </a:ln>
+        <a:effectLst/>
+      </dsp:spPr>
+      <dsp:style>
+        <a:lnRef idx="0">
+          <a:scrgbClr r="0" g="0" b="0"/>
+        </a:lnRef>
+        <a:fillRef idx="0">
+          <a:scrgbClr r="0" g="0" b="0"/>
+        </a:fillRef>
+        <a:effectRef idx="0">
+          <a:scrgbClr r="0" g="0" b="0"/>
+        </a:effectRef>
+        <a:fontRef idx="minor"/>
+      </dsp:style>
+      <dsp:txBody>
+        <a:bodyPr spcFirstLastPara="0" vert="horz" wrap="square" lIns="83443" tIns="83443" rIns="83443" bIns="83443" numCol="1" spcCol="1270" anchor="ctr" anchorCtr="0">
+          <a:noAutofit/>
+        </a:bodyPr>
+        <a:lstStyle/>
+        <a:p>
+          <a:pPr marL="0" lvl="0" indent="0" algn="l" defTabSz="622300">
+            <a:lnSpc>
+              <a:spcPct val="100000"/>
+            </a:lnSpc>
+            <a:spcBef>
+              <a:spcPct val="0"/>
+            </a:spcBef>
+            <a:spcAft>
+              <a:spcPct val="35000"/>
+            </a:spcAft>
+            <a:buNone/>
+          </a:pPr>
+          <a:r>
+            <a:rPr lang="en-US" sz="1400" kern="1200" dirty="0"/>
+            <a:t>All subscribers need to follow the same interface, so that the Subject/Publisher can interact uniformly with them</a:t>
+          </a:r>
+        </a:p>
+      </dsp:txBody>
+      <dsp:txXfrm>
+        <a:off x="910646" y="1555"/>
+        <a:ext cx="3729089" cy="788438"/>
+      </dsp:txXfrm>
+    </dsp:sp>
+    <dsp:sp modelId="{37F77629-432B-4A69-837C-14C65DEDD20C}">
+      <dsp:nvSpPr>
+        <dsp:cNvPr id="0" name=""/>
+        <dsp:cNvSpPr/>
+      </dsp:nvSpPr>
+      <dsp:spPr>
+        <a:xfrm>
+          <a:off x="0" y="913881"/>
+          <a:ext cx="4639736" cy="788438"/>
+        </a:xfrm>
+        <a:prstGeom prst="roundRect">
+          <a:avLst>
+            <a:gd name="adj" fmla="val 10000"/>
+          </a:avLst>
+        </a:prstGeom>
+        <a:solidFill>
+          <a:schemeClr val="accent1">
+            <a:tint val="40000"/>
+            <a:hueOff val="0"/>
+            <a:satOff val="0"/>
+            <a:lumOff val="0"/>
+            <a:alphaOff val="0"/>
+          </a:schemeClr>
+        </a:solidFill>
+        <a:ln>
+          <a:noFill/>
+        </a:ln>
+        <a:effectLst/>
+      </dsp:spPr>
+      <dsp:style>
+        <a:lnRef idx="0">
+          <a:scrgbClr r="0" g="0" b="0"/>
+        </a:lnRef>
+        <a:fillRef idx="1">
+          <a:scrgbClr r="0" g="0" b="0"/>
+        </a:fillRef>
+        <a:effectRef idx="0">
+          <a:scrgbClr r="0" g="0" b="0"/>
+        </a:effectRef>
+        <a:fontRef idx="minor"/>
+      </dsp:style>
+    </dsp:sp>
+    <dsp:sp modelId="{C1FCEA5C-0298-4163-931F-016E81AAB647}">
+      <dsp:nvSpPr>
+        <dsp:cNvPr id="0" name=""/>
+        <dsp:cNvSpPr/>
+      </dsp:nvSpPr>
+      <dsp:spPr>
+        <a:xfrm>
+          <a:off x="238502" y="1164502"/>
+          <a:ext cx="433641" cy="433641"/>
+        </a:xfrm>
+        <a:prstGeom prst="rect">
+          <a:avLst/>
+        </a:prstGeom>
+        <a:blipFill>
+          <a:blip xmlns:r="http://schemas.openxmlformats.org/officeDocument/2006/relationships" r:embed="rId3">
+            <a:extLst>
+              <a:ext uri="{28A0092B-C50C-407E-A947-70E740481C1C}">
+                <a14:useLocalDpi xmlns:a14="http://schemas.microsoft.com/office/drawing/2010/main" val="0"/>
+              </a:ext>
+              <a:ext uri="{96DAC541-7B7A-43D3-8B79-37D633B846F1}">
+                <asvg:svgBlip xmlns:asvg="http://schemas.microsoft.com/office/drawing/2016/SVG/main" r:embed="rId4"/>
+              </a:ext>
+            </a:extLst>
+          </a:blip>
+          <a:stretch>
+            <a:fillRect/>
+          </a:stretch>
+        </a:blipFill>
+        <a:ln w="15875" cap="flat" cmpd="sng" algn="ctr">
+          <a:solidFill>
+            <a:schemeClr val="lt1">
+              <a:hueOff val="0"/>
+              <a:satOff val="0"/>
+              <a:lumOff val="0"/>
+              <a:alphaOff val="0"/>
+            </a:schemeClr>
+          </a:solidFill>
+          <a:prstDash val="solid"/>
+        </a:ln>
+        <a:effectLst/>
+      </dsp:spPr>
+      <dsp:style>
+        <a:lnRef idx="2">
+          <a:scrgbClr r="0" g="0" b="0"/>
+        </a:lnRef>
+        <a:fillRef idx="1">
+          <a:scrgbClr r="0" g="0" b="0"/>
+        </a:fillRef>
+        <a:effectRef idx="0">
+          <a:scrgbClr r="0" g="0" b="0"/>
+        </a:effectRef>
+        <a:fontRef idx="minor">
+          <a:schemeClr val="lt1"/>
+        </a:fontRef>
+      </dsp:style>
+    </dsp:sp>
+    <dsp:sp modelId="{7DE8E408-DE79-443F-8629-C089FBA689E3}">
+      <dsp:nvSpPr>
+        <dsp:cNvPr id="0" name=""/>
+        <dsp:cNvSpPr/>
+      </dsp:nvSpPr>
+      <dsp:spPr>
+        <a:xfrm>
+          <a:off x="910646" y="987103"/>
+          <a:ext cx="3729089" cy="788438"/>
+        </a:xfrm>
+        <a:prstGeom prst="rect">
+          <a:avLst/>
+        </a:prstGeom>
+        <a:noFill/>
+        <a:ln>
+          <a:noFill/>
+        </a:ln>
+        <a:effectLst/>
+      </dsp:spPr>
+      <dsp:style>
+        <a:lnRef idx="0">
+          <a:scrgbClr r="0" g="0" b="0"/>
+        </a:lnRef>
+        <a:fillRef idx="0">
+          <a:scrgbClr r="0" g="0" b="0"/>
+        </a:fillRef>
+        <a:effectRef idx="0">
+          <a:scrgbClr r="0" g="0" b="0"/>
+        </a:effectRef>
+        <a:fontRef idx="minor"/>
+      </dsp:style>
+      <dsp:txBody>
+        <a:bodyPr spcFirstLastPara="0" vert="horz" wrap="square" lIns="83443" tIns="83443" rIns="83443" bIns="83443" numCol="1" spcCol="1270" anchor="ctr" anchorCtr="0">
+          <a:noAutofit/>
+        </a:bodyPr>
+        <a:lstStyle/>
+        <a:p>
+          <a:pPr marL="0" lvl="0" indent="0" algn="l" defTabSz="622300">
+            <a:lnSpc>
+              <a:spcPct val="100000"/>
+            </a:lnSpc>
+            <a:spcBef>
+              <a:spcPct val="0"/>
+            </a:spcBef>
+            <a:spcAft>
+              <a:spcPct val="35000"/>
+            </a:spcAft>
+            <a:buNone/>
+          </a:pPr>
+          <a:r>
+            <a:rPr lang="en-US" sz="1400" kern="1200" dirty="0"/>
+            <a:t>Usually, 1 to many relationship (1 observable with many subscribers)</a:t>
+          </a:r>
+        </a:p>
+      </dsp:txBody>
+      <dsp:txXfrm>
+        <a:off x="910646" y="987103"/>
+        <a:ext cx="3729089" cy="788438"/>
+      </dsp:txXfrm>
+    </dsp:sp>
+    <dsp:sp modelId="{7760943E-59EA-4625-8C71-92A18A3E7522}">
+      <dsp:nvSpPr>
+        <dsp:cNvPr id="0" name=""/>
+        <dsp:cNvSpPr/>
+      </dsp:nvSpPr>
+      <dsp:spPr>
+        <a:xfrm>
+          <a:off x="0" y="1972651"/>
+          <a:ext cx="4639736" cy="788438"/>
+        </a:xfrm>
+        <a:prstGeom prst="roundRect">
+          <a:avLst>
+            <a:gd name="adj" fmla="val 10000"/>
+          </a:avLst>
+        </a:prstGeom>
+        <a:solidFill>
+          <a:schemeClr val="accent1">
+            <a:tint val="40000"/>
+            <a:hueOff val="0"/>
+            <a:satOff val="0"/>
+            <a:lumOff val="0"/>
+            <a:alphaOff val="0"/>
+          </a:schemeClr>
+        </a:solidFill>
+        <a:ln>
+          <a:noFill/>
+        </a:ln>
+        <a:effectLst/>
+      </dsp:spPr>
+      <dsp:style>
+        <a:lnRef idx="0">
+          <a:scrgbClr r="0" g="0" b="0"/>
+        </a:lnRef>
+        <a:fillRef idx="1">
+          <a:scrgbClr r="0" g="0" b="0"/>
+        </a:fillRef>
+        <a:effectRef idx="0">
+          <a:scrgbClr r="0" g="0" b="0"/>
+        </a:effectRef>
+        <a:fontRef idx="minor"/>
+      </dsp:style>
+    </dsp:sp>
+    <dsp:sp modelId="{676EE63F-6485-4E2A-ABAE-83CF265BF069}">
+      <dsp:nvSpPr>
+        <dsp:cNvPr id="0" name=""/>
+        <dsp:cNvSpPr/>
+      </dsp:nvSpPr>
+      <dsp:spPr>
+        <a:xfrm>
+          <a:off x="238502" y="2150049"/>
+          <a:ext cx="433641" cy="433641"/>
+        </a:xfrm>
+        <a:prstGeom prst="rect">
+          <a:avLst/>
+        </a:prstGeom>
+        <a:blipFill>
+          <a:blip xmlns:r="http://schemas.openxmlformats.org/officeDocument/2006/relationships" r:embed="rId5">
+            <a:extLst>
+              <a:ext uri="{28A0092B-C50C-407E-A947-70E740481C1C}">
+                <a14:useLocalDpi xmlns:a14="http://schemas.microsoft.com/office/drawing/2010/main" val="0"/>
+              </a:ext>
+              <a:ext uri="{96DAC541-7B7A-43D3-8B79-37D633B846F1}">
+                <asvg:svgBlip xmlns:asvg="http://schemas.microsoft.com/office/drawing/2016/SVG/main" r:embed="rId6"/>
+              </a:ext>
+            </a:extLst>
+          </a:blip>
+          <a:stretch>
+            <a:fillRect/>
+          </a:stretch>
+        </a:blipFill>
+        <a:ln w="15875" cap="flat" cmpd="sng" algn="ctr">
+          <a:solidFill>
+            <a:schemeClr val="lt1">
+              <a:hueOff val="0"/>
+              <a:satOff val="0"/>
+              <a:lumOff val="0"/>
+              <a:alphaOff val="0"/>
+            </a:schemeClr>
+          </a:solidFill>
+          <a:prstDash val="solid"/>
+        </a:ln>
+        <a:effectLst/>
+      </dsp:spPr>
+      <dsp:style>
+        <a:lnRef idx="2">
+          <a:scrgbClr r="0" g="0" b="0"/>
+        </a:lnRef>
+        <a:fillRef idx="1">
+          <a:scrgbClr r="0" g="0" b="0"/>
+        </a:fillRef>
+        <a:effectRef idx="0">
+          <a:scrgbClr r="0" g="0" b="0"/>
+        </a:effectRef>
+        <a:fontRef idx="minor">
+          <a:schemeClr val="lt1"/>
+        </a:fontRef>
+      </dsp:style>
+    </dsp:sp>
+    <dsp:sp modelId="{B9DB9720-3FDF-4ACB-85FA-66976B22A528}">
+      <dsp:nvSpPr>
+        <dsp:cNvPr id="0" name=""/>
+        <dsp:cNvSpPr/>
+      </dsp:nvSpPr>
+      <dsp:spPr>
+        <a:xfrm>
+          <a:off x="910646" y="1972651"/>
+          <a:ext cx="3729089" cy="788438"/>
+        </a:xfrm>
+        <a:prstGeom prst="rect">
+          <a:avLst/>
+        </a:prstGeom>
+        <a:noFill/>
+        <a:ln>
+          <a:noFill/>
+        </a:ln>
+        <a:effectLst/>
+      </dsp:spPr>
+      <dsp:style>
+        <a:lnRef idx="0">
+          <a:scrgbClr r="0" g="0" b="0"/>
+        </a:lnRef>
+        <a:fillRef idx="0">
+          <a:scrgbClr r="0" g="0" b="0"/>
+        </a:fillRef>
+        <a:effectRef idx="0">
+          <a:scrgbClr r="0" g="0" b="0"/>
+        </a:effectRef>
+        <a:fontRef idx="minor"/>
+      </dsp:style>
+      <dsp:txBody>
+        <a:bodyPr spcFirstLastPara="0" vert="horz" wrap="square" lIns="83443" tIns="83443" rIns="83443" bIns="83443" numCol="1" spcCol="1270" anchor="ctr" anchorCtr="0">
+          <a:noAutofit/>
+        </a:bodyPr>
+        <a:lstStyle/>
+        <a:p>
+          <a:pPr marL="0" lvl="0" indent="0" algn="l" defTabSz="622300">
+            <a:lnSpc>
+              <a:spcPct val="100000"/>
+            </a:lnSpc>
+            <a:spcBef>
+              <a:spcPct val="0"/>
+            </a:spcBef>
+            <a:spcAft>
+              <a:spcPct val="35000"/>
+            </a:spcAft>
+            <a:buNone/>
+          </a:pPr>
+          <a:r>
+            <a:rPr lang="en-US" sz="1400" kern="1200" dirty="0"/>
+            <a:t>Change subscribers at runtime</a:t>
+          </a:r>
+        </a:p>
+      </dsp:txBody>
+      <dsp:txXfrm>
+        <a:off x="910646" y="1972651"/>
+        <a:ext cx="3729089" cy="788438"/>
+      </dsp:txXfrm>
+    </dsp:sp>
+    <dsp:sp modelId="{79AEF808-314B-4C4B-82AA-6EEA54A65F07}">
+      <dsp:nvSpPr>
+        <dsp:cNvPr id="0" name=""/>
+        <dsp:cNvSpPr/>
+      </dsp:nvSpPr>
+      <dsp:spPr>
+        <a:xfrm>
+          <a:off x="0" y="2958199"/>
+          <a:ext cx="4639736" cy="788438"/>
+        </a:xfrm>
+        <a:prstGeom prst="roundRect">
+          <a:avLst>
+            <a:gd name="adj" fmla="val 10000"/>
+          </a:avLst>
+        </a:prstGeom>
+        <a:solidFill>
+          <a:schemeClr val="accent1">
+            <a:tint val="40000"/>
+            <a:hueOff val="0"/>
+            <a:satOff val="0"/>
+            <a:lumOff val="0"/>
+            <a:alphaOff val="0"/>
+          </a:schemeClr>
+        </a:solidFill>
+        <a:ln>
+          <a:noFill/>
+        </a:ln>
+        <a:effectLst/>
+      </dsp:spPr>
+      <dsp:style>
+        <a:lnRef idx="0">
+          <a:scrgbClr r="0" g="0" b="0"/>
+        </a:lnRef>
+        <a:fillRef idx="1">
+          <a:scrgbClr r="0" g="0" b="0"/>
+        </a:fillRef>
+        <a:effectRef idx="0">
+          <a:scrgbClr r="0" g="0" b="0"/>
+        </a:effectRef>
+        <a:fontRef idx="minor"/>
+      </dsp:style>
+    </dsp:sp>
+    <dsp:sp modelId="{73575651-229C-4229-B203-88512EEA95C5}">
+      <dsp:nvSpPr>
+        <dsp:cNvPr id="0" name=""/>
+        <dsp:cNvSpPr/>
+      </dsp:nvSpPr>
+      <dsp:spPr>
+        <a:xfrm>
+          <a:off x="238502" y="3135597"/>
+          <a:ext cx="433641" cy="433641"/>
+        </a:xfrm>
+        <a:prstGeom prst="rect">
+          <a:avLst/>
+        </a:prstGeom>
+        <a:blipFill>
+          <a:blip xmlns:r="http://schemas.openxmlformats.org/officeDocument/2006/relationships" r:embed="rId7">
+            <a:extLst>
+              <a:ext uri="{28A0092B-C50C-407E-A947-70E740481C1C}">
+                <a14:useLocalDpi xmlns:a14="http://schemas.microsoft.com/office/drawing/2010/main" val="0"/>
+              </a:ext>
+              <a:ext uri="{96DAC541-7B7A-43D3-8B79-37D633B846F1}">
+                <asvg:svgBlip xmlns:asvg="http://schemas.microsoft.com/office/drawing/2016/SVG/main" r:embed="rId8"/>
+              </a:ext>
+            </a:extLst>
+          </a:blip>
+          <a:stretch>
+            <a:fillRect/>
+          </a:stretch>
+        </a:blipFill>
+        <a:ln w="15875" cap="flat" cmpd="sng" algn="ctr">
+          <a:solidFill>
+            <a:schemeClr val="lt1">
+              <a:hueOff val="0"/>
+              <a:satOff val="0"/>
+              <a:lumOff val="0"/>
+              <a:alphaOff val="0"/>
+            </a:schemeClr>
+          </a:solidFill>
+          <a:prstDash val="solid"/>
+        </a:ln>
+        <a:effectLst/>
+      </dsp:spPr>
+      <dsp:style>
+        <a:lnRef idx="2">
+          <a:scrgbClr r="0" g="0" b="0"/>
+        </a:lnRef>
+        <a:fillRef idx="1">
+          <a:scrgbClr r="0" g="0" b="0"/>
+        </a:fillRef>
+        <a:effectRef idx="0">
+          <a:scrgbClr r="0" g="0" b="0"/>
+        </a:effectRef>
+        <a:fontRef idx="minor">
+          <a:schemeClr val="lt1"/>
+        </a:fontRef>
+      </dsp:style>
+    </dsp:sp>
+    <dsp:sp modelId="{77CFAC55-D3CF-45EA-A63C-9656646CA42E}">
+      <dsp:nvSpPr>
+        <dsp:cNvPr id="0" name=""/>
+        <dsp:cNvSpPr/>
+      </dsp:nvSpPr>
+      <dsp:spPr>
+        <a:xfrm>
+          <a:off x="910646" y="2958199"/>
+          <a:ext cx="3729089" cy="788438"/>
+        </a:xfrm>
+        <a:prstGeom prst="rect">
+          <a:avLst/>
+        </a:prstGeom>
+        <a:noFill/>
+        <a:ln>
+          <a:noFill/>
+        </a:ln>
+        <a:effectLst/>
+      </dsp:spPr>
+      <dsp:style>
+        <a:lnRef idx="0">
+          <a:scrgbClr r="0" g="0" b="0"/>
+        </a:lnRef>
+        <a:fillRef idx="0">
+          <a:scrgbClr r="0" g="0" b="0"/>
+        </a:fillRef>
+        <a:effectRef idx="0">
+          <a:scrgbClr r="0" g="0" b="0"/>
+        </a:effectRef>
+        <a:fontRef idx="minor"/>
+      </dsp:style>
+      <dsp:txBody>
+        <a:bodyPr spcFirstLastPara="0" vert="horz" wrap="square" lIns="83443" tIns="83443" rIns="83443" bIns="83443" numCol="1" spcCol="1270" anchor="ctr" anchorCtr="0">
+          <a:noAutofit/>
+        </a:bodyPr>
+        <a:lstStyle/>
+        <a:p>
+          <a:pPr marL="0" lvl="0" indent="0" algn="l" defTabSz="622300">
+            <a:lnSpc>
+              <a:spcPct val="100000"/>
+            </a:lnSpc>
+            <a:spcBef>
+              <a:spcPct val="0"/>
+            </a:spcBef>
+            <a:spcAft>
+              <a:spcPct val="35000"/>
+            </a:spcAft>
+            <a:buNone/>
+          </a:pPr>
+          <a:r>
+            <a:rPr lang="en-US" sz="1400" kern="1200" dirty="0"/>
+            <a:t>Can make debugging difficult, can lead to unexpected updates</a:t>
+          </a:r>
+        </a:p>
+      </dsp:txBody>
+      <dsp:txXfrm>
+        <a:off x="910646" y="2958199"/>
+        <a:ext cx="3729089" cy="788438"/>
+      </dsp:txXfrm>
+    </dsp:sp>
+  </dsp:spTree>
+</dsp:drawing>
+</file>
+
 <file path=ppt/diagrams/layout1.xml><?xml version="1.0" encoding="utf-8"?>
 <dgm:layoutDef xmlns:dgm="http://schemas.openxmlformats.org/drawingml/2006/diagram" xmlns:a="http://schemas.openxmlformats.org/drawingml/2006/main" uniqueId="urn:microsoft.com/office/officeart/2018/2/layout/IconVerticalSolidList">
   <dgm:title val="Icon Vertical Solid List"/>
@@ -10779,6 +12600,300 @@
 </dgm:layoutDef>
 </file>
 
+<file path=ppt/diagrams/layout6.xml><?xml version="1.0" encoding="utf-8"?>
+<dgm:layoutDef xmlns:dgm="http://schemas.openxmlformats.org/drawingml/2006/diagram" xmlns:a="http://schemas.openxmlformats.org/drawingml/2006/main" uniqueId="urn:microsoft.com/office/officeart/2018/2/layout/IconVerticalSolidList">
+  <dgm:title val="Icon Vertical Solid List"/>
+  <dgm:desc val="Use to show a series of visuals from top to bottom with Level 1 or Level 1 and Level 2 text grouped in a shape. Works best with icons or small pictures with lengthier descriptions."/>
+  <dgm:catLst>
+    <dgm:cat type="icon" pri="500"/>
+  </dgm:catLst>
+  <dgm:sampData useDef="1">
+    <dgm:dataModel>
+      <dgm:ptLst/>
+      <dgm:bg/>
+      <dgm:whole/>
+    </dgm:dataModel>
+  </dgm:sampData>
+  <dgm:styleData useDef="1">
+    <dgm:dataModel>
+      <dgm:ptLst/>
+      <dgm:bg/>
+      <dgm:whole/>
+    </dgm:dataModel>
+  </dgm:styleData>
+  <dgm:clrData useDef="1">
+    <dgm:dataModel>
+      <dgm:ptLst/>
+      <dgm:bg/>
+      <dgm:whole/>
+    </dgm:dataModel>
+  </dgm:clrData>
+  <dgm:layoutNode name="root">
+    <dgm:varLst>
+      <dgm:dir/>
+      <dgm:resizeHandles val="exact"/>
+    </dgm:varLst>
+    <dgm:choose name="Name0">
+      <dgm:if name="Name1" axis="self" func="var" arg="dir" op="equ" val="norm">
+        <dgm:alg type="lin">
+          <dgm:param type="linDir" val="fromT"/>
+          <dgm:param type="nodeHorzAlign" val="l"/>
+        </dgm:alg>
+      </dgm:if>
+      <dgm:else name="Name2">
+        <dgm:alg type="lin">
+          <dgm:param type="linDir" val="fromT"/>
+          <dgm:param type="nodeHorzAlign" val="r"/>
+        </dgm:alg>
+      </dgm:else>
+    </dgm:choose>
+    <dgm:shape xmlns:r="http://schemas.openxmlformats.org/officeDocument/2006/relationships" r:blip="">
+      <dgm:adjLst/>
+    </dgm:shape>
+    <dgm:presOf/>
+    <dgm:choose name="Name3">
+      <dgm:if name="Name4" axis="ch" ptType="node" func="cnt" op="lte" val="3">
+        <dgm:constrLst>
+          <dgm:constr type="h" for="ch" forName="compNode" refType="h" fact="0.3"/>
+          <dgm:constr type="w" for="ch" forName="compNode" refType="w"/>
+          <dgm:constr type="h" for="ch" forName="sibTrans" refType="h" refFor="ch" refForName="compNode" fact="0.25"/>
+          <dgm:constr type="primFontSz" for="des" forName="parTx" val="25"/>
+          <dgm:constr type="primFontSz" for="des" forName="desTx" refType="primFontSz" refFor="des" refForName="parTx" op="lte" fact="0.75"/>
+          <dgm:constr type="h" for="des" forName="compNode" op="equ"/>
+          <dgm:constr type="h" for="des" forName="bgRect" op="equ"/>
+          <dgm:constr type="h" for="des" forName="iconRect" op="equ"/>
+          <dgm:constr type="w" for="des" forName="iconRect" op="equ"/>
+          <dgm:constr type="h" for="des" forName="spaceRect" op="equ"/>
+          <dgm:constr type="h" for="des" forName="parTx" op="equ"/>
+          <dgm:constr type="h" for="des" forName="desTx" op="equ"/>
+        </dgm:constrLst>
+      </dgm:if>
+      <dgm:if name="Name5" axis="ch" ptType="node" func="cnt" op="lte" val="4">
+        <dgm:constrLst>
+          <dgm:constr type="h" for="ch" forName="compNode" refType="h" fact="0.3"/>
+          <dgm:constr type="w" for="ch" forName="compNode" refType="w"/>
+          <dgm:constr type="h" for="ch" forName="sibTrans" refType="h" refFor="ch" refForName="compNode" fact="0.25"/>
+          <dgm:constr type="primFontSz" for="des" forName="parTx" val="22"/>
+          <dgm:constr type="primFontSz" for="des" forName="desTx" refType="primFontSz" refFor="des" refForName="parTx" op="lte" fact="0.75"/>
+          <dgm:constr type="h" for="des" forName="compNode" op="equ"/>
+          <dgm:constr type="h" for="des" forName="bgRect" op="equ"/>
+          <dgm:constr type="h" for="des" forName="iconRect" op="equ"/>
+          <dgm:constr type="w" for="des" forName="iconRect" op="equ"/>
+          <dgm:constr type="h" for="des" forName="spaceRect" op="equ"/>
+          <dgm:constr type="h" for="des" forName="parTx" op="equ"/>
+          <dgm:constr type="h" for="des" forName="desTx" op="equ"/>
+        </dgm:constrLst>
+      </dgm:if>
+      <dgm:if name="Name6" axis="ch" ptType="node" func="cnt" op="lte" val="6">
+        <dgm:constrLst>
+          <dgm:constr type="h" for="ch" forName="compNode" refType="h" fact="0.3"/>
+          <dgm:constr type="w" for="ch" forName="compNode" refType="w"/>
+          <dgm:constr type="h" for="ch" forName="sibTrans" refType="h" refFor="ch" refForName="compNode" fact="0.25"/>
+          <dgm:constr type="primFontSz" for="des" forName="parTx" val="19"/>
+          <dgm:constr type="primFontSz" for="des" forName="desTx" refType="primFontSz" refFor="des" refForName="parTx" op="lte" fact="0.75"/>
+          <dgm:constr type="h" for="des" forName="compNode" op="equ"/>
+          <dgm:constr type="h" for="des" forName="bgRect" op="equ"/>
+          <dgm:constr type="h" for="des" forName="iconRect" op="equ"/>
+          <dgm:constr type="w" for="des" forName="iconRect" op="equ"/>
+          <dgm:constr type="h" for="des" forName="spaceRect" op="equ"/>
+          <dgm:constr type="h" for="des" forName="parTx" op="equ"/>
+          <dgm:constr type="h" for="des" forName="desTx" op="equ"/>
+        </dgm:constrLst>
+      </dgm:if>
+      <dgm:else name="Name7">
+        <dgm:constrLst>
+          <dgm:constr type="h" for="ch" forName="compNode" refType="h" fact="0.3"/>
+          <dgm:constr type="w" for="ch" forName="compNode" refType="w"/>
+          <dgm:constr type="h" for="ch" forName="sibTrans" refType="h" refFor="ch" refForName="compNode" fact="0.25"/>
+          <dgm:constr type="primFontSz" for="des" forName="parTx" val="16"/>
+          <dgm:constr type="primFontSz" for="des" forName="desTx" refType="primFontSz" refFor="des" refForName="parTx" op="lte" fact="0.75"/>
+          <dgm:constr type="h" for="des" forName="compNode" op="equ"/>
+          <dgm:constr type="h" for="des" forName="bgRect" op="equ"/>
+          <dgm:constr type="h" for="des" forName="iconRect" op="equ"/>
+          <dgm:constr type="w" for="des" forName="iconRect" op="equ"/>
+          <dgm:constr type="h" for="des" forName="spaceRect" op="equ"/>
+          <dgm:constr type="h" for="des" forName="parTx" op="equ"/>
+          <dgm:constr type="h" for="des" forName="desTx" op="equ"/>
+        </dgm:constrLst>
+      </dgm:else>
+    </dgm:choose>
+    <dgm:ruleLst>
+      <dgm:rule type="h" for="ch" forName="compNode" val="0" fact="NaN" max="NaN"/>
+    </dgm:ruleLst>
+    <dgm:forEach name="Name8" axis="ch" ptType="node">
+      <dgm:layoutNode name="compNode">
+        <dgm:alg type="composite"/>
+        <dgm:shape xmlns:r="http://schemas.openxmlformats.org/officeDocument/2006/relationships" r:blip="">
+          <dgm:adjLst/>
+        </dgm:shape>
+        <dgm:presOf axis="self"/>
+        <dgm:choose name="Name9">
+          <dgm:if name="Name10" axis="ch" ptType="node" func="cnt" op="gte" val="1">
+            <dgm:constrLst>
+              <dgm:constr type="w" for="ch" forName="bgRect" refType="w"/>
+              <dgm:constr type="h" for="ch" forName="bgRect" refType="h"/>
+              <dgm:constr type="l" for="ch" forName="bgRect"/>
+              <dgm:constr type="t" for="ch" forName="bgRect"/>
+              <dgm:constr type="h" for="ch" forName="iconRect" refType="h" fact="0.55"/>
+              <dgm:constr type="w" for="ch" forName="iconRect" refType="h" refFor="ch" refForName="iconRect"/>
+              <dgm:constr type="l" for="ch" forName="iconRect" refType="h" refFor="ch" refForName="iconRect" fact="0.55"/>
+              <dgm:constr type="ctrY" for="ch" forName="iconRect" refType="ctrY" refFor="ch" refForName="bgRect"/>
+              <dgm:constr type="w" for="ch" forName="spaceRect" refType="l" refFor="ch" refForName="iconRect"/>
+              <dgm:constr type="h" for="ch" forName="spaceRect" refType="h"/>
+              <dgm:constr type="l" for="ch" forName="spaceRect" refType="r" refFor="ch" refForName="iconRect"/>
+              <dgm:constr type="t" for="ch" forName="spaceRect"/>
+              <dgm:constr type="w" for="ch" forName="parTx" refType="w" fact="0.45"/>
+              <dgm:constr type="h" for="ch" forName="parTx" refType="h"/>
+              <dgm:constr type="l" for="ch" forName="parTx" refType="r" refFor="ch" refForName="spaceRect"/>
+              <dgm:constr type="t" for="ch" forName="parTx"/>
+              <dgm:constr type="h" for="ch" forName="desTx" refType="h"/>
+              <dgm:constr type="l" for="ch" forName="desTx" refType="r" refFor="ch" refForName="parTx"/>
+              <dgm:constr type="t" for="ch" forName="desTx"/>
+            </dgm:constrLst>
+          </dgm:if>
+          <dgm:else name="Name11">
+            <dgm:constrLst>
+              <dgm:constr type="w" for="ch" forName="bgRect" refType="w"/>
+              <dgm:constr type="h" for="ch" forName="bgRect" refType="h"/>
+              <dgm:constr type="l" for="ch" forName="bgRect"/>
+              <dgm:constr type="t" for="ch" forName="bgRect"/>
+              <dgm:constr type="h" for="ch" forName="iconRect" refType="h" fact="0.55"/>
+              <dgm:constr type="w" for="ch" forName="iconRect" refType="h" refFor="ch" refForName="iconRect"/>
+              <dgm:constr type="l" for="ch" forName="iconRect" refType="h" refFor="ch" refForName="iconRect" fact="0.55"/>
+              <dgm:constr type="ctrY" for="ch" forName="iconRect" refType="ctrY" refFor="ch" refForName="bgRect"/>
+              <dgm:constr type="w" for="ch" forName="spaceRect" refType="l" refFor="ch" refForName="iconRect"/>
+              <dgm:constr type="h" for="ch" forName="spaceRect" refType="h"/>
+              <dgm:constr type="l" for="ch" forName="spaceRect" refType="r" refFor="ch" refForName="iconRect"/>
+              <dgm:constr type="t" for="ch" forName="spaceRect"/>
+              <dgm:constr type="h" for="ch" forName="parTx" refType="h"/>
+              <dgm:constr type="l" for="ch" forName="parTx" refType="r" refFor="ch" refForName="spaceRect"/>
+              <dgm:constr type="t" for="ch" forName="parTx"/>
+            </dgm:constrLst>
+          </dgm:else>
+        </dgm:choose>
+        <dgm:ruleLst>
+          <dgm:rule type="h" val="INF" fact="NaN" max="NaN"/>
+        </dgm:ruleLst>
+        <dgm:layoutNode name="bgRect" styleLbl="bgShp">
+          <dgm:alg type="sp"/>
+          <dgm:shape xmlns:r="http://schemas.openxmlformats.org/officeDocument/2006/relationships" type="roundRect" r:blip="">
+            <dgm:adjLst>
+              <dgm:adj idx="1" val="0.1"/>
+            </dgm:adjLst>
+          </dgm:shape>
+          <dgm:presOf/>
+          <dgm:constrLst/>
+          <dgm:ruleLst/>
+        </dgm:layoutNode>
+        <dgm:layoutNode name="iconRect" styleLbl="node1">
+          <dgm:alg type="sp"/>
+          <dgm:shape xmlns:r="http://schemas.openxmlformats.org/officeDocument/2006/relationships" type="rect" r:blip="" blipPhldr="1">
+            <dgm:adjLst/>
+          </dgm:shape>
+          <dgm:presOf/>
+          <dgm:constrLst/>
+          <dgm:ruleLst/>
+        </dgm:layoutNode>
+        <dgm:layoutNode name="spaceRect">
+          <dgm:alg type="sp"/>
+          <dgm:shape xmlns:r="http://schemas.openxmlformats.org/officeDocument/2006/relationships" r:blip="">
+            <dgm:adjLst/>
+          </dgm:shape>
+          <dgm:presOf/>
+          <dgm:constrLst/>
+          <dgm:ruleLst/>
+        </dgm:layoutNode>
+        <dgm:layoutNode name="parTx" styleLbl="revTx">
+          <dgm:varLst>
+            <dgm:chMax val="0"/>
+            <dgm:chPref val="0"/>
+          </dgm:varLst>
+          <dgm:alg type="tx">
+            <dgm:param type="txAnchorVert" val="mid"/>
+            <dgm:param type="parTxLTRAlign" val="l"/>
+            <dgm:param type="shpTxLTRAlignCh" val="l"/>
+            <dgm:param type="parTxRTLAlign" val="r"/>
+            <dgm:param type="shpTxRTLAlignCh" val="r"/>
+          </dgm:alg>
+          <dgm:shape xmlns:r="http://schemas.openxmlformats.org/officeDocument/2006/relationships" type="rect" r:blip="">
+            <dgm:adjLst/>
+          </dgm:shape>
+          <dgm:presOf axis="self" ptType="node"/>
+          <dgm:constrLst>
+            <dgm:constr type="lMarg" refType="h" fact="0.3"/>
+            <dgm:constr type="rMarg" refType="h" fact="0.3"/>
+            <dgm:constr type="tMarg" refType="h" fact="0.3"/>
+            <dgm:constr type="bMarg" refType="h" fact="0.3"/>
+          </dgm:constrLst>
+          <dgm:ruleLst>
+            <dgm:rule type="primFontSz" val="14" fact="NaN" max="NaN"/>
+            <dgm:rule type="h" val="INF" fact="NaN" max="NaN"/>
+          </dgm:ruleLst>
+        </dgm:layoutNode>
+        <dgm:choose name="Name12">
+          <dgm:if name="Name13" axis="ch" ptType="node" func="cnt" op="gte" val="1">
+            <dgm:layoutNode name="desTx" styleLbl="revTx">
+              <dgm:varLst/>
+              <dgm:alg type="tx">
+                <dgm:param type="txAnchorVertCh" val="mid"/>
+                <dgm:param type="parTxLTRAlign" val="l"/>
+                <dgm:param type="shpTxLTRAlignCh" val="l"/>
+                <dgm:param type="parTxRTLAlign" val="r"/>
+                <dgm:param type="shpTxRTLAlignCh" val="r"/>
+                <dgm:param type="stBulletLvl" val="0"/>
+              </dgm:alg>
+              <dgm:shape xmlns:r="http://schemas.openxmlformats.org/officeDocument/2006/relationships" type="rect" r:blip="">
+                <dgm:adjLst/>
+              </dgm:shape>
+              <dgm:presOf axis="des" ptType="node"/>
+              <dgm:constrLst>
+                <dgm:constr type="primFontSz" val="18"/>
+                <dgm:constr type="secFontSz" refType="primFontSz"/>
+                <dgm:constr type="lMarg" refType="h" fact="0.3"/>
+                <dgm:constr type="rMarg" refType="h" fact="0.3"/>
+                <dgm:constr type="tMarg" refType="h" fact="0.3"/>
+                <dgm:constr type="bMarg" refType="h" fact="0.3"/>
+              </dgm:constrLst>
+              <dgm:ruleLst>
+                <dgm:rule type="primFontSz" val="11" fact="NaN" max="NaN"/>
+              </dgm:ruleLst>
+            </dgm:layoutNode>
+          </dgm:if>
+          <dgm:else name="Name14"/>
+        </dgm:choose>
+      </dgm:layoutNode>
+      <dgm:forEach name="Name15" axis="followSib" ptType="sibTrans" cnt="1">
+        <dgm:layoutNode name="sibTrans">
+          <dgm:alg type="sp"/>
+          <dgm:shape xmlns:r="http://schemas.openxmlformats.org/officeDocument/2006/relationships" r:blip="">
+            <dgm:adjLst/>
+          </dgm:shape>
+          <dgm:presOf axis="self"/>
+          <dgm:constrLst/>
+          <dgm:ruleLst/>
+        </dgm:layoutNode>
+      </dgm:forEach>
+    </dgm:forEach>
+  </dgm:layoutNode>
+  <dgm:extLst>
+    <a:ext uri="{68A01E43-0DF5-4B5B-8FA6-DAF915123BFB}">
+      <dgm1612:lstStyle xmlns:dgm1612="http://schemas.microsoft.com/office/drawing/2016/12/diagram">
+        <a:lvl1pPr>
+          <a:lnSpc>
+            <a:spcPct val="100000"/>
+          </a:lnSpc>
+        </a:lvl1pPr>
+        <a:lvl2pPr>
+          <a:lnSpc>
+            <a:spcPct val="100000"/>
+          </a:lnSpc>
+        </a:lvl2pPr>
+      </dgm1612:lstStyle>
+    </a:ext>
+  </dgm:extLst>
+</dgm:layoutDef>
+</file>
+
 <file path=ppt/diagrams/quickStyle1.xml><?xml version="1.0" encoding="utf-8"?>
 <dgm:styleDef xmlns:dgm="http://schemas.openxmlformats.org/drawingml/2006/diagram" xmlns:a="http://schemas.openxmlformats.org/drawingml/2006/main" uniqueId="urn:microsoft.com/office/officeart/2005/8/quickstyle/simple1">
   <dgm:title val=""/>
@@ -14916,6 +17031,1040 @@
 </file>
 
 <file path=ppt/diagrams/quickStyle5.xml><?xml version="1.0" encoding="utf-8"?>
+<dgm:styleDef xmlns:dgm="http://schemas.openxmlformats.org/drawingml/2006/diagram" xmlns:a="http://schemas.openxmlformats.org/drawingml/2006/main" uniqueId="urn:microsoft.com/office/officeart/2005/8/quickstyle/simple1">
+  <dgm:title val=""/>
+  <dgm:desc val=""/>
+  <dgm:catLst>
+    <dgm:cat type="simple" pri="10100"/>
+  </dgm:catLst>
+  <dgm:scene3d>
+    <a:camera prst="orthographicFront"/>
+    <a:lightRig rig="threePt" dir="t"/>
+  </dgm:scene3d>
+  <dgm:styleLbl name="node0">
+    <dgm:scene3d>
+      <a:camera prst="orthographicFront"/>
+      <a:lightRig rig="threePt" dir="t"/>
+    </dgm:scene3d>
+    <dgm:sp3d/>
+    <dgm:txPr/>
+    <dgm:style>
+      <a:lnRef idx="2">
+        <a:scrgbClr r="0" g="0" b="0"/>
+      </a:lnRef>
+      <a:fillRef idx="1">
+        <a:scrgbClr r="0" g="0" b="0"/>
+      </a:fillRef>
+      <a:effectRef idx="0">
+        <a:scrgbClr r="0" g="0" b="0"/>
+      </a:effectRef>
+      <a:fontRef idx="minor">
+        <a:schemeClr val="lt1"/>
+      </a:fontRef>
+    </dgm:style>
+  </dgm:styleLbl>
+  <dgm:styleLbl name="lnNode1">
+    <dgm:scene3d>
+      <a:camera prst="orthographicFront"/>
+      <a:lightRig rig="threePt" dir="t"/>
+    </dgm:scene3d>
+    <dgm:sp3d/>
+    <dgm:txPr/>
+    <dgm:style>
+      <a:lnRef idx="2">
+        <a:scrgbClr r="0" g="0" b="0"/>
+      </a:lnRef>
+      <a:fillRef idx="1">
+        <a:scrgbClr r="0" g="0" b="0"/>
+      </a:fillRef>
+      <a:effectRef idx="0">
+        <a:scrgbClr r="0" g="0" b="0"/>
+      </a:effectRef>
+      <a:fontRef idx="minor">
+        <a:schemeClr val="lt1"/>
+      </a:fontRef>
+    </dgm:style>
+  </dgm:styleLbl>
+  <dgm:styleLbl name="vennNode1">
+    <dgm:scene3d>
+      <a:camera prst="orthographicFront"/>
+      <a:lightRig rig="threePt" dir="t"/>
+    </dgm:scene3d>
+    <dgm:sp3d/>
+    <dgm:txPr/>
+    <dgm:style>
+      <a:lnRef idx="2">
+        <a:scrgbClr r="0" g="0" b="0"/>
+      </a:lnRef>
+      <a:fillRef idx="1">
+        <a:scrgbClr r="0" g="0" b="0"/>
+      </a:fillRef>
+      <a:effectRef idx="0">
+        <a:scrgbClr r="0" g="0" b="0"/>
+      </a:effectRef>
+      <a:fontRef idx="minor">
+        <a:schemeClr val="tx1"/>
+      </a:fontRef>
+    </dgm:style>
+  </dgm:styleLbl>
+  <dgm:styleLbl name="alignNode1">
+    <dgm:scene3d>
+      <a:camera prst="orthographicFront"/>
+      <a:lightRig rig="threePt" dir="t"/>
+    </dgm:scene3d>
+    <dgm:sp3d/>
+    <dgm:txPr/>
+    <dgm:style>
+      <a:lnRef idx="2">
+        <a:scrgbClr r="0" g="0" b="0"/>
+      </a:lnRef>
+      <a:fillRef idx="1">
+        <a:scrgbClr r="0" g="0" b="0"/>
+      </a:fillRef>
+      <a:effectRef idx="0">
+        <a:scrgbClr r="0" g="0" b="0"/>
+      </a:effectRef>
+      <a:fontRef idx="minor">
+        <a:schemeClr val="lt1"/>
+      </a:fontRef>
+    </dgm:style>
+  </dgm:styleLbl>
+  <dgm:styleLbl name="node1">
+    <dgm:scene3d>
+      <a:camera prst="orthographicFront"/>
+      <a:lightRig rig="threePt" dir="t"/>
+    </dgm:scene3d>
+    <dgm:sp3d/>
+    <dgm:txPr/>
+    <dgm:style>
+      <a:lnRef idx="2">
+        <a:scrgbClr r="0" g="0" b="0"/>
+      </a:lnRef>
+      <a:fillRef idx="1">
+        <a:scrgbClr r="0" g="0" b="0"/>
+      </a:fillRef>
+      <a:effectRef idx="0">
+        <a:scrgbClr r="0" g="0" b="0"/>
+      </a:effectRef>
+      <a:fontRef idx="minor">
+        <a:schemeClr val="lt1"/>
+      </a:fontRef>
+    </dgm:style>
+  </dgm:styleLbl>
+  <dgm:styleLbl name="node2">
+    <dgm:scene3d>
+      <a:camera prst="orthographicFront"/>
+      <a:lightRig rig="threePt" dir="t"/>
+    </dgm:scene3d>
+    <dgm:sp3d/>
+    <dgm:txPr/>
+    <dgm:style>
+      <a:lnRef idx="2">
+        <a:scrgbClr r="0" g="0" b="0"/>
+      </a:lnRef>
+      <a:fillRef idx="1">
+        <a:scrgbClr r="0" g="0" b="0"/>
+      </a:fillRef>
+      <a:effectRef idx="0">
+        <a:scrgbClr r="0" g="0" b="0"/>
+      </a:effectRef>
+      <a:fontRef idx="minor">
+        <a:schemeClr val="lt1"/>
+      </a:fontRef>
+    </dgm:style>
+  </dgm:styleLbl>
+  <dgm:styleLbl name="node3">
+    <dgm:scene3d>
+      <a:camera prst="orthographicFront"/>
+      <a:lightRig rig="threePt" dir="t"/>
+    </dgm:scene3d>
+    <dgm:sp3d/>
+    <dgm:txPr/>
+    <dgm:style>
+      <a:lnRef idx="2">
+        <a:scrgbClr r="0" g="0" b="0"/>
+      </a:lnRef>
+      <a:fillRef idx="1">
+        <a:scrgbClr r="0" g="0" b="0"/>
+      </a:fillRef>
+      <a:effectRef idx="0">
+        <a:scrgbClr r="0" g="0" b="0"/>
+      </a:effectRef>
+      <a:fontRef idx="minor">
+        <a:schemeClr val="lt1"/>
+      </a:fontRef>
+    </dgm:style>
+  </dgm:styleLbl>
+  <dgm:styleLbl name="node4">
+    <dgm:scene3d>
+      <a:camera prst="orthographicFront"/>
+      <a:lightRig rig="threePt" dir="t"/>
+    </dgm:scene3d>
+    <dgm:sp3d/>
+    <dgm:txPr/>
+    <dgm:style>
+      <a:lnRef idx="2">
+        <a:scrgbClr r="0" g="0" b="0"/>
+      </a:lnRef>
+      <a:fillRef idx="1">
+        <a:scrgbClr r="0" g="0" b="0"/>
+      </a:fillRef>
+      <a:effectRef idx="0">
+        <a:scrgbClr r="0" g="0" b="0"/>
+      </a:effectRef>
+      <a:fontRef idx="minor">
+        <a:schemeClr val="lt1"/>
+      </a:fontRef>
+    </dgm:style>
+  </dgm:styleLbl>
+  <dgm:styleLbl name="fgImgPlace1">
+    <dgm:scene3d>
+      <a:camera prst="orthographicFront"/>
+      <a:lightRig rig="threePt" dir="t"/>
+    </dgm:scene3d>
+    <dgm:sp3d/>
+    <dgm:txPr/>
+    <dgm:style>
+      <a:lnRef idx="2">
+        <a:scrgbClr r="0" g="0" b="0"/>
+      </a:lnRef>
+      <a:fillRef idx="1">
+        <a:scrgbClr r="0" g="0" b="0"/>
+      </a:fillRef>
+      <a:effectRef idx="0">
+        <a:scrgbClr r="0" g="0" b="0"/>
+      </a:effectRef>
+      <a:fontRef idx="minor"/>
+    </dgm:style>
+  </dgm:styleLbl>
+  <dgm:styleLbl name="alignImgPlace1">
+    <dgm:scene3d>
+      <a:camera prst="orthographicFront"/>
+      <a:lightRig rig="threePt" dir="t"/>
+    </dgm:scene3d>
+    <dgm:sp3d/>
+    <dgm:txPr/>
+    <dgm:style>
+      <a:lnRef idx="2">
+        <a:scrgbClr r="0" g="0" b="0"/>
+      </a:lnRef>
+      <a:fillRef idx="1">
+        <a:scrgbClr r="0" g="0" b="0"/>
+      </a:fillRef>
+      <a:effectRef idx="0">
+        <a:scrgbClr r="0" g="0" b="0"/>
+      </a:effectRef>
+      <a:fontRef idx="minor"/>
+    </dgm:style>
+  </dgm:styleLbl>
+  <dgm:styleLbl name="bgImgPlace1">
+    <dgm:scene3d>
+      <a:camera prst="orthographicFront"/>
+      <a:lightRig rig="threePt" dir="t"/>
+    </dgm:scene3d>
+    <dgm:sp3d/>
+    <dgm:txPr/>
+    <dgm:style>
+      <a:lnRef idx="2">
+        <a:scrgbClr r="0" g="0" b="0"/>
+      </a:lnRef>
+      <a:fillRef idx="1">
+        <a:scrgbClr r="0" g="0" b="0"/>
+      </a:fillRef>
+      <a:effectRef idx="0">
+        <a:scrgbClr r="0" g="0" b="0"/>
+      </a:effectRef>
+      <a:fontRef idx="minor"/>
+    </dgm:style>
+  </dgm:styleLbl>
+  <dgm:styleLbl name="sibTrans2D1">
+    <dgm:scene3d>
+      <a:camera prst="orthographicFront"/>
+      <a:lightRig rig="threePt" dir="t"/>
+    </dgm:scene3d>
+    <dgm:sp3d/>
+    <dgm:txPr/>
+    <dgm:style>
+      <a:lnRef idx="0">
+        <a:scrgbClr r="0" g="0" b="0"/>
+      </a:lnRef>
+      <a:fillRef idx="1">
+        <a:scrgbClr r="0" g="0" b="0"/>
+      </a:fillRef>
+      <a:effectRef idx="0">
+        <a:scrgbClr r="0" g="0" b="0"/>
+      </a:effectRef>
+      <a:fontRef idx="minor">
+        <a:schemeClr val="lt1"/>
+      </a:fontRef>
+    </dgm:style>
+  </dgm:styleLbl>
+  <dgm:styleLbl name="fgSibTrans2D1">
+    <dgm:scene3d>
+      <a:camera prst="orthographicFront"/>
+      <a:lightRig rig="threePt" dir="t"/>
+    </dgm:scene3d>
+    <dgm:sp3d/>
+    <dgm:txPr/>
+    <dgm:style>
+      <a:lnRef idx="0">
+        <a:scrgbClr r="0" g="0" b="0"/>
+      </a:lnRef>
+      <a:fillRef idx="1">
+        <a:scrgbClr r="0" g="0" b="0"/>
+      </a:fillRef>
+      <a:effectRef idx="0">
+        <a:scrgbClr r="0" g="0" b="0"/>
+      </a:effectRef>
+      <a:fontRef idx="minor">
+        <a:schemeClr val="lt1"/>
+      </a:fontRef>
+    </dgm:style>
+  </dgm:styleLbl>
+  <dgm:styleLbl name="bgSibTrans2D1">
+    <dgm:scene3d>
+      <a:camera prst="orthographicFront"/>
+      <a:lightRig rig="threePt" dir="t"/>
+    </dgm:scene3d>
+    <dgm:sp3d/>
+    <dgm:txPr/>
+    <dgm:style>
+      <a:lnRef idx="0">
+        <a:scrgbClr r="0" g="0" b="0"/>
+      </a:lnRef>
+      <a:fillRef idx="1">
+        <a:scrgbClr r="0" g="0" b="0"/>
+      </a:fillRef>
+      <a:effectRef idx="0">
+        <a:scrgbClr r="0" g="0" b="0"/>
+      </a:effectRef>
+      <a:fontRef idx="minor">
+        <a:schemeClr val="lt1"/>
+      </a:fontRef>
+    </dgm:style>
+  </dgm:styleLbl>
+  <dgm:styleLbl name="sibTrans1D1">
+    <dgm:scene3d>
+      <a:camera prst="orthographicFront"/>
+      <a:lightRig rig="threePt" dir="t"/>
+    </dgm:scene3d>
+    <dgm:sp3d/>
+    <dgm:txPr/>
+    <dgm:style>
+      <a:lnRef idx="1">
+        <a:scrgbClr r="0" g="0" b="0"/>
+      </a:lnRef>
+      <a:fillRef idx="0">
+        <a:scrgbClr r="0" g="0" b="0"/>
+      </a:fillRef>
+      <a:effectRef idx="0">
+        <a:scrgbClr r="0" g="0" b="0"/>
+      </a:effectRef>
+      <a:fontRef idx="minor"/>
+    </dgm:style>
+  </dgm:styleLbl>
+  <dgm:styleLbl name="callout">
+    <dgm:scene3d>
+      <a:camera prst="orthographicFront"/>
+      <a:lightRig rig="threePt" dir="t"/>
+    </dgm:scene3d>
+    <dgm:sp3d/>
+    <dgm:txPr/>
+    <dgm:style>
+      <a:lnRef idx="2">
+        <a:scrgbClr r="0" g="0" b="0"/>
+      </a:lnRef>
+      <a:fillRef idx="1">
+        <a:scrgbClr r="0" g="0" b="0"/>
+      </a:fillRef>
+      <a:effectRef idx="0">
+        <a:scrgbClr r="0" g="0" b="0"/>
+      </a:effectRef>
+      <a:fontRef idx="minor"/>
+    </dgm:style>
+  </dgm:styleLbl>
+  <dgm:styleLbl name="asst0">
+    <dgm:scene3d>
+      <a:camera prst="orthographicFront"/>
+      <a:lightRig rig="threePt" dir="t"/>
+    </dgm:scene3d>
+    <dgm:sp3d/>
+    <dgm:txPr/>
+    <dgm:style>
+      <a:lnRef idx="2">
+        <a:scrgbClr r="0" g="0" b="0"/>
+      </a:lnRef>
+      <a:fillRef idx="1">
+        <a:scrgbClr r="0" g="0" b="0"/>
+      </a:fillRef>
+      <a:effectRef idx="0">
+        <a:scrgbClr r="0" g="0" b="0"/>
+      </a:effectRef>
+      <a:fontRef idx="minor">
+        <a:schemeClr val="lt1"/>
+      </a:fontRef>
+    </dgm:style>
+  </dgm:styleLbl>
+  <dgm:styleLbl name="asst1">
+    <dgm:scene3d>
+      <a:camera prst="orthographicFront"/>
+      <a:lightRig rig="threePt" dir="t"/>
+    </dgm:scene3d>
+    <dgm:sp3d/>
+    <dgm:txPr/>
+    <dgm:style>
+      <a:lnRef idx="2">
+        <a:scrgbClr r="0" g="0" b="0"/>
+      </a:lnRef>
+      <a:fillRef idx="1">
+        <a:scrgbClr r="0" g="0" b="0"/>
+      </a:fillRef>
+      <a:effectRef idx="0">
+        <a:scrgbClr r="0" g="0" b="0"/>
+      </a:effectRef>
+      <a:fontRef idx="minor">
+        <a:schemeClr val="lt1"/>
+      </a:fontRef>
+    </dgm:style>
+  </dgm:styleLbl>
+  <dgm:styleLbl name="asst2">
+    <dgm:scene3d>
+      <a:camera prst="orthographicFront"/>
+      <a:lightRig rig="threePt" dir="t"/>
+    </dgm:scene3d>
+    <dgm:sp3d/>
+    <dgm:txPr/>
+    <dgm:style>
+      <a:lnRef idx="2">
+        <a:scrgbClr r="0" g="0" b="0"/>
+      </a:lnRef>
+      <a:fillRef idx="1">
+        <a:scrgbClr r="0" g="0" b="0"/>
+      </a:fillRef>
+      <a:effectRef idx="0">
+        <a:scrgbClr r="0" g="0" b="0"/>
+      </a:effectRef>
+      <a:fontRef idx="minor">
+        <a:schemeClr val="lt1"/>
+      </a:fontRef>
+    </dgm:style>
+  </dgm:styleLbl>
+  <dgm:styleLbl name="asst3">
+    <dgm:scene3d>
+      <a:camera prst="orthographicFront"/>
+      <a:lightRig rig="threePt" dir="t"/>
+    </dgm:scene3d>
+    <dgm:sp3d/>
+    <dgm:txPr/>
+    <dgm:style>
+      <a:lnRef idx="2">
+        <a:scrgbClr r="0" g="0" b="0"/>
+      </a:lnRef>
+      <a:fillRef idx="1">
+        <a:scrgbClr r="0" g="0" b="0"/>
+      </a:fillRef>
+      <a:effectRef idx="0">
+        <a:scrgbClr r="0" g="0" b="0"/>
+      </a:effectRef>
+      <a:fontRef idx="minor">
+        <a:schemeClr val="lt1"/>
+      </a:fontRef>
+    </dgm:style>
+  </dgm:styleLbl>
+  <dgm:styleLbl name="asst4">
+    <dgm:scene3d>
+      <a:camera prst="orthographicFront"/>
+      <a:lightRig rig="threePt" dir="t"/>
+    </dgm:scene3d>
+    <dgm:sp3d/>
+    <dgm:txPr/>
+    <dgm:style>
+      <a:lnRef idx="2">
+        <a:scrgbClr r="0" g="0" b="0"/>
+      </a:lnRef>
+      <a:fillRef idx="1">
+        <a:scrgbClr r="0" g="0" b="0"/>
+      </a:fillRef>
+      <a:effectRef idx="0">
+        <a:scrgbClr r="0" g="0" b="0"/>
+      </a:effectRef>
+      <a:fontRef idx="minor">
+        <a:schemeClr val="lt1"/>
+      </a:fontRef>
+    </dgm:style>
+  </dgm:styleLbl>
+  <dgm:styleLbl name="parChTrans2D1">
+    <dgm:scene3d>
+      <a:camera prst="orthographicFront"/>
+      <a:lightRig rig="threePt" dir="t"/>
+    </dgm:scene3d>
+    <dgm:sp3d/>
+    <dgm:txPr/>
+    <dgm:style>
+      <a:lnRef idx="2">
+        <a:scrgbClr r="0" g="0" b="0"/>
+      </a:lnRef>
+      <a:fillRef idx="1">
+        <a:scrgbClr r="0" g="0" b="0"/>
+      </a:fillRef>
+      <a:effectRef idx="0">
+        <a:scrgbClr r="0" g="0" b="0"/>
+      </a:effectRef>
+      <a:fontRef idx="minor">
+        <a:schemeClr val="lt1"/>
+      </a:fontRef>
+    </dgm:style>
+  </dgm:styleLbl>
+  <dgm:styleLbl name="parChTrans2D2">
+    <dgm:scene3d>
+      <a:camera prst="orthographicFront"/>
+      <a:lightRig rig="threePt" dir="t"/>
+    </dgm:scene3d>
+    <dgm:sp3d/>
+    <dgm:txPr/>
+    <dgm:style>
+      <a:lnRef idx="2">
+        <a:scrgbClr r="0" g="0" b="0"/>
+      </a:lnRef>
+      <a:fillRef idx="1">
+        <a:scrgbClr r="0" g="0" b="0"/>
+      </a:fillRef>
+      <a:effectRef idx="0">
+        <a:scrgbClr r="0" g="0" b="0"/>
+      </a:effectRef>
+      <a:fontRef idx="minor">
+        <a:schemeClr val="lt1"/>
+      </a:fontRef>
+    </dgm:style>
+  </dgm:styleLbl>
+  <dgm:styleLbl name="parChTrans2D3">
+    <dgm:scene3d>
+      <a:camera prst="orthographicFront"/>
+      <a:lightRig rig="threePt" dir="t"/>
+    </dgm:scene3d>
+    <dgm:sp3d/>
+    <dgm:txPr/>
+    <dgm:style>
+      <a:lnRef idx="2">
+        <a:scrgbClr r="0" g="0" b="0"/>
+      </a:lnRef>
+      <a:fillRef idx="1">
+        <a:scrgbClr r="0" g="0" b="0"/>
+      </a:fillRef>
+      <a:effectRef idx="0">
+        <a:scrgbClr r="0" g="0" b="0"/>
+      </a:effectRef>
+      <a:fontRef idx="minor">
+        <a:schemeClr val="lt1"/>
+      </a:fontRef>
+    </dgm:style>
+  </dgm:styleLbl>
+  <dgm:styleLbl name="parChTrans2D4">
+    <dgm:scene3d>
+      <a:camera prst="orthographicFront"/>
+      <a:lightRig rig="threePt" dir="t"/>
+    </dgm:scene3d>
+    <dgm:sp3d/>
+    <dgm:txPr/>
+    <dgm:style>
+      <a:lnRef idx="2">
+        <a:scrgbClr r="0" g="0" b="0"/>
+      </a:lnRef>
+      <a:fillRef idx="1">
+        <a:scrgbClr r="0" g="0" b="0"/>
+      </a:fillRef>
+      <a:effectRef idx="0">
+        <a:scrgbClr r="0" g="0" b="0"/>
+      </a:effectRef>
+      <a:fontRef idx="minor">
+        <a:schemeClr val="lt1"/>
+      </a:fontRef>
+    </dgm:style>
+  </dgm:styleLbl>
+  <dgm:styleLbl name="parChTrans1D1">
+    <dgm:scene3d>
+      <a:camera prst="orthographicFront"/>
+      <a:lightRig rig="threePt" dir="t"/>
+    </dgm:scene3d>
+    <dgm:sp3d/>
+    <dgm:txPr/>
+    <dgm:style>
+      <a:lnRef idx="2">
+        <a:scrgbClr r="0" g="0" b="0"/>
+      </a:lnRef>
+      <a:fillRef idx="0">
+        <a:scrgbClr r="0" g="0" b="0"/>
+      </a:fillRef>
+      <a:effectRef idx="0">
+        <a:scrgbClr r="0" g="0" b="0"/>
+      </a:effectRef>
+      <a:fontRef idx="minor"/>
+    </dgm:style>
+  </dgm:styleLbl>
+  <dgm:styleLbl name="parChTrans1D2">
+    <dgm:scene3d>
+      <a:camera prst="orthographicFront"/>
+      <a:lightRig rig="threePt" dir="t"/>
+    </dgm:scene3d>
+    <dgm:sp3d/>
+    <dgm:txPr/>
+    <dgm:style>
+      <a:lnRef idx="2">
+        <a:scrgbClr r="0" g="0" b="0"/>
+      </a:lnRef>
+      <a:fillRef idx="0">
+        <a:scrgbClr r="0" g="0" b="0"/>
+      </a:fillRef>
+      <a:effectRef idx="0">
+        <a:scrgbClr r="0" g="0" b="0"/>
+      </a:effectRef>
+      <a:fontRef idx="minor"/>
+    </dgm:style>
+  </dgm:styleLbl>
+  <dgm:styleLbl name="parChTrans1D3">
+    <dgm:scene3d>
+      <a:camera prst="orthographicFront"/>
+      <a:lightRig rig="threePt" dir="t"/>
+    </dgm:scene3d>
+    <dgm:sp3d/>
+    <dgm:txPr/>
+    <dgm:style>
+      <a:lnRef idx="2">
+        <a:scrgbClr r="0" g="0" b="0"/>
+      </a:lnRef>
+      <a:fillRef idx="0">
+        <a:scrgbClr r="0" g="0" b="0"/>
+      </a:fillRef>
+      <a:effectRef idx="0">
+        <a:scrgbClr r="0" g="0" b="0"/>
+      </a:effectRef>
+      <a:fontRef idx="minor"/>
+    </dgm:style>
+  </dgm:styleLbl>
+  <dgm:styleLbl name="parChTrans1D4">
+    <dgm:scene3d>
+      <a:camera prst="orthographicFront"/>
+      <a:lightRig rig="threePt" dir="t"/>
+    </dgm:scene3d>
+    <dgm:sp3d/>
+    <dgm:txPr/>
+    <dgm:style>
+      <a:lnRef idx="2">
+        <a:scrgbClr r="0" g="0" b="0"/>
+      </a:lnRef>
+      <a:fillRef idx="0">
+        <a:scrgbClr r="0" g="0" b="0"/>
+      </a:fillRef>
+      <a:effectRef idx="0">
+        <a:scrgbClr r="0" g="0" b="0"/>
+      </a:effectRef>
+      <a:fontRef idx="minor"/>
+    </dgm:style>
+  </dgm:styleLbl>
+  <dgm:styleLbl name="fgAcc1">
+    <dgm:scene3d>
+      <a:camera prst="orthographicFront"/>
+      <a:lightRig rig="threePt" dir="t"/>
+    </dgm:scene3d>
+    <dgm:sp3d/>
+    <dgm:txPr/>
+    <dgm:style>
+      <a:lnRef idx="2">
+        <a:scrgbClr r="0" g="0" b="0"/>
+      </a:lnRef>
+      <a:fillRef idx="1">
+        <a:scrgbClr r="0" g="0" b="0"/>
+      </a:fillRef>
+      <a:effectRef idx="0">
+        <a:scrgbClr r="0" g="0" b="0"/>
+      </a:effectRef>
+      <a:fontRef idx="minor"/>
+    </dgm:style>
+  </dgm:styleLbl>
+  <dgm:styleLbl name="conFgAcc1">
+    <dgm:scene3d>
+      <a:camera prst="orthographicFront"/>
+      <a:lightRig rig="threePt" dir="t"/>
+    </dgm:scene3d>
+    <dgm:sp3d/>
+    <dgm:txPr/>
+    <dgm:style>
+      <a:lnRef idx="2">
+        <a:scrgbClr r="0" g="0" b="0"/>
+      </a:lnRef>
+      <a:fillRef idx="1">
+        <a:scrgbClr r="0" g="0" b="0"/>
+      </a:fillRef>
+      <a:effectRef idx="0">
+        <a:scrgbClr r="0" g="0" b="0"/>
+      </a:effectRef>
+      <a:fontRef idx="minor"/>
+    </dgm:style>
+  </dgm:styleLbl>
+  <dgm:styleLbl name="alignAcc1">
+    <dgm:scene3d>
+      <a:camera prst="orthographicFront"/>
+      <a:lightRig rig="threePt" dir="t"/>
+    </dgm:scene3d>
+    <dgm:sp3d/>
+    <dgm:txPr/>
+    <dgm:style>
+      <a:lnRef idx="2">
+        <a:scrgbClr r="0" g="0" b="0"/>
+      </a:lnRef>
+      <a:fillRef idx="1">
+        <a:scrgbClr r="0" g="0" b="0"/>
+      </a:fillRef>
+      <a:effectRef idx="0">
+        <a:scrgbClr r="0" g="0" b="0"/>
+      </a:effectRef>
+      <a:fontRef idx="minor"/>
+    </dgm:style>
+  </dgm:styleLbl>
+  <dgm:styleLbl name="trAlignAcc1">
+    <dgm:scene3d>
+      <a:camera prst="orthographicFront"/>
+      <a:lightRig rig="threePt" dir="t"/>
+    </dgm:scene3d>
+    <dgm:sp3d/>
+    <dgm:txPr/>
+    <dgm:style>
+      <a:lnRef idx="1">
+        <a:scrgbClr r="0" g="0" b="0"/>
+      </a:lnRef>
+      <a:fillRef idx="1">
+        <a:scrgbClr r="0" g="0" b="0"/>
+      </a:fillRef>
+      <a:effectRef idx="0">
+        <a:scrgbClr r="0" g="0" b="0"/>
+      </a:effectRef>
+      <a:fontRef idx="minor"/>
+    </dgm:style>
+  </dgm:styleLbl>
+  <dgm:styleLbl name="bgAcc1">
+    <dgm:scene3d>
+      <a:camera prst="orthographicFront"/>
+      <a:lightRig rig="threePt" dir="t"/>
+    </dgm:scene3d>
+    <dgm:sp3d/>
+    <dgm:txPr/>
+    <dgm:style>
+      <a:lnRef idx="2">
+        <a:scrgbClr r="0" g="0" b="0"/>
+      </a:lnRef>
+      <a:fillRef idx="1">
+        <a:scrgbClr r="0" g="0" b="0"/>
+      </a:fillRef>
+      <a:effectRef idx="0">
+        <a:scrgbClr r="0" g="0" b="0"/>
+      </a:effectRef>
+      <a:fontRef idx="minor"/>
+    </dgm:style>
+  </dgm:styleLbl>
+  <dgm:styleLbl name="solidFgAcc1">
+    <dgm:scene3d>
+      <a:camera prst="orthographicFront"/>
+      <a:lightRig rig="threePt" dir="t"/>
+    </dgm:scene3d>
+    <dgm:sp3d/>
+    <dgm:txPr/>
+    <dgm:style>
+      <a:lnRef idx="2">
+        <a:scrgbClr r="0" g="0" b="0"/>
+      </a:lnRef>
+      <a:fillRef idx="1">
+        <a:scrgbClr r="0" g="0" b="0"/>
+      </a:fillRef>
+      <a:effectRef idx="0">
+        <a:scrgbClr r="0" g="0" b="0"/>
+      </a:effectRef>
+      <a:fontRef idx="minor"/>
+    </dgm:style>
+  </dgm:styleLbl>
+  <dgm:styleLbl name="solidAlignAcc1">
+    <dgm:scene3d>
+      <a:camera prst="orthographicFront"/>
+      <a:lightRig rig="threePt" dir="t"/>
+    </dgm:scene3d>
+    <dgm:sp3d/>
+    <dgm:txPr/>
+    <dgm:style>
+      <a:lnRef idx="2">
+        <a:scrgbClr r="0" g="0" b="0"/>
+      </a:lnRef>
+      <a:fillRef idx="1">
+        <a:scrgbClr r="0" g="0" b="0"/>
+      </a:fillRef>
+      <a:effectRef idx="0">
+        <a:scrgbClr r="0" g="0" b="0"/>
+      </a:effectRef>
+      <a:fontRef idx="minor"/>
+    </dgm:style>
+  </dgm:styleLbl>
+  <dgm:styleLbl name="solidBgAcc1">
+    <dgm:scene3d>
+      <a:camera prst="orthographicFront"/>
+      <a:lightRig rig="threePt" dir="t"/>
+    </dgm:scene3d>
+    <dgm:sp3d/>
+    <dgm:txPr/>
+    <dgm:style>
+      <a:lnRef idx="2">
+        <a:scrgbClr r="0" g="0" b="0"/>
+      </a:lnRef>
+      <a:fillRef idx="1">
+        <a:scrgbClr r="0" g="0" b="0"/>
+      </a:fillRef>
+      <a:effectRef idx="0">
+        <a:scrgbClr r="0" g="0" b="0"/>
+      </a:effectRef>
+      <a:fontRef idx="minor"/>
+    </dgm:style>
+  </dgm:styleLbl>
+  <dgm:styleLbl name="fgAccFollowNode1">
+    <dgm:scene3d>
+      <a:camera prst="orthographicFront"/>
+      <a:lightRig rig="threePt" dir="t"/>
+    </dgm:scene3d>
+    <dgm:sp3d/>
+    <dgm:txPr/>
+    <dgm:style>
+      <a:lnRef idx="2">
+        <a:scrgbClr r="0" g="0" b="0"/>
+      </a:lnRef>
+      <a:fillRef idx="1">
+        <a:scrgbClr r="0" g="0" b="0"/>
+      </a:fillRef>
+      <a:effectRef idx="0">
+        <a:scrgbClr r="0" g="0" b="0"/>
+      </a:effectRef>
+      <a:fontRef idx="minor"/>
+    </dgm:style>
+  </dgm:styleLbl>
+  <dgm:styleLbl name="alignAccFollowNode1">
+    <dgm:scene3d>
+      <a:camera prst="orthographicFront"/>
+      <a:lightRig rig="threePt" dir="t"/>
+    </dgm:scene3d>
+    <dgm:sp3d/>
+    <dgm:txPr/>
+    <dgm:style>
+      <a:lnRef idx="2">
+        <a:scrgbClr r="0" g="0" b="0"/>
+      </a:lnRef>
+      <a:fillRef idx="1">
+        <a:scrgbClr r="0" g="0" b="0"/>
+      </a:fillRef>
+      <a:effectRef idx="0">
+        <a:scrgbClr r="0" g="0" b="0"/>
+      </a:effectRef>
+      <a:fontRef idx="minor"/>
+    </dgm:style>
+  </dgm:styleLbl>
+  <dgm:styleLbl name="bgAccFollowNode1">
+    <dgm:scene3d>
+      <a:camera prst="orthographicFront"/>
+      <a:lightRig rig="threePt" dir="t"/>
+    </dgm:scene3d>
+    <dgm:sp3d/>
+    <dgm:txPr/>
+    <dgm:style>
+      <a:lnRef idx="2">
+        <a:scrgbClr r="0" g="0" b="0"/>
+      </a:lnRef>
+      <a:fillRef idx="1">
+        <a:scrgbClr r="0" g="0" b="0"/>
+      </a:fillRef>
+      <a:effectRef idx="0">
+        <a:scrgbClr r="0" g="0" b="0"/>
+      </a:effectRef>
+      <a:fontRef idx="minor"/>
+    </dgm:style>
+  </dgm:styleLbl>
+  <dgm:styleLbl name="fgAcc0">
+    <dgm:scene3d>
+      <a:camera prst="orthographicFront"/>
+      <a:lightRig rig="threePt" dir="t"/>
+    </dgm:scene3d>
+    <dgm:sp3d/>
+    <dgm:txPr/>
+    <dgm:style>
+      <a:lnRef idx="2">
+        <a:scrgbClr r="0" g="0" b="0"/>
+      </a:lnRef>
+      <a:fillRef idx="1">
+        <a:scrgbClr r="0" g="0" b="0"/>
+      </a:fillRef>
+      <a:effectRef idx="0">
+        <a:scrgbClr r="0" g="0" b="0"/>
+      </a:effectRef>
+      <a:fontRef idx="minor"/>
+    </dgm:style>
+  </dgm:styleLbl>
+  <dgm:styleLbl name="fgAcc2">
+    <dgm:scene3d>
+      <a:camera prst="orthographicFront"/>
+      <a:lightRig rig="threePt" dir="t"/>
+    </dgm:scene3d>
+    <dgm:sp3d/>
+    <dgm:txPr/>
+    <dgm:style>
+      <a:lnRef idx="2">
+        <a:scrgbClr r="0" g="0" b="0"/>
+      </a:lnRef>
+      <a:fillRef idx="1">
+        <a:scrgbClr r="0" g="0" b="0"/>
+      </a:fillRef>
+      <a:effectRef idx="0">
+        <a:scrgbClr r="0" g="0" b="0"/>
+      </a:effectRef>
+      <a:fontRef idx="minor"/>
+    </dgm:style>
+  </dgm:styleLbl>
+  <dgm:styleLbl name="fgAcc3">
+    <dgm:scene3d>
+      <a:camera prst="orthographicFront"/>
+      <a:lightRig rig="threePt" dir="t"/>
+    </dgm:scene3d>
+    <dgm:sp3d/>
+    <dgm:txPr/>
+    <dgm:style>
+      <a:lnRef idx="2">
+        <a:scrgbClr r="0" g="0" b="0"/>
+      </a:lnRef>
+      <a:fillRef idx="1">
+        <a:scrgbClr r="0" g="0" b="0"/>
+      </a:fillRef>
+      <a:effectRef idx="0">
+        <a:scrgbClr r="0" g="0" b="0"/>
+      </a:effectRef>
+      <a:fontRef idx="minor"/>
+    </dgm:style>
+  </dgm:styleLbl>
+  <dgm:styleLbl name="fgAcc4">
+    <dgm:scene3d>
+      <a:camera prst="orthographicFront"/>
+      <a:lightRig rig="threePt" dir="t"/>
+    </dgm:scene3d>
+    <dgm:sp3d/>
+    <dgm:txPr/>
+    <dgm:style>
+      <a:lnRef idx="2">
+        <a:scrgbClr r="0" g="0" b="0"/>
+      </a:lnRef>
+      <a:fillRef idx="1">
+        <a:scrgbClr r="0" g="0" b="0"/>
+      </a:fillRef>
+      <a:effectRef idx="0">
+        <a:scrgbClr r="0" g="0" b="0"/>
+      </a:effectRef>
+      <a:fontRef idx="minor"/>
+    </dgm:style>
+  </dgm:styleLbl>
+  <dgm:styleLbl name="bgShp">
+    <dgm:scene3d>
+      <a:camera prst="orthographicFront"/>
+      <a:lightRig rig="threePt" dir="t"/>
+    </dgm:scene3d>
+    <dgm:sp3d/>
+    <dgm:txPr/>
+    <dgm:style>
+      <a:lnRef idx="0">
+        <a:scrgbClr r="0" g="0" b="0"/>
+      </a:lnRef>
+      <a:fillRef idx="1">
+        <a:scrgbClr r="0" g="0" b="0"/>
+      </a:fillRef>
+      <a:effectRef idx="0">
+        <a:scrgbClr r="0" g="0" b="0"/>
+      </a:effectRef>
+      <a:fontRef idx="minor"/>
+    </dgm:style>
+  </dgm:styleLbl>
+  <dgm:styleLbl name="dkBgShp">
+    <dgm:scene3d>
+      <a:camera prst="orthographicFront"/>
+      <a:lightRig rig="threePt" dir="t"/>
+    </dgm:scene3d>
+    <dgm:sp3d/>
+    <dgm:txPr/>
+    <dgm:style>
+      <a:lnRef idx="0">
+        <a:scrgbClr r="0" g="0" b="0"/>
+      </a:lnRef>
+      <a:fillRef idx="1">
+        <a:scrgbClr r="0" g="0" b="0"/>
+      </a:fillRef>
+      <a:effectRef idx="0">
+        <a:scrgbClr r="0" g="0" b="0"/>
+      </a:effectRef>
+      <a:fontRef idx="minor"/>
+    </dgm:style>
+  </dgm:styleLbl>
+  <dgm:styleLbl name="trBgShp">
+    <dgm:scene3d>
+      <a:camera prst="orthographicFront"/>
+      <a:lightRig rig="threePt" dir="t"/>
+    </dgm:scene3d>
+    <dgm:sp3d/>
+    <dgm:txPr/>
+    <dgm:style>
+      <a:lnRef idx="0">
+        <a:scrgbClr r="0" g="0" b="0"/>
+      </a:lnRef>
+      <a:fillRef idx="1">
+        <a:scrgbClr r="0" g="0" b="0"/>
+      </a:fillRef>
+      <a:effectRef idx="0">
+        <a:scrgbClr r="0" g="0" b="0"/>
+      </a:effectRef>
+      <a:fontRef idx="minor"/>
+    </dgm:style>
+  </dgm:styleLbl>
+  <dgm:styleLbl name="fgShp">
+    <dgm:scene3d>
+      <a:camera prst="orthographicFront"/>
+      <a:lightRig rig="threePt" dir="t"/>
+    </dgm:scene3d>
+    <dgm:sp3d/>
+    <dgm:txPr/>
+    <dgm:style>
+      <a:lnRef idx="2">
+        <a:scrgbClr r="0" g="0" b="0"/>
+      </a:lnRef>
+      <a:fillRef idx="1">
+        <a:scrgbClr r="0" g="0" b="0"/>
+      </a:fillRef>
+      <a:effectRef idx="0">
+        <a:scrgbClr r="0" g="0" b="0"/>
+      </a:effectRef>
+      <a:fontRef idx="minor"/>
+    </dgm:style>
+  </dgm:styleLbl>
+  <dgm:styleLbl name="revTx">
+    <dgm:scene3d>
+      <a:camera prst="orthographicFront"/>
+      <a:lightRig rig="threePt" dir="t"/>
+    </dgm:scene3d>
+    <dgm:sp3d/>
+    <dgm:txPr/>
+    <dgm:style>
+      <a:lnRef idx="0">
+        <a:scrgbClr r="0" g="0" b="0"/>
+      </a:lnRef>
+      <a:fillRef idx="0">
+        <a:scrgbClr r="0" g="0" b="0"/>
+      </a:fillRef>
+      <a:effectRef idx="0">
+        <a:scrgbClr r="0" g="0" b="0"/>
+      </a:effectRef>
+      <a:fontRef idx="minor"/>
+    </dgm:style>
+  </dgm:styleLbl>
+</dgm:styleDef>
+</file>
+
+<file path=ppt/diagrams/quickStyle6.xml><?xml version="1.0" encoding="utf-8"?>
 <dgm:styleDef xmlns:dgm="http://schemas.openxmlformats.org/drawingml/2006/diagram" xmlns:a="http://schemas.openxmlformats.org/drawingml/2006/main" uniqueId="urn:microsoft.com/office/officeart/2005/8/quickstyle/simple1">
   <dgm:title val=""/>
   <dgm:desc val=""/>
@@ -16031,7 +19180,7 @@
           <a:p>
             <a:fld id="{5100E855-DC3F-44F7-B6F1-F5D0C0D1A424}" type="datetimeFigureOut">
               <a:rPr lang="en-US" smtClean="0"/>
-              <a:t>4/6/2021</a:t>
+              <a:t>4/11/2021</a:t>
             </a:fld>
             <a:endParaRPr lang="en-US"/>
           </a:p>
@@ -17138,6 +20287,90 @@
 </p:notes>
 </file>
 
+<file path=ppt/notesSlides/notesSlide6.xml><?xml version="1.0" encoding="utf-8"?>
+<p:notes xmlns:a="http://schemas.openxmlformats.org/drawingml/2006/main" xmlns:r="http://schemas.openxmlformats.org/officeDocument/2006/relationships" xmlns:p="http://schemas.openxmlformats.org/presentationml/2006/main">
+  <p:cSld>
+    <p:spTree>
+      <p:nvGrpSpPr>
+        <p:cNvPr id="1" name=""/>
+        <p:cNvGrpSpPr/>
+        <p:nvPr/>
+      </p:nvGrpSpPr>
+      <p:grpSpPr>
+        <a:xfrm>
+          <a:off x="0" y="0"/>
+          <a:ext cx="0" cy="0"/>
+          <a:chOff x="0" y="0"/>
+          <a:chExt cx="0" cy="0"/>
+        </a:xfrm>
+      </p:grpSpPr>
+      <p:sp>
+        <p:nvSpPr>
+          <p:cNvPr id="2" name="Slide Image Placeholder 1"/>
+          <p:cNvSpPr>
+            <a:spLocks noGrp="1" noRot="1" noChangeAspect="1"/>
+          </p:cNvSpPr>
+          <p:nvPr>
+            <p:ph type="sldImg"/>
+          </p:nvPr>
+        </p:nvSpPr>
+        <p:spPr/>
+      </p:sp>
+      <p:sp>
+        <p:nvSpPr>
+          <p:cNvPr id="3" name="Notes Placeholder 2"/>
+          <p:cNvSpPr>
+            <a:spLocks noGrp="1"/>
+          </p:cNvSpPr>
+          <p:nvPr>
+            <p:ph type="body" idx="1"/>
+          </p:nvPr>
+        </p:nvSpPr>
+        <p:spPr/>
+        <p:txBody>
+          <a:bodyPr/>
+          <a:lstStyle/>
+          <a:p>
+            <a:endParaRPr lang="en-US" dirty="0"/>
+          </a:p>
+        </p:txBody>
+      </p:sp>
+      <p:sp>
+        <p:nvSpPr>
+          <p:cNvPr id="4" name="Slide Number Placeholder 3"/>
+          <p:cNvSpPr>
+            <a:spLocks noGrp="1"/>
+          </p:cNvSpPr>
+          <p:nvPr>
+            <p:ph type="sldNum" sz="quarter" idx="5"/>
+          </p:nvPr>
+        </p:nvSpPr>
+        <p:spPr/>
+        <p:txBody>
+          <a:bodyPr/>
+          <a:lstStyle/>
+          <a:p>
+            <a:fld id="{378EC67B-05AF-45BD-9870-8FF3B10B57E3}" type="slidenum">
+              <a:rPr lang="en-US" smtClean="0"/>
+              <a:t>13</a:t>
+            </a:fld>
+            <a:endParaRPr lang="en-US"/>
+          </a:p>
+        </p:txBody>
+      </p:sp>
+    </p:spTree>
+    <p:extLst>
+      <p:ext uri="{BB962C8B-B14F-4D97-AF65-F5344CB8AC3E}">
+        <p14:creationId xmlns:p14="http://schemas.microsoft.com/office/powerpoint/2010/main" val="1276376470"/>
+      </p:ext>
+    </p:extLst>
+  </p:cSld>
+  <p:clrMapOvr>
+    <a:masterClrMapping/>
+  </p:clrMapOvr>
+</p:notes>
+</file>
+
 <file path=ppt/slideLayouts/slideLayout1.xml><?xml version="1.0" encoding="utf-8"?>
 <p:sldLayout xmlns:a="http://schemas.openxmlformats.org/drawingml/2006/main" xmlns:r="http://schemas.openxmlformats.org/officeDocument/2006/relationships" xmlns:p="http://schemas.openxmlformats.org/presentationml/2006/main" showMasterSp="0" type="title" preserve="1">
   <p:cSld name="Title Slide">
@@ -17382,7 +20615,7 @@
           <a:p>
             <a:fld id="{9184DA70-C731-4C70-880D-CCD4705E623C}" type="datetime1">
               <a:rPr lang="en-US" smtClean="0"/>
-              <a:t>4/6/2021</a:t>
+              <a:t>4/11/2021</a:t>
             </a:fld>
             <a:endParaRPr lang="en-US" dirty="0"/>
           </a:p>
@@ -17570,7 +20803,7 @@
           <a:p>
             <a:fld id="{4BE1D723-8F53-4F53-90B0-1982A396982E}" type="datetime1">
               <a:rPr lang="en-US" smtClean="0"/>
-              <a:t>4/6/2021</a:t>
+              <a:t>4/11/2021</a:t>
             </a:fld>
             <a:endParaRPr lang="en-US" dirty="0"/>
           </a:p>
@@ -17943,7 +21176,7 @@
           <a:p>
             <a:fld id="{97669AF7-7BEB-44E4-9852-375E34362B5B}" type="datetime1">
               <a:rPr lang="en-US" smtClean="0"/>
-              <a:t>4/6/2021</a:t>
+              <a:t>4/11/2021</a:t>
             </a:fld>
             <a:endParaRPr lang="en-US" dirty="0"/>
           </a:p>
@@ -18198,7 +21431,7 @@
           <a:p>
             <a:fld id="{BAAAC38D-0552-4C82-B593-E6124DFADBE2}" type="datetime1">
               <a:rPr lang="en-US" smtClean="0"/>
-              <a:t>4/6/2021</a:t>
+              <a:t>4/11/2021</a:t>
             </a:fld>
             <a:endParaRPr lang="en-US" dirty="0"/>
           </a:p>
@@ -18595,7 +21828,7 @@
           <a:p>
             <a:fld id="{D9DF0F1C-5577-4ACB-BB62-DF8F3C494C7E}" type="datetime1">
               <a:rPr lang="en-US" smtClean="0"/>
-              <a:t>4/6/2021</a:t>
+              <a:t>4/11/2021</a:t>
             </a:fld>
             <a:endParaRPr lang="en-US" dirty="0"/>
           </a:p>
@@ -18731,7 +21964,7 @@
           <a:p>
             <a:fld id="{1775B394-D9F9-4F0C-B15D-605F45CB9E9F}" type="datetime1">
               <a:rPr lang="en-US" smtClean="0"/>
-              <a:t>4/6/2021</a:t>
+              <a:t>4/11/2021</a:t>
             </a:fld>
             <a:endParaRPr lang="en-US" dirty="0"/>
           </a:p>
@@ -18888,7 +22121,7 @@
           <a:p>
             <a:fld id="{39667345-2558-425A-8533-9BFDBCE15005}" type="datetime1">
               <a:rPr lang="en-US" smtClean="0"/>
-              <a:t>4/6/2021</a:t>
+              <a:t>4/11/2021</a:t>
             </a:fld>
             <a:endParaRPr lang="en-US" dirty="0"/>
           </a:p>
@@ -19217,7 +22450,7 @@
           <a:p>
             <a:fld id="{92BEA474-078D-4E9B-9B14-09A87B19DC46}" type="datetime1">
               <a:rPr lang="en-US" smtClean="0"/>
-              <a:t>4/6/2021</a:t>
+              <a:t>4/11/2021</a:t>
             </a:fld>
             <a:endParaRPr lang="en-US" dirty="0"/>
           </a:p>
@@ -19567,7 +22800,7 @@
           <a:p>
             <a:fld id="{4907D986-8816-4272-A432-0437A28A9828}" type="datetime1">
               <a:rPr lang="en-US" smtClean="0"/>
-              <a:t>4/6/2021</a:t>
+              <a:t>4/11/2021</a:t>
             </a:fld>
             <a:endParaRPr lang="en-US" dirty="0"/>
           </a:p>
@@ -19828,7 +23061,7 @@
           <a:p>
             <a:fld id="{62D6E202-B606-4609-B914-27C9371A1F6D}" type="datetime1">
               <a:rPr lang="en-US" smtClean="0"/>
-              <a:t>4/6/2021</a:t>
+              <a:t>4/11/2021</a:t>
             </a:fld>
             <a:endParaRPr lang="en-US" dirty="0"/>
           </a:p>
@@ -21852,6 +25085,866 @@
     <p:extLst>
       <p:ext uri="{BB962C8B-B14F-4D97-AF65-F5344CB8AC3E}">
         <p14:creationId xmlns:p14="http://schemas.microsoft.com/office/powerpoint/2010/main" val="602677226"/>
+      </p:ext>
+    </p:extLst>
+  </p:cSld>
+  <p:clrMapOvr>
+    <a:masterClrMapping/>
+  </p:clrMapOvr>
+</p:sld>
+</file>
+
+<file path=ppt/slides/slide13.xml><?xml version="1.0" encoding="utf-8"?>
+<p:sld xmlns:a="http://schemas.openxmlformats.org/drawingml/2006/main" xmlns:r="http://schemas.openxmlformats.org/officeDocument/2006/relationships" xmlns:p="http://schemas.openxmlformats.org/presentationml/2006/main">
+  <p:cSld>
+    <p:bg>
+      <p:bgPr>
+        <a:solidFill>
+          <a:schemeClr val="bg1"/>
+        </a:solidFill>
+        <a:effectLst/>
+      </p:bgPr>
+    </p:bg>
+    <p:spTree>
+      <p:nvGrpSpPr>
+        <p:cNvPr id="1" name=""/>
+        <p:cNvGrpSpPr/>
+        <p:nvPr/>
+      </p:nvGrpSpPr>
+      <p:grpSpPr>
+        <a:xfrm>
+          <a:off x="0" y="0"/>
+          <a:ext cx="0" cy="0"/>
+          <a:chOff x="0" y="0"/>
+          <a:chExt cx="0" cy="0"/>
+        </a:xfrm>
+      </p:grpSpPr>
+      <p:sp>
+        <p:nvSpPr>
+          <p:cNvPr id="1034" name="Rectangle 76">
+            <a:extLst>
+              <a:ext uri="{FF2B5EF4-FFF2-40B4-BE49-F238E27FC236}">
+                <a16:creationId xmlns:a16="http://schemas.microsoft.com/office/drawing/2014/main" id="{416A0E3C-60E6-4F39-BC55-5F7C224E1F7C}"/>
+              </a:ext>
+              <a:ext uri="{C183D7F6-B498-43B3-948B-1728B52AA6E4}">
+                <adec:decorative xmlns:adec="http://schemas.microsoft.com/office/drawing/2017/decorative" val="1"/>
+              </a:ext>
+            </a:extLst>
+          </p:cNvPr>
+          <p:cNvSpPr>
+            <a:spLocks noGrp="1" noRot="1" noChangeAspect="1" noMove="1" noResize="1" noEditPoints="1" noAdjustHandles="1" noChangeArrowheads="1" noChangeShapeType="1" noTextEdit="1"/>
+          </p:cNvSpPr>
+          <p:nvPr>
+            <p:extLst>
+              <p:ext uri="{386F3935-93C4-4BCD-93E2-E3B085C9AB24}">
+                <p16:designElem xmlns:p16="http://schemas.microsoft.com/office/powerpoint/2015/main" val="1"/>
+              </p:ext>
+            </p:extLst>
+          </p:nvPr>
+        </p:nvSpPr>
+        <p:spPr>
+          <a:xfrm>
+            <a:off x="3175" y="6400800"/>
+            <a:ext cx="12188825" cy="457200"/>
+          </a:xfrm>
+          <a:prstGeom prst="rect">
+            <a:avLst/>
+          </a:prstGeom>
+          <a:solidFill>
+            <a:srgbClr val="262626"/>
+          </a:solidFill>
+          <a:ln>
+            <a:noFill/>
+          </a:ln>
+        </p:spPr>
+        <p:style>
+          <a:lnRef idx="2">
+            <a:schemeClr val="accent1">
+              <a:shade val="50000"/>
+            </a:schemeClr>
+          </a:lnRef>
+          <a:fillRef idx="1">
+            <a:schemeClr val="accent1"/>
+          </a:fillRef>
+          <a:effectRef idx="0">
+            <a:schemeClr val="accent1"/>
+          </a:effectRef>
+          <a:fontRef idx="minor">
+            <a:schemeClr val="lt1"/>
+          </a:fontRef>
+        </p:style>
+      </p:sp>
+      <p:cxnSp>
+        <p:nvCxnSpPr>
+          <p:cNvPr id="1035" name="Straight Connector 78">
+            <a:extLst>
+              <a:ext uri="{FF2B5EF4-FFF2-40B4-BE49-F238E27FC236}">
+                <a16:creationId xmlns:a16="http://schemas.microsoft.com/office/drawing/2014/main" id="{C5025DAC-8B93-4160-B017-3A274A5828C0}"/>
+              </a:ext>
+              <a:ext uri="{C183D7F6-B498-43B3-948B-1728B52AA6E4}">
+                <adec:decorative xmlns:adec="http://schemas.microsoft.com/office/drawing/2017/decorative" val="1"/>
+              </a:ext>
+            </a:extLst>
+          </p:cNvPr>
+          <p:cNvCxnSpPr>
+            <a:cxnSpLocks noGrp="1" noRot="1" noChangeAspect="1" noMove="1" noResize="1" noEditPoints="1" noAdjustHandles="1" noChangeArrowheads="1" noChangeShapeType="1"/>
+          </p:cNvCxnSpPr>
+          <p:nvPr>
+            <p:extLst>
+              <p:ext uri="{386F3935-93C4-4BCD-93E2-E3B085C9AB24}">
+                <p16:designElem xmlns:p16="http://schemas.microsoft.com/office/powerpoint/2015/main" val="1"/>
+              </p:ext>
+            </p:extLst>
+          </p:nvPr>
+        </p:nvCxnSpPr>
+        <p:spPr>
+          <a:xfrm>
+            <a:off x="1193532" y="1897380"/>
+            <a:ext cx="9966960" cy="0"/>
+          </a:xfrm>
+          <a:prstGeom prst="line">
+            <a:avLst/>
+          </a:prstGeom>
+          <a:ln w="12700">
+            <a:solidFill>
+              <a:schemeClr val="tx1">
+                <a:lumMod val="75000"/>
+                <a:lumOff val="25000"/>
+              </a:schemeClr>
+            </a:solidFill>
+          </a:ln>
+        </p:spPr>
+        <p:style>
+          <a:lnRef idx="1">
+            <a:schemeClr val="accent1"/>
+          </a:lnRef>
+          <a:fillRef idx="0">
+            <a:schemeClr val="accent1"/>
+          </a:fillRef>
+          <a:effectRef idx="0">
+            <a:schemeClr val="accent1"/>
+          </a:effectRef>
+          <a:fontRef idx="minor">
+            <a:schemeClr val="tx1"/>
+          </a:fontRef>
+        </p:style>
+      </p:cxnSp>
+      <p:sp useBgFill="1">
+        <p:nvSpPr>
+          <p:cNvPr id="1036" name="Rectangle 80">
+            <a:extLst>
+              <a:ext uri="{FF2B5EF4-FFF2-40B4-BE49-F238E27FC236}">
+                <a16:creationId xmlns:a16="http://schemas.microsoft.com/office/drawing/2014/main" id="{39B4056F-1959-4627-A683-77F6C0603FCD}"/>
+              </a:ext>
+              <a:ext uri="{C183D7F6-B498-43B3-948B-1728B52AA6E4}">
+                <adec:decorative xmlns:adec="http://schemas.microsoft.com/office/drawing/2017/decorative" val="1"/>
+              </a:ext>
+            </a:extLst>
+          </p:cNvPr>
+          <p:cNvSpPr>
+            <a:spLocks noGrp="1" noRot="1" noChangeAspect="1" noMove="1" noResize="1" noEditPoints="1" noAdjustHandles="1" noChangeArrowheads="1" noChangeShapeType="1" noTextEdit="1"/>
+          </p:cNvSpPr>
+          <p:nvPr>
+            <p:extLst>
+              <p:ext uri="{386F3935-93C4-4BCD-93E2-E3B085C9AB24}">
+                <p16:designElem xmlns:p16="http://schemas.microsoft.com/office/powerpoint/2015/main" val="1"/>
+              </p:ext>
+            </p:extLst>
+          </p:nvPr>
+        </p:nvSpPr>
+        <p:spPr>
+          <a:xfrm>
+            <a:off x="0" y="0"/>
+            <a:ext cx="12192001" cy="6858000"/>
+          </a:xfrm>
+          <a:prstGeom prst="rect">
+            <a:avLst/>
+          </a:prstGeom>
+          <a:ln>
+            <a:noFill/>
+          </a:ln>
+        </p:spPr>
+        <p:style>
+          <a:lnRef idx="2">
+            <a:schemeClr val="accent1">
+              <a:shade val="50000"/>
+            </a:schemeClr>
+          </a:lnRef>
+          <a:fillRef idx="1">
+            <a:schemeClr val="accent1"/>
+          </a:fillRef>
+          <a:effectRef idx="0">
+            <a:schemeClr val="accent1"/>
+          </a:effectRef>
+          <a:fontRef idx="minor">
+            <a:schemeClr val="lt1"/>
+          </a:fontRef>
+        </p:style>
+        <p:txBody>
+          <a:bodyPr rtlCol="0" anchor="ctr"/>
+          <a:lstStyle/>
+          <a:p>
+            <a:pPr algn="ctr"/>
+            <a:endParaRPr lang="en-US"/>
+          </a:p>
+        </p:txBody>
+      </p:sp>
+      <p:sp>
+        <p:nvSpPr>
+          <p:cNvPr id="1037" name="Rectangle 82">
+            <a:extLst>
+              <a:ext uri="{FF2B5EF4-FFF2-40B4-BE49-F238E27FC236}">
+                <a16:creationId xmlns:a16="http://schemas.microsoft.com/office/drawing/2014/main" id="{D8D7349B-C9FA-4FCE-A1FF-948F460A3A9A}"/>
+              </a:ext>
+              <a:ext uri="{C183D7F6-B498-43B3-948B-1728B52AA6E4}">
+                <adec:decorative xmlns:adec="http://schemas.microsoft.com/office/drawing/2017/decorative" val="1"/>
+              </a:ext>
+            </a:extLst>
+          </p:cNvPr>
+          <p:cNvSpPr>
+            <a:spLocks noGrp="1" noRot="1" noChangeAspect="1" noMove="1" noResize="1" noEditPoints="1" noAdjustHandles="1" noChangeArrowheads="1" noChangeShapeType="1" noTextEdit="1"/>
+          </p:cNvSpPr>
+          <p:nvPr>
+            <p:extLst>
+              <p:ext uri="{386F3935-93C4-4BCD-93E2-E3B085C9AB24}">
+                <p16:designElem xmlns:p16="http://schemas.microsoft.com/office/powerpoint/2015/main" val="1"/>
+              </p:ext>
+            </p:extLst>
+          </p:nvPr>
+        </p:nvSpPr>
+        <p:spPr bwMode="white">
+          <a:xfrm>
+            <a:off x="1507" y="4554906"/>
+            <a:ext cx="12188952" cy="2303094"/>
+          </a:xfrm>
+          <a:prstGeom prst="rect">
+            <a:avLst/>
+          </a:prstGeom>
+          <a:solidFill>
+            <a:srgbClr val="262626"/>
+          </a:solidFill>
+          <a:ln>
+            <a:noFill/>
+          </a:ln>
+        </p:spPr>
+        <p:style>
+          <a:lnRef idx="2">
+            <a:schemeClr val="accent1">
+              <a:shade val="50000"/>
+            </a:schemeClr>
+          </a:lnRef>
+          <a:fillRef idx="1">
+            <a:schemeClr val="accent1"/>
+          </a:fillRef>
+          <a:effectRef idx="0">
+            <a:schemeClr val="accent1"/>
+          </a:effectRef>
+          <a:fontRef idx="minor">
+            <a:schemeClr val="lt1"/>
+          </a:fontRef>
+        </p:style>
+      </p:sp>
+      <p:sp>
+        <p:nvSpPr>
+          <p:cNvPr id="5" name="Title 4">
+            <a:extLst>
+              <a:ext uri="{FF2B5EF4-FFF2-40B4-BE49-F238E27FC236}">
+                <a16:creationId xmlns:a16="http://schemas.microsoft.com/office/drawing/2014/main" id="{643C2EDD-9B02-481C-9721-A6669C7B7060}"/>
+              </a:ext>
+            </a:extLst>
+          </p:cNvPr>
+          <p:cNvSpPr>
+            <a:spLocks noGrp="1"/>
+          </p:cNvSpPr>
+          <p:nvPr>
+            <p:ph type="title"/>
+          </p:nvPr>
+        </p:nvSpPr>
+        <p:spPr>
+          <a:xfrm>
+            <a:off x="633998" y="4905301"/>
+            <a:ext cx="4988879" cy="1554485"/>
+          </a:xfrm>
+        </p:spPr>
+        <p:txBody>
+          <a:bodyPr vert="horz" lIns="91440" tIns="45720" rIns="91440" bIns="45720" rtlCol="0" anchor="ctr">
+            <a:normAutofit/>
+          </a:bodyPr>
+          <a:lstStyle/>
+          <a:p>
+            <a:pPr algn="r"/>
+            <a:r>
+              <a:rPr lang="en-US" sz="4000" dirty="0"/>
+              <a:t>Observer</a:t>
+            </a:r>
+          </a:p>
+        </p:txBody>
+      </p:sp>
+      <p:cxnSp>
+        <p:nvCxnSpPr>
+          <p:cNvPr id="85" name="Straight Connector 84">
+            <a:extLst>
+              <a:ext uri="{FF2B5EF4-FFF2-40B4-BE49-F238E27FC236}">
+                <a16:creationId xmlns:a16="http://schemas.microsoft.com/office/drawing/2014/main" id="{55646586-8E5D-4A2B-BDA9-01CE28AC89A1}"/>
+              </a:ext>
+              <a:ext uri="{C183D7F6-B498-43B3-948B-1728B52AA6E4}">
+                <adec:decorative xmlns:adec="http://schemas.microsoft.com/office/drawing/2017/decorative" val="1"/>
+              </a:ext>
+            </a:extLst>
+          </p:cNvPr>
+          <p:cNvCxnSpPr>
+            <a:cxnSpLocks noGrp="1" noRot="1" noChangeAspect="1" noMove="1" noResize="1" noEditPoints="1" noAdjustHandles="1" noChangeArrowheads="1" noChangeShapeType="1"/>
+          </p:cNvCxnSpPr>
+          <p:nvPr>
+            <p:extLst>
+              <p:ext uri="{386F3935-93C4-4BCD-93E2-E3B085C9AB24}">
+                <p16:designElem xmlns:p16="http://schemas.microsoft.com/office/powerpoint/2015/main" val="1"/>
+              </p:ext>
+            </p:extLst>
+          </p:nvPr>
+        </p:nvCxnSpPr>
+        <p:spPr>
+          <a:xfrm>
+            <a:off x="5820770" y="5247564"/>
+            <a:ext cx="0" cy="873457"/>
+          </a:xfrm>
+          <a:prstGeom prst="line">
+            <a:avLst/>
+          </a:prstGeom>
+          <a:ln w="19050">
+            <a:solidFill>
+              <a:srgbClr val="FFC578"/>
+            </a:solidFill>
+          </a:ln>
+        </p:spPr>
+        <p:style>
+          <a:lnRef idx="1">
+            <a:schemeClr val="accent1"/>
+          </a:lnRef>
+          <a:fillRef idx="0">
+            <a:schemeClr val="accent1"/>
+          </a:fillRef>
+          <a:effectRef idx="0">
+            <a:schemeClr val="accent1"/>
+          </a:effectRef>
+          <a:fontRef idx="minor">
+            <a:schemeClr val="tx1"/>
+          </a:fontRef>
+        </p:style>
+      </p:cxnSp>
+      <p:sp>
+        <p:nvSpPr>
+          <p:cNvPr id="7" name="Text Placeholder 6">
+            <a:extLst>
+              <a:ext uri="{FF2B5EF4-FFF2-40B4-BE49-F238E27FC236}">
+                <a16:creationId xmlns:a16="http://schemas.microsoft.com/office/drawing/2014/main" id="{7E8F4492-485A-4DE4-AF79-08F65DEE159B}"/>
+              </a:ext>
+            </a:extLst>
+          </p:cNvPr>
+          <p:cNvSpPr>
+            <a:spLocks noGrp="1"/>
+          </p:cNvSpPr>
+          <p:nvPr>
+            <p:ph type="body" sz="half" idx="2"/>
+          </p:nvPr>
+        </p:nvSpPr>
+        <p:spPr>
+          <a:xfrm>
+            <a:off x="6064301" y="4673829"/>
+            <a:ext cx="5493699" cy="2088477"/>
+          </a:xfrm>
+        </p:spPr>
+        <p:txBody>
+          <a:bodyPr vert="horz" lIns="0" tIns="45720" rIns="0" bIns="45720" rtlCol="0" anchor="ctr">
+            <a:normAutofit/>
+          </a:bodyPr>
+          <a:lstStyle/>
+          <a:p>
+            <a:pPr>
+              <a:lnSpc>
+                <a:spcPct val="100000"/>
+              </a:lnSpc>
+            </a:pPr>
+            <a:r>
+              <a:rPr lang="en-US" dirty="0">
+                <a:solidFill>
+                  <a:schemeClr val="accent5">
+                    <a:lumMod val="75000"/>
+                  </a:schemeClr>
+                </a:solidFill>
+              </a:rPr>
+              <a:t>Problem</a:t>
+            </a:r>
+            <a:r>
+              <a:rPr lang="en-US" dirty="0"/>
+              <a:t>: need to dynamically react on some events happening in the app, need some objects to follow other objects for a limited time or in some specific cases</a:t>
+            </a:r>
+          </a:p>
+          <a:p>
+            <a:pPr>
+              <a:lnSpc>
+                <a:spcPct val="100000"/>
+              </a:lnSpc>
+            </a:pPr>
+            <a:r>
+              <a:rPr lang="en-US" dirty="0">
+                <a:solidFill>
+                  <a:schemeClr val="accent5">
+                    <a:lumMod val="75000"/>
+                  </a:schemeClr>
+                </a:solidFill>
+              </a:rPr>
+              <a:t>Solution</a:t>
+            </a:r>
+            <a:r>
+              <a:rPr lang="en-US" dirty="0"/>
+              <a:t>: identify the object that is observable </a:t>
+            </a:r>
+            <a:r>
+              <a:rPr lang="en-US" dirty="0">
+                <a:solidFill>
+                  <a:schemeClr val="accent6">
+                    <a:lumMod val="60000"/>
+                    <a:lumOff val="40000"/>
+                  </a:schemeClr>
+                </a:solidFill>
+              </a:rPr>
+              <a:t>(observable/publisher/subject)</a:t>
+            </a:r>
+            <a:r>
+              <a:rPr lang="en-US" dirty="0"/>
+              <a:t>, maintain a list of objects depending on it </a:t>
+            </a:r>
+            <a:r>
+              <a:rPr lang="en-US" dirty="0">
+                <a:solidFill>
+                  <a:schemeClr val="accent6">
+                    <a:lumMod val="60000"/>
+                    <a:lumOff val="40000"/>
+                  </a:schemeClr>
+                </a:solidFill>
+              </a:rPr>
+              <a:t>(observers/subscribers)</a:t>
+            </a:r>
+            <a:r>
+              <a:rPr lang="en-US" dirty="0"/>
+              <a:t> that need to be automatically notified about any changes in the state</a:t>
+            </a:r>
+          </a:p>
+        </p:txBody>
+      </p:sp>
+      <p:pic>
+        <p:nvPicPr>
+          <p:cNvPr id="1026" name="Picture 2" descr="Structure of the Observer design pattern">
+            <a:extLst>
+              <a:ext uri="{FF2B5EF4-FFF2-40B4-BE49-F238E27FC236}">
+                <a16:creationId xmlns:a16="http://schemas.microsoft.com/office/drawing/2014/main" id="{BF7845B8-A1EB-4BF5-914F-1C64FE39F549}"/>
+              </a:ext>
+            </a:extLst>
+          </p:cNvPr>
+          <p:cNvPicPr>
+            <a:picLocks noChangeAspect="1" noChangeArrowheads="1"/>
+          </p:cNvPicPr>
+          <p:nvPr/>
+        </p:nvPicPr>
+        <p:blipFill>
+          <a:blip r:embed="rId3">
+            <a:extLst>
+              <a:ext uri="{28A0092B-C50C-407E-A947-70E740481C1C}">
+                <a14:useLocalDpi xmlns:a14="http://schemas.microsoft.com/office/drawing/2010/main" val="0"/>
+              </a:ext>
+            </a:extLst>
+          </a:blip>
+          <a:srcRect/>
+          <a:stretch>
+            <a:fillRect/>
+          </a:stretch>
+        </p:blipFill>
+        <p:spPr bwMode="auto">
+          <a:xfrm>
+            <a:off x="3190858" y="570789"/>
+            <a:ext cx="5810250" cy="2952750"/>
+          </a:xfrm>
+          <a:prstGeom prst="rect">
+            <a:avLst/>
+          </a:prstGeom>
+          <a:noFill/>
+          <a:extLst>
+            <a:ext uri="{909E8E84-426E-40DD-AFC4-6F175D3DCCD1}">
+              <a14:hiddenFill xmlns:a14="http://schemas.microsoft.com/office/drawing/2010/main">
+                <a:solidFill>
+                  <a:srgbClr val="FFFFFF"/>
+                </a:solidFill>
+              </a14:hiddenFill>
+            </a:ext>
+          </a:extLst>
+        </p:spPr>
+      </p:pic>
+    </p:spTree>
+    <p:extLst>
+      <p:ext uri="{BB962C8B-B14F-4D97-AF65-F5344CB8AC3E}">
+        <p14:creationId xmlns:p14="http://schemas.microsoft.com/office/powerpoint/2010/main" val="2792114984"/>
+      </p:ext>
+    </p:extLst>
+  </p:cSld>
+  <p:clrMapOvr>
+    <a:masterClrMapping/>
+  </p:clrMapOvr>
+</p:sld>
+</file>
+
+<file path=ppt/slides/slide14.xml><?xml version="1.0" encoding="utf-8"?>
+<p:sld xmlns:a="http://schemas.openxmlformats.org/drawingml/2006/main" xmlns:r="http://schemas.openxmlformats.org/officeDocument/2006/relationships" xmlns:p="http://schemas.openxmlformats.org/presentationml/2006/main">
+  <p:cSld>
+    <p:spTree>
+      <p:nvGrpSpPr>
+        <p:cNvPr id="1" name=""/>
+        <p:cNvGrpSpPr/>
+        <p:nvPr/>
+      </p:nvGrpSpPr>
+      <p:grpSpPr>
+        <a:xfrm>
+          <a:off x="0" y="0"/>
+          <a:ext cx="0" cy="0"/>
+          <a:chOff x="0" y="0"/>
+          <a:chExt cx="0" cy="0"/>
+        </a:xfrm>
+      </p:grpSpPr>
+      <p:sp>
+        <p:nvSpPr>
+          <p:cNvPr id="5" name="Title 4">
+            <a:extLst>
+              <a:ext uri="{FF2B5EF4-FFF2-40B4-BE49-F238E27FC236}">
+                <a16:creationId xmlns:a16="http://schemas.microsoft.com/office/drawing/2014/main" id="{15DE6CDC-3760-4614-8575-CB1459F11CD8}"/>
+              </a:ext>
+            </a:extLst>
+          </p:cNvPr>
+          <p:cNvSpPr>
+            <a:spLocks noGrp="1"/>
+          </p:cNvSpPr>
+          <p:nvPr>
+            <p:ph type="title"/>
+          </p:nvPr>
+        </p:nvSpPr>
+        <p:spPr/>
+        <p:txBody>
+          <a:bodyPr>
+            <a:normAutofit fontScale="90000"/>
+          </a:bodyPr>
+          <a:lstStyle/>
+          <a:p>
+            <a:r>
+              <a:rPr lang="en-US" dirty="0"/>
+              <a:t>Observer in a few words + examples from open-source projects</a:t>
+            </a:r>
+          </a:p>
+        </p:txBody>
+      </p:sp>
+      <p:graphicFrame>
+        <p:nvGraphicFramePr>
+          <p:cNvPr id="10" name="Content Placeholder 5">
+            <a:extLst>
+              <a:ext uri="{FF2B5EF4-FFF2-40B4-BE49-F238E27FC236}">
+                <a16:creationId xmlns:a16="http://schemas.microsoft.com/office/drawing/2014/main" id="{1DA604AA-B0C5-4DE1-8F1A-F3546A2ED7F0}"/>
+              </a:ext>
+            </a:extLst>
+          </p:cNvPr>
+          <p:cNvGraphicFramePr>
+            <a:graphicFrameLocks noGrp="1"/>
+          </p:cNvGraphicFramePr>
+          <p:nvPr>
+            <p:ph sz="half" idx="1"/>
+            <p:extLst>
+              <p:ext uri="{D42A27DB-BD31-4B8C-83A1-F6EECF244321}">
+                <p14:modId xmlns:p14="http://schemas.microsoft.com/office/powerpoint/2010/main" val="297468236"/>
+              </p:ext>
+            </p:extLst>
+          </p:nvPr>
+        </p:nvGraphicFramePr>
+        <p:xfrm>
+          <a:off x="1097280" y="2120900"/>
+          <a:ext cx="4639736" cy="3748193"/>
+        </p:xfrm>
+        <a:graphic>
+          <a:graphicData uri="http://schemas.openxmlformats.org/drawingml/2006/diagram">
+            <dgm:relIds xmlns:dgm="http://schemas.openxmlformats.org/drawingml/2006/diagram" xmlns:r="http://schemas.openxmlformats.org/officeDocument/2006/relationships" r:dm="rId2" r:lo="rId3" r:qs="rId4" r:cs="rId5"/>
+          </a:graphicData>
+        </a:graphic>
+      </p:graphicFrame>
+      <p:sp>
+        <p:nvSpPr>
+          <p:cNvPr id="7" name="Content Placeholder 6">
+            <a:extLst>
+              <a:ext uri="{FF2B5EF4-FFF2-40B4-BE49-F238E27FC236}">
+                <a16:creationId xmlns:a16="http://schemas.microsoft.com/office/drawing/2014/main" id="{DB492ABE-1506-4371-999F-C690661B3366}"/>
+              </a:ext>
+            </a:extLst>
+          </p:cNvPr>
+          <p:cNvSpPr>
+            <a:spLocks noGrp="1"/>
+          </p:cNvSpPr>
+          <p:nvPr>
+            <p:ph sz="half" idx="2"/>
+          </p:nvPr>
+        </p:nvSpPr>
+        <p:spPr>
+          <a:xfrm>
+            <a:off x="6363093" y="1913860"/>
+            <a:ext cx="5088172" cy="4455041"/>
+          </a:xfrm>
+        </p:spPr>
+        <p:txBody>
+          <a:bodyPr>
+            <a:normAutofit fontScale="92500" lnSpcReduction="10000"/>
+          </a:bodyPr>
+          <a:lstStyle/>
+          <a:p>
+            <a:pPr marL="0" indent="0">
+              <a:buNone/>
+            </a:pPr>
+            <a:r>
+              <a:rPr lang="en-US" dirty="0"/>
+              <a:t>Java: </a:t>
+            </a:r>
+            <a:r>
+              <a:rPr lang="en-US" dirty="0" err="1"/>
+              <a:t>java.util.EventListener</a:t>
+            </a:r>
+            <a:endParaRPr lang="en-US" dirty="0"/>
+          </a:p>
+          <a:p>
+            <a:pPr marL="0" indent="0">
+              <a:buNone/>
+            </a:pPr>
+            <a:r>
+              <a:rPr lang="en-US" dirty="0"/>
+              <a:t>C#: </a:t>
+            </a:r>
+            <a:r>
+              <a:rPr lang="en-US" dirty="0" err="1"/>
+              <a:t>Sytem.IObservable</a:t>
+            </a:r>
+            <a:endParaRPr lang="en-US" dirty="0"/>
+          </a:p>
+          <a:p>
+            <a:pPr marL="0" indent="0">
+              <a:buNone/>
+            </a:pPr>
+            <a:r>
+              <a:rPr lang="en-US" dirty="0"/>
+              <a:t>Android: </a:t>
+            </a:r>
+            <a:r>
+              <a:rPr lang="en-US" dirty="0">
+                <a:hlinkClick r:id="rId7"/>
+              </a:rPr>
+              <a:t>https://developer.android.com/reference/android/database/DataSetObservable</a:t>
+            </a:r>
+            <a:endParaRPr lang="en-US" dirty="0"/>
+          </a:p>
+          <a:p>
+            <a:pPr marL="0" indent="0">
+              <a:buNone/>
+            </a:pPr>
+            <a:r>
+              <a:rPr lang="en-US" dirty="0"/>
+              <a:t>jQuery: </a:t>
+            </a:r>
+            <a:r>
+              <a:rPr lang="en-US" dirty="0" err="1"/>
+              <a:t>jquery.on</a:t>
+            </a:r>
+            <a:r>
+              <a:rPr lang="en-US" dirty="0"/>
+              <a:t>(), </a:t>
+            </a:r>
+            <a:r>
+              <a:rPr lang="en-US" dirty="0" err="1"/>
+              <a:t>jquery.trigger</a:t>
+            </a:r>
+            <a:r>
+              <a:rPr lang="en-US" dirty="0"/>
+              <a:t>(), </a:t>
+            </a:r>
+            <a:r>
+              <a:rPr lang="en-US" dirty="0" err="1"/>
+              <a:t>jquery.off</a:t>
+            </a:r>
+            <a:r>
+              <a:rPr lang="en-US" dirty="0"/>
+              <a:t>()</a:t>
+            </a:r>
+          </a:p>
+          <a:p>
+            <a:pPr marL="0" indent="0">
+              <a:buNone/>
+            </a:pPr>
+            <a:r>
+              <a:rPr lang="en-US" dirty="0"/>
+              <a:t>React Redux: </a:t>
+            </a:r>
+            <a:r>
+              <a:rPr lang="en-US" dirty="0">
+                <a:hlinkClick r:id="rId8"/>
+              </a:rPr>
+              <a:t>https://react-redux.js.org/</a:t>
+            </a:r>
+            <a:endParaRPr lang="en-US" dirty="0"/>
+          </a:p>
+          <a:p>
+            <a:pPr marL="0" indent="0">
+              <a:buNone/>
+            </a:pPr>
+            <a:r>
+              <a:rPr lang="en-US" dirty="0" err="1"/>
+              <a:t>RxJS</a:t>
+            </a:r>
+            <a:r>
+              <a:rPr lang="en-US" dirty="0"/>
+              <a:t>: </a:t>
+            </a:r>
+            <a:r>
+              <a:rPr lang="en-US" dirty="0">
+                <a:hlinkClick r:id="rId9"/>
+              </a:rPr>
+              <a:t>https://rossbulat.medium.com/rxjs-a-simple-introduction-32fb48f52a67</a:t>
+            </a:r>
+            <a:endParaRPr lang="en-US" dirty="0"/>
+          </a:p>
+          <a:p>
+            <a:pPr marL="0" indent="0">
+              <a:buNone/>
+            </a:pPr>
+            <a:r>
+              <a:rPr lang="en-US" dirty="0"/>
+              <a:t>Tip for presentation: compare with Publish/Subscribe pattern</a:t>
+            </a:r>
+          </a:p>
+          <a:p>
+            <a:pPr marL="0" indent="0">
+              <a:buNone/>
+            </a:pPr>
+            <a:endParaRPr lang="en-US" dirty="0"/>
+          </a:p>
+          <a:p>
+            <a:endParaRPr lang="en-US" dirty="0"/>
+          </a:p>
+          <a:p>
+            <a:endParaRPr lang="en-US" dirty="0"/>
+          </a:p>
+        </p:txBody>
+      </p:sp>
+      <p:sp>
+        <p:nvSpPr>
+          <p:cNvPr id="8" name="Rectangle 1">
+            <a:extLst>
+              <a:ext uri="{FF2B5EF4-FFF2-40B4-BE49-F238E27FC236}">
+                <a16:creationId xmlns:a16="http://schemas.microsoft.com/office/drawing/2014/main" id="{B065E2E4-AE49-41FC-8842-63643489E193}"/>
+              </a:ext>
+            </a:extLst>
+          </p:cNvPr>
+          <p:cNvSpPr>
+            <a:spLocks noChangeArrowheads="1"/>
+          </p:cNvSpPr>
+          <p:nvPr/>
+        </p:nvSpPr>
+        <p:spPr bwMode="auto">
+          <a:xfrm>
+            <a:off x="0" y="159350"/>
+            <a:ext cx="25648" cy="138499"/>
+          </a:xfrm>
+          <a:prstGeom prst="rect">
+            <a:avLst/>
+          </a:prstGeom>
+          <a:noFill/>
+          <a:ln>
+            <a:noFill/>
+          </a:ln>
+          <a:effectLst/>
+          <a:extLst>
+            <a:ext uri="{909E8E84-426E-40DD-AFC4-6F175D3DCCD1}">
+              <a14:hiddenFill xmlns:a14="http://schemas.microsoft.com/office/drawing/2010/main">
+                <a:solidFill>
+                  <a:schemeClr val="accent1"/>
+                </a:solidFill>
+              </a14:hiddenFill>
+            </a:ext>
+            <a:ext uri="{91240B29-F687-4F45-9708-019B960494DF}">
+              <a14:hiddenLine xmlns:a14="http://schemas.microsoft.com/office/drawing/2010/main" w="9525">
+                <a:solidFill>
+                  <a:schemeClr val="tx1"/>
+                </a:solidFill>
+                <a:miter lim="800000"/>
+                <a:headEnd/>
+                <a:tailEnd/>
+              </a14:hiddenLine>
+            </a:ext>
+            <a:ext uri="{AF507438-7753-43E0-B8FC-AC1667EBCBE1}">
+              <a14:hiddenEffects xmlns:a14="http://schemas.microsoft.com/office/drawing/2010/main">
+                <a:effectLst>
+                  <a:outerShdw dist="35921" dir="2700000" algn="ctr" rotWithShape="0">
+                    <a:schemeClr val="bg2"/>
+                  </a:outerShdw>
+                </a:effectLst>
+              </a14:hiddenEffects>
+            </a:ext>
+          </a:extLst>
+        </p:spPr>
+        <p:txBody>
+          <a:bodyPr vert="horz" wrap="none" lIns="0" tIns="0" rIns="0" bIns="0" numCol="1" anchor="ctr" anchorCtr="0" compatLnSpc="1">
+            <a:prstTxWarp prst="textNoShape">
+              <a:avLst/>
+            </a:prstTxWarp>
+            <a:spAutoFit/>
+          </a:bodyPr>
+          <a:lstStyle/>
+          <a:p>
+            <a:pPr marL="0" marR="0" lvl="0" indent="0" algn="l" defTabSz="914400" rtl="0" eaLnBrk="0" fontAlgn="base" latinLnBrk="0" hangingPunct="0">
+              <a:lnSpc>
+                <a:spcPct val="100000"/>
+              </a:lnSpc>
+              <a:spcBef>
+                <a:spcPct val="0"/>
+              </a:spcBef>
+              <a:spcAft>
+                <a:spcPct val="0"/>
+              </a:spcAft>
+              <a:buClrTx/>
+              <a:buSzTx/>
+              <a:buFontTx/>
+              <a:buNone/>
+              <a:tabLst/>
+            </a:pPr>
+            <a:r>
+              <a:rPr kumimoji="0" lang="en-US" altLang="en-US" sz="900" b="0" i="0" u="none" strike="noStrike" cap="none" normalizeH="0" baseline="0" dirty="0">
+                <a:ln>
+                  <a:noFill/>
+                </a:ln>
+                <a:solidFill>
+                  <a:schemeClr val="tx1"/>
+                </a:solidFill>
+                <a:effectLst/>
+                <a:latin typeface="inherit"/>
+              </a:rPr>
+              <a:t> </a:t>
+            </a:r>
+            <a:endParaRPr kumimoji="0" lang="en-US" altLang="en-US" sz="1800" b="0" i="0" u="none" strike="noStrike" cap="none" normalizeH="0" baseline="0" dirty="0">
+              <a:ln>
+                <a:noFill/>
+              </a:ln>
+              <a:solidFill>
+                <a:schemeClr val="tx1"/>
+              </a:solidFill>
+              <a:effectLst/>
+              <a:latin typeface="Arial" panose="020B0604020202020204" pitchFamily="34" charset="0"/>
+            </a:endParaRPr>
+          </a:p>
+        </p:txBody>
+      </p:sp>
+    </p:spTree>
+    <p:extLst>
+      <p:ext uri="{BB962C8B-B14F-4D97-AF65-F5344CB8AC3E}">
+        <p14:creationId xmlns:p14="http://schemas.microsoft.com/office/powerpoint/2010/main" val="3720701191"/>
       </p:ext>
     </p:extLst>
   </p:cSld>
@@ -25751,6 +29844,15 @@
 </file>
 
 <file path=customXml/item2.xml><?xml version="1.0" encoding="utf-8"?>
+<?mso-contentType ?>
+<FormTemplates xmlns="http://schemas.microsoft.com/sharepoint/v3/contenttype/forms">
+  <Display>DocumentLibraryForm</Display>
+  <Edit>DocumentLibraryForm</Edit>
+  <New>DocumentLibraryForm</New>
+</FormTemplates>
+</file>
+
+<file path=customXml/item3.xml><?xml version="1.0" encoding="utf-8"?>
 <ct:contentTypeSchema xmlns:ct="http://schemas.microsoft.com/office/2006/metadata/contentType" xmlns:ma="http://schemas.microsoft.com/office/2006/metadata/properties/metaAttributes" ct:_="" ma:_="" ma:contentTypeName="Document" ma:contentTypeID="0x01010079F111ED35F8CC479449609E8A0923A6" ma:contentTypeVersion="12" ma:contentTypeDescription="Create a new document." ma:contentTypeScope="" ma:versionID="426e97fa315356fffbdcd9876fe988c2">
   <xsd:schema xmlns:xsd="http://www.w3.org/2001/XMLSchema" xmlns:xs="http://www.w3.org/2001/XMLSchema" xmlns:p="http://schemas.microsoft.com/office/2006/metadata/properties" xmlns:ns2="71af3243-3dd4-4a8d-8c0d-dd76da1f02a5" xmlns:ns3="16c05727-aa75-4e4a-9b5f-8a80a1165891" targetNamespace="http://schemas.microsoft.com/office/2006/metadata/properties" ma:root="true" ma:fieldsID="14b8f0def80e6d70ce3def20c90759ae" ns2:_="" ns3:_="">
     <xsd:import namespace="71af3243-3dd4-4a8d-8c0d-dd76da1f02a5"/>
@@ -25971,15 +30073,6 @@
 </ct:contentTypeSchema>
 </file>
 
-<file path=customXml/item3.xml><?xml version="1.0" encoding="utf-8"?>
-<?mso-contentType ?>
-<FormTemplates xmlns="http://schemas.microsoft.com/sharepoint/v3/contenttype/forms">
-  <Display>DocumentLibraryForm</Display>
-  <Edit>DocumentLibraryForm</Edit>
-  <New>DocumentLibraryForm</New>
-</FormTemplates>
-</file>
-
 <file path=customXml/itemProps1.xml><?xml version="1.0" encoding="utf-8"?>
 <ds:datastoreItem xmlns:ds="http://schemas.openxmlformats.org/officeDocument/2006/customXml" ds:itemID="{84F503EC-3FFF-4193-A86F-39150E2BAC75}">
   <ds:schemaRefs>
@@ -25991,6 +30084,14 @@
 </file>
 
 <file path=customXml/itemProps2.xml><?xml version="1.0" encoding="utf-8"?>
+<ds:datastoreItem xmlns:ds="http://schemas.openxmlformats.org/officeDocument/2006/customXml" ds:itemID="{2E5ECA37-C458-4BA2-A090-D7A19E07B434}">
+  <ds:schemaRefs>
+    <ds:schemaRef ds:uri="http://schemas.microsoft.com/sharepoint/v3/contenttype/forms"/>
+  </ds:schemaRefs>
+</ds:datastoreItem>
+</file>
+
+<file path=customXml/itemProps3.xml><?xml version="1.0" encoding="utf-8"?>
 <ds:datastoreItem xmlns:ds="http://schemas.openxmlformats.org/officeDocument/2006/customXml" ds:itemID="{7A26AAF5-6CFC-4C52-B7DF-08410EDE6701}">
   <ds:schemaRefs>
     <ds:schemaRef ds:uri="http://schemas.microsoft.com/office/2006/metadata/contentType"/>
@@ -26007,12 +30108,4 @@
     <ds:schemaRef ds:uri="http://schemas.microsoft.com/internal/obd"/>
   </ds:schemaRefs>
 </ds:datastoreItem>
-</file>
-
-<file path=customXml/itemProps3.xml><?xml version="1.0" encoding="utf-8"?>
-<ds:datastoreItem xmlns:ds="http://schemas.openxmlformats.org/officeDocument/2006/customXml" ds:itemID="{2E5ECA37-C458-4BA2-A090-D7A19E07B434}">
-  <ds:schemaRefs>
-    <ds:schemaRef ds:uri="http://schemas.microsoft.com/sharepoint/v3/contenttype/forms"/>
-  </ds:schemaRefs>
-</ds:datastoreItem>
 </file>
</xml_diff>